<commit_message>
Update Report as well as Presentation files
</commit_message>
<xml_diff>
--- a/Group Project Presentation.pptx
+++ b/Group Project Presentation.pptx
@@ -4,10 +4,22 @@
   <p:sldMasterIdLst>
     <p:sldMasterId id="2147483648" r:id="rId1"/>
   </p:sldMasterIdLst>
+  <p:notesMasterIdLst>
+    <p:notesMasterId r:id="rId14"/>
+  </p:notesMasterIdLst>
   <p:sldIdLst>
     <p:sldId id="256" r:id="rId3"/>
-    <p:sldId id="257" r:id="rId4"/>
-    <p:sldId id="258" r:id="rId5"/>
+    <p:sldId id="265" r:id="rId4"/>
+    <p:sldId id="257" r:id="rId5"/>
+    <p:sldId id="258" r:id="rId6"/>
+    <p:sldId id="259" r:id="rId7"/>
+    <p:sldId id="260" r:id="rId8"/>
+    <p:sldId id="261" r:id="rId9"/>
+    <p:sldId id="262" r:id="rId10"/>
+    <p:sldId id="263" r:id="rId11"/>
+    <p:sldId id="264" r:id="rId12"/>
+    <p:sldId id="266" r:id="rId13"/>
+    <p:sldId id="267" r:id="rId15"/>
   </p:sldIdLst>
   <p:sldSz cx="12192000" cy="6858000"/>
   <p:notesSz cx="6858000" cy="9144000"/>
@@ -107,6 +119,397 @@
     </a:lvl9pPr>
   </p:defaultTextStyle>
 </p:presentation>
+</file>
+
+<file path=ppt/notesMasters/notesMaster1.xml><?xml version="1.0" encoding="utf-8"?>
+<p:notesMaster xmlns:a="http://schemas.openxmlformats.org/drawingml/2006/main" xmlns:r="http://schemas.openxmlformats.org/officeDocument/2006/relationships" xmlns:p="http://schemas.openxmlformats.org/presentationml/2006/main">
+  <p:cSld>
+    <p:bg>
+      <p:bgRef idx="1001">
+        <a:schemeClr val="bg1"/>
+      </p:bgRef>
+    </p:bg>
+    <p:spTree>
+      <p:nvGrpSpPr>
+        <p:cNvPr id="1" name=""/>
+        <p:cNvGrpSpPr/>
+        <p:nvPr/>
+      </p:nvGrpSpPr>
+      <p:grpSpPr>
+        <a:xfrm>
+          <a:off x="0" y="0"/>
+          <a:ext cx="0" cy="0"/>
+          <a:chOff x="0" y="0"/>
+          <a:chExt cx="0" cy="0"/>
+        </a:xfrm>
+      </p:grpSpPr>
+      <p:sp>
+        <p:nvSpPr>
+          <p:cNvPr id="2" name="Header Placeholder 1"/>
+          <p:cNvSpPr>
+            <a:spLocks noGrp="1"/>
+          </p:cNvSpPr>
+          <p:nvPr>
+            <p:ph type="hdr" sz="quarter"/>
+          </p:nvPr>
+        </p:nvSpPr>
+        <p:spPr>
+          <a:xfrm>
+            <a:off x="0" y="0"/>
+            <a:ext cx="2971800" cy="458788"/>
+          </a:xfrm>
+          <a:prstGeom prst="rect">
+            <a:avLst/>
+          </a:prstGeom>
+        </p:spPr>
+        <p:txBody>
+          <a:bodyPr vert="horz" lIns="91440" tIns="45720" rIns="91440" bIns="45720" rtlCol="0"/>
+          <a:lstStyle>
+            <a:lvl1pPr algn="l">
+              <a:defRPr sz="1200"/>
+            </a:lvl1pPr>
+          </a:lstStyle>
+          <a:p>
+            <a:endParaRPr lang="en-US"/>
+          </a:p>
+        </p:txBody>
+      </p:sp>
+      <p:sp>
+        <p:nvSpPr>
+          <p:cNvPr id="3" name="Date Placeholder 2"/>
+          <p:cNvSpPr>
+            <a:spLocks noGrp="1"/>
+          </p:cNvSpPr>
+          <p:nvPr>
+            <p:ph type="dt" idx="1"/>
+          </p:nvPr>
+        </p:nvSpPr>
+        <p:spPr>
+          <a:xfrm>
+            <a:off x="3884613" y="0"/>
+            <a:ext cx="2971800" cy="458788"/>
+          </a:xfrm>
+          <a:prstGeom prst="rect">
+            <a:avLst/>
+          </a:prstGeom>
+        </p:spPr>
+        <p:txBody>
+          <a:bodyPr vert="horz" lIns="91440" tIns="45720" rIns="91440" bIns="45720" rtlCol="0"/>
+          <a:lstStyle>
+            <a:lvl1pPr algn="r">
+              <a:defRPr sz="1200"/>
+            </a:lvl1pPr>
+          </a:lstStyle>
+          <a:p>
+            <a:fld id="{3EFD42F7-718C-4B98-AAEC-167E6DDD60A7}" type="datetimeFigureOut">
+              <a:rPr lang="en-US" smtClean="0"/>
+            </a:fld>
+            <a:endParaRPr lang="en-US"/>
+          </a:p>
+        </p:txBody>
+      </p:sp>
+      <p:sp>
+        <p:nvSpPr>
+          <p:cNvPr id="4" name="Slide Image Placeholder 3"/>
+          <p:cNvSpPr>
+            <a:spLocks noGrp="1" noRot="1" noChangeAspect="1"/>
+          </p:cNvSpPr>
+          <p:nvPr>
+            <p:ph type="sldImg" idx="2"/>
+          </p:nvPr>
+        </p:nvSpPr>
+        <p:spPr>
+          <a:xfrm>
+            <a:off x="685800" y="1143000"/>
+            <a:ext cx="5486400" cy="3086100"/>
+          </a:xfrm>
+          <a:prstGeom prst="rect">
+            <a:avLst/>
+          </a:prstGeom>
+          <a:noFill/>
+          <a:ln w="12700">
+            <a:solidFill>
+              <a:prstClr val="black"/>
+            </a:solidFill>
+          </a:ln>
+        </p:spPr>
+        <p:txBody>
+          <a:bodyPr vert="horz" lIns="91440" tIns="45720" rIns="91440" bIns="45720" rtlCol="0" anchor="ctr"/>
+          <a:lstStyle/>
+          <a:p>
+            <a:endParaRPr lang="en-US"/>
+          </a:p>
+        </p:txBody>
+      </p:sp>
+      <p:sp>
+        <p:nvSpPr>
+          <p:cNvPr id="5" name="Notes Placeholder 4"/>
+          <p:cNvSpPr>
+            <a:spLocks noGrp="1"/>
+          </p:cNvSpPr>
+          <p:nvPr>
+            <p:ph type="body" sz="quarter" idx="3"/>
+          </p:nvPr>
+        </p:nvSpPr>
+        <p:spPr>
+          <a:xfrm>
+            <a:off x="685800" y="4400550"/>
+            <a:ext cx="5486400" cy="3600450"/>
+          </a:xfrm>
+          <a:prstGeom prst="rect">
+            <a:avLst/>
+          </a:prstGeom>
+        </p:spPr>
+        <p:txBody>
+          <a:bodyPr vert="horz" lIns="91440" tIns="45720" rIns="91440" bIns="45720" rtlCol="0"/>
+          <a:lstStyle/>
+          <a:p>
+            <a:pPr lvl="0"/>
+            <a:r>
+              <a:rPr lang="en-US" smtClean="0"/>
+              <a:t>Click to edit Master text styles</a:t>
+            </a:r>
+            <a:endParaRPr lang="en-US" smtClean="0"/>
+          </a:p>
+          <a:p>
+            <a:pPr lvl="1"/>
+            <a:r>
+              <a:rPr lang="en-US" smtClean="0"/>
+              <a:t>Second level</a:t>
+            </a:r>
+            <a:endParaRPr lang="en-US" smtClean="0"/>
+          </a:p>
+          <a:p>
+            <a:pPr lvl="2"/>
+            <a:r>
+              <a:rPr lang="en-US" smtClean="0"/>
+              <a:t>Third level</a:t>
+            </a:r>
+            <a:endParaRPr lang="en-US" smtClean="0"/>
+          </a:p>
+          <a:p>
+            <a:pPr lvl="3"/>
+            <a:r>
+              <a:rPr lang="en-US" smtClean="0"/>
+              <a:t>Fourth level</a:t>
+            </a:r>
+            <a:endParaRPr lang="en-US" smtClean="0"/>
+          </a:p>
+          <a:p>
+            <a:pPr lvl="4"/>
+            <a:r>
+              <a:rPr lang="en-US" smtClean="0"/>
+              <a:t>Fifth level</a:t>
+            </a:r>
+            <a:endParaRPr lang="en-US"/>
+          </a:p>
+        </p:txBody>
+      </p:sp>
+      <p:sp>
+        <p:nvSpPr>
+          <p:cNvPr id="6" name="Footer Placeholder 5"/>
+          <p:cNvSpPr>
+            <a:spLocks noGrp="1"/>
+          </p:cNvSpPr>
+          <p:nvPr>
+            <p:ph type="ftr" sz="quarter" idx="4"/>
+          </p:nvPr>
+        </p:nvSpPr>
+        <p:spPr>
+          <a:xfrm>
+            <a:off x="0" y="8685213"/>
+            <a:ext cx="2971800" cy="458787"/>
+          </a:xfrm>
+          <a:prstGeom prst="rect">
+            <a:avLst/>
+          </a:prstGeom>
+        </p:spPr>
+        <p:txBody>
+          <a:bodyPr vert="horz" lIns="91440" tIns="45720" rIns="91440" bIns="45720" rtlCol="0" anchor="b"/>
+          <a:lstStyle>
+            <a:lvl1pPr algn="l">
+              <a:defRPr sz="1200"/>
+            </a:lvl1pPr>
+          </a:lstStyle>
+          <a:p>
+            <a:endParaRPr lang="en-US"/>
+          </a:p>
+        </p:txBody>
+      </p:sp>
+      <p:sp>
+        <p:nvSpPr>
+          <p:cNvPr id="7" name="Slide Number Placeholder 6"/>
+          <p:cNvSpPr>
+            <a:spLocks noGrp="1"/>
+          </p:cNvSpPr>
+          <p:nvPr>
+            <p:ph type="sldNum" sz="quarter" idx="5"/>
+          </p:nvPr>
+        </p:nvSpPr>
+        <p:spPr>
+          <a:xfrm>
+            <a:off x="3884613" y="8685213"/>
+            <a:ext cx="2971800" cy="458787"/>
+          </a:xfrm>
+          <a:prstGeom prst="rect">
+            <a:avLst/>
+          </a:prstGeom>
+        </p:spPr>
+        <p:txBody>
+          <a:bodyPr vert="horz" lIns="91440" tIns="45720" rIns="91440" bIns="45720" rtlCol="0" anchor="b"/>
+          <a:lstStyle>
+            <a:lvl1pPr algn="r">
+              <a:defRPr sz="1200"/>
+            </a:lvl1pPr>
+          </a:lstStyle>
+          <a:p>
+            <a:fld id="{21B2AA4F-B828-4D7C-AFD3-893933DAFCB4}" type="slidenum">
+              <a:rPr lang="en-US" smtClean="0"/>
+            </a:fld>
+            <a:endParaRPr lang="en-US"/>
+          </a:p>
+        </p:txBody>
+      </p:sp>
+    </p:spTree>
+  </p:cSld>
+  <p:clrMap bg1="lt1" tx1="dk1" bg2="lt2" tx2="dk2" accent1="accent1" accent2="accent2" accent3="accent3" accent4="accent4" accent5="accent5" accent6="accent6" hlink="hlink" folHlink="folHlink"/>
+  <p:notesStyle>
+    <a:lvl1pPr marL="0" algn="l" defTabSz="914400" rtl="0" eaLnBrk="1" latinLnBrk="0" hangingPunct="1">
+      <a:defRPr sz="1200" kern="1200">
+        <a:solidFill>
+          <a:schemeClr val="tx1"/>
+        </a:solidFill>
+        <a:latin typeface="+mn-lt"/>
+        <a:ea typeface="+mn-ea"/>
+        <a:cs typeface="+mn-cs"/>
+      </a:defRPr>
+    </a:lvl1pPr>
+    <a:lvl2pPr marL="457200" algn="l" defTabSz="914400" rtl="0" eaLnBrk="1" latinLnBrk="0" hangingPunct="1">
+      <a:defRPr sz="1200" kern="1200">
+        <a:solidFill>
+          <a:schemeClr val="tx1"/>
+        </a:solidFill>
+        <a:latin typeface="+mn-lt"/>
+        <a:ea typeface="+mn-ea"/>
+        <a:cs typeface="+mn-cs"/>
+      </a:defRPr>
+    </a:lvl2pPr>
+    <a:lvl3pPr marL="914400" algn="l" defTabSz="914400" rtl="0" eaLnBrk="1" latinLnBrk="0" hangingPunct="1">
+      <a:defRPr sz="1200" kern="1200">
+        <a:solidFill>
+          <a:schemeClr val="tx1"/>
+        </a:solidFill>
+        <a:latin typeface="+mn-lt"/>
+        <a:ea typeface="+mn-ea"/>
+        <a:cs typeface="+mn-cs"/>
+      </a:defRPr>
+    </a:lvl3pPr>
+    <a:lvl4pPr marL="1371600" algn="l" defTabSz="914400" rtl="0" eaLnBrk="1" latinLnBrk="0" hangingPunct="1">
+      <a:defRPr sz="1200" kern="1200">
+        <a:solidFill>
+          <a:schemeClr val="tx1"/>
+        </a:solidFill>
+        <a:latin typeface="+mn-lt"/>
+        <a:ea typeface="+mn-ea"/>
+        <a:cs typeface="+mn-cs"/>
+      </a:defRPr>
+    </a:lvl4pPr>
+    <a:lvl5pPr marL="1828800" algn="l" defTabSz="914400" rtl="0" eaLnBrk="1" latinLnBrk="0" hangingPunct="1">
+      <a:defRPr sz="1200" kern="1200">
+        <a:solidFill>
+          <a:schemeClr val="tx1"/>
+        </a:solidFill>
+        <a:latin typeface="+mn-lt"/>
+        <a:ea typeface="+mn-ea"/>
+        <a:cs typeface="+mn-cs"/>
+      </a:defRPr>
+    </a:lvl5pPr>
+    <a:lvl6pPr marL="2286000" algn="l" defTabSz="914400" rtl="0" eaLnBrk="1" latinLnBrk="0" hangingPunct="1">
+      <a:defRPr sz="1200" kern="1200">
+        <a:solidFill>
+          <a:schemeClr val="tx1"/>
+        </a:solidFill>
+        <a:latin typeface="+mn-lt"/>
+        <a:ea typeface="+mn-ea"/>
+        <a:cs typeface="+mn-cs"/>
+      </a:defRPr>
+    </a:lvl6pPr>
+    <a:lvl7pPr marL="2743200" algn="l" defTabSz="914400" rtl="0" eaLnBrk="1" latinLnBrk="0" hangingPunct="1">
+      <a:defRPr sz="1200" kern="1200">
+        <a:solidFill>
+          <a:schemeClr val="tx1"/>
+        </a:solidFill>
+        <a:latin typeface="+mn-lt"/>
+        <a:ea typeface="+mn-ea"/>
+        <a:cs typeface="+mn-cs"/>
+      </a:defRPr>
+    </a:lvl7pPr>
+    <a:lvl8pPr marL="3200400" algn="l" defTabSz="914400" rtl="0" eaLnBrk="1" latinLnBrk="0" hangingPunct="1">
+      <a:defRPr sz="1200" kern="1200">
+        <a:solidFill>
+          <a:schemeClr val="tx1"/>
+        </a:solidFill>
+        <a:latin typeface="+mn-lt"/>
+        <a:ea typeface="+mn-ea"/>
+        <a:cs typeface="+mn-cs"/>
+      </a:defRPr>
+    </a:lvl8pPr>
+    <a:lvl9pPr marL="3657600" algn="l" defTabSz="914400" rtl="0" eaLnBrk="1" latinLnBrk="0" hangingPunct="1">
+      <a:defRPr sz="1200" kern="1200">
+        <a:solidFill>
+          <a:schemeClr val="tx1"/>
+        </a:solidFill>
+        <a:latin typeface="+mn-lt"/>
+        <a:ea typeface="+mn-ea"/>
+        <a:cs typeface="+mn-cs"/>
+      </a:defRPr>
+    </a:lvl9pPr>
+  </p:notesStyle>
+</p:notesMaster>
+</file>
+
+<file path=ppt/notesSlides/notesSlide1.xml><?xml version="1.0" encoding="utf-8"?>
+<p:notes xmlns:a="http://schemas.openxmlformats.org/drawingml/2006/main" xmlns:r="http://schemas.openxmlformats.org/officeDocument/2006/relationships" xmlns:p="http://schemas.openxmlformats.org/presentationml/2006/main">
+  <p:cSld>
+    <p:spTree>
+      <p:nvGrpSpPr>
+        <p:cNvPr id="1" name=""/>
+        <p:cNvGrpSpPr/>
+        <p:nvPr/>
+      </p:nvGrpSpPr>
+      <p:grpSpPr/>
+      <p:sp>
+        <p:nvSpPr>
+          <p:cNvPr id="2" name="Slide Image Placeholder 1"/>
+          <p:cNvSpPr/>
+          <p:nvPr>
+            <p:ph type="sldImg" idx="2"/>
+          </p:nvPr>
+        </p:nvSpPr>
+        <p:spPr/>
+      </p:sp>
+      <p:sp>
+        <p:nvSpPr>
+          <p:cNvPr id="3" name="Text Placeholder 2"/>
+          <p:cNvSpPr/>
+          <p:nvPr>
+            <p:ph type="body" idx="3"/>
+          </p:nvPr>
+        </p:nvSpPr>
+        <p:spPr/>
+        <p:txBody>
+          <a:bodyPr/>
+          <a:p>
+            <a:endParaRPr lang="en-US"/>
+          </a:p>
+        </p:txBody>
+      </p:sp>
+    </p:spTree>
+  </p:cSld>
+  <p:clrMapOvr>
+    <a:masterClrMapping/>
+  </p:clrMapOvr>
+</p:notes>
 </file>
 
 <file path=ppt/slideLayouts/slideLayout1.xml><?xml version="1.0" encoding="utf-8"?>
@@ -2961,6 +3364,248 @@
           <a:bodyPr/>
           <a:lstStyle/>
           <a:p>
+            <a:r>
+              <a:rPr lang="en-US"/>
+              <a:t>Insight into New Zealand economics - A data science approach</a:t>
+            </a:r>
+            <a:endParaRPr lang="en-US"/>
+          </a:p>
+        </p:txBody>
+      </p:sp>
+    </p:spTree>
+  </p:cSld>
+  <p:clrMapOvr>
+    <a:masterClrMapping/>
+  </p:clrMapOvr>
+</p:sld>
+</file>
+
+<file path=ppt/slides/slide10.xml><?xml version="1.0" encoding="utf-8"?>
+<p:sld xmlns:a="http://schemas.openxmlformats.org/drawingml/2006/main" xmlns:r="http://schemas.openxmlformats.org/officeDocument/2006/relationships" xmlns:p="http://schemas.openxmlformats.org/presentationml/2006/main">
+  <p:cSld>
+    <p:spTree>
+      <p:nvGrpSpPr>
+        <p:cNvPr id="1" name=""/>
+        <p:cNvGrpSpPr/>
+        <p:nvPr/>
+      </p:nvGrpSpPr>
+      <p:grpSpPr/>
+      <p:sp>
+        <p:nvSpPr>
+          <p:cNvPr id="2" name="Title 1"/>
+          <p:cNvSpPr>
+            <a:spLocks noGrp="1"/>
+          </p:cNvSpPr>
+          <p:nvPr>
+            <p:ph type="title"/>
+          </p:nvPr>
+        </p:nvSpPr>
+        <p:spPr/>
+        <p:txBody>
+          <a:bodyPr/>
+          <a:p>
+            <a:r>
+              <a:rPr lang="en-US"/>
+              <a:t>Charts Generated </a:t>
+            </a:r>
+            <a:endParaRPr lang="en-US"/>
+          </a:p>
+        </p:txBody>
+      </p:sp>
+      <p:pic>
+        <p:nvPicPr>
+          <p:cNvPr id="4" name="Content Placeholder 3"/>
+          <p:cNvPicPr>
+            <a:picLocks noChangeAspect="1"/>
+          </p:cNvPicPr>
+          <p:nvPr>
+            <p:ph idx="1"/>
+          </p:nvPr>
+        </p:nvPicPr>
+        <p:blipFill>
+          <a:blip r:embed="rId1"/>
+          <a:stretch>
+            <a:fillRect/>
+          </a:stretch>
+        </p:blipFill>
+        <p:spPr>
+          <a:xfrm>
+            <a:off x="3265170" y="1825625"/>
+            <a:ext cx="5661025" cy="4351655"/>
+          </a:xfrm>
+          <a:prstGeom prst="rect">
+            <a:avLst/>
+          </a:prstGeom>
+        </p:spPr>
+      </p:pic>
+    </p:spTree>
+  </p:cSld>
+  <p:clrMapOvr>
+    <a:masterClrMapping/>
+  </p:clrMapOvr>
+</p:sld>
+</file>
+
+<file path=ppt/slides/slide11.xml><?xml version="1.0" encoding="utf-8"?>
+<p:sld xmlns:a="http://schemas.openxmlformats.org/drawingml/2006/main" xmlns:r="http://schemas.openxmlformats.org/officeDocument/2006/relationships" xmlns:p="http://schemas.openxmlformats.org/presentationml/2006/main">
+  <p:cSld>
+    <p:spTree>
+      <p:nvGrpSpPr>
+        <p:cNvPr id="1" name=""/>
+        <p:cNvGrpSpPr/>
+        <p:nvPr/>
+      </p:nvGrpSpPr>
+      <p:grpSpPr/>
+      <p:sp>
+        <p:nvSpPr>
+          <p:cNvPr id="2" name="Title 1"/>
+          <p:cNvSpPr>
+            <a:spLocks noGrp="1"/>
+          </p:cNvSpPr>
+          <p:nvPr>
+            <p:ph type="title"/>
+          </p:nvPr>
+        </p:nvSpPr>
+        <p:spPr/>
+        <p:txBody>
+          <a:bodyPr/>
+          <a:p>
+            <a:r>
+              <a:rPr lang="en-US"/>
+              <a:t>Conclusions</a:t>
+            </a:r>
+            <a:endParaRPr lang="en-US"/>
+          </a:p>
+        </p:txBody>
+      </p:sp>
+      <p:sp>
+        <p:nvSpPr>
+          <p:cNvPr id="3" name="Content Placeholder 2"/>
+          <p:cNvSpPr>
+            <a:spLocks noGrp="1"/>
+          </p:cNvSpPr>
+          <p:nvPr>
+            <p:ph idx="1"/>
+          </p:nvPr>
+        </p:nvSpPr>
+        <p:spPr/>
+        <p:txBody>
+          <a:bodyPr>
+            <a:normAutofit fontScale="90000"/>
+          </a:bodyPr>
+          <a:p>
+            <a:r>
+              <a:rPr lang="en-US"/>
+              <a:t>Based on the data we have collected as well as what subsequent plots generated based on that.  The following insights have been reviewed. </a:t>
+            </a:r>
+            <a:endParaRPr lang="en-US"/>
+          </a:p>
+          <a:p>
+            <a:pPr lvl="1"/>
+            <a:r>
+              <a:rPr lang="en-US"/>
+              <a:t>As New Zealand Reserve Bank sets its interest rate up, various business will have difficult of getting cheap loans for further development, therefore business activities have been reduced, which leads to increase of unemployment. </a:t>
+            </a:r>
+            <a:endParaRPr lang="en-US"/>
+          </a:p>
+          <a:p>
+            <a:pPr lvl="1"/>
+            <a:r>
+              <a:rPr lang="en-US"/>
+              <a:t>On the other hand, increase of Reserve Bank interest rate will attract oversea hot money for short term investment, therefore it is anticipated that exchange rate of New Zealand dollars VS. Other currency will go up. The high Reserve bank interest rate will lead to lower level of economic activities, hence in term of cargo freight statistics, general vehicle activities and tourism account, we are anticipating dropping in these activities.</a:t>
+            </a:r>
+            <a:endParaRPr lang="en-US"/>
+          </a:p>
+          <a:p>
+            <a:pPr lvl="1"/>
+            <a:r>
+              <a:rPr lang="en-US"/>
+              <a:t>However, Reserve Bank raise interest rate usually to combat high inflation rate (CPI), therefore, we should be expecting dropping of the CPI.</a:t>
+            </a:r>
+            <a:endParaRPr lang="en-US"/>
+          </a:p>
+        </p:txBody>
+      </p:sp>
+    </p:spTree>
+  </p:cSld>
+  <p:clrMapOvr>
+    <a:masterClrMapping/>
+  </p:clrMapOvr>
+</p:sld>
+</file>
+
+<file path=ppt/slides/slide12.xml><?xml version="1.0" encoding="utf-8"?>
+<p:sld xmlns:a="http://schemas.openxmlformats.org/drawingml/2006/main" xmlns:r="http://schemas.openxmlformats.org/officeDocument/2006/relationships" xmlns:p="http://schemas.openxmlformats.org/presentationml/2006/main">
+  <p:cSld>
+    <p:spTree>
+      <p:nvGrpSpPr>
+        <p:cNvPr id="1" name=""/>
+        <p:cNvGrpSpPr/>
+        <p:nvPr/>
+      </p:nvGrpSpPr>
+      <p:grpSpPr/>
+      <p:sp>
+        <p:nvSpPr>
+          <p:cNvPr id="2" name="Title 1"/>
+          <p:cNvSpPr>
+            <a:spLocks noGrp="1"/>
+          </p:cNvSpPr>
+          <p:nvPr>
+            <p:ph type="title"/>
+          </p:nvPr>
+        </p:nvSpPr>
+        <p:spPr/>
+        <p:txBody>
+          <a:bodyPr/>
+          <a:p>
+            <a:endParaRPr lang="en-US"/>
+          </a:p>
+        </p:txBody>
+      </p:sp>
+      <p:sp>
+        <p:nvSpPr>
+          <p:cNvPr id="3" name="Content Placeholder 2"/>
+          <p:cNvSpPr>
+            <a:spLocks noGrp="1"/>
+          </p:cNvSpPr>
+          <p:nvPr>
+            <p:ph idx="1"/>
+          </p:nvPr>
+        </p:nvSpPr>
+        <p:spPr/>
+        <p:txBody>
+          <a:bodyPr>
+            <a:normAutofit lnSpcReduction="20000"/>
+          </a:bodyPr>
+          <a:p>
+            <a:r>
+              <a:rPr lang="en-US"/>
+              <a:t>When the economic activities are low and unemployment rate is high </a:t>
+            </a:r>
+            <a:endParaRPr lang="en-US"/>
+          </a:p>
+          <a:p>
+            <a:pPr lvl="1"/>
+            <a:r>
+              <a:rPr lang="en-US"/>
+              <a:t>New Zealand government is under pressure to unleash new monetary policies to stimulate economy. Hence government usually resolve to lower reserve bank interest rate. </a:t>
+            </a:r>
+            <a:endParaRPr lang="en-US"/>
+          </a:p>
+          <a:p>
+            <a:pPr lvl="1"/>
+            <a:r>
+              <a:rPr lang="en-US"/>
+              <a:t>With high reserve bank interest rate, we should be able to observe weak New Zealand dollars VS other currency. Thus make export of our products cheaper, therefore attracts more oversea orders, subsequently we should be able to observe an increase of freight transportation activities, oversea passage flights. </a:t>
+            </a:r>
+            <a:endParaRPr lang="en-US"/>
+          </a:p>
+          <a:p>
+            <a:pPr lvl="1"/>
+            <a:r>
+              <a:rPr lang="en-US"/>
+              <a:t>To stimulate general economic growth, government usually starts major infrastructural projects like major road works, etc. Hence it is also anticipated that general road construction activities are increasing.</a:t>
+            </a:r>
             <a:endParaRPr lang="en-US"/>
           </a:p>
         </p:txBody>
@@ -2999,7 +3644,7 @@
           <a:p>
             <a:r>
               <a:rPr lang="en-US"/>
-              <a:t>What do we want to collect</a:t>
+              <a:t>Overview</a:t>
             </a:r>
             <a:endParaRPr lang="en-US"/>
           </a:p>
@@ -3019,17 +3664,6 @@
         <p:txBody>
           <a:bodyPr/>
           <a:p>
-            <a:r>
-              <a:rPr lang="en-US"/>
-              <a:t>Historical economical activity data for New Zeland</a:t>
-            </a:r>
-            <a:endParaRPr lang="en-US"/>
-          </a:p>
-          <a:p>
-            <a:r>
-              <a:rPr lang="en-US"/>
-              <a:t>Economical policy data of New Zealand Government</a:t>
-            </a:r>
             <a:endParaRPr lang="en-US"/>
           </a:p>
         </p:txBody>
@@ -3068,6 +3702,75 @@
           <a:p>
             <a:r>
               <a:rPr lang="en-US"/>
+              <a:t>What do we want to collect</a:t>
+            </a:r>
+            <a:endParaRPr lang="en-US"/>
+          </a:p>
+        </p:txBody>
+      </p:sp>
+      <p:sp>
+        <p:nvSpPr>
+          <p:cNvPr id="3" name="Content Placeholder 2"/>
+          <p:cNvSpPr>
+            <a:spLocks noGrp="1"/>
+          </p:cNvSpPr>
+          <p:nvPr>
+            <p:ph idx="1"/>
+          </p:nvPr>
+        </p:nvSpPr>
+        <p:spPr/>
+        <p:txBody>
+          <a:bodyPr/>
+          <a:p>
+            <a:r>
+              <a:rPr lang="en-US"/>
+              <a:t>Historical economical activity data for New Zeland</a:t>
+            </a:r>
+            <a:endParaRPr lang="en-US"/>
+          </a:p>
+          <a:p>
+            <a:r>
+              <a:rPr lang="en-US"/>
+              <a:t>Economical policy data of New Zealand Government</a:t>
+            </a:r>
+            <a:endParaRPr lang="en-US"/>
+          </a:p>
+        </p:txBody>
+      </p:sp>
+    </p:spTree>
+  </p:cSld>
+  <p:clrMapOvr>
+    <a:masterClrMapping/>
+  </p:clrMapOvr>
+</p:sld>
+</file>
+
+<file path=ppt/slides/slide4.xml><?xml version="1.0" encoding="utf-8"?>
+<p:sld xmlns:a="http://schemas.openxmlformats.org/drawingml/2006/main" xmlns:r="http://schemas.openxmlformats.org/officeDocument/2006/relationships" xmlns:p="http://schemas.openxmlformats.org/presentationml/2006/main">
+  <p:cSld>
+    <p:spTree>
+      <p:nvGrpSpPr>
+        <p:cNvPr id="1" name=""/>
+        <p:cNvGrpSpPr/>
+        <p:nvPr/>
+      </p:nvGrpSpPr>
+      <p:grpSpPr/>
+      <p:sp>
+        <p:nvSpPr>
+          <p:cNvPr id="2" name="Title 1"/>
+          <p:cNvSpPr>
+            <a:spLocks noGrp="1"/>
+          </p:cNvSpPr>
+          <p:nvPr>
+            <p:ph type="title"/>
+          </p:nvPr>
+        </p:nvSpPr>
+        <p:spPr/>
+        <p:txBody>
+          <a:bodyPr/>
+          <a:p>
+            <a:r>
+              <a:rPr lang="en-US"/>
               <a:t>Why do we choose these data sources</a:t>
             </a:r>
             <a:endParaRPr lang="en-US"/>
@@ -3103,6 +3806,310 @@
           </a:p>
         </p:txBody>
       </p:sp>
+    </p:spTree>
+  </p:cSld>
+  <p:clrMapOvr>
+    <a:masterClrMapping/>
+  </p:clrMapOvr>
+</p:sld>
+</file>
+
+<file path=ppt/slides/slide5.xml><?xml version="1.0" encoding="utf-8"?>
+<p:sld xmlns:a="http://schemas.openxmlformats.org/drawingml/2006/main" xmlns:r="http://schemas.openxmlformats.org/officeDocument/2006/relationships" xmlns:p="http://schemas.openxmlformats.org/presentationml/2006/main">
+  <p:cSld>
+    <p:spTree>
+      <p:nvGrpSpPr>
+        <p:cNvPr id="1" name=""/>
+        <p:cNvGrpSpPr/>
+        <p:nvPr/>
+      </p:nvGrpSpPr>
+      <p:grpSpPr/>
+      <p:sp>
+        <p:nvSpPr>
+          <p:cNvPr id="2" name="Title 1"/>
+          <p:cNvSpPr>
+            <a:spLocks noGrp="1"/>
+          </p:cNvSpPr>
+          <p:nvPr>
+            <p:ph type="title"/>
+          </p:nvPr>
+        </p:nvSpPr>
+        <p:spPr/>
+        <p:txBody>
+          <a:bodyPr>
+            <a:normAutofit fontScale="90000"/>
+          </a:bodyPr>
+          <a:p>
+            <a:r>
+              <a:rPr lang="en-US"/>
+              <a:t>What target you chose (I.e.n what is the intended use of the data, …)</a:t>
+            </a:r>
+            <a:endParaRPr lang="en-US"/>
+          </a:p>
+        </p:txBody>
+      </p:sp>
+      <p:sp>
+        <p:nvSpPr>
+          <p:cNvPr id="3" name="Content Placeholder 2"/>
+          <p:cNvSpPr>
+            <a:spLocks noGrp="1"/>
+          </p:cNvSpPr>
+          <p:nvPr>
+            <p:ph idx="1"/>
+          </p:nvPr>
+        </p:nvSpPr>
+        <p:spPr/>
+        <p:txBody>
+          <a:bodyPr/>
+          <a:p>
+            <a:endParaRPr lang="en-US"/>
+          </a:p>
+        </p:txBody>
+      </p:sp>
+    </p:spTree>
+  </p:cSld>
+  <p:clrMapOvr>
+    <a:masterClrMapping/>
+  </p:clrMapOvr>
+</p:sld>
+</file>
+
+<file path=ppt/slides/slide6.xml><?xml version="1.0" encoding="utf-8"?>
+<p:sld xmlns:a="http://schemas.openxmlformats.org/drawingml/2006/main" xmlns:r="http://schemas.openxmlformats.org/officeDocument/2006/relationships" xmlns:p="http://schemas.openxmlformats.org/presentationml/2006/main">
+  <p:cSld>
+    <p:spTree>
+      <p:nvGrpSpPr>
+        <p:cNvPr id="1" name=""/>
+        <p:cNvGrpSpPr/>
+        <p:nvPr/>
+      </p:nvGrpSpPr>
+      <p:grpSpPr/>
+      <p:sp>
+        <p:nvSpPr>
+          <p:cNvPr id="2" name="Title 1"/>
+          <p:cNvSpPr>
+            <a:spLocks noGrp="1"/>
+          </p:cNvSpPr>
+          <p:nvPr>
+            <p:ph type="title"/>
+          </p:nvPr>
+        </p:nvSpPr>
+        <p:spPr/>
+        <p:txBody>
+          <a:bodyPr>
+            <a:normAutofit fontScale="90000"/>
+          </a:bodyPr>
+          <a:p>
+            <a:r>
+              <a:rPr lang="en-US"/>
+              <a:t>What difficulties you have to overcome to wrangle the data sources into the target data model</a:t>
+            </a:r>
+            <a:endParaRPr lang="en-US"/>
+          </a:p>
+        </p:txBody>
+      </p:sp>
+      <p:sp>
+        <p:nvSpPr>
+          <p:cNvPr id="3" name="Content Placeholder 2"/>
+          <p:cNvSpPr>
+            <a:spLocks noGrp="1"/>
+          </p:cNvSpPr>
+          <p:nvPr>
+            <p:ph idx="1"/>
+          </p:nvPr>
+        </p:nvSpPr>
+        <p:spPr/>
+        <p:txBody>
+          <a:bodyPr/>
+          <a:p>
+            <a:endParaRPr lang="en-US"/>
+          </a:p>
+        </p:txBody>
+      </p:sp>
+    </p:spTree>
+  </p:cSld>
+  <p:clrMapOvr>
+    <a:masterClrMapping/>
+  </p:clrMapOvr>
+</p:sld>
+</file>
+
+<file path=ppt/slides/slide7.xml><?xml version="1.0" encoding="utf-8"?>
+<p:sld xmlns:a="http://schemas.openxmlformats.org/drawingml/2006/main" xmlns:r="http://schemas.openxmlformats.org/officeDocument/2006/relationships" xmlns:p="http://schemas.openxmlformats.org/presentationml/2006/main">
+  <p:cSld>
+    <p:spTree>
+      <p:nvGrpSpPr>
+        <p:cNvPr id="1" name=""/>
+        <p:cNvGrpSpPr/>
+        <p:nvPr/>
+      </p:nvGrpSpPr>
+      <p:grpSpPr/>
+      <p:sp>
+        <p:nvSpPr>
+          <p:cNvPr id="2" name="Title 1"/>
+          <p:cNvSpPr>
+            <a:spLocks noGrp="1"/>
+          </p:cNvSpPr>
+          <p:nvPr>
+            <p:ph type="title"/>
+          </p:nvPr>
+        </p:nvSpPr>
+        <p:spPr/>
+        <p:txBody>
+          <a:bodyPr/>
+          <a:p>
+            <a:r>
+              <a:rPr lang="en-US"/>
+              <a:t>What techniques you did see</a:t>
+            </a:r>
+            <a:endParaRPr lang="en-US"/>
+          </a:p>
+        </p:txBody>
+      </p:sp>
+      <p:sp>
+        <p:nvSpPr>
+          <p:cNvPr id="3" name="Content Placeholder 2"/>
+          <p:cNvSpPr>
+            <a:spLocks noGrp="1"/>
+          </p:cNvSpPr>
+          <p:nvPr>
+            <p:ph idx="1"/>
+          </p:nvPr>
+        </p:nvSpPr>
+        <p:spPr/>
+        <p:txBody>
+          <a:bodyPr/>
+          <a:p>
+            <a:endParaRPr lang="en-US"/>
+          </a:p>
+        </p:txBody>
+      </p:sp>
+    </p:spTree>
+  </p:cSld>
+  <p:clrMapOvr>
+    <a:masterClrMapping/>
+  </p:clrMapOvr>
+</p:sld>
+</file>
+
+<file path=ppt/slides/slide8.xml><?xml version="1.0" encoding="utf-8"?>
+<p:sld xmlns:a="http://schemas.openxmlformats.org/drawingml/2006/main" xmlns:r="http://schemas.openxmlformats.org/officeDocument/2006/relationships" xmlns:p="http://schemas.openxmlformats.org/presentationml/2006/main">
+  <p:cSld>
+    <p:spTree>
+      <p:nvGrpSpPr>
+        <p:cNvPr id="1" name=""/>
+        <p:cNvGrpSpPr/>
+        <p:nvPr/>
+      </p:nvGrpSpPr>
+      <p:grpSpPr/>
+      <p:sp>
+        <p:nvSpPr>
+          <p:cNvPr id="2" name="Title 1"/>
+          <p:cNvSpPr>
+            <a:spLocks noGrp="1"/>
+          </p:cNvSpPr>
+          <p:nvPr>
+            <p:ph type="title"/>
+          </p:nvPr>
+        </p:nvSpPr>
+        <p:spPr/>
+        <p:txBody>
+          <a:bodyPr>
+            <a:normAutofit fontScale="90000"/>
+          </a:bodyPr>
+          <a:p>
+            <a:r>
+              <a:rPr lang="en-US"/>
+              <a:t>What you managed to achieve and what you failed to do  </a:t>
+            </a:r>
+            <a:endParaRPr lang="en-US"/>
+          </a:p>
+        </p:txBody>
+      </p:sp>
+      <p:sp>
+        <p:nvSpPr>
+          <p:cNvPr id="3" name="Content Placeholder 2"/>
+          <p:cNvSpPr>
+            <a:spLocks noGrp="1"/>
+          </p:cNvSpPr>
+          <p:nvPr>
+            <p:ph idx="1"/>
+          </p:nvPr>
+        </p:nvSpPr>
+        <p:spPr/>
+        <p:txBody>
+          <a:bodyPr/>
+          <a:p>
+            <a:endParaRPr lang="en-US"/>
+          </a:p>
+        </p:txBody>
+      </p:sp>
+    </p:spTree>
+  </p:cSld>
+  <p:clrMapOvr>
+    <a:masterClrMapping/>
+  </p:clrMapOvr>
+</p:sld>
+</file>
+
+<file path=ppt/slides/slide9.xml><?xml version="1.0" encoding="utf-8"?>
+<p:sld xmlns:a="http://schemas.openxmlformats.org/drawingml/2006/main" xmlns:r="http://schemas.openxmlformats.org/officeDocument/2006/relationships" xmlns:p="http://schemas.openxmlformats.org/presentationml/2006/main">
+  <p:cSld>
+    <p:spTree>
+      <p:nvGrpSpPr>
+        <p:cNvPr id="1" name=""/>
+        <p:cNvGrpSpPr/>
+        <p:nvPr/>
+      </p:nvGrpSpPr>
+      <p:grpSpPr/>
+      <p:sp>
+        <p:nvSpPr>
+          <p:cNvPr id="2" name="Title 1"/>
+          <p:cNvSpPr>
+            <a:spLocks noGrp="1"/>
+          </p:cNvSpPr>
+          <p:nvPr>
+            <p:ph type="title"/>
+          </p:nvPr>
+        </p:nvSpPr>
+        <p:spPr/>
+        <p:txBody>
+          <a:bodyPr/>
+          <a:p>
+            <a:r>
+              <a:rPr lang="en-US"/>
+              <a:t>Charts generated to </a:t>
+            </a:r>
+            <a:endParaRPr lang="en-US"/>
+          </a:p>
+        </p:txBody>
+      </p:sp>
+      <p:pic>
+        <p:nvPicPr>
+          <p:cNvPr id="4" name="Content Placeholder 3"/>
+          <p:cNvPicPr>
+            <a:picLocks noChangeAspect="1"/>
+          </p:cNvPicPr>
+          <p:nvPr>
+            <p:ph idx="1"/>
+          </p:nvPr>
+        </p:nvPicPr>
+        <p:blipFill>
+          <a:blip r:embed="rId1"/>
+          <a:stretch>
+            <a:fillRect/>
+          </a:stretch>
+        </p:blipFill>
+        <p:spPr>
+          <a:xfrm>
+            <a:off x="2227580" y="1825625"/>
+            <a:ext cx="7735570" cy="4351655"/>
+          </a:xfrm>
+          <a:prstGeom prst="rect">
+            <a:avLst/>
+          </a:prstGeom>
+        </p:spPr>
+      </p:pic>
     </p:spTree>
   </p:cSld>
   <p:clrMapOvr>
@@ -3368,4 +4375,263 @@
     </a:ext>
   </a:extLst>
 </a:theme>
+</file>
+
+<file path=ppt/theme/theme2.xml><?xml version="1.0" encoding="utf-8"?>
+<a:theme xmlns:a="http://schemas.openxmlformats.org/drawingml/2006/main" name="Office Theme">
+  <a:themeElements>
+    <a:clrScheme name="Office">
+      <a:dk1>
+        <a:sysClr val="windowText" lastClr="000000"/>
+      </a:dk1>
+      <a:lt1>
+        <a:sysClr val="window" lastClr="FFFFFF"/>
+      </a:lt1>
+      <a:dk2>
+        <a:srgbClr val="44546A"/>
+      </a:dk2>
+      <a:lt2>
+        <a:srgbClr val="E7E6E6"/>
+      </a:lt2>
+      <a:accent1>
+        <a:srgbClr val="5B9BD5"/>
+      </a:accent1>
+      <a:accent2>
+        <a:srgbClr val="ED7D31"/>
+      </a:accent2>
+      <a:accent3>
+        <a:srgbClr val="A5A5A5"/>
+      </a:accent3>
+      <a:accent4>
+        <a:srgbClr val="FFC000"/>
+      </a:accent4>
+      <a:accent5>
+        <a:srgbClr val="4472C4"/>
+      </a:accent5>
+      <a:accent6>
+        <a:srgbClr val="70AD47"/>
+      </a:accent6>
+      <a:hlink>
+        <a:srgbClr val="0563C1"/>
+      </a:hlink>
+      <a:folHlink>
+        <a:srgbClr val="954F72"/>
+      </a:folHlink>
+    </a:clrScheme>
+    <a:fontScheme name="Office">
+      <a:majorFont>
+        <a:latin typeface="Calibri Light"/>
+        <a:ea typeface=""/>
+        <a:cs typeface=""/>
+        <a:font script="Jpan" typeface="ＭＳ Ｐゴシック"/>
+        <a:font script="Hang" typeface="맑은 고딕"/>
+        <a:font script="Hans" typeface="宋体"/>
+        <a:font script="Hant" typeface="新細明體"/>
+        <a:font script="Arab" typeface="Times New Roman"/>
+        <a:font script="Hebr" typeface="Times New Roman"/>
+        <a:font script="Thai" typeface="Angsana New"/>
+        <a:font script="Ethi" typeface="Nyala"/>
+        <a:font script="Beng" typeface="Vrinda"/>
+        <a:font script="Gujr" typeface="Shruti"/>
+        <a:font script="Khmr" typeface="MoolBoran"/>
+        <a:font script="Knda" typeface="Tunga"/>
+        <a:font script="Guru" typeface="Raavi"/>
+        <a:font script="Cans" typeface="Euphemia"/>
+        <a:font script="Cher" typeface="Plantagenet Cherokee"/>
+        <a:font script="Yiii" typeface="Microsoft Yi Baiti"/>
+        <a:font script="Tibt" typeface="Microsoft Himalaya"/>
+        <a:font script="Thaa" typeface="MV Boli"/>
+        <a:font script="Deva" typeface="Mangal"/>
+        <a:font script="Telu" typeface="Gautami"/>
+        <a:font script="Taml" typeface="Latha"/>
+        <a:font script="Syrc" typeface="Estrangelo Edessa"/>
+        <a:font script="Orya" typeface="Kalinga"/>
+        <a:font script="Mlym" typeface="Kartika"/>
+        <a:font script="Laoo" typeface="DokChampa"/>
+        <a:font script="Sinh" typeface="Iskoola Pota"/>
+        <a:font script="Mong" typeface="Mongolian Baiti"/>
+        <a:font script="Viet" typeface="Times New Roman"/>
+        <a:font script="Uigh" typeface="Microsoft Uighur"/>
+        <a:font script="Geor" typeface="Sylfaen"/>
+      </a:majorFont>
+      <a:minorFont>
+        <a:latin typeface="Calibri"/>
+        <a:ea typeface=""/>
+        <a:cs typeface=""/>
+        <a:font script="Jpan" typeface="ＭＳ Ｐゴシック"/>
+        <a:font script="Hang" typeface="맑은 고딕"/>
+        <a:font script="Hans" typeface="宋体"/>
+        <a:font script="Hant" typeface="新細明體"/>
+        <a:font script="Arab" typeface="Arial"/>
+        <a:font script="Hebr" typeface="Arial"/>
+        <a:font script="Thai" typeface="Cordia New"/>
+        <a:font script="Ethi" typeface="Nyala"/>
+        <a:font script="Beng" typeface="Vrinda"/>
+        <a:font script="Gujr" typeface="Shruti"/>
+        <a:font script="Khmr" typeface="DaunPenh"/>
+        <a:font script="Knda" typeface="Tunga"/>
+        <a:font script="Guru" typeface="Raavi"/>
+        <a:font script="Cans" typeface="Euphemia"/>
+        <a:font script="Cher" typeface="Plantagenet Cherokee"/>
+        <a:font script="Yiii" typeface="Microsoft Yi Baiti"/>
+        <a:font script="Tibt" typeface="Microsoft Himalaya"/>
+        <a:font script="Thaa" typeface="MV Boli"/>
+        <a:font script="Deva" typeface="Mangal"/>
+        <a:font script="Telu" typeface="Gautami"/>
+        <a:font script="Taml" typeface="Latha"/>
+        <a:font script="Syrc" typeface="Estrangelo Edessa"/>
+        <a:font script="Orya" typeface="Kalinga"/>
+        <a:font script="Mlym" typeface="Kartika"/>
+        <a:font script="Laoo" typeface="DokChampa"/>
+        <a:font script="Sinh" typeface="Iskoola Pota"/>
+        <a:font script="Mong" typeface="Mongolian Baiti"/>
+        <a:font script="Viet" typeface="Arial"/>
+        <a:font script="Uigh" typeface="Microsoft Uighur"/>
+        <a:font script="Geor" typeface="Sylfaen"/>
+      </a:minorFont>
+    </a:fontScheme>
+    <a:fmtScheme name="Office">
+      <a:fillStyleLst>
+        <a:solidFill>
+          <a:schemeClr val="phClr"/>
+        </a:solidFill>
+        <a:gradFill rotWithShape="1">
+          <a:gsLst>
+            <a:gs pos="0">
+              <a:schemeClr val="phClr">
+                <a:lumMod val="110000"/>
+                <a:satMod val="105000"/>
+                <a:tint val="67000"/>
+              </a:schemeClr>
+            </a:gs>
+            <a:gs pos="50000">
+              <a:schemeClr val="phClr">
+                <a:lumMod val="105000"/>
+                <a:satMod val="103000"/>
+                <a:tint val="73000"/>
+              </a:schemeClr>
+            </a:gs>
+            <a:gs pos="100000">
+              <a:schemeClr val="phClr">
+                <a:lumMod val="105000"/>
+                <a:satMod val="109000"/>
+                <a:tint val="81000"/>
+              </a:schemeClr>
+            </a:gs>
+          </a:gsLst>
+          <a:lin ang="5400000" scaled="0"/>
+        </a:gradFill>
+        <a:gradFill rotWithShape="1">
+          <a:gsLst>
+            <a:gs pos="0">
+              <a:schemeClr val="phClr">
+                <a:satMod val="103000"/>
+                <a:lumMod val="102000"/>
+                <a:tint val="94000"/>
+              </a:schemeClr>
+            </a:gs>
+            <a:gs pos="50000">
+              <a:schemeClr val="phClr">
+                <a:satMod val="110000"/>
+                <a:lumMod val="100000"/>
+                <a:shade val="100000"/>
+              </a:schemeClr>
+            </a:gs>
+            <a:gs pos="100000">
+              <a:schemeClr val="phClr">
+                <a:lumMod val="99000"/>
+                <a:satMod val="120000"/>
+                <a:shade val="78000"/>
+              </a:schemeClr>
+            </a:gs>
+          </a:gsLst>
+          <a:lin ang="5400000" scaled="0"/>
+        </a:gradFill>
+      </a:fillStyleLst>
+      <a:lnStyleLst>
+        <a:ln w="6350" cap="flat" cmpd="sng" algn="ctr">
+          <a:solidFill>
+            <a:schemeClr val="phClr"/>
+          </a:solidFill>
+          <a:prstDash val="solid"/>
+          <a:miter lim="800000"/>
+        </a:ln>
+        <a:ln w="12700" cap="flat" cmpd="sng" algn="ctr">
+          <a:solidFill>
+            <a:schemeClr val="phClr"/>
+          </a:solidFill>
+          <a:prstDash val="solid"/>
+          <a:miter lim="800000"/>
+        </a:ln>
+        <a:ln w="19050" cap="flat" cmpd="sng" algn="ctr">
+          <a:solidFill>
+            <a:schemeClr val="phClr"/>
+          </a:solidFill>
+          <a:prstDash val="solid"/>
+          <a:miter lim="800000"/>
+        </a:ln>
+      </a:lnStyleLst>
+      <a:effectStyleLst>
+        <a:effectStyle>
+          <a:effectLst/>
+        </a:effectStyle>
+        <a:effectStyle>
+          <a:effectLst/>
+        </a:effectStyle>
+        <a:effectStyle>
+          <a:effectLst>
+            <a:outerShdw blurRad="57150" dist="19050" dir="5400000" algn="ctr" rotWithShape="0">
+              <a:srgbClr val="000000">
+                <a:alpha val="63000"/>
+              </a:srgbClr>
+            </a:outerShdw>
+          </a:effectLst>
+        </a:effectStyle>
+      </a:effectStyleLst>
+      <a:bgFillStyleLst>
+        <a:solidFill>
+          <a:schemeClr val="phClr"/>
+        </a:solidFill>
+        <a:solidFill>
+          <a:schemeClr val="phClr">
+            <a:tint val="95000"/>
+            <a:satMod val="170000"/>
+          </a:schemeClr>
+        </a:solidFill>
+        <a:gradFill rotWithShape="1">
+          <a:gsLst>
+            <a:gs pos="0">
+              <a:schemeClr val="phClr">
+                <a:tint val="93000"/>
+                <a:satMod val="150000"/>
+                <a:shade val="98000"/>
+                <a:lumMod val="102000"/>
+              </a:schemeClr>
+            </a:gs>
+            <a:gs pos="50000">
+              <a:schemeClr val="phClr">
+                <a:tint val="98000"/>
+                <a:satMod val="130000"/>
+                <a:shade val="90000"/>
+                <a:lumMod val="103000"/>
+              </a:schemeClr>
+            </a:gs>
+            <a:gs pos="100000">
+              <a:schemeClr val="phClr">
+                <a:shade val="63000"/>
+                <a:satMod val="120000"/>
+              </a:schemeClr>
+            </a:gs>
+          </a:gsLst>
+          <a:lin ang="5400000" scaled="0"/>
+        </a:gradFill>
+      </a:bgFillStyleLst>
+    </a:fmtScheme>
+  </a:themeElements>
+  <a:extLst>
+    <a:ext uri="{05A4C25C-085E-4340-85A3-A5531E510DB2}">
+      <thm15:themeFamily xmlns:thm15="http://schemas.microsoft.com/office/thememl/2012/main" name="Office Theme" id="{62F939B6-93AF-4DB8-9C6B-D6C7DFDC589F}" vid="{4A3C46E8-61CC-4603-A589-7422A47A8E4A}"/>
+    </a:ext>
+  </a:extLst>
+</a:theme>
 </file>
</xml_diff>

<commit_message>
further update presentation file
</commit_message>
<xml_diff>
--- a/Group Project Presentation.pptx
+++ b/Group Project Presentation.pptx
@@ -14,13 +14,17 @@
     <p:sldId id="257" r:id="rId7"/>
     <p:sldId id="258" r:id="rId8"/>
     <p:sldId id="259" r:id="rId9"/>
-    <p:sldId id="260" r:id="rId10"/>
-    <p:sldId id="261" r:id="rId11"/>
-    <p:sldId id="262" r:id="rId12"/>
-    <p:sldId id="263" r:id="rId13"/>
-    <p:sldId id="264" r:id="rId14"/>
-    <p:sldId id="266" r:id="rId15"/>
-    <p:sldId id="267" r:id="rId16"/>
+    <p:sldId id="288" r:id="rId10"/>
+    <p:sldId id="287" r:id="rId11"/>
+    <p:sldId id="260" r:id="rId12"/>
+    <p:sldId id="261" r:id="rId13"/>
+    <p:sldId id="262" r:id="rId14"/>
+    <p:sldId id="263" r:id="rId15"/>
+    <p:sldId id="297" r:id="rId16"/>
+    <p:sldId id="298" r:id="rId17"/>
+    <p:sldId id="264" r:id="rId18"/>
+    <p:sldId id="266" r:id="rId19"/>
+    <p:sldId id="267" r:id="rId20"/>
   </p:sldIdLst>
   <p:sldSz cx="12192000" cy="6858000"/>
   <p:notesSz cx="6858000" cy="9144000"/>
@@ -120,6 +124,21 @@
     </a:lvl9pPr>
   </p:defaultTextStyle>
 </p:presentation>
+</file>
+
+<file path=ppt/commentAuthors.xml><?xml version="1.0" encoding="utf-8"?>
+<p:cmAuthorLst xmlns:a="http://schemas.openxmlformats.org/drawingml/2006/main" xmlns:r="http://schemas.openxmlformats.org/officeDocument/2006/relationships" xmlns:p="http://schemas.openxmlformats.org/presentationml/2006/main">
+  <p:cmAuthor id="1" name="JeffreyC" initials="J" lastIdx="1" clrIdx="0"/>
+</p:cmAuthorLst>
+</file>
+
+<file path=ppt/comments/comment1.xml><?xml version="1.0" encoding="utf-8"?>
+<p:cmLst xmlns:a="http://schemas.openxmlformats.org/drawingml/2006/main" xmlns:r="http://schemas.openxmlformats.org/officeDocument/2006/relationships" xmlns:p="http://schemas.openxmlformats.org/presentationml/2006/main">
+  <p:cm authorId="1" dt="2022-10-18T22:14:41.755" idx="1">
+    <p:pos x="10" y="10"/>
+    <p:text/>
+  </p:cm>
+</p:cmLst>
 </file>
 
 <file path=ppt/notesMasters/notesMaster1.xml><?xml version="1.0" encoding="utf-8"?>
@@ -3869,7 +3888,34 @@
           <a:p>
             <a:r>
               <a:rPr lang="en-US"/>
-              <a:t>Charts generated to </a:t>
+              <a:t>What techniques you did see</a:t>
+            </a:r>
+            <a:endParaRPr lang="en-US"/>
+          </a:p>
+        </p:txBody>
+      </p:sp>
+      <p:sp>
+        <p:nvSpPr>
+          <p:cNvPr id="3" name="Content Placeholder 2"/>
+          <p:cNvSpPr>
+            <a:spLocks noGrp="1"/>
+          </p:cNvSpPr>
+          <p:nvPr>
+            <p:ph sz="half" idx="1"/>
+          </p:nvPr>
+        </p:nvSpPr>
+        <p:spPr>
+          <a:xfrm>
+            <a:off x="609600" y="1174750"/>
+            <a:ext cx="11246485" cy="1351280"/>
+          </a:xfrm>
+        </p:spPr>
+        <p:txBody>
+          <a:bodyPr/>
+          <a:p>
+            <a:r>
+              <a:rPr lang="en-US"/>
+              <a:t>For data scraping,  various techniques have been utilized for direct data file downing, web scraping, API calling</a:t>
             </a:r>
             <a:endParaRPr lang="en-US"/>
           </a:p>
@@ -3877,12 +3923,10 @@
       </p:sp>
       <p:pic>
         <p:nvPicPr>
-          <p:cNvPr id="4" name="Content Placeholder 3"/>
-          <p:cNvPicPr>
-            <a:picLocks noChangeAspect="1"/>
-          </p:cNvPicPr>
-          <p:nvPr>
-            <p:ph idx="1"/>
+          <p:cNvPr id="100" name="Content Placeholder 99"/>
+          <p:cNvPicPr/>
+          <p:nvPr>
+            <p:ph sz="half" idx="2"/>
           </p:nvPr>
         </p:nvPicPr>
         <p:blipFill>
@@ -3893,12 +3937,42 @@
         </p:blipFill>
         <p:spPr>
           <a:xfrm>
-            <a:off x="2227580" y="1825625"/>
-            <a:ext cx="7735570" cy="4351655"/>
+            <a:off x="4691380" y="3823335"/>
+            <a:ext cx="6891020" cy="2545715"/>
           </a:xfrm>
           <a:prstGeom prst="rect">
             <a:avLst/>
           </a:prstGeom>
+          <a:noFill/>
+          <a:ln w="9525">
+            <a:noFill/>
+          </a:ln>
+        </p:spPr>
+      </p:pic>
+      <p:pic>
+        <p:nvPicPr>
+          <p:cNvPr id="102" name="Picture 101"/>
+          <p:cNvPicPr/>
+          <p:nvPr/>
+        </p:nvPicPr>
+        <p:blipFill>
+          <a:blip r:embed="rId2"/>
+          <a:stretch>
+            <a:fillRect/>
+          </a:stretch>
+        </p:blipFill>
+        <p:spPr>
+          <a:xfrm>
+            <a:off x="462915" y="3714115"/>
+            <a:ext cx="4084955" cy="2654935"/>
+          </a:xfrm>
+          <a:prstGeom prst="rect">
+            <a:avLst/>
+          </a:prstGeom>
+          <a:noFill/>
+          <a:ln w="9525">
+            <a:noFill/>
+          </a:ln>
         </p:spPr>
       </p:pic>
     </p:spTree>
@@ -3931,156 +4005,47 @@
         </p:nvSpPr>
         <p:spPr/>
         <p:txBody>
-          <a:bodyPr/>
+          <a:bodyPr>
+            <a:normAutofit fontScale="90000"/>
+          </a:bodyPr>
           <a:p>
             <a:r>
               <a:rPr lang="en-US"/>
-              <a:t>Charts Generated </a:t>
-            </a:r>
-            <a:endParaRPr lang="en-US"/>
-          </a:p>
-        </p:txBody>
-      </p:sp>
-      <p:pic>
-        <p:nvPicPr>
-          <p:cNvPr id="4" name="Content Placeholder 3"/>
-          <p:cNvPicPr>
-            <a:picLocks noChangeAspect="1"/>
-          </p:cNvPicPr>
-          <p:nvPr>
-            <p:ph sz="half" idx="1"/>
-          </p:nvPr>
-        </p:nvPicPr>
-        <p:blipFill>
-          <a:blip r:embed="rId1"/>
-          <a:stretch>
-            <a:fillRect/>
-          </a:stretch>
-        </p:blipFill>
-        <p:spPr>
-          <a:xfrm>
-            <a:off x="492760" y="1313815"/>
-            <a:ext cx="3117850" cy="2396490"/>
-          </a:xfrm>
-          <a:prstGeom prst="rect">
-            <a:avLst/>
-          </a:prstGeom>
-        </p:spPr>
-      </p:pic>
-      <p:pic>
-        <p:nvPicPr>
-          <p:cNvPr id="3" name="Content Placeholder 3"/>
-          <p:cNvPicPr>
-            <a:picLocks noChangeAspect="1"/>
-          </p:cNvPicPr>
-          <p:nvPr>
-            <p:ph sz="half" idx="2"/>
-          </p:nvPr>
-        </p:nvPicPr>
-        <p:blipFill>
-          <a:blip r:embed="rId1"/>
-          <a:stretch>
-            <a:fillRect/>
-          </a:stretch>
-        </p:blipFill>
-        <p:spPr>
-          <a:xfrm>
-            <a:off x="4010660" y="1489075"/>
-            <a:ext cx="2661285" cy="2045970"/>
-          </a:xfrm>
-          <a:prstGeom prst="rect">
-            <a:avLst/>
-          </a:prstGeom>
-          <a:noFill/>
-          <a:ln w="9525">
-            <a:noFill/>
-          </a:ln>
-        </p:spPr>
-      </p:pic>
-      <p:pic>
-        <p:nvPicPr>
-          <p:cNvPr id="5" name="Content Placeholder 3"/>
-          <p:cNvPicPr>
-            <a:picLocks noChangeAspect="1"/>
-          </p:cNvPicPr>
-          <p:nvPr/>
-        </p:nvPicPr>
-        <p:blipFill>
-          <a:blip r:embed="rId1"/>
-          <a:stretch>
-            <a:fillRect/>
-          </a:stretch>
-        </p:blipFill>
-        <p:spPr>
-          <a:xfrm>
-            <a:off x="433070" y="3689985"/>
-            <a:ext cx="3577590" cy="2750185"/>
-          </a:xfrm>
-          <a:prstGeom prst="rect">
-            <a:avLst/>
-          </a:prstGeom>
-          <a:noFill/>
-          <a:ln w="9525">
-            <a:noFill/>
-          </a:ln>
-        </p:spPr>
-      </p:pic>
-      <p:pic>
-        <p:nvPicPr>
-          <p:cNvPr id="6" name="Content Placeholder 3"/>
-          <p:cNvPicPr>
-            <a:picLocks noChangeAspect="1"/>
-          </p:cNvPicPr>
-          <p:nvPr/>
-        </p:nvPicPr>
-        <p:blipFill>
-          <a:blip r:embed="rId1"/>
-          <a:stretch>
-            <a:fillRect/>
-          </a:stretch>
-        </p:blipFill>
-        <p:spPr>
-          <a:xfrm>
-            <a:off x="3943985" y="3710305"/>
-            <a:ext cx="3577590" cy="2750185"/>
-          </a:xfrm>
-          <a:prstGeom prst="rect">
-            <a:avLst/>
-          </a:prstGeom>
-          <a:noFill/>
-          <a:ln w="9525">
-            <a:noFill/>
-          </a:ln>
-        </p:spPr>
-      </p:pic>
-      <p:pic>
-        <p:nvPicPr>
-          <p:cNvPr id="7" name="Content Placeholder 3"/>
-          <p:cNvPicPr>
-            <a:picLocks noChangeAspect="1"/>
-          </p:cNvPicPr>
-          <p:nvPr/>
-        </p:nvPicPr>
-        <p:blipFill>
-          <a:blip r:embed="rId1"/>
-          <a:stretch>
-            <a:fillRect/>
-          </a:stretch>
-        </p:blipFill>
-        <p:spPr>
-          <a:xfrm>
-            <a:off x="7608570" y="1313815"/>
-            <a:ext cx="3577590" cy="2750185"/>
-          </a:xfrm>
-          <a:prstGeom prst="rect">
-            <a:avLst/>
-          </a:prstGeom>
-          <a:noFill/>
-          <a:ln w="9525">
-            <a:noFill/>
-          </a:ln>
-        </p:spPr>
-      </p:pic>
+              <a:t>What you managed to achieve and what you failed to do  </a:t>
+            </a:r>
+            <a:endParaRPr lang="en-US"/>
+          </a:p>
+        </p:txBody>
+      </p:sp>
+      <p:sp>
+        <p:nvSpPr>
+          <p:cNvPr id="3" name="Content Placeholder 2"/>
+          <p:cNvSpPr>
+            <a:spLocks noGrp="1"/>
+          </p:cNvSpPr>
+          <p:nvPr>
+            <p:ph idx="1"/>
+          </p:nvPr>
+        </p:nvSpPr>
+        <p:spPr/>
+        <p:txBody>
+          <a:bodyPr/>
+          <a:p>
+            <a:r>
+              <a:rPr lang="en-US"/>
+              <a:t>API </a:t>
+            </a:r>
+            <a:endParaRPr lang="en-US"/>
+          </a:p>
+          <a:p>
+            <a:r>
+              <a:rPr lang="en-US"/>
+              <a:t>HPI failed to </a:t>
+            </a:r>
+            <a:endParaRPr lang="en-US"/>
+          </a:p>
+        </p:txBody>
+      </p:sp>
     </p:spTree>
   </p:cSld>
   <p:clrMapOvr>
@@ -4115,60 +4080,38 @@
           <a:p>
             <a:r>
               <a:rPr lang="en-US"/>
-              <a:t>Conclusions</a:t>
-            </a:r>
-            <a:endParaRPr lang="en-US"/>
-          </a:p>
-        </p:txBody>
-      </p:sp>
-      <p:sp>
-        <p:nvSpPr>
-          <p:cNvPr id="3" name="Content Placeholder 2"/>
-          <p:cNvSpPr>
-            <a:spLocks noGrp="1"/>
-          </p:cNvSpPr>
+              <a:t>Charts generated to </a:t>
+            </a:r>
+            <a:endParaRPr lang="en-US"/>
+          </a:p>
+        </p:txBody>
+      </p:sp>
+      <p:pic>
+        <p:nvPicPr>
+          <p:cNvPr id="4" name="Content Placeholder 3"/>
+          <p:cNvPicPr>
+            <a:picLocks noChangeAspect="1"/>
+          </p:cNvPicPr>
           <p:nvPr>
             <p:ph idx="1"/>
           </p:nvPr>
-        </p:nvSpPr>
-        <p:spPr/>
-        <p:txBody>
-          <a:bodyPr>
-            <a:normAutofit fontScale="90000" lnSpcReduction="20000"/>
-          </a:bodyPr>
-          <a:p>
-            <a:r>
-              <a:rPr lang="en-US"/>
-              <a:t>Based on the data we have collected as well as what subsequent plots generated based on that.  The following insights have been reviewed. </a:t>
-            </a:r>
-            <a:endParaRPr lang="en-US"/>
-          </a:p>
-          <a:p>
-            <a:pPr lvl="1"/>
-            <a:r>
-              <a:rPr lang="en-US" sz="2700"/>
-              <a:t>As New Zealand Reserve Bank sets its interest rate up, various business will have difficult of getting cheap loans for further development, therefore business activities have been reduced, which leads to increase of unemployment. </a:t>
-            </a:r>
-            <a:endParaRPr lang="en-US" sz="2700"/>
-          </a:p>
-          <a:p>
-            <a:pPr lvl="1"/>
-            <a:r>
-              <a:rPr lang="en-US" sz="2700"/>
-              <a:t>On the other hand, increase of Reserve Bank interest rate will attract oversea hot money for short term investment, therefore it is anticipated that exchange rate of New Zealand dollars VS. Other currency will go up. The high Reserve bank interest rate will lead to lower level of economic activities, hence in term of cargo freight statistics, general vehicle activities and tourism account, we are anticipating dropping in these activities.</a:t>
-            </a:r>
-            <a:endParaRPr lang="en-US" sz="2700"/>
-          </a:p>
-          <a:p>
-            <a:pPr lvl="1"/>
-            <a:r>
-              <a:rPr lang="en-US" sz="2700"/>
-              <a:t>However, Reserve Bank raise interest rate usually to combat high inflation rate (CPI), therefore, we should be expecting dropping of the CPI.</a:t>
-            </a:r>
-            <a:endParaRPr lang="en-US" sz="2700"/>
-          </a:p>
-        </p:txBody>
-      </p:sp>
+        </p:nvPicPr>
+        <p:blipFill>
+          <a:blip r:embed="rId1"/>
+          <a:stretch>
+            <a:fillRect/>
+          </a:stretch>
+        </p:blipFill>
+        <p:spPr>
+          <a:xfrm>
+            <a:off x="2227580" y="1825625"/>
+            <a:ext cx="7735570" cy="4351655"/>
+          </a:xfrm>
+          <a:prstGeom prst="rect">
+            <a:avLst/>
+          </a:prstGeom>
+        </p:spPr>
+      </p:pic>
     </p:spTree>
   </p:cSld>
   <p:clrMapOvr>
@@ -4201,6 +4144,318 @@
         <p:txBody>
           <a:bodyPr/>
           <a:p>
+            <a:r>
+              <a:rPr lang="en-US"/>
+              <a:t>Charts</a:t>
+            </a:r>
+            <a:endParaRPr lang="en-US"/>
+          </a:p>
+        </p:txBody>
+      </p:sp>
+      <p:pic>
+        <p:nvPicPr>
+          <p:cNvPr id="4" name="Content Placeholder 3"/>
+          <p:cNvPicPr>
+            <a:picLocks noChangeAspect="1"/>
+          </p:cNvPicPr>
+          <p:nvPr>
+            <p:ph idx="1"/>
+          </p:nvPr>
+        </p:nvPicPr>
+        <p:blipFill>
+          <a:blip r:embed="rId1"/>
+          <a:stretch>
+            <a:fillRect/>
+          </a:stretch>
+        </p:blipFill>
+        <p:spPr>
+          <a:xfrm>
+            <a:off x="3642995" y="1469390"/>
+            <a:ext cx="4905375" cy="4362450"/>
+          </a:xfrm>
+          <a:prstGeom prst="rect">
+            <a:avLst/>
+          </a:prstGeom>
+        </p:spPr>
+      </p:pic>
+    </p:spTree>
+  </p:cSld>
+  <p:clrMapOvr>
+    <a:masterClrMapping/>
+  </p:clrMapOvr>
+</p:sld>
+</file>
+
+<file path=ppt/slides/slide14.xml><?xml version="1.0" encoding="utf-8"?>
+<p:sld xmlns:a="http://schemas.openxmlformats.org/drawingml/2006/main" xmlns:r="http://schemas.openxmlformats.org/officeDocument/2006/relationships" xmlns:p="http://schemas.openxmlformats.org/presentationml/2006/main">
+  <p:cSld>
+    <p:spTree>
+      <p:nvGrpSpPr>
+        <p:cNvPr id="1" name=""/>
+        <p:cNvGrpSpPr/>
+        <p:nvPr/>
+      </p:nvGrpSpPr>
+      <p:grpSpPr/>
+      <p:sp>
+        <p:nvSpPr>
+          <p:cNvPr id="2" name="Title 1"/>
+          <p:cNvSpPr>
+            <a:spLocks noGrp="1"/>
+          </p:cNvSpPr>
+          <p:nvPr>
+            <p:ph type="title"/>
+          </p:nvPr>
+        </p:nvSpPr>
+        <p:spPr/>
+        <p:txBody>
+          <a:bodyPr/>
+          <a:p>
+            <a:endParaRPr lang="en-US"/>
+          </a:p>
+        </p:txBody>
+      </p:sp>
+      <p:pic>
+        <p:nvPicPr>
+          <p:cNvPr id="4" name="Content Placeholder 3"/>
+          <p:cNvPicPr>
+            <a:picLocks noChangeAspect="1"/>
+          </p:cNvPicPr>
+          <p:nvPr>
+            <p:ph idx="1"/>
+          </p:nvPr>
+        </p:nvPicPr>
+        <p:blipFill>
+          <a:blip r:embed="rId1"/>
+          <a:stretch>
+            <a:fillRect/>
+          </a:stretch>
+        </p:blipFill>
+        <p:spPr>
+          <a:xfrm>
+            <a:off x="3466465" y="1493520"/>
+            <a:ext cx="5257800" cy="4314825"/>
+          </a:xfrm>
+          <a:prstGeom prst="rect">
+            <a:avLst/>
+          </a:prstGeom>
+        </p:spPr>
+      </p:pic>
+    </p:spTree>
+  </p:cSld>
+  <p:clrMapOvr>
+    <a:masterClrMapping/>
+  </p:clrMapOvr>
+</p:sld>
+</file>
+
+<file path=ppt/slides/slide15.xml><?xml version="1.0" encoding="utf-8"?>
+<p:sld xmlns:a="http://schemas.openxmlformats.org/drawingml/2006/main" xmlns:r="http://schemas.openxmlformats.org/officeDocument/2006/relationships" xmlns:p="http://schemas.openxmlformats.org/presentationml/2006/main">
+  <p:cSld>
+    <p:spTree>
+      <p:nvGrpSpPr>
+        <p:cNvPr id="1" name=""/>
+        <p:cNvGrpSpPr/>
+        <p:nvPr/>
+      </p:nvGrpSpPr>
+      <p:grpSpPr/>
+      <p:sp>
+        <p:nvSpPr>
+          <p:cNvPr id="2" name="Title 1"/>
+          <p:cNvSpPr>
+            <a:spLocks noGrp="1"/>
+          </p:cNvSpPr>
+          <p:nvPr>
+            <p:ph type="title"/>
+          </p:nvPr>
+        </p:nvSpPr>
+        <p:spPr/>
+        <p:txBody>
+          <a:bodyPr/>
+          <a:p>
+            <a:r>
+              <a:rPr lang="en-US"/>
+              <a:t>Charts Generated </a:t>
+            </a:r>
+            <a:endParaRPr lang="en-US"/>
+          </a:p>
+        </p:txBody>
+      </p:sp>
+      <p:pic>
+        <p:nvPicPr>
+          <p:cNvPr id="4" name="Content Placeholder 3"/>
+          <p:cNvPicPr>
+            <a:picLocks noChangeAspect="1"/>
+          </p:cNvPicPr>
+          <p:nvPr>
+            <p:ph sz="half" idx="1"/>
+          </p:nvPr>
+        </p:nvPicPr>
+        <p:blipFill>
+          <a:blip r:embed="rId1"/>
+          <a:stretch>
+            <a:fillRect/>
+          </a:stretch>
+        </p:blipFill>
+        <p:spPr>
+          <a:xfrm>
+            <a:off x="492760" y="1313815"/>
+            <a:ext cx="3117850" cy="2396490"/>
+          </a:xfrm>
+          <a:prstGeom prst="rect">
+            <a:avLst/>
+          </a:prstGeom>
+        </p:spPr>
+      </p:pic>
+      <p:pic>
+        <p:nvPicPr>
+          <p:cNvPr id="3" name="Content Placeholder 3"/>
+          <p:cNvPicPr>
+            <a:picLocks noChangeAspect="1"/>
+          </p:cNvPicPr>
+          <p:nvPr>
+            <p:ph sz="half" idx="2"/>
+          </p:nvPr>
+        </p:nvPicPr>
+        <p:blipFill>
+          <a:blip r:embed="rId1"/>
+          <a:stretch>
+            <a:fillRect/>
+          </a:stretch>
+        </p:blipFill>
+        <p:spPr>
+          <a:xfrm>
+            <a:off x="4010660" y="1489075"/>
+            <a:ext cx="2661285" cy="2045970"/>
+          </a:xfrm>
+          <a:prstGeom prst="rect">
+            <a:avLst/>
+          </a:prstGeom>
+          <a:noFill/>
+          <a:ln w="9525">
+            <a:noFill/>
+          </a:ln>
+        </p:spPr>
+      </p:pic>
+      <p:pic>
+        <p:nvPicPr>
+          <p:cNvPr id="5" name="Content Placeholder 3"/>
+          <p:cNvPicPr>
+            <a:picLocks noChangeAspect="1"/>
+          </p:cNvPicPr>
+          <p:nvPr/>
+        </p:nvPicPr>
+        <p:blipFill>
+          <a:blip r:embed="rId1"/>
+          <a:stretch>
+            <a:fillRect/>
+          </a:stretch>
+        </p:blipFill>
+        <p:spPr>
+          <a:xfrm>
+            <a:off x="433070" y="3689985"/>
+            <a:ext cx="3577590" cy="2750185"/>
+          </a:xfrm>
+          <a:prstGeom prst="rect">
+            <a:avLst/>
+          </a:prstGeom>
+          <a:noFill/>
+          <a:ln w="9525">
+            <a:noFill/>
+          </a:ln>
+        </p:spPr>
+      </p:pic>
+      <p:pic>
+        <p:nvPicPr>
+          <p:cNvPr id="6" name="Content Placeholder 3"/>
+          <p:cNvPicPr>
+            <a:picLocks noChangeAspect="1"/>
+          </p:cNvPicPr>
+          <p:nvPr/>
+        </p:nvPicPr>
+        <p:blipFill>
+          <a:blip r:embed="rId1"/>
+          <a:stretch>
+            <a:fillRect/>
+          </a:stretch>
+        </p:blipFill>
+        <p:spPr>
+          <a:xfrm>
+            <a:off x="3943985" y="3710305"/>
+            <a:ext cx="3577590" cy="2750185"/>
+          </a:xfrm>
+          <a:prstGeom prst="rect">
+            <a:avLst/>
+          </a:prstGeom>
+          <a:noFill/>
+          <a:ln w="9525">
+            <a:noFill/>
+          </a:ln>
+        </p:spPr>
+      </p:pic>
+      <p:pic>
+        <p:nvPicPr>
+          <p:cNvPr id="7" name="Content Placeholder 3"/>
+          <p:cNvPicPr>
+            <a:picLocks noChangeAspect="1"/>
+          </p:cNvPicPr>
+          <p:nvPr/>
+        </p:nvPicPr>
+        <p:blipFill>
+          <a:blip r:embed="rId1"/>
+          <a:stretch>
+            <a:fillRect/>
+          </a:stretch>
+        </p:blipFill>
+        <p:spPr>
+          <a:xfrm>
+            <a:off x="7608570" y="1313815"/>
+            <a:ext cx="3577590" cy="2750185"/>
+          </a:xfrm>
+          <a:prstGeom prst="rect">
+            <a:avLst/>
+          </a:prstGeom>
+          <a:noFill/>
+          <a:ln w="9525">
+            <a:noFill/>
+          </a:ln>
+        </p:spPr>
+      </p:pic>
+    </p:spTree>
+  </p:cSld>
+  <p:clrMapOvr>
+    <a:masterClrMapping/>
+  </p:clrMapOvr>
+</p:sld>
+</file>
+
+<file path=ppt/slides/slide16.xml><?xml version="1.0" encoding="utf-8"?>
+<p:sld xmlns:a="http://schemas.openxmlformats.org/drawingml/2006/main" xmlns:r="http://schemas.openxmlformats.org/officeDocument/2006/relationships" xmlns:p="http://schemas.openxmlformats.org/presentationml/2006/main">
+  <p:cSld>
+    <p:spTree>
+      <p:nvGrpSpPr>
+        <p:cNvPr id="1" name=""/>
+        <p:cNvGrpSpPr/>
+        <p:nvPr/>
+      </p:nvGrpSpPr>
+      <p:grpSpPr/>
+      <p:sp>
+        <p:nvSpPr>
+          <p:cNvPr id="2" name="Title 1"/>
+          <p:cNvSpPr>
+            <a:spLocks noGrp="1"/>
+          </p:cNvSpPr>
+          <p:nvPr>
+            <p:ph type="title"/>
+          </p:nvPr>
+        </p:nvSpPr>
+        <p:spPr/>
+        <p:txBody>
+          <a:bodyPr/>
+          <a:p>
+            <a:r>
+              <a:rPr lang="en-US"/>
+              <a:t>Conclusions</a:t>
+            </a:r>
             <a:endParaRPr lang="en-US"/>
           </a:p>
         </p:txBody>
@@ -4212,44 +4467,259 @@
             <a:spLocks noGrp="1"/>
           </p:cNvSpPr>
           <p:nvPr>
-            <p:ph idx="1"/>
+            <p:ph sz="half" idx="1"/>
           </p:nvPr>
         </p:nvSpPr>
         <p:spPr/>
         <p:txBody>
+          <a:bodyPr/>
+          <a:p>
+            <a:r>
+              <a:rPr lang="en-US" sz="1800"/>
+              <a:t>Based on the data we have collected as well as what subsequent plots generated based on that.  The following insights have been reviewed. </a:t>
+            </a:r>
+            <a:endParaRPr lang="en-US" sz="1800"/>
+          </a:p>
+          <a:p>
+            <a:pPr lvl="1"/>
+            <a:r>
+              <a:rPr lang="en-US" sz="1600"/>
+              <a:t>As New Zealand Reserve Bank sets its interest rate up, various business will have difficult of getting cheap loans for further development, therefore business activities have been reduced, which leads to increase of unemployment. </a:t>
+            </a:r>
+            <a:endParaRPr lang="en-US" sz="1600"/>
+          </a:p>
+          <a:p>
+            <a:pPr lvl="1"/>
+            <a:r>
+              <a:rPr lang="en-US" sz="1600"/>
+              <a:t>On the other hand, increase of Reserve Bank interest rate will attract oversea hot money for short term investment, therefore it is anticipated that exchange rate of New Zealand dollars VS. Other currency will go up. The high Reserve bank interest rate will lead to lower level of economic activities, hence in term of cargo freight statistics, general vehicle activities and tourism account, we are anticipating dropping in these activities.</a:t>
+            </a:r>
+            <a:endParaRPr lang="en-US" sz="1600"/>
+          </a:p>
+          <a:p>
+            <a:pPr lvl="1"/>
+            <a:r>
+              <a:rPr lang="en-US" sz="1600"/>
+              <a:t>However, Reserve Bank raise interest rate usually to combat high inflation rate (CPI), therefore, we should be expecting dropping of the CPI.</a:t>
+            </a:r>
+            <a:endParaRPr lang="en-US" sz="1600"/>
+          </a:p>
+        </p:txBody>
+      </p:sp>
+      <p:pic>
+        <p:nvPicPr>
+          <p:cNvPr id="103" name="Content Placeholder 102"/>
+          <p:cNvPicPr/>
+          <p:nvPr>
+            <p:ph sz="half" idx="2"/>
+          </p:nvPr>
+        </p:nvPicPr>
+        <p:blipFill>
+          <a:blip r:embed="rId1"/>
+          <a:stretch>
+            <a:fillRect/>
+          </a:stretch>
+        </p:blipFill>
+        <p:spPr>
+          <a:xfrm>
+            <a:off x="6197600" y="1174750"/>
+            <a:ext cx="5922010" cy="2874645"/>
+          </a:xfrm>
+          <a:prstGeom prst="rect">
+            <a:avLst/>
+          </a:prstGeom>
+          <a:noFill/>
+          <a:ln w="9525">
+            <a:noFill/>
+          </a:ln>
+        </p:spPr>
+      </p:pic>
+      <p:pic>
+        <p:nvPicPr>
+          <p:cNvPr id="104" name="Picture 103"/>
+          <p:cNvPicPr/>
+          <p:nvPr/>
+        </p:nvPicPr>
+        <p:blipFill>
+          <a:blip r:embed="rId2" r:link="rId3"/>
+          <a:stretch>
+            <a:fillRect/>
+          </a:stretch>
+        </p:blipFill>
+        <p:spPr>
+          <a:xfrm>
+            <a:off x="4095750" y="2095500"/>
+            <a:ext cx="4000500" cy="2667000"/>
+          </a:xfrm>
+          <a:prstGeom prst="rect">
+            <a:avLst/>
+          </a:prstGeom>
+          <a:noFill/>
+          <a:ln w="9525">
+            <a:noFill/>
+          </a:ln>
+        </p:spPr>
+      </p:pic>
+      <p:pic>
+        <p:nvPicPr>
+          <p:cNvPr id="4" name="Picture 3"/>
+          <p:cNvPicPr>
+            <a:picLocks noChangeAspect="1"/>
+          </p:cNvPicPr>
+          <p:nvPr/>
+        </p:nvPicPr>
+        <p:blipFill>
+          <a:blip r:embed="rId4"/>
+          <a:stretch>
+            <a:fillRect/>
+          </a:stretch>
+        </p:blipFill>
+        <p:spPr>
+          <a:xfrm>
+            <a:off x="6410960" y="4076700"/>
+            <a:ext cx="4133850" cy="2781300"/>
+          </a:xfrm>
+          <a:prstGeom prst="rect">
+            <a:avLst/>
+          </a:prstGeom>
+        </p:spPr>
+      </p:pic>
+    </p:spTree>
+  </p:cSld>
+  <p:clrMapOvr>
+    <a:masterClrMapping/>
+  </p:clrMapOvr>
+</p:sld>
+</file>
+
+<file path=ppt/slides/slide17.xml><?xml version="1.0" encoding="utf-8"?>
+<p:sld xmlns:a="http://schemas.openxmlformats.org/drawingml/2006/main" xmlns:r="http://schemas.openxmlformats.org/officeDocument/2006/relationships" xmlns:p="http://schemas.openxmlformats.org/presentationml/2006/main">
+  <p:cSld>
+    <p:spTree>
+      <p:nvGrpSpPr>
+        <p:cNvPr id="1" name=""/>
+        <p:cNvGrpSpPr/>
+        <p:nvPr/>
+      </p:nvGrpSpPr>
+      <p:grpSpPr/>
+      <p:sp>
+        <p:nvSpPr>
+          <p:cNvPr id="5" name="Title 4"/>
+          <p:cNvSpPr>
+            <a:spLocks noGrp="1"/>
+          </p:cNvSpPr>
+          <p:nvPr>
+            <p:ph type="title"/>
+          </p:nvPr>
+        </p:nvSpPr>
+        <p:spPr/>
+        <p:txBody>
+          <a:bodyPr/>
+          <a:p>
+            <a:endParaRPr lang="en-US"/>
+          </a:p>
+        </p:txBody>
+      </p:sp>
+      <p:sp>
+        <p:nvSpPr>
+          <p:cNvPr id="3" name="Content Placeholder 2"/>
+          <p:cNvSpPr>
+            <a:spLocks noGrp="1"/>
+          </p:cNvSpPr>
+          <p:nvPr>
+            <p:ph sz="half" idx="1"/>
+          </p:nvPr>
+        </p:nvSpPr>
+        <p:spPr/>
+        <p:txBody>
           <a:bodyPr>
-            <a:normAutofit lnSpcReduction="20000"/>
+            <a:noAutofit/>
           </a:bodyPr>
           <a:p>
             <a:r>
-              <a:rPr lang="en-US"/>
+              <a:rPr lang="en-US" sz="1800"/>
               <a:t>When the economic activities are low and unemployment rate is high </a:t>
             </a:r>
-            <a:endParaRPr lang="en-US"/>
+            <a:endParaRPr lang="en-US" sz="1800"/>
           </a:p>
           <a:p>
             <a:pPr lvl="1"/>
             <a:r>
-              <a:rPr lang="en-US"/>
+              <a:rPr lang="en-US" sz="1600"/>
               <a:t>New Zealand government is under pressure to unleash new monetary policies to stimulate economy. Hence government usually resolve to lower reserve bank interest rate. </a:t>
             </a:r>
-            <a:endParaRPr lang="en-US"/>
+            <a:endParaRPr lang="en-US" sz="1600"/>
           </a:p>
           <a:p>
             <a:pPr lvl="1"/>
             <a:r>
-              <a:rPr lang="en-US"/>
+              <a:rPr lang="en-US" sz="1600"/>
               <a:t>With high reserve bank interest rate, we should be able to observe weak New Zealand dollars VS other currency. Thus make export of our products cheaper, therefore attracts more oversea orders, subsequently we should be able to observe an increase of freight transportation activities, oversea passage flights. </a:t>
             </a:r>
-            <a:endParaRPr lang="en-US"/>
+            <a:endParaRPr lang="en-US" sz="1600"/>
           </a:p>
           <a:p>
             <a:pPr lvl="1"/>
             <a:r>
-              <a:rPr lang="en-US"/>
+              <a:rPr lang="en-US" sz="1600"/>
               <a:t>To stimulate general economic growth, government usually starts major infrastructural projects like major road works, etc. Hence it is also anticipated that general road construction activities are increasing.</a:t>
             </a:r>
-            <a:endParaRPr lang="en-US"/>
+            <a:endParaRPr lang="en-US" sz="1600"/>
+          </a:p>
+        </p:txBody>
+      </p:sp>
+      <p:pic>
+        <p:nvPicPr>
+          <p:cNvPr id="4" name="Content Placeholder 3"/>
+          <p:cNvPicPr>
+            <a:picLocks noChangeAspect="1"/>
+          </p:cNvPicPr>
+          <p:nvPr>
+            <p:ph sz="half" idx="2"/>
+          </p:nvPr>
+        </p:nvPicPr>
+        <p:blipFill>
+          <a:blip r:embed="rId1"/>
+          <a:stretch>
+            <a:fillRect/>
+          </a:stretch>
+        </p:blipFill>
+        <p:spPr>
+          <a:xfrm>
+            <a:off x="6665595" y="1264920"/>
+            <a:ext cx="4448175" cy="4772025"/>
+          </a:xfrm>
+          <a:prstGeom prst="rect">
+            <a:avLst/>
+          </a:prstGeom>
+        </p:spPr>
+      </p:pic>
+      <p:sp>
+        <p:nvSpPr>
+          <p:cNvPr id="6" name="Text Box 5"/>
+          <p:cNvSpPr txBox="1"/>
+          <p:nvPr/>
+        </p:nvSpPr>
+        <p:spPr>
+          <a:xfrm>
+            <a:off x="609600" y="6227445"/>
+            <a:ext cx="8583930" cy="306705"/>
+          </a:xfrm>
+          <a:prstGeom prst="rect">
+            <a:avLst/>
+          </a:prstGeom>
+          <a:noFill/>
+        </p:spPr>
+        <p:txBody>
+          <a:bodyPr wrap="square" rtlCol="0" anchor="t">
+            <a:spAutoFit/>
+          </a:bodyPr>
+          <a:p>
+            <a:r>
+              <a:rPr lang="en-US" sz="1400"/>
+              <a:t>https://www.treasury.govt.nz/publications/weu/weekly-economic-update-17-april-2020-html</a:t>
+            </a:r>
+            <a:endParaRPr lang="en-US" sz="1400"/>
           </a:p>
         </p:txBody>
       </p:sp>
@@ -4481,6 +4951,21 @@
         <p:txBody>
           <a:bodyPr/>
           <a:p>
+            <a:endParaRPr lang="en-US"/>
+          </a:p>
+          <a:p>
+            <a:endParaRPr lang="en-US"/>
+          </a:p>
+          <a:p>
+            <a:endParaRPr lang="en-US"/>
+          </a:p>
+          <a:p>
+            <a:endParaRPr lang="en-US"/>
+          </a:p>
+          <a:p>
+            <a:endParaRPr lang="en-US"/>
+          </a:p>
+          <a:p>
             <a:r>
               <a:rPr lang="en-US"/>
               <a:t>Stimulate the economy</a:t>
@@ -4489,6 +4974,58 @@
           </a:p>
         </p:txBody>
       </p:sp>
+      <p:pic>
+        <p:nvPicPr>
+          <p:cNvPr id="100" name="Picture 99"/>
+          <p:cNvPicPr/>
+          <p:nvPr/>
+        </p:nvPicPr>
+        <p:blipFill>
+          <a:blip r:embed="rId1"/>
+          <a:stretch>
+            <a:fillRect/>
+          </a:stretch>
+        </p:blipFill>
+        <p:spPr>
+          <a:xfrm>
+            <a:off x="2258060" y="3041015"/>
+            <a:ext cx="3831590" cy="2862580"/>
+          </a:xfrm>
+          <a:prstGeom prst="rect">
+            <a:avLst/>
+          </a:prstGeom>
+          <a:noFill/>
+          <a:ln w="9525">
+            <a:noFill/>
+          </a:ln>
+        </p:spPr>
+      </p:pic>
+      <p:pic>
+        <p:nvPicPr>
+          <p:cNvPr id="101" name="Picture 100"/>
+          <p:cNvPicPr/>
+          <p:nvPr/>
+        </p:nvPicPr>
+        <p:blipFill>
+          <a:blip r:embed="rId2"/>
+          <a:stretch>
+            <a:fillRect/>
+          </a:stretch>
+        </p:blipFill>
+        <p:spPr>
+          <a:xfrm>
+            <a:off x="7324725" y="1174750"/>
+            <a:ext cx="3508375" cy="2917190"/>
+          </a:xfrm>
+          <a:prstGeom prst="rect">
+            <a:avLst/>
+          </a:prstGeom>
+          <a:noFill/>
+          <a:ln w="9525">
+            <a:noFill/>
+          </a:ln>
+        </p:spPr>
+      </p:pic>
     </p:spTree>
   </p:cSld>
   <p:clrMapOvr>
@@ -4536,7 +5073,7 @@
             <a:spLocks noGrp="1"/>
           </p:cNvSpPr>
           <p:nvPr>
-            <p:ph idx="1"/>
+            <p:ph sz="half" idx="1"/>
           </p:nvPr>
         </p:nvSpPr>
         <p:spPr/>
@@ -4544,65 +5081,148 @@
           <a:bodyPr/>
           <a:p>
             <a:r>
-              <a:rPr lang="en-US"/>
+              <a:rPr lang="en-US" sz="2800"/>
               <a:t>Historical economical activity data for New Zeland</a:t>
             </a:r>
-            <a:endParaRPr lang="en-US"/>
+            <a:endParaRPr lang="en-US" sz="2800"/>
           </a:p>
           <a:p>
             <a:pPr lvl="1"/>
             <a:r>
-              <a:rPr lang="en-US"/>
+              <a:rPr lang="en-US" sz="2400"/>
               <a:t>Transporation (Air, Land...)</a:t>
             </a:r>
-            <a:endParaRPr lang="en-US"/>
+            <a:endParaRPr lang="en-US" sz="2400"/>
           </a:p>
           <a:p>
             <a:pPr lvl="1"/>
             <a:r>
-              <a:rPr lang="en-US"/>
+              <a:rPr lang="en-US" sz="2400"/>
               <a:t>Employment / Unemployment Rate</a:t>
             </a:r>
-            <a:endParaRPr lang="en-US"/>
-          </a:p>
-          <a:p>
-            <a:r>
-              <a:rPr lang="en-US"/>
+            <a:endParaRPr lang="en-US" sz="2400"/>
+          </a:p>
+          <a:p>
+            <a:r>
+              <a:rPr lang="en-US" sz="2800"/>
               <a:t>Economical policy data of New Zealand Government</a:t>
             </a:r>
-            <a:endParaRPr lang="en-US"/>
+            <a:endParaRPr lang="en-US" sz="2800"/>
           </a:p>
           <a:p>
             <a:pPr lvl="1"/>
             <a:r>
-              <a:rPr lang="en-US"/>
+              <a:rPr lang="en-US" sz="2400"/>
               <a:t>Interest rate</a:t>
             </a:r>
-            <a:endParaRPr lang="en-US"/>
+            <a:endParaRPr lang="en-US" sz="2400"/>
           </a:p>
           <a:p>
             <a:pPr lvl="1"/>
             <a:r>
-              <a:rPr lang="en-US"/>
+              <a:rPr lang="en-US" sz="2400"/>
               <a:t>CPI</a:t>
             </a:r>
-            <a:endParaRPr lang="en-US"/>
+            <a:endParaRPr lang="en-US" sz="2400"/>
           </a:p>
           <a:p>
             <a:pPr lvl="1"/>
             <a:r>
-              <a:rPr lang="en-US"/>
+              <a:rPr lang="en-US" sz="2400"/>
               <a:t>HPI (optional)</a:t>
             </a:r>
-            <a:endParaRPr lang="en-US"/>
+            <a:endParaRPr lang="en-US" sz="2400"/>
           </a:p>
           <a:p>
             <a:pPr lvl="1"/>
             <a:r>
-              <a:rPr lang="en-US"/>
+              <a:rPr lang="en-US" sz="2400"/>
               <a:t>Exchange Rate</a:t>
             </a:r>
-            <a:endParaRPr lang="en-US"/>
+            <a:endParaRPr lang="en-US" sz="2400"/>
+          </a:p>
+        </p:txBody>
+      </p:sp>
+      <p:pic>
+        <p:nvPicPr>
+          <p:cNvPr id="102" name="Picture 101"/>
+          <p:cNvPicPr/>
+          <p:nvPr/>
+        </p:nvPicPr>
+        <p:blipFill>
+          <a:blip r:embed="rId1"/>
+          <a:stretch>
+            <a:fillRect/>
+          </a:stretch>
+        </p:blipFill>
+        <p:spPr>
+          <a:xfrm>
+            <a:off x="6048058" y="1174750"/>
+            <a:ext cx="5534025" cy="2933700"/>
+          </a:xfrm>
+          <a:prstGeom prst="rect">
+            <a:avLst/>
+          </a:prstGeom>
+          <a:noFill/>
+          <a:ln w="9525">
+            <a:noFill/>
+          </a:ln>
+        </p:spPr>
+      </p:pic>
+      <p:pic>
+        <p:nvPicPr>
+          <p:cNvPr id="104" name="Content Placeholder 103"/>
+          <p:cNvPicPr/>
+          <p:nvPr>
+            <p:ph sz="half" idx="2"/>
+          </p:nvPr>
+        </p:nvPicPr>
+        <p:blipFill>
+          <a:blip r:embed="rId2"/>
+          <a:stretch>
+            <a:fillRect/>
+          </a:stretch>
+        </p:blipFill>
+        <p:spPr>
+          <a:xfrm>
+            <a:off x="4331970" y="4047490"/>
+            <a:ext cx="4792345" cy="2811145"/>
+          </a:xfrm>
+          <a:prstGeom prst="rect">
+            <a:avLst/>
+          </a:prstGeom>
+          <a:noFill/>
+          <a:ln w="9525">
+            <a:noFill/>
+          </a:ln>
+        </p:spPr>
+      </p:pic>
+      <p:sp>
+        <p:nvSpPr>
+          <p:cNvPr id="5" name="Text Box 4"/>
+          <p:cNvSpPr txBox="1"/>
+          <p:nvPr/>
+        </p:nvSpPr>
+        <p:spPr>
+          <a:xfrm>
+            <a:off x="5670550" y="1054100"/>
+            <a:ext cx="6289040" cy="275590"/>
+          </a:xfrm>
+          <a:prstGeom prst="rect">
+            <a:avLst/>
+          </a:prstGeom>
+          <a:noFill/>
+        </p:spPr>
+        <p:txBody>
+          <a:bodyPr wrap="square" rtlCol="0" anchor="t">
+            <a:spAutoFit/>
+          </a:bodyPr>
+          <a:p>
+            <a:r>
+              <a:rPr lang="en-US" sz="1200"/>
+              <a:t>https://chartingtransport.com/category/new-zealand-cities/</a:t>
+            </a:r>
+            <a:endParaRPr lang="en-US" sz="1200"/>
           </a:p>
         </p:txBody>
       </p:sp>
@@ -4681,6 +5301,87 @@
           </a:p>
         </p:txBody>
       </p:sp>
+      <p:pic>
+        <p:nvPicPr>
+          <p:cNvPr id="105" name="Picture 104"/>
+          <p:cNvPicPr/>
+          <p:nvPr/>
+        </p:nvPicPr>
+        <p:blipFill>
+          <a:blip r:embed="rId1"/>
+          <a:stretch>
+            <a:fillRect/>
+          </a:stretch>
+        </p:blipFill>
+        <p:spPr>
+          <a:xfrm>
+            <a:off x="6955155" y="2713355"/>
+            <a:ext cx="4879975" cy="3251200"/>
+          </a:xfrm>
+          <a:prstGeom prst="rect">
+            <a:avLst/>
+          </a:prstGeom>
+          <a:noFill/>
+          <a:ln w="9525">
+            <a:noFill/>
+          </a:ln>
+        </p:spPr>
+      </p:pic>
+      <p:sp>
+        <p:nvSpPr>
+          <p:cNvPr id="4" name="Text Box 3"/>
+          <p:cNvSpPr txBox="1"/>
+          <p:nvPr/>
+        </p:nvSpPr>
+        <p:spPr>
+          <a:xfrm>
+            <a:off x="245110" y="6127750"/>
+            <a:ext cx="8954770" cy="368300"/>
+          </a:xfrm>
+          <a:prstGeom prst="rect">
+            <a:avLst/>
+          </a:prstGeom>
+          <a:noFill/>
+        </p:spPr>
+        <p:txBody>
+          <a:bodyPr wrap="square" rtlCol="0" anchor="t">
+            <a:spAutoFit/>
+          </a:bodyPr>
+          <a:p>
+            <a:r>
+              <a:rPr lang="en-US"/>
+              <a:t>https://www.eiu.com/n/will-the-new-zealand-economy-tip-into-recession/</a:t>
+            </a:r>
+            <a:endParaRPr lang="en-US"/>
+          </a:p>
+        </p:txBody>
+      </p:sp>
+      <p:pic>
+        <p:nvPicPr>
+          <p:cNvPr id="106" name="Picture 105"/>
+          <p:cNvPicPr/>
+          <p:nvPr/>
+        </p:nvPicPr>
+        <p:blipFill>
+          <a:blip r:embed="rId2"/>
+          <a:stretch>
+            <a:fillRect/>
+          </a:stretch>
+        </p:blipFill>
+        <p:spPr>
+          <a:xfrm>
+            <a:off x="735965" y="2767330"/>
+            <a:ext cx="5715000" cy="3143250"/>
+          </a:xfrm>
+          <a:prstGeom prst="rect">
+            <a:avLst/>
+          </a:prstGeom>
+          <a:noFill/>
+          <a:ln w="9525">
+            <a:noFill/>
+          </a:ln>
+        </p:spPr>
+      </p:pic>
     </p:spTree>
   </p:cSld>
   <p:clrMapOvr>
@@ -4709,17 +5410,30 @@
             <p:ph type="title"/>
           </p:nvPr>
         </p:nvSpPr>
-        <p:spPr/>
+        <p:spPr>
+          <a:xfrm>
+            <a:off x="609600" y="112395"/>
+            <a:ext cx="10972800" cy="790575"/>
+          </a:xfrm>
+        </p:spPr>
         <p:txBody>
           <a:bodyPr>
             <a:normAutofit fontScale="90000"/>
           </a:bodyPr>
           <a:p>
+            <a:pPr algn="r"/>
             <a:r>
               <a:rPr lang="en-US"/>
-              <a:t>What target you chose (I.e.n what is the intended use of the data, …)</a:t>
-            </a:r>
-            <a:endParaRPr lang="en-US"/>
+              <a:t>What target you chose </a:t>
+            </a:r>
+            <a:br>
+              <a:rPr lang="en-US"/>
+            </a:br>
+            <a:r>
+              <a:rPr lang="en-US" sz="2700"/>
+              <a:t>(I.e.n what is the intended use of the data, …)</a:t>
+            </a:r>
+            <a:endParaRPr lang="en-US" sz="2700"/>
           </a:p>
         </p:txBody>
       </p:sp>
@@ -4852,9 +5566,66 @@
         <p:nvPr/>
       </p:nvGrpSpPr>
       <p:grpSpPr/>
-      <p:sp>
-        <p:nvSpPr>
-          <p:cNvPr id="2" name="Title 1"/>
+      <p:pic>
+        <p:nvPicPr>
+          <p:cNvPr id="109" name="Content Placeholder 108"/>
+          <p:cNvPicPr/>
+          <p:nvPr>
+            <p:ph idx="1"/>
+          </p:nvPr>
+        </p:nvPicPr>
+        <p:blipFill>
+          <a:blip r:embed="rId1"/>
+          <a:stretch>
+            <a:fillRect/>
+          </a:stretch>
+        </p:blipFill>
+        <p:spPr>
+          <a:xfrm>
+            <a:off x="609600" y="1123315"/>
+            <a:ext cx="7397115" cy="3074035"/>
+          </a:xfrm>
+          <a:prstGeom prst="rect">
+            <a:avLst/>
+          </a:prstGeom>
+          <a:noFill/>
+          <a:ln w="9525">
+            <a:noFill/>
+          </a:ln>
+        </p:spPr>
+      </p:pic>
+      <p:sp>
+        <p:nvSpPr>
+          <p:cNvPr id="5" name="Text Box 4"/>
+          <p:cNvSpPr txBox="1"/>
+          <p:nvPr/>
+        </p:nvSpPr>
+        <p:spPr>
+          <a:xfrm>
+            <a:off x="8705850" y="1584325"/>
+            <a:ext cx="2978785" cy="1753235"/>
+          </a:xfrm>
+          <a:prstGeom prst="rect">
+            <a:avLst/>
+          </a:prstGeom>
+          <a:noFill/>
+        </p:spPr>
+        <p:txBody>
+          <a:bodyPr wrap="square" rtlCol="0">
+            <a:spAutoFit/>
+          </a:bodyPr>
+          <a:p>
+            <a:r>
+              <a:rPr lang="en-US"/>
+              <a:t>Based on the data we have collected, machine learning / Artificial Intelligence Algorithms could be deployed to conduct prediction on Recession</a:t>
+            </a:r>
+            <a:endParaRPr lang="en-US"/>
+          </a:p>
+        </p:txBody>
+      </p:sp>
+      <p:sp>
+        <p:nvSpPr>
+          <p:cNvPr id="7" name="Title 6"/>
           <p:cNvSpPr>
             <a:spLocks noGrp="1"/>
           </p:cNvSpPr>
@@ -4862,39 +5633,30 @@
             <p:ph type="title"/>
           </p:nvPr>
         </p:nvSpPr>
-        <p:spPr/>
+        <p:spPr>
+          <a:xfrm>
+            <a:off x="609600" y="112395"/>
+            <a:ext cx="10972800" cy="790575"/>
+          </a:xfrm>
+        </p:spPr>
         <p:txBody>
           <a:bodyPr>
             <a:normAutofit fontScale="90000"/>
           </a:bodyPr>
           <a:p>
+            <a:pPr algn="r"/>
             <a:r>
               <a:rPr lang="en-US"/>
-              <a:t>What difficulties you have to overcome to wrangle the data sources into the target data model</a:t>
-            </a:r>
-            <a:endParaRPr lang="en-US"/>
-          </a:p>
-        </p:txBody>
-      </p:sp>
-      <p:sp>
-        <p:nvSpPr>
-          <p:cNvPr id="3" name="Content Placeholder 2"/>
-          <p:cNvSpPr>
-            <a:spLocks noGrp="1"/>
-          </p:cNvSpPr>
-          <p:nvPr>
-            <p:ph idx="1"/>
-          </p:nvPr>
-        </p:nvSpPr>
-        <p:spPr/>
-        <p:txBody>
-          <a:bodyPr/>
-          <a:p>
-            <a:r>
+              <a:t>What target you chose </a:t>
+            </a:r>
+            <a:br>
               <a:rPr lang="en-US"/>
-              <a:t>We faced difficulties of finding keys between these entities, these historical data are not collected with the same frequencies. Some of them are collected on annual base, some of them are collected on monthly base and some of them are collected on quarterly basis. We need to wrangle these data to form unified keys for further construction of the relationship between these entities. </a:t>
-            </a:r>
-            <a:endParaRPr lang="en-US"/>
+            </a:br>
+            <a:r>
+              <a:rPr lang="en-US" sz="2700"/>
+              <a:t>(I.e.n what is the intended use of the data, …)</a:t>
+            </a:r>
+            <a:endParaRPr lang="en-US" sz="2700"/>
           </a:p>
         </p:txBody>
       </p:sp>
@@ -4918,7 +5680,7 @@
       <p:grpSpPr/>
       <p:sp>
         <p:nvSpPr>
-          <p:cNvPr id="2" name="Title 1"/>
+          <p:cNvPr id="10" name="Title 9"/>
           <p:cNvSpPr>
             <a:spLocks noGrp="1"/>
           </p:cNvSpPr>
@@ -4932,34 +5694,64 @@
           <a:p>
             <a:r>
               <a:rPr lang="en-US"/>
-              <a:t>What techniques you did see</a:t>
-            </a:r>
-            <a:endParaRPr lang="en-US"/>
-          </a:p>
-        </p:txBody>
-      </p:sp>
-      <p:sp>
-        <p:nvSpPr>
-          <p:cNvPr id="3" name="Content Placeholder 2"/>
-          <p:cNvSpPr>
-            <a:spLocks noGrp="1"/>
-          </p:cNvSpPr>
-          <p:nvPr>
-            <p:ph idx="1"/>
-          </p:nvPr>
-        </p:nvSpPr>
-        <p:spPr/>
-        <p:txBody>
-          <a:bodyPr/>
-          <a:p>
-            <a:r>
-              <a:rPr lang="en-US"/>
-              <a:t>For data scraping,  various techniques have been utilized for direct data file downing, web scraping, API calling</a:t>
-            </a:r>
-            <a:endParaRPr lang="en-US"/>
-          </a:p>
-        </p:txBody>
-      </p:sp>
+              <a:t>`</a:t>
+            </a:r>
+            <a:endParaRPr lang="en-US"/>
+          </a:p>
+        </p:txBody>
+      </p:sp>
+      <p:pic>
+        <p:nvPicPr>
+          <p:cNvPr id="8" name="Content Placeholder 7"/>
+          <p:cNvPicPr>
+            <a:picLocks noChangeAspect="1"/>
+          </p:cNvPicPr>
+          <p:nvPr>
+            <p:ph sz="half" idx="1"/>
+          </p:nvPr>
+        </p:nvPicPr>
+        <p:blipFill>
+          <a:blip r:embed="rId1"/>
+          <a:stretch>
+            <a:fillRect/>
+          </a:stretch>
+        </p:blipFill>
+        <p:spPr>
+          <a:xfrm>
+            <a:off x="741045" y="1174750"/>
+            <a:ext cx="5120640" cy="4953000"/>
+          </a:xfrm>
+          <a:prstGeom prst="rect">
+            <a:avLst/>
+          </a:prstGeom>
+        </p:spPr>
+      </p:pic>
+      <p:pic>
+        <p:nvPicPr>
+          <p:cNvPr id="9" name="Content Placeholder 8"/>
+          <p:cNvPicPr>
+            <a:picLocks noChangeAspect="1"/>
+          </p:cNvPicPr>
+          <p:nvPr>
+            <p:ph sz="half" idx="2"/>
+          </p:nvPr>
+        </p:nvPicPr>
+        <p:blipFill>
+          <a:blip r:embed="rId2"/>
+          <a:stretch>
+            <a:fillRect/>
+          </a:stretch>
+        </p:blipFill>
+        <p:spPr>
+          <a:xfrm>
+            <a:off x="6309995" y="1350010"/>
+            <a:ext cx="5384800" cy="3129915"/>
+          </a:xfrm>
+          <a:prstGeom prst="rect">
+            <a:avLst/>
+          </a:prstGeom>
+        </p:spPr>
+      </p:pic>
     </p:spTree>
   </p:cSld>
   <p:clrMapOvr>
@@ -4990,15 +5782,13 @@
         </p:nvSpPr>
         <p:spPr/>
         <p:txBody>
-          <a:bodyPr>
-            <a:normAutofit fontScale="90000"/>
-          </a:bodyPr>
-          <a:p>
-            <a:r>
-              <a:rPr lang="en-US"/>
-              <a:t>What you managed to achieve and what you failed to do  </a:t>
-            </a:r>
-            <a:endParaRPr lang="en-US"/>
+          <a:bodyPr/>
+          <a:p>
+            <a:r>
+              <a:rPr lang="en-US" sz="2400"/>
+              <a:t>What difficulties you have to overcome to wrangle the data sources into the target data model</a:t>
+            </a:r>
+            <a:endParaRPr lang="en-US" sz="2400"/>
           </a:p>
         </p:txBody>
       </p:sp>
@@ -5009,7 +5799,7 @@
             <a:spLocks noGrp="1"/>
           </p:cNvSpPr>
           <p:nvPr>
-            <p:ph idx="1"/>
+            <p:ph sz="half" idx="1"/>
           </p:nvPr>
         </p:nvSpPr>
         <p:spPr/>
@@ -5017,20 +5807,39 @@
           <a:bodyPr/>
           <a:p>
             <a:r>
-              <a:rPr lang="en-US"/>
-              <a:t>API </a:t>
-            </a:r>
-            <a:endParaRPr lang="en-US"/>
-          </a:p>
-          <a:p>
-            <a:r>
-              <a:rPr lang="en-US"/>
-              <a:t>HPI failed to </a:t>
-            </a:r>
-            <a:endParaRPr lang="en-US"/>
-          </a:p>
-        </p:txBody>
-      </p:sp>
+              <a:rPr lang="en-US" sz="2400"/>
+              <a:t>We faced difficulties of finding keys between these entities, these historical data are not collected with the same frequencies. Some of them are collected on annual base, some of them are collected on monthly base and some of them are collected on quarterly basis. We need to wrangle these data to form unified keys for further construction of the relationship between these entities. </a:t>
+            </a:r>
+            <a:endParaRPr lang="en-US" sz="2400"/>
+          </a:p>
+        </p:txBody>
+      </p:sp>
+      <p:pic>
+        <p:nvPicPr>
+          <p:cNvPr id="4" name="Content Placeholder 3"/>
+          <p:cNvPicPr>
+            <a:picLocks noChangeAspect="1"/>
+          </p:cNvPicPr>
+          <p:nvPr>
+            <p:ph sz="half" idx="2"/>
+          </p:nvPr>
+        </p:nvPicPr>
+        <p:blipFill>
+          <a:blip r:embed="rId1"/>
+          <a:stretch>
+            <a:fillRect/>
+          </a:stretch>
+        </p:blipFill>
+        <p:spPr>
+          <a:xfrm>
+            <a:off x="6344920" y="1506855"/>
+            <a:ext cx="5384800" cy="2244090"/>
+          </a:xfrm>
+          <a:prstGeom prst="rect">
+            <a:avLst/>
+          </a:prstGeom>
+        </p:spPr>
+      </p:pic>
     </p:spTree>
   </p:cSld>
   <p:clrMapOvr>

</xml_diff>

<commit_message>
update ppt with HPI
</commit_message>
<xml_diff>
--- a/Group Project Presentation.pptx
+++ b/Group Project Presentation.pptx
@@ -23,8 +23,9 @@
     <p:sldId id="297" r:id="rId16"/>
     <p:sldId id="298" r:id="rId17"/>
     <p:sldId id="264" r:id="rId18"/>
-    <p:sldId id="266" r:id="rId19"/>
-    <p:sldId id="267" r:id="rId20"/>
+    <p:sldId id="302" r:id="rId19"/>
+    <p:sldId id="266" r:id="rId20"/>
+    <p:sldId id="267" r:id="rId21"/>
   </p:sldIdLst>
   <p:sldSz cx="12192000" cy="6858000"/>
   <p:notesSz cx="6858000" cy="9144000"/>
@@ -4454,6 +4455,101 @@
           <a:p>
             <a:r>
               <a:rPr lang="en-US"/>
+              <a:t>How does Interest Rate Impact HPI</a:t>
+            </a:r>
+            <a:endParaRPr lang="en-US"/>
+          </a:p>
+        </p:txBody>
+      </p:sp>
+      <p:pic>
+        <p:nvPicPr>
+          <p:cNvPr id="7" name="Content Placeholder 6"/>
+          <p:cNvPicPr>
+            <a:picLocks noChangeAspect="1"/>
+          </p:cNvPicPr>
+          <p:nvPr>
+            <p:ph idx="1"/>
+          </p:nvPr>
+        </p:nvPicPr>
+        <p:blipFill>
+          <a:blip r:embed="rId1"/>
+          <a:stretch>
+            <a:fillRect/>
+          </a:stretch>
+        </p:blipFill>
+        <p:spPr>
+          <a:xfrm>
+            <a:off x="4513580" y="1154430"/>
+            <a:ext cx="7442200" cy="4953000"/>
+          </a:xfrm>
+          <a:prstGeom prst="rect">
+            <a:avLst/>
+          </a:prstGeom>
+        </p:spPr>
+      </p:pic>
+      <p:sp>
+        <p:nvSpPr>
+          <p:cNvPr id="8" name="Text Box 7"/>
+          <p:cNvSpPr txBox="1"/>
+          <p:nvPr/>
+        </p:nvSpPr>
+        <p:spPr>
+          <a:xfrm>
+            <a:off x="301625" y="1176655"/>
+            <a:ext cx="3818255" cy="922020"/>
+          </a:xfrm>
+          <a:prstGeom prst="rect">
+            <a:avLst/>
+          </a:prstGeom>
+          <a:noFill/>
+        </p:spPr>
+        <p:txBody>
+          <a:bodyPr wrap="square" rtlCol="0">
+            <a:spAutoFit/>
+          </a:bodyPr>
+          <a:p>
+            <a:r>
+              <a:rPr lang="en-US"/>
+              <a:t>How does Interest Rate of Reserver Bank of New Zealand Impact on house price index (HPI )</a:t>
+            </a:r>
+            <a:endParaRPr lang="en-US"/>
+          </a:p>
+        </p:txBody>
+      </p:sp>
+    </p:spTree>
+  </p:cSld>
+  <p:clrMapOvr>
+    <a:masterClrMapping/>
+  </p:clrMapOvr>
+</p:sld>
+</file>
+
+<file path=ppt/slides/slide17.xml><?xml version="1.0" encoding="utf-8"?>
+<p:sld xmlns:a="http://schemas.openxmlformats.org/drawingml/2006/main" xmlns:r="http://schemas.openxmlformats.org/officeDocument/2006/relationships" xmlns:p="http://schemas.openxmlformats.org/presentationml/2006/main">
+  <p:cSld>
+    <p:spTree>
+      <p:nvGrpSpPr>
+        <p:cNvPr id="1" name=""/>
+        <p:cNvGrpSpPr/>
+        <p:nvPr/>
+      </p:nvGrpSpPr>
+      <p:grpSpPr/>
+      <p:sp>
+        <p:nvSpPr>
+          <p:cNvPr id="2" name="Title 1"/>
+          <p:cNvSpPr>
+            <a:spLocks noGrp="1"/>
+          </p:cNvSpPr>
+          <p:nvPr>
+            <p:ph type="title"/>
+          </p:nvPr>
+        </p:nvSpPr>
+        <p:spPr/>
+        <p:txBody>
+          <a:bodyPr/>
+          <a:p>
+            <a:r>
+              <a:rPr lang="en-US"/>
               <a:t>Conclusions</a:t>
             </a:r>
             <a:endParaRPr lang="en-US"/>
@@ -4592,7 +4688,7 @@
 </p:sld>
 </file>
 
-<file path=ppt/slides/slide17.xml><?xml version="1.0" encoding="utf-8"?>
+<file path=ppt/slides/slide18.xml><?xml version="1.0" encoding="utf-8"?>
 <p:sld xmlns:a="http://schemas.openxmlformats.org/drawingml/2006/main" xmlns:r="http://schemas.openxmlformats.org/officeDocument/2006/relationships" xmlns:p="http://schemas.openxmlformats.org/presentationml/2006/main">
   <p:cSld>
     <p:spTree>

</xml_diff>

<commit_message>
update presentation with charts formula
</commit_message>
<xml_diff>
--- a/Group Project Presentation.pptx
+++ b/Group Project Presentation.pptx
@@ -5882,15 +5882,62 @@
           </a:p>
         </p:txBody>
       </p:sp>
+      <p:sp>
+        <p:nvSpPr>
+          <p:cNvPr id="8" name="Text Box 7"/>
+          <p:cNvSpPr txBox="1"/>
+          <p:nvPr/>
+        </p:nvSpPr>
+        <p:spPr>
+          <a:xfrm>
+            <a:off x="6169025" y="1745615"/>
+            <a:ext cx="5281295" cy="2861310"/>
+          </a:xfrm>
+          <a:prstGeom prst="rect">
+            <a:avLst/>
+          </a:prstGeom>
+          <a:noFill/>
+        </p:spPr>
+        <p:txBody>
+          <a:bodyPr wrap="square" rtlCol="0">
+            <a:spAutoFit/>
+          </a:bodyPr>
+          <a:p>
+            <a:r>
+              <a:rPr lang="en-US"/>
+              <a:t>Official cash rate / Interest rate</a:t>
+            </a:r>
+            <a:endParaRPr lang="en-US"/>
+          </a:p>
+          <a:p>
+            <a:endParaRPr lang="en-US"/>
+          </a:p>
+          <a:p>
+            <a:r>
+              <a:rPr lang="en-US" sz="1600"/>
+              <a:t>Monetary policy influences economic activity by changing the incentives for saving and investment. This channel typically affects consumption, housing investment and business investment. Lower interest rates on bank deposits reduce the incentives households have to save their money.</a:t>
+            </a:r>
+            <a:endParaRPr lang="en-US" sz="1600"/>
+          </a:p>
+          <a:p>
+            <a:endParaRPr lang="en-US" sz="1600"/>
+          </a:p>
+          <a:p>
+            <a:r>
+              <a:rPr lang="en-US" sz="1600"/>
+              <a:t>In our project, we choose “Reserve bank Interest Rate” as primary monetar policy indicators</a:t>
+            </a:r>
+            <a:endParaRPr lang="en-US" sz="1600"/>
+          </a:p>
+        </p:txBody>
+      </p:sp>
       <p:pic>
         <p:nvPicPr>
-          <p:cNvPr id="7" name="Content Placeholder 6"/>
+          <p:cNvPr id="4" name="Picture 3" descr="DatabaseDesign"/>
           <p:cNvPicPr>
             <a:picLocks noChangeAspect="1"/>
           </p:cNvPicPr>
-          <p:nvPr>
-            <p:ph sz="half" idx="2"/>
-          </p:nvPr>
+          <p:nvPr/>
         </p:nvPicPr>
         <p:blipFill>
           <a:blip r:embed="rId1"/>
@@ -5900,73 +5947,14 @@
         </p:blipFill>
         <p:spPr>
           <a:xfrm>
-            <a:off x="551180" y="1000125"/>
-            <a:ext cx="6744335" cy="5598160"/>
+            <a:off x="215900" y="917575"/>
+            <a:ext cx="5329555" cy="5659120"/>
           </a:xfrm>
           <a:prstGeom prst="rect">
             <a:avLst/>
           </a:prstGeom>
         </p:spPr>
       </p:pic>
-      <p:sp>
-        <p:nvSpPr>
-          <p:cNvPr id="8" name="Text Box 7"/>
-          <p:cNvSpPr txBox="1"/>
-          <p:nvPr/>
-        </p:nvSpPr>
-        <p:spPr>
-          <a:xfrm>
-            <a:off x="8021955" y="1229360"/>
-            <a:ext cx="3584575" cy="4831080"/>
-          </a:xfrm>
-          <a:prstGeom prst="rect">
-            <a:avLst/>
-          </a:prstGeom>
-          <a:noFill/>
-        </p:spPr>
-        <p:txBody>
-          <a:bodyPr wrap="square" rtlCol="0">
-            <a:spAutoFit/>
-          </a:bodyPr>
-          <a:p>
-            <a:r>
-              <a:rPr lang="en-US"/>
-              <a:t>Official cash rate / Interest rate</a:t>
-            </a:r>
-            <a:endParaRPr lang="en-US"/>
-          </a:p>
-          <a:p>
-            <a:endParaRPr lang="en-US"/>
-          </a:p>
-          <a:p>
-            <a:r>
-              <a:rPr lang="en-US" sz="1600"/>
-              <a:t>Monetary policy influences economic activity by changing the incentives for saving and investment. This channel typically affects consumption, housing investment and business investment. Lower interest rates on bank deposits reduce the incentives households have to save their money.</a:t>
-            </a:r>
-            <a:endParaRPr lang="en-US" sz="1600"/>
-          </a:p>
-          <a:p>
-            <a:endParaRPr lang="en-US" sz="1600"/>
-          </a:p>
-          <a:p>
-            <a:r>
-              <a:rPr lang="en-US" sz="1600"/>
-              <a:t>Central banks have four main monetary policy tools: the reserve requirement, open market operations, the discount rate, and interest on reserves.</a:t>
-            </a:r>
-            <a:endParaRPr lang="en-US" sz="1600"/>
-          </a:p>
-          <a:p>
-            <a:endParaRPr lang="en-US" sz="1600"/>
-          </a:p>
-          <a:p>
-            <a:r>
-              <a:rPr lang="en-US" sz="1600"/>
-              <a:t>In our project, we choose “Reserve bank Interest Rate”</a:t>
-            </a:r>
-            <a:endParaRPr lang="en-US" sz="1600"/>
-          </a:p>
-        </p:txBody>
-      </p:sp>
     </p:spTree>
   </p:cSld>
   <p:clrMapOvr>
@@ -6054,6 +6042,17 @@
             <a:endParaRPr lang="en-US"/>
           </a:p>
           <a:p>
+            <a:pPr marL="0" indent="0">
+              <a:buNone/>
+            </a:pPr>
+            <a:endParaRPr lang="en-US" sz="1000" b="1">
+              <a:sym typeface="+mn-ea"/>
+            </a:endParaRPr>
+          </a:p>
+          <a:p>
+            <a:pPr marL="0" indent="0">
+              <a:buNone/>
+            </a:pPr>
             <a:r>
               <a:rPr lang="en-US" sz="1000" b="1">
                 <a:sym typeface="+mn-ea"/>
@@ -6071,9 +6070,15 @@
             <a:endParaRPr lang="en-US" sz="1000"/>
           </a:p>
           <a:p>
+            <a:pPr marL="0" indent="0">
+              <a:buNone/>
+            </a:pPr>
             <a:endParaRPr lang="en-US" sz="1000"/>
           </a:p>
           <a:p>
+            <a:pPr marL="0" indent="0">
+              <a:buNone/>
+            </a:pPr>
             <a:r>
               <a:rPr lang="en-US" sz="1000"/>
               <a:t>Critical review of the NZ monetary policy effectiveness. To coupe with covid-19 lockdown and sequence recession, slowing down to dealing. </a:t>
@@ -6081,9 +6086,15 @@
             <a:endParaRPr lang="en-US" sz="1000"/>
           </a:p>
           <a:p>
+            <a:pPr marL="0" indent="0">
+              <a:buNone/>
+            </a:pPr>
             <a:endParaRPr lang="en-US" sz="1000"/>
           </a:p>
           <a:p>
+            <a:pPr marL="0" indent="0">
+              <a:buNone/>
+            </a:pPr>
             <a:r>
               <a:rPr lang="en-US" sz="1000" b="1"/>
               <a:t>2) Potential usage </a:t>
@@ -6095,6 +6106,9 @@
             <a:endParaRPr lang="en-US" sz="1000"/>
           </a:p>
           <a:p>
+            <a:pPr marL="0" indent="0">
+              <a:buNone/>
+            </a:pPr>
             <a:r>
               <a:rPr lang="en-US" sz="1000"/>
               <a:t>The data source we are building is intended to be used for building (visualization) and training prediction model (machine learning) _time series, forecasting . for New Zealand companies. </a:t>
@@ -6102,9 +6116,15 @@
             <a:endParaRPr lang="en-US" sz="1000"/>
           </a:p>
           <a:p>
+            <a:pPr marL="0" indent="0">
+              <a:buNone/>
+            </a:pPr>
             <a:endParaRPr lang="en-US" sz="1000"/>
           </a:p>
           <a:p>
+            <a:pPr marL="0" indent="0">
+              <a:buNone/>
+            </a:pPr>
             <a:r>
               <a:rPr lang="en-US" sz="1000"/>
               <a:t>The potential user of our datasource are targeted to improve their company efficiency.</a:t>
@@ -6112,9 +6132,15 @@
             <a:endParaRPr lang="en-US" sz="1000"/>
           </a:p>
           <a:p>
+            <a:pPr marL="0" indent="0">
+              <a:buNone/>
+            </a:pPr>
             <a:endParaRPr lang="en-US" sz="1000"/>
           </a:p>
           <a:p>
+            <a:pPr marL="0" indent="0">
+              <a:buNone/>
+            </a:pPr>
             <a:r>
               <a:rPr lang="en-US" sz="1000"/>
               <a:t>By analyzing company performance data such as Annual Income VS historical transportation statistics VS. New Zealand Government monetary policy data such as CPI, Exchange Rate, Import Taxation. </a:t>
@@ -6122,9 +6148,15 @@
             <a:endParaRPr lang="en-US" sz="1000"/>
           </a:p>
           <a:p>
+            <a:pPr marL="0" indent="0">
+              <a:buNone/>
+            </a:pPr>
             <a:endParaRPr lang="en-US" sz="1000"/>
           </a:p>
           <a:p>
+            <a:pPr marL="0" indent="0">
+              <a:buNone/>
+            </a:pPr>
             <a:r>
               <a:rPr lang="en-US" sz="1000"/>
               <a:t>Should we include more overseas government data such Import Tax of China, US. Dollar CPI. Join these such data together, we are potentially able to produce a prediction mode trained with these historical data. Utilization of such prediction model will enable company to device forward strategies for increase or decrease production capabilities. Such company strategies will further enable its finance / accounting department on allocate investment budgets as well as income forecasting. Whether or not company should be hiring new employees and purchasing new equipment will depends upon such forward strategies.</a:t>

</xml_diff>

<commit_message>
Added my slides to the presentation
</commit_message>
<xml_diff>
--- a/Group Project Presentation.pptx
+++ b/Group Project Presentation.pptx
@@ -5,28 +5,31 @@
     <p:sldMasterId id="2147483648" r:id="rId1"/>
   </p:sldMasterIdLst>
   <p:notesMasterIdLst>
-    <p:notesMasterId r:id="rId4"/>
+    <p:notesMasterId r:id="rId24"/>
   </p:notesMasterIdLst>
   <p:sldIdLst>
-    <p:sldId id="256" r:id="rId3"/>
-    <p:sldId id="265" r:id="rId5"/>
-    <p:sldId id="276" r:id="rId6"/>
-    <p:sldId id="257" r:id="rId7"/>
-    <p:sldId id="303" r:id="rId8"/>
-    <p:sldId id="259" r:id="rId9"/>
-    <p:sldId id="288" r:id="rId10"/>
-    <p:sldId id="258" r:id="rId11"/>
-    <p:sldId id="287" r:id="rId12"/>
-    <p:sldId id="260" r:id="rId13"/>
-    <p:sldId id="261" r:id="rId14"/>
-    <p:sldId id="262" r:id="rId15"/>
-    <p:sldId id="263" r:id="rId16"/>
-    <p:sldId id="297" r:id="rId17"/>
-    <p:sldId id="298" r:id="rId18"/>
-    <p:sldId id="264" r:id="rId19"/>
-    <p:sldId id="302" r:id="rId20"/>
-    <p:sldId id="266" r:id="rId21"/>
-    <p:sldId id="267" r:id="rId22"/>
+    <p:sldId id="256" r:id="rId2"/>
+    <p:sldId id="265" r:id="rId3"/>
+    <p:sldId id="276" r:id="rId4"/>
+    <p:sldId id="257" r:id="rId5"/>
+    <p:sldId id="303" r:id="rId6"/>
+    <p:sldId id="259" r:id="rId7"/>
+    <p:sldId id="288" r:id="rId8"/>
+    <p:sldId id="258" r:id="rId9"/>
+    <p:sldId id="287" r:id="rId10"/>
+    <p:sldId id="304" r:id="rId11"/>
+    <p:sldId id="305" r:id="rId12"/>
+    <p:sldId id="307" r:id="rId13"/>
+    <p:sldId id="306" r:id="rId14"/>
+    <p:sldId id="261" r:id="rId15"/>
+    <p:sldId id="262" r:id="rId16"/>
+    <p:sldId id="263" r:id="rId17"/>
+    <p:sldId id="297" r:id="rId18"/>
+    <p:sldId id="298" r:id="rId19"/>
+    <p:sldId id="264" r:id="rId20"/>
+    <p:sldId id="302" r:id="rId21"/>
+    <p:sldId id="266" r:id="rId22"/>
+    <p:sldId id="267" r:id="rId23"/>
   </p:sldIdLst>
   <p:sldSz cx="12192000" cy="6858000"/>
   <p:notesSz cx="6858000" cy="9144000"/>
@@ -125,12 +128,24 @@
       </a:defRPr>
     </a:lvl9pPr>
   </p:defaultTextStyle>
+  <p:extLst>
+    <p:ext uri="{EFAFB233-063F-42B5-8137-9DF3F51BA10A}">
+      <p15:sldGuideLst xmlns:p15="http://schemas.microsoft.com/office/powerpoint/2012/main"/>
+    </p:ext>
+  </p:extLst>
 </p:presentation>
 </file>
 
 <file path=ppt/commentAuthors.xml><?xml version="1.0" encoding="utf-8"?>
 <p:cmAuthorLst xmlns:a="http://schemas.openxmlformats.org/drawingml/2006/main" xmlns:r="http://schemas.openxmlformats.org/officeDocument/2006/relationships" xmlns:p="http://schemas.openxmlformats.org/presentationml/2006/main">
   <p:cmAuthor id="1" name="JeffreyC" initials="J" lastIdx="1" clrIdx="0"/>
+  <p:cmAuthor id="2" name="Ali Surface" initials="AS" lastIdx="1" clrIdx="1">
+    <p:extLst>
+      <p:ext uri="{19B8F6BF-5375-455C-9EA6-DF929625EA0E}">
+        <p15:presenceInfo xmlns:p15="http://schemas.microsoft.com/office/powerpoint/2012/main" userId="987164923809310b" providerId="Windows Live"/>
+      </p:ext>
+    </p:extLst>
+  </p:cmAuthor>
 </p:cmAuthorLst>
 </file>
 
@@ -225,6 +240,7 @@
           <a:p>
             <a:fld id="{3EFD42F7-718C-4B98-AAEC-167E6DDD60A7}" type="datetimeFigureOut">
               <a:rPr lang="en-US" smtClean="0"/>
+              <a:t>10/20/2022</a:t>
             </a:fld>
             <a:endParaRPr lang="en-US"/>
           </a:p>
@@ -288,42 +304,37 @@
           <a:p>
             <a:pPr lvl="0"/>
             <a:r>
-              <a:rPr lang="en-US" smtClean="0"/>
+              <a:rPr lang="en-US"/>
               <a:t>Click to edit Master text styles</a:t>
             </a:r>
-            <a:endParaRPr lang="en-US" smtClean="0"/>
           </a:p>
           <a:p>
             <a:pPr lvl="1"/>
             <a:r>
-              <a:rPr lang="en-US" smtClean="0"/>
+              <a:rPr lang="en-US"/>
               <a:t>Second level</a:t>
             </a:r>
-            <a:endParaRPr lang="en-US" smtClean="0"/>
           </a:p>
           <a:p>
             <a:pPr lvl="2"/>
             <a:r>
-              <a:rPr lang="en-US" smtClean="0"/>
+              <a:rPr lang="en-US"/>
               <a:t>Third level</a:t>
             </a:r>
-            <a:endParaRPr lang="en-US" smtClean="0"/>
           </a:p>
           <a:p>
             <a:pPr lvl="3"/>
             <a:r>
-              <a:rPr lang="en-US" smtClean="0"/>
+              <a:rPr lang="en-US"/>
               <a:t>Fourth level</a:t>
             </a:r>
-            <a:endParaRPr lang="en-US" smtClean="0"/>
           </a:p>
           <a:p>
             <a:pPr lvl="4"/>
             <a:r>
-              <a:rPr lang="en-US" smtClean="0"/>
+              <a:rPr lang="en-US"/>
               <a:t>Fifth level</a:t>
             </a:r>
-            <a:endParaRPr lang="en-US"/>
           </a:p>
         </p:txBody>
       </p:sp>
@@ -387,6 +398,7 @@
           <a:p>
             <a:fld id="{21B2AA4F-B828-4D7C-AFD3-893933DAFCB4}" type="slidenum">
               <a:rPr lang="en-US" smtClean="0"/>
+              <a:t>‹#›</a:t>
             </a:fld>
             <a:endParaRPr lang="en-US"/>
           </a:p>
@@ -499,11 +511,20 @@
         <p:cNvGrpSpPr/>
         <p:nvPr/>
       </p:nvGrpSpPr>
-      <p:grpSpPr/>
+      <p:grpSpPr>
+        <a:xfrm>
+          <a:off x="0" y="0"/>
+          <a:ext cx="0" cy="0"/>
+          <a:chOff x="0" y="0"/>
+          <a:chExt cx="0" cy="0"/>
+        </a:xfrm>
+      </p:grpSpPr>
       <p:sp>
         <p:nvSpPr>
           <p:cNvPr id="2" name="Slide Image Placeholder 1"/>
-          <p:cNvSpPr/>
+          <p:cNvSpPr>
+            <a:spLocks noGrp="1" noRot="1" noChangeAspect="1"/>
+          </p:cNvSpPr>
           <p:nvPr>
             <p:ph type="sldImg" idx="2"/>
           </p:nvPr>
@@ -513,7 +534,9 @@
       <p:sp>
         <p:nvSpPr>
           <p:cNvPr id="3" name="Text Placeholder 2"/>
-          <p:cNvSpPr/>
+          <p:cNvSpPr>
+            <a:spLocks noGrp="1"/>
+          </p:cNvSpPr>
           <p:nvPr>
             <p:ph type="body" idx="3"/>
           </p:nvPr>
@@ -521,12 +544,12 @@
         <p:spPr/>
         <p:txBody>
           <a:bodyPr/>
+          <a:lstStyle/>
           <a:p>
             <a:r>
               <a:rPr lang="en-US"/>
               <a:t>New Zealand is a relatively small economical entity that heavily rely on overseas business. Facing an increasing turbulent international political and economical environment (war and covid-19), in order to maintain our prosperity, in depth analysis on how New Zealand vital economical policy impact on our main economical activities are not only useful but also crucial for the success of these New Zealand companies, such as Air NewZealand, Kiwi Rail and Tourism New Zealand. </a:t>
             </a:r>
-            <a:endParaRPr lang="en-US"/>
           </a:p>
         </p:txBody>
       </p:sp>
@@ -547,11 +570,20 @@
         <p:cNvGrpSpPr/>
         <p:nvPr/>
       </p:nvGrpSpPr>
-      <p:grpSpPr/>
+      <p:grpSpPr>
+        <a:xfrm>
+          <a:off x="0" y="0"/>
+          <a:ext cx="0" cy="0"/>
+          <a:chOff x="0" y="0"/>
+          <a:chExt cx="0" cy="0"/>
+        </a:xfrm>
+      </p:grpSpPr>
       <p:sp>
         <p:nvSpPr>
           <p:cNvPr id="2" name="Slide Image Placeholder 1"/>
-          <p:cNvSpPr/>
+          <p:cNvSpPr>
+            <a:spLocks noGrp="1" noRot="1" noChangeAspect="1"/>
+          </p:cNvSpPr>
           <p:nvPr>
             <p:ph type="sldImg" idx="2"/>
           </p:nvPr>
@@ -561,7 +593,9 @@
       <p:sp>
         <p:nvSpPr>
           <p:cNvPr id="3" name="Text Placeholder 2"/>
-          <p:cNvSpPr/>
+          <p:cNvSpPr>
+            <a:spLocks noGrp="1"/>
+          </p:cNvSpPr>
           <p:nvPr>
             <p:ph type="body" idx="3"/>
           </p:nvPr>
@@ -569,6 +603,7 @@
         <p:spPr/>
         <p:txBody>
           <a:bodyPr/>
+          <a:lstStyle/>
           <a:p>
             <a:endParaRPr lang="en-US"/>
           </a:p>
@@ -591,11 +626,20 @@
         <p:cNvGrpSpPr/>
         <p:nvPr/>
       </p:nvGrpSpPr>
-      <p:grpSpPr/>
+      <p:grpSpPr>
+        <a:xfrm>
+          <a:off x="0" y="0"/>
+          <a:ext cx="0" cy="0"/>
+          <a:chOff x="0" y="0"/>
+          <a:chExt cx="0" cy="0"/>
+        </a:xfrm>
+      </p:grpSpPr>
       <p:sp>
         <p:nvSpPr>
           <p:cNvPr id="2" name="Slide Image Placeholder 1"/>
-          <p:cNvSpPr/>
+          <p:cNvSpPr>
+            <a:spLocks noGrp="1" noRot="1" noChangeAspect="1"/>
+          </p:cNvSpPr>
           <p:nvPr>
             <p:ph type="sldImg" idx="2"/>
           </p:nvPr>
@@ -605,7 +649,9 @@
       <p:sp>
         <p:nvSpPr>
           <p:cNvPr id="3" name="Text Placeholder 2"/>
-          <p:cNvSpPr/>
+          <p:cNvSpPr>
+            <a:spLocks noGrp="1"/>
+          </p:cNvSpPr>
           <p:nvPr>
             <p:ph type="body" idx="3"/>
           </p:nvPr>
@@ -613,6 +659,7 @@
         <p:spPr/>
         <p:txBody>
           <a:bodyPr/>
+          <a:lstStyle/>
           <a:p>
             <a:endParaRPr lang="en-US"/>
           </a:p>
@@ -627,7 +674,7 @@
 </file>
 
 <file path=ppt/slideLayouts/slideLayout1.xml><?xml version="1.0" encoding="utf-8"?>
-<p:sldLayout xmlns:a="http://schemas.openxmlformats.org/drawingml/2006/main" xmlns:r="http://schemas.openxmlformats.org/officeDocument/2006/relationships" xmlns:p="http://schemas.openxmlformats.org/presentationml/2006/main" type="title" preserve="1" showMasterSp="0">
+<p:sldLayout xmlns:a="http://schemas.openxmlformats.org/drawingml/2006/main" xmlns:r="http://schemas.openxmlformats.org/officeDocument/2006/relationships" xmlns:p="http://schemas.openxmlformats.org/presentationml/2006/main" showMasterSp="0" type="title" preserve="1">
   <p:cSld name="Title Slide">
     <p:bg>
       <p:bgPr>
@@ -705,10 +752,9 @@
           <a:p>
             <a:pPr lvl="0"/>
             <a:r>
-              <a:rPr lang="en-US" altLang="zh-CN" noProof="0" smtClean="0"/>
+              <a:rPr lang="en-US" altLang="zh-CN" noProof="0"/>
               <a:t>Click to edit Master title style</a:t>
             </a:r>
-            <a:endParaRPr lang="en-US" altLang="zh-CN" noProof="0" smtClean="0"/>
           </a:p>
         </p:txBody>
       </p:sp>
@@ -744,10 +790,9 @@
           <a:p>
             <a:pPr lvl="0"/>
             <a:r>
-              <a:rPr lang="en-US" altLang="zh-CN" noProof="0" smtClean="0"/>
+              <a:rPr lang="en-US" altLang="zh-CN" noProof="0"/>
               <a:t>Click to edit Master subtitle style</a:t>
             </a:r>
-            <a:endParaRPr lang="en-US" altLang="zh-CN" noProof="0" smtClean="0"/>
           </a:p>
         </p:txBody>
       </p:sp>
@@ -809,6 +854,7 @@
           <a:p>
             <a:fld id="{63A1C593-65D0-4073-BCC9-577B9352EA97}" type="datetimeFigureOut">
               <a:rPr lang="en-US" smtClean="0"/>
+              <a:t>10/20/2022</a:t>
             </a:fld>
             <a:endParaRPr lang="en-US"/>
           </a:p>
@@ -932,6 +978,7 @@
           <a:p>
             <a:fld id="{9B618960-8005-486C-9A75-10CB2AAC16F9}" type="slidenum">
               <a:rPr lang="en-US" smtClean="0"/>
+              <a:t>‹#›</a:t>
             </a:fld>
             <a:endParaRPr lang="en-US"/>
           </a:p>
@@ -979,10 +1026,9 @@
           <a:lstStyle/>
           <a:p>
             <a:r>
-              <a:rPr lang="en-US" smtClean="0"/>
+              <a:rPr lang="en-US"/>
               <a:t>Click to edit Master title style</a:t>
             </a:r>
-            <a:endParaRPr lang="en-US"/>
           </a:p>
         </p:txBody>
       </p:sp>
@@ -1003,42 +1049,37 @@
           <a:p>
             <a:pPr lvl="0"/>
             <a:r>
-              <a:rPr lang="en-US" smtClean="0"/>
+              <a:rPr lang="en-US"/>
               <a:t>Click to edit Master text styles</a:t>
             </a:r>
-            <a:endParaRPr lang="en-US" smtClean="0"/>
           </a:p>
           <a:p>
             <a:pPr lvl="1"/>
             <a:r>
-              <a:rPr lang="en-US" smtClean="0"/>
+              <a:rPr lang="en-US"/>
               <a:t>Second level</a:t>
             </a:r>
-            <a:endParaRPr lang="en-US" smtClean="0"/>
           </a:p>
           <a:p>
             <a:pPr lvl="2"/>
             <a:r>
-              <a:rPr lang="en-US" smtClean="0"/>
+              <a:rPr lang="en-US"/>
               <a:t>Third level</a:t>
             </a:r>
-            <a:endParaRPr lang="en-US" smtClean="0"/>
           </a:p>
           <a:p>
             <a:pPr lvl="3"/>
             <a:r>
-              <a:rPr lang="en-US" smtClean="0"/>
+              <a:rPr lang="en-US"/>
               <a:t>Fourth level</a:t>
             </a:r>
-            <a:endParaRPr lang="en-US" smtClean="0"/>
           </a:p>
           <a:p>
             <a:pPr lvl="4"/>
             <a:r>
-              <a:rPr lang="en-US" smtClean="0"/>
+              <a:rPr lang="en-US"/>
               <a:t>Fifth level</a:t>
             </a:r>
-            <a:endParaRPr lang="en-US"/>
           </a:p>
         </p:txBody>
       </p:sp>
@@ -1055,9 +1096,11 @@
         <p:spPr/>
         <p:txBody>
           <a:bodyPr/>
+          <a:lstStyle/>
           <a:p>
             <a:fld id="{63A1C593-65D0-4073-BCC9-577B9352EA97}" type="datetimeFigureOut">
               <a:rPr lang="en-US" smtClean="0"/>
+              <a:t>10/20/2022</a:t>
             </a:fld>
             <a:endParaRPr lang="en-US"/>
           </a:p>
@@ -1076,6 +1119,7 @@
         <p:spPr/>
         <p:txBody>
           <a:bodyPr/>
+          <a:lstStyle/>
           <a:p>
             <a:endParaRPr lang="en-US"/>
           </a:p>
@@ -1094,9 +1138,11 @@
         <p:spPr/>
         <p:txBody>
           <a:bodyPr/>
+          <a:lstStyle/>
           <a:p>
             <a:fld id="{9B618960-8005-486C-9A75-10CB2AAC16F9}" type="slidenum">
               <a:rPr lang="en-US" smtClean="0"/>
+              <a:t>‹#›</a:t>
             </a:fld>
             <a:endParaRPr lang="en-US"/>
           </a:p>
@@ -1149,10 +1195,9 @@
           <a:lstStyle/>
           <a:p>
             <a:r>
-              <a:rPr lang="en-US" smtClean="0"/>
+              <a:rPr lang="en-US"/>
               <a:t>Click to edit Master title style</a:t>
             </a:r>
-            <a:endParaRPr lang="en-US"/>
           </a:p>
         </p:txBody>
       </p:sp>
@@ -1178,42 +1223,37 @@
           <a:p>
             <a:pPr lvl="0"/>
             <a:r>
-              <a:rPr lang="en-US" smtClean="0"/>
+              <a:rPr lang="en-US"/>
               <a:t>Click to edit Master text styles</a:t>
             </a:r>
-            <a:endParaRPr lang="en-US" smtClean="0"/>
           </a:p>
           <a:p>
             <a:pPr lvl="1"/>
             <a:r>
-              <a:rPr lang="en-US" smtClean="0"/>
+              <a:rPr lang="en-US"/>
               <a:t>Second level</a:t>
             </a:r>
-            <a:endParaRPr lang="en-US" smtClean="0"/>
           </a:p>
           <a:p>
             <a:pPr lvl="2"/>
             <a:r>
-              <a:rPr lang="en-US" smtClean="0"/>
+              <a:rPr lang="en-US"/>
               <a:t>Third level</a:t>
             </a:r>
-            <a:endParaRPr lang="en-US" smtClean="0"/>
           </a:p>
           <a:p>
             <a:pPr lvl="3"/>
             <a:r>
-              <a:rPr lang="en-US" smtClean="0"/>
+              <a:rPr lang="en-US"/>
               <a:t>Fourth level</a:t>
             </a:r>
-            <a:endParaRPr lang="en-US" smtClean="0"/>
           </a:p>
           <a:p>
             <a:pPr lvl="4"/>
             <a:r>
-              <a:rPr lang="en-US" smtClean="0"/>
+              <a:rPr lang="en-US"/>
               <a:t>Fifth level</a:t>
             </a:r>
-            <a:endParaRPr lang="en-US"/>
           </a:p>
         </p:txBody>
       </p:sp>
@@ -1230,9 +1270,11 @@
         <p:spPr/>
         <p:txBody>
           <a:bodyPr/>
+          <a:lstStyle/>
           <a:p>
             <a:fld id="{63A1C593-65D0-4073-BCC9-577B9352EA97}" type="datetimeFigureOut">
               <a:rPr lang="en-US" smtClean="0"/>
+              <a:t>10/20/2022</a:t>
             </a:fld>
             <a:endParaRPr lang="en-US"/>
           </a:p>
@@ -1251,6 +1293,7 @@
         <p:spPr/>
         <p:txBody>
           <a:bodyPr/>
+          <a:lstStyle/>
           <a:p>
             <a:endParaRPr lang="en-US"/>
           </a:p>
@@ -1269,9 +1312,11 @@
         <p:spPr/>
         <p:txBody>
           <a:bodyPr/>
+          <a:lstStyle/>
           <a:p>
             <a:fld id="{9B618960-8005-486C-9A75-10CB2AAC16F9}" type="slidenum">
               <a:rPr lang="en-US" smtClean="0"/>
+              <a:t>‹#›</a:t>
             </a:fld>
             <a:endParaRPr lang="en-US"/>
           </a:p>
@@ -1319,10 +1364,9 @@
           <a:lstStyle/>
           <a:p>
             <a:r>
-              <a:rPr lang="en-US" smtClean="0"/>
+              <a:rPr lang="en-US"/>
               <a:t>Click to edit Master title style</a:t>
             </a:r>
-            <a:endParaRPr lang="en-US"/>
           </a:p>
         </p:txBody>
       </p:sp>
@@ -1343,42 +1387,37 @@
           <a:p>
             <a:pPr lvl="0"/>
             <a:r>
-              <a:rPr lang="en-US" smtClean="0"/>
+              <a:rPr lang="en-US"/>
               <a:t>Click to edit Master text styles</a:t>
             </a:r>
-            <a:endParaRPr lang="en-US" smtClean="0"/>
           </a:p>
           <a:p>
             <a:pPr lvl="1"/>
             <a:r>
-              <a:rPr lang="en-US" smtClean="0"/>
+              <a:rPr lang="en-US"/>
               <a:t>Second level</a:t>
             </a:r>
-            <a:endParaRPr lang="en-US" smtClean="0"/>
           </a:p>
           <a:p>
             <a:pPr lvl="2"/>
             <a:r>
-              <a:rPr lang="en-US" smtClean="0"/>
+              <a:rPr lang="en-US"/>
               <a:t>Third level</a:t>
             </a:r>
-            <a:endParaRPr lang="en-US" smtClean="0"/>
           </a:p>
           <a:p>
             <a:pPr lvl="3"/>
             <a:r>
-              <a:rPr lang="en-US" smtClean="0"/>
+              <a:rPr lang="en-US"/>
               <a:t>Fourth level</a:t>
             </a:r>
-            <a:endParaRPr lang="en-US" smtClean="0"/>
           </a:p>
           <a:p>
             <a:pPr lvl="4"/>
             <a:r>
-              <a:rPr lang="en-US" smtClean="0"/>
+              <a:rPr lang="en-US"/>
               <a:t>Fifth level</a:t>
             </a:r>
-            <a:endParaRPr lang="en-US"/>
           </a:p>
         </p:txBody>
       </p:sp>
@@ -1395,9 +1434,11 @@
         <p:spPr/>
         <p:txBody>
           <a:bodyPr/>
+          <a:lstStyle/>
           <a:p>
             <a:fld id="{63A1C593-65D0-4073-BCC9-577B9352EA97}" type="datetimeFigureOut">
               <a:rPr lang="en-US" smtClean="0"/>
+              <a:t>10/20/2022</a:t>
             </a:fld>
             <a:endParaRPr lang="en-US"/>
           </a:p>
@@ -1416,6 +1457,7 @@
         <p:spPr/>
         <p:txBody>
           <a:bodyPr/>
+          <a:lstStyle/>
           <a:p>
             <a:endParaRPr lang="en-US"/>
           </a:p>
@@ -1434,9 +1476,11 @@
         <p:spPr/>
         <p:txBody>
           <a:bodyPr/>
+          <a:lstStyle/>
           <a:p>
             <a:fld id="{9B618960-8005-486C-9A75-10CB2AAC16F9}" type="slidenum">
               <a:rPr lang="en-US" smtClean="0"/>
+              <a:t>‹#›</a:t>
             </a:fld>
             <a:endParaRPr lang="en-US"/>
           </a:p>
@@ -1493,10 +1537,9 @@
           </a:lstStyle>
           <a:p>
             <a:r>
-              <a:rPr lang="en-US" smtClean="0"/>
+              <a:rPr lang="en-US"/>
               <a:t>Click to edit Master title style</a:t>
             </a:r>
-            <a:endParaRPr lang="en-US"/>
           </a:p>
         </p:txBody>
       </p:sp>
@@ -1559,10 +1602,9 @@
           <a:p>
             <a:pPr lvl="0"/>
             <a:r>
-              <a:rPr lang="en-US" smtClean="0"/>
+              <a:rPr lang="en-US"/>
               <a:t>Click to edit Master text styles</a:t>
             </a:r>
-            <a:endParaRPr lang="en-US" smtClean="0"/>
           </a:p>
         </p:txBody>
       </p:sp>
@@ -1579,9 +1621,11 @@
         <p:spPr/>
         <p:txBody>
           <a:bodyPr/>
+          <a:lstStyle/>
           <a:p>
             <a:fld id="{63A1C593-65D0-4073-BCC9-577B9352EA97}" type="datetimeFigureOut">
               <a:rPr lang="en-US" smtClean="0"/>
+              <a:t>10/20/2022</a:t>
             </a:fld>
             <a:endParaRPr lang="en-US"/>
           </a:p>
@@ -1600,6 +1644,7 @@
         <p:spPr/>
         <p:txBody>
           <a:bodyPr/>
+          <a:lstStyle/>
           <a:p>
             <a:endParaRPr lang="en-US"/>
           </a:p>
@@ -1618,9 +1663,11 @@
         <p:spPr/>
         <p:txBody>
           <a:bodyPr/>
+          <a:lstStyle/>
           <a:p>
             <a:fld id="{9B618960-8005-486C-9A75-10CB2AAC16F9}" type="slidenum">
               <a:rPr lang="en-US" smtClean="0"/>
+              <a:t>‹#›</a:t>
             </a:fld>
             <a:endParaRPr lang="en-US"/>
           </a:p>
@@ -1668,10 +1715,9 @@
           <a:lstStyle/>
           <a:p>
             <a:r>
-              <a:rPr lang="en-US" smtClean="0"/>
+              <a:rPr lang="en-US"/>
               <a:t>Click to edit Master title style</a:t>
             </a:r>
-            <a:endParaRPr lang="en-US"/>
           </a:p>
         </p:txBody>
       </p:sp>
@@ -1697,42 +1743,37 @@
           <a:p>
             <a:pPr lvl="0"/>
             <a:r>
-              <a:rPr lang="en-US" smtClean="0"/>
+              <a:rPr lang="en-US"/>
               <a:t>Click to edit Master text styles</a:t>
             </a:r>
-            <a:endParaRPr lang="en-US" smtClean="0"/>
           </a:p>
           <a:p>
             <a:pPr lvl="1"/>
             <a:r>
-              <a:rPr lang="en-US" smtClean="0"/>
+              <a:rPr lang="en-US"/>
               <a:t>Second level</a:t>
             </a:r>
-            <a:endParaRPr lang="en-US" smtClean="0"/>
           </a:p>
           <a:p>
             <a:pPr lvl="2"/>
             <a:r>
-              <a:rPr lang="en-US" smtClean="0"/>
+              <a:rPr lang="en-US"/>
               <a:t>Third level</a:t>
             </a:r>
-            <a:endParaRPr lang="en-US" smtClean="0"/>
           </a:p>
           <a:p>
             <a:pPr lvl="3"/>
             <a:r>
-              <a:rPr lang="en-US" smtClean="0"/>
+              <a:rPr lang="en-US"/>
               <a:t>Fourth level</a:t>
             </a:r>
-            <a:endParaRPr lang="en-US" smtClean="0"/>
           </a:p>
           <a:p>
             <a:pPr lvl="4"/>
             <a:r>
-              <a:rPr lang="en-US" smtClean="0"/>
+              <a:rPr lang="en-US"/>
               <a:t>Fifth level</a:t>
             </a:r>
-            <a:endParaRPr lang="en-US"/>
           </a:p>
         </p:txBody>
       </p:sp>
@@ -1758,42 +1799,37 @@
           <a:p>
             <a:pPr lvl="0"/>
             <a:r>
-              <a:rPr lang="en-US" smtClean="0"/>
+              <a:rPr lang="en-US"/>
               <a:t>Click to edit Master text styles</a:t>
             </a:r>
-            <a:endParaRPr lang="en-US" smtClean="0"/>
           </a:p>
           <a:p>
             <a:pPr lvl="1"/>
             <a:r>
-              <a:rPr lang="en-US" smtClean="0"/>
+              <a:rPr lang="en-US"/>
               <a:t>Second level</a:t>
             </a:r>
-            <a:endParaRPr lang="en-US" smtClean="0"/>
           </a:p>
           <a:p>
             <a:pPr lvl="2"/>
             <a:r>
-              <a:rPr lang="en-US" smtClean="0"/>
+              <a:rPr lang="en-US"/>
               <a:t>Third level</a:t>
             </a:r>
-            <a:endParaRPr lang="en-US" smtClean="0"/>
           </a:p>
           <a:p>
             <a:pPr lvl="3"/>
             <a:r>
-              <a:rPr lang="en-US" smtClean="0"/>
+              <a:rPr lang="en-US"/>
               <a:t>Fourth level</a:t>
             </a:r>
-            <a:endParaRPr lang="en-US" smtClean="0"/>
           </a:p>
           <a:p>
             <a:pPr lvl="4"/>
             <a:r>
-              <a:rPr lang="en-US" smtClean="0"/>
+              <a:rPr lang="en-US"/>
               <a:t>Fifth level</a:t>
             </a:r>
-            <a:endParaRPr lang="en-US"/>
           </a:p>
         </p:txBody>
       </p:sp>
@@ -1810,9 +1846,11 @@
         <p:spPr/>
         <p:txBody>
           <a:bodyPr/>
+          <a:lstStyle/>
           <a:p>
             <a:fld id="{63A1C593-65D0-4073-BCC9-577B9352EA97}" type="datetimeFigureOut">
               <a:rPr lang="en-US" smtClean="0"/>
+              <a:t>10/20/2022</a:t>
             </a:fld>
             <a:endParaRPr lang="en-US"/>
           </a:p>
@@ -1831,6 +1869,7 @@
         <p:spPr/>
         <p:txBody>
           <a:bodyPr/>
+          <a:lstStyle/>
           <a:p>
             <a:endParaRPr lang="en-US"/>
           </a:p>
@@ -1849,9 +1888,11 @@
         <p:spPr/>
         <p:txBody>
           <a:bodyPr/>
+          <a:lstStyle/>
           <a:p>
             <a:fld id="{9B618960-8005-486C-9A75-10CB2AAC16F9}" type="slidenum">
               <a:rPr lang="en-US" smtClean="0"/>
+              <a:t>‹#›</a:t>
             </a:fld>
             <a:endParaRPr lang="en-US"/>
           </a:p>
@@ -1904,10 +1945,9 @@
           <a:lstStyle/>
           <a:p>
             <a:r>
-              <a:rPr lang="en-US" smtClean="0"/>
+              <a:rPr lang="en-US"/>
               <a:t>Click to edit Master title style</a:t>
             </a:r>
-            <a:endParaRPr lang="en-US"/>
           </a:p>
         </p:txBody>
       </p:sp>
@@ -1970,10 +2010,9 @@
           <a:p>
             <a:pPr lvl="0"/>
             <a:r>
-              <a:rPr lang="en-US" smtClean="0"/>
+              <a:rPr lang="en-US"/>
               <a:t>Click to edit Master text styles</a:t>
             </a:r>
-            <a:endParaRPr lang="en-US" smtClean="0"/>
           </a:p>
         </p:txBody>
       </p:sp>
@@ -1999,42 +2038,37 @@
           <a:p>
             <a:pPr lvl="0"/>
             <a:r>
-              <a:rPr lang="en-US" smtClean="0"/>
+              <a:rPr lang="en-US"/>
               <a:t>Click to edit Master text styles</a:t>
             </a:r>
-            <a:endParaRPr lang="en-US" smtClean="0"/>
           </a:p>
           <a:p>
             <a:pPr lvl="1"/>
             <a:r>
-              <a:rPr lang="en-US" smtClean="0"/>
+              <a:rPr lang="en-US"/>
               <a:t>Second level</a:t>
             </a:r>
-            <a:endParaRPr lang="en-US" smtClean="0"/>
           </a:p>
           <a:p>
             <a:pPr lvl="2"/>
             <a:r>
-              <a:rPr lang="en-US" smtClean="0"/>
+              <a:rPr lang="en-US"/>
               <a:t>Third level</a:t>
             </a:r>
-            <a:endParaRPr lang="en-US" smtClean="0"/>
           </a:p>
           <a:p>
             <a:pPr lvl="3"/>
             <a:r>
-              <a:rPr lang="en-US" smtClean="0"/>
+              <a:rPr lang="en-US"/>
               <a:t>Fourth level</a:t>
             </a:r>
-            <a:endParaRPr lang="en-US" smtClean="0"/>
           </a:p>
           <a:p>
             <a:pPr lvl="4"/>
             <a:r>
-              <a:rPr lang="en-US" smtClean="0"/>
+              <a:rPr lang="en-US"/>
               <a:t>Fifth level</a:t>
             </a:r>
-            <a:endParaRPr lang="en-US"/>
           </a:p>
         </p:txBody>
       </p:sp>
@@ -2097,10 +2131,9 @@
           <a:p>
             <a:pPr lvl="0"/>
             <a:r>
-              <a:rPr lang="en-US" smtClean="0"/>
+              <a:rPr lang="en-US"/>
               <a:t>Click to edit Master text styles</a:t>
             </a:r>
-            <a:endParaRPr lang="en-US" smtClean="0"/>
           </a:p>
         </p:txBody>
       </p:sp>
@@ -2126,42 +2159,37 @@
           <a:p>
             <a:pPr lvl="0"/>
             <a:r>
-              <a:rPr lang="en-US" smtClean="0"/>
+              <a:rPr lang="en-US"/>
               <a:t>Click to edit Master text styles</a:t>
             </a:r>
-            <a:endParaRPr lang="en-US" smtClean="0"/>
           </a:p>
           <a:p>
             <a:pPr lvl="1"/>
             <a:r>
-              <a:rPr lang="en-US" smtClean="0"/>
+              <a:rPr lang="en-US"/>
               <a:t>Second level</a:t>
             </a:r>
-            <a:endParaRPr lang="en-US" smtClean="0"/>
           </a:p>
           <a:p>
             <a:pPr lvl="2"/>
             <a:r>
-              <a:rPr lang="en-US" smtClean="0"/>
+              <a:rPr lang="en-US"/>
               <a:t>Third level</a:t>
             </a:r>
-            <a:endParaRPr lang="en-US" smtClean="0"/>
           </a:p>
           <a:p>
             <a:pPr lvl="3"/>
             <a:r>
-              <a:rPr lang="en-US" smtClean="0"/>
+              <a:rPr lang="en-US"/>
               <a:t>Fourth level</a:t>
             </a:r>
-            <a:endParaRPr lang="en-US" smtClean="0"/>
           </a:p>
           <a:p>
             <a:pPr lvl="4"/>
             <a:r>
-              <a:rPr lang="en-US" smtClean="0"/>
+              <a:rPr lang="en-US"/>
               <a:t>Fifth level</a:t>
             </a:r>
-            <a:endParaRPr lang="en-US"/>
           </a:p>
         </p:txBody>
       </p:sp>
@@ -2178,9 +2206,11 @@
         <p:spPr/>
         <p:txBody>
           <a:bodyPr/>
+          <a:lstStyle/>
           <a:p>
             <a:fld id="{63A1C593-65D0-4073-BCC9-577B9352EA97}" type="datetimeFigureOut">
               <a:rPr lang="en-US" smtClean="0"/>
+              <a:t>10/20/2022</a:t>
             </a:fld>
             <a:endParaRPr lang="en-US"/>
           </a:p>
@@ -2199,6 +2229,7 @@
         <p:spPr/>
         <p:txBody>
           <a:bodyPr/>
+          <a:lstStyle/>
           <a:p>
             <a:endParaRPr lang="en-US"/>
           </a:p>
@@ -2217,9 +2248,11 @@
         <p:spPr/>
         <p:txBody>
           <a:bodyPr/>
+          <a:lstStyle/>
           <a:p>
             <a:fld id="{9B618960-8005-486C-9A75-10CB2AAC16F9}" type="slidenum">
               <a:rPr lang="en-US" smtClean="0"/>
+              <a:t>‹#›</a:t>
             </a:fld>
             <a:endParaRPr lang="en-US"/>
           </a:p>
@@ -2267,10 +2300,9 @@
           <a:lstStyle/>
           <a:p>
             <a:r>
-              <a:rPr lang="en-US" smtClean="0"/>
+              <a:rPr lang="en-US"/>
               <a:t>Click to edit Master title style</a:t>
             </a:r>
-            <a:endParaRPr lang="en-US"/>
           </a:p>
         </p:txBody>
       </p:sp>
@@ -2287,9 +2319,11 @@
         <p:spPr/>
         <p:txBody>
           <a:bodyPr/>
+          <a:lstStyle/>
           <a:p>
             <a:fld id="{63A1C593-65D0-4073-BCC9-577B9352EA97}" type="datetimeFigureOut">
               <a:rPr lang="en-US" smtClean="0"/>
+              <a:t>10/20/2022</a:t>
             </a:fld>
             <a:endParaRPr lang="en-US"/>
           </a:p>
@@ -2308,6 +2342,7 @@
         <p:spPr/>
         <p:txBody>
           <a:bodyPr/>
+          <a:lstStyle/>
           <a:p>
             <a:endParaRPr lang="en-US"/>
           </a:p>
@@ -2326,9 +2361,11 @@
         <p:spPr/>
         <p:txBody>
           <a:bodyPr/>
+          <a:lstStyle/>
           <a:p>
             <a:fld id="{9B618960-8005-486C-9A75-10CB2AAC16F9}" type="slidenum">
               <a:rPr lang="en-US" smtClean="0"/>
+              <a:t>‹#›</a:t>
             </a:fld>
             <a:endParaRPr lang="en-US"/>
           </a:p>
@@ -2373,9 +2410,11 @@
         <p:spPr/>
         <p:txBody>
           <a:bodyPr/>
+          <a:lstStyle/>
           <a:p>
             <a:fld id="{63A1C593-65D0-4073-BCC9-577B9352EA97}" type="datetimeFigureOut">
               <a:rPr lang="en-US" smtClean="0"/>
+              <a:t>10/20/2022</a:t>
             </a:fld>
             <a:endParaRPr lang="en-US"/>
           </a:p>
@@ -2394,6 +2433,7 @@
         <p:spPr/>
         <p:txBody>
           <a:bodyPr/>
+          <a:lstStyle/>
           <a:p>
             <a:endParaRPr lang="en-US"/>
           </a:p>
@@ -2412,9 +2452,11 @@
         <p:spPr/>
         <p:txBody>
           <a:bodyPr/>
+          <a:lstStyle/>
           <a:p>
             <a:fld id="{9B618960-8005-486C-9A75-10CB2AAC16F9}" type="slidenum">
               <a:rPr lang="en-US" smtClean="0"/>
+              <a:t>‹#›</a:t>
             </a:fld>
             <a:endParaRPr lang="en-US"/>
           </a:p>
@@ -2471,10 +2513,9 @@
           </a:lstStyle>
           <a:p>
             <a:r>
-              <a:rPr lang="en-US" smtClean="0"/>
+              <a:rPr lang="en-US"/>
               <a:t>Click to edit Master title style</a:t>
             </a:r>
-            <a:endParaRPr lang="en-US"/>
           </a:p>
         </p:txBody>
       </p:sp>
@@ -2528,42 +2569,37 @@
           <a:p>
             <a:pPr lvl="0"/>
             <a:r>
-              <a:rPr lang="en-US" smtClean="0"/>
+              <a:rPr lang="en-US"/>
               <a:t>Click to edit Master text styles</a:t>
             </a:r>
-            <a:endParaRPr lang="en-US" smtClean="0"/>
           </a:p>
           <a:p>
             <a:pPr lvl="1"/>
             <a:r>
-              <a:rPr lang="en-US" smtClean="0"/>
+              <a:rPr lang="en-US"/>
               <a:t>Second level</a:t>
             </a:r>
-            <a:endParaRPr lang="en-US" smtClean="0"/>
           </a:p>
           <a:p>
             <a:pPr lvl="2"/>
             <a:r>
-              <a:rPr lang="en-US" smtClean="0"/>
+              <a:rPr lang="en-US"/>
               <a:t>Third level</a:t>
             </a:r>
-            <a:endParaRPr lang="en-US" smtClean="0"/>
           </a:p>
           <a:p>
             <a:pPr lvl="3"/>
             <a:r>
-              <a:rPr lang="en-US" smtClean="0"/>
+              <a:rPr lang="en-US"/>
               <a:t>Fourth level</a:t>
             </a:r>
-            <a:endParaRPr lang="en-US" smtClean="0"/>
           </a:p>
           <a:p>
             <a:pPr lvl="4"/>
             <a:r>
-              <a:rPr lang="en-US" smtClean="0"/>
+              <a:rPr lang="en-US"/>
               <a:t>Fifth level</a:t>
             </a:r>
-            <a:endParaRPr lang="en-US"/>
           </a:p>
         </p:txBody>
       </p:sp>
@@ -2626,10 +2662,9 @@
           <a:p>
             <a:pPr lvl="0"/>
             <a:r>
-              <a:rPr lang="en-US" smtClean="0"/>
+              <a:rPr lang="en-US"/>
               <a:t>Click to edit Master text styles</a:t>
             </a:r>
-            <a:endParaRPr lang="en-US" smtClean="0"/>
           </a:p>
         </p:txBody>
       </p:sp>
@@ -2646,9 +2681,11 @@
         <p:spPr/>
         <p:txBody>
           <a:bodyPr/>
+          <a:lstStyle/>
           <a:p>
             <a:fld id="{63A1C593-65D0-4073-BCC9-577B9352EA97}" type="datetimeFigureOut">
               <a:rPr lang="en-US" smtClean="0"/>
+              <a:t>10/20/2022</a:t>
             </a:fld>
             <a:endParaRPr lang="en-US"/>
           </a:p>
@@ -2667,6 +2704,7 @@
         <p:spPr/>
         <p:txBody>
           <a:bodyPr/>
+          <a:lstStyle/>
           <a:p>
             <a:endParaRPr lang="en-US"/>
           </a:p>
@@ -2685,9 +2723,11 @@
         <p:spPr/>
         <p:txBody>
           <a:bodyPr/>
+          <a:lstStyle/>
           <a:p>
             <a:fld id="{9B618960-8005-486C-9A75-10CB2AAC16F9}" type="slidenum">
               <a:rPr lang="en-US" smtClean="0"/>
+              <a:t>‹#›</a:t>
             </a:fld>
             <a:endParaRPr lang="en-US"/>
           </a:p>
@@ -2744,10 +2784,9 @@
           </a:lstStyle>
           <a:p>
             <a:r>
-              <a:rPr lang="en-US" smtClean="0"/>
+              <a:rPr lang="en-US"/>
               <a:t>Click to edit Master title style</a:t>
             </a:r>
-            <a:endParaRPr lang="en-US"/>
           </a:p>
         </p:txBody>
       </p:sp>
@@ -2824,7 +2863,7 @@
               <a:buNone/>
               <a:defRPr/>
             </a:pPr>
-            <a:endParaRPr kumimoji="0" lang="en-US" sz="3200" b="0" i="0" u="none" strike="noStrike" kern="1200" cap="none" spc="0" normalizeH="0" baseline="0" noProof="0" smtClean="0">
+            <a:endParaRPr kumimoji="0" lang="en-US" sz="3200" b="0" i="0" u="none" strike="noStrike" kern="1200" cap="none" spc="0" normalizeH="0" baseline="0" noProof="0">
               <a:ln>
                 <a:noFill/>
               </a:ln>
@@ -2900,10 +2939,9 @@
           <a:p>
             <a:pPr lvl="0"/>
             <a:r>
-              <a:rPr lang="en-US" smtClean="0"/>
+              <a:rPr lang="en-US"/>
               <a:t>Click to edit Master text styles</a:t>
             </a:r>
-            <a:endParaRPr lang="en-US" smtClean="0"/>
           </a:p>
         </p:txBody>
       </p:sp>
@@ -2920,9 +2958,11 @@
         <p:spPr/>
         <p:txBody>
           <a:bodyPr/>
+          <a:lstStyle/>
           <a:p>
             <a:fld id="{63A1C593-65D0-4073-BCC9-577B9352EA97}" type="datetimeFigureOut">
               <a:rPr lang="en-US" smtClean="0"/>
+              <a:t>10/20/2022</a:t>
             </a:fld>
             <a:endParaRPr lang="en-US"/>
           </a:p>
@@ -2941,6 +2981,7 @@
         <p:spPr/>
         <p:txBody>
           <a:bodyPr/>
+          <a:lstStyle/>
           <a:p>
             <a:endParaRPr lang="en-US"/>
           </a:p>
@@ -2959,9 +3000,11 @@
         <p:spPr/>
         <p:txBody>
           <a:bodyPr/>
+          <a:lstStyle/>
           <a:p>
             <a:fld id="{9B618960-8005-486C-9A75-10CB2AAC16F9}" type="slidenum">
               <a:rPr lang="en-US" smtClean="0"/>
+              <a:t>‹#›</a:t>
             </a:fld>
             <a:endParaRPr lang="en-US"/>
           </a:p>
@@ -2993,7 +3036,14 @@
         <p:cNvGrpSpPr/>
         <p:nvPr/>
       </p:nvGrpSpPr>
-      <p:grpSpPr/>
+      <p:grpSpPr>
+        <a:xfrm>
+          <a:off x="0" y="0"/>
+          <a:ext cx="0" cy="0"/>
+          <a:chOff x="0" y="0"/>
+          <a:chExt cx="0" cy="0"/>
+        </a:xfrm>
+      </p:grpSpPr>
       <p:pic>
         <p:nvPicPr>
           <p:cNvPr id="1026" name="Picture 8"/>
@@ -3003,7 +3053,7 @@
           <p:nvPr/>
         </p:nvPicPr>
         <p:blipFill>
-          <a:blip r:embed="rId12"/>
+          <a:blip r:embed="rId13"/>
           <a:stretch>
             <a:fillRect/>
           </a:stretch>
@@ -3047,13 +3097,13 @@
         </p:spPr>
         <p:txBody>
           <a:bodyPr anchor="ctr" anchorCtr="0"/>
+          <a:lstStyle/>
           <a:p>
             <a:pPr lvl="0"/>
             <a:r>
               <a:rPr lang="en-US" altLang="zh-CN" dirty="0"/>
               <a:t>Click to edit Master title style</a:t>
             </a:r>
-            <a:endParaRPr lang="en-US" altLang="zh-CN" dirty="0"/>
           </a:p>
         </p:txBody>
       </p:sp>
@@ -3082,13 +3132,13 @@
         </p:spPr>
         <p:txBody>
           <a:bodyPr/>
+          <a:lstStyle/>
           <a:p>
             <a:pPr lvl="0"/>
             <a:r>
               <a:rPr lang="en-US" altLang="zh-CN" dirty="0"/>
               <a:t>Click to edit Master text styles</a:t>
             </a:r>
-            <a:endParaRPr lang="en-US" altLang="zh-CN" dirty="0"/>
           </a:p>
           <a:p>
             <a:pPr lvl="1"/>
@@ -3096,7 +3146,6 @@
               <a:rPr lang="en-US" altLang="zh-CN" dirty="0"/>
               <a:t>Second level</a:t>
             </a:r>
-            <a:endParaRPr lang="en-US" altLang="zh-CN" dirty="0"/>
           </a:p>
           <a:p>
             <a:pPr lvl="2"/>
@@ -3104,7 +3153,6 @@
               <a:rPr lang="en-US" altLang="zh-CN" dirty="0"/>
               <a:t>Third level</a:t>
             </a:r>
-            <a:endParaRPr lang="en-US" altLang="zh-CN" dirty="0"/>
           </a:p>
           <a:p>
             <a:pPr lvl="3"/>
@@ -3112,7 +3160,6 @@
               <a:rPr lang="en-US" altLang="zh-CN" dirty="0"/>
               <a:t>Fourth level</a:t>
             </a:r>
-            <a:endParaRPr lang="en-US" altLang="zh-CN" dirty="0"/>
           </a:p>
           <a:p>
             <a:pPr lvl="4"/>
@@ -3120,7 +3167,6 @@
               <a:rPr lang="en-US" altLang="zh-CN" dirty="0"/>
               <a:t>Fifth level</a:t>
             </a:r>
-            <a:endParaRPr lang="en-US" altLang="zh-CN" dirty="0"/>
           </a:p>
         </p:txBody>
       </p:sp>
@@ -3186,6 +3232,7 @@
           <a:p>
             <a:fld id="{63A1C593-65D0-4073-BCC9-577B9352EA97}" type="datetimeFigureOut">
               <a:rPr lang="en-US" smtClean="0"/>
+              <a:t>10/20/2022</a:t>
             </a:fld>
             <a:endParaRPr lang="en-US"/>
           </a:p>
@@ -3317,6 +3364,7 @@
           <a:p>
             <a:fld id="{9B618960-8005-486C-9A75-10CB2AAC16F9}" type="slidenum">
               <a:rPr lang="en-US" smtClean="0"/>
+              <a:t>‹#›</a:t>
             </a:fld>
             <a:endParaRPr lang="en-US"/>
           </a:p>
@@ -3762,7 +3810,7 @@
           <p:nvPr/>
         </p:nvPicPr>
         <p:blipFill>
-          <a:blip r:embed="rId1"/>
+          <a:blip r:embed="rId3"/>
           <a:stretch>
             <a:fillRect/>
           </a:stretch>
@@ -3801,7 +3849,6 @@
               <a:rPr lang="en-US" dirty="0"/>
               <a:t>Team Asclepius</a:t>
             </a:r>
-            <a:endParaRPr lang="en-US" dirty="0"/>
           </a:p>
         </p:txBody>
       </p:sp>
@@ -3829,14 +3876,12 @@
               <a:rPr lang="en-US"/>
               <a:t>Insight into New Zealand Economy </a:t>
             </a:r>
-            <a:endParaRPr lang="en-US"/>
           </a:p>
           <a:p>
             <a:r>
               <a:rPr lang="en-US"/>
               <a:t>- A data science approach</a:t>
             </a:r>
-            <a:endParaRPr lang="en-US"/>
           </a:p>
         </p:txBody>
       </p:sp>
@@ -3847,7 +3892,7 @@
           <p:nvPr/>
         </p:nvPicPr>
         <p:blipFill>
-          <a:blip r:embed="rId2"/>
+          <a:blip r:embed="rId4"/>
           <a:stretch>
             <a:fillRect/>
           </a:stretch>
@@ -3873,7 +3918,7 @@
           <p:nvPr/>
         </p:nvPicPr>
         <p:blipFill>
-          <a:blip r:embed="rId3"/>
+          <a:blip r:embed="rId5"/>
           <a:stretch>
             <a:fillRect/>
           </a:stretch>
@@ -3909,10 +3954,17 @@
         <p:cNvGrpSpPr/>
         <p:nvPr/>
       </p:nvGrpSpPr>
-      <p:grpSpPr/>
-      <p:sp>
-        <p:nvSpPr>
-          <p:cNvPr id="2" name="Title 1"/>
+      <p:grpSpPr>
+        <a:xfrm>
+          <a:off x="0" y="0"/>
+          <a:ext cx="0" cy="0"/>
+          <a:chOff x="0" y="0"/>
+          <a:chExt cx="0" cy="0"/>
+        </a:xfrm>
+      </p:grpSpPr>
+      <p:sp>
+        <p:nvSpPr>
+          <p:cNvPr id="10" name="Title 9"/>
           <p:cNvSpPr>
             <a:spLocks noGrp="1"/>
           </p:cNvSpPr>
@@ -3923,18 +3975,24 @@
         <p:spPr/>
         <p:txBody>
           <a:bodyPr/>
-          <a:p>
-            <a:r>
-              <a:rPr lang="en-US" sz="2400"/>
-              <a:t>What difficulties you have to overcome to wrangle the data sources into the target data model</a:t>
-            </a:r>
-            <a:endParaRPr lang="en-US" sz="2400"/>
-          </a:p>
-        </p:txBody>
-      </p:sp>
-      <p:sp>
-        <p:nvSpPr>
-          <p:cNvPr id="3" name="Content Placeholder 2"/>
+          <a:lstStyle/>
+          <a:p>
+            <a:r>
+              <a:rPr lang="en-US" dirty="0"/>
+              <a:t>Resources used to get data</a:t>
+            </a:r>
+          </a:p>
+        </p:txBody>
+      </p:sp>
+      <p:sp>
+        <p:nvSpPr>
+          <p:cNvPr id="3" name="Content Placeholder 2">
+            <a:extLst>
+              <a:ext uri="{FF2B5EF4-FFF2-40B4-BE49-F238E27FC236}">
+                <a16:creationId xmlns:a16="http://schemas.microsoft.com/office/drawing/2014/main" id="{710032EE-B782-C044-BD0F-24183EE1F90C}"/>
+              </a:ext>
+            </a:extLst>
+          </p:cNvPr>
           <p:cNvSpPr>
             <a:spLocks noGrp="1"/>
           </p:cNvSpPr>
@@ -3942,45 +4000,57 @@
             <p:ph sz="half" idx="1"/>
           </p:nvPr>
         </p:nvSpPr>
-        <p:spPr/>
+        <p:spPr>
+          <a:xfrm>
+            <a:off x="609599" y="1773382"/>
+            <a:ext cx="11056883" cy="3255818"/>
+          </a:xfrm>
+        </p:spPr>
         <p:txBody>
           <a:bodyPr/>
-          <a:p>
-            <a:r>
-              <a:rPr lang="en-US" sz="2400"/>
-              <a:t>We faced difficulties of finding keys between these entities, these historical data are not collected with the same frequencies. Some of them are collected on annual base, some of them are collected on monthly base and some of them are collected on quarterly basis. We need to wrangle these data to form unified keys for further construction of the relationship between these entities. </a:t>
-            </a:r>
-            <a:endParaRPr lang="en-US" sz="2400"/>
-          </a:p>
-        </p:txBody>
-      </p:sp>
-      <p:pic>
-        <p:nvPicPr>
-          <p:cNvPr id="4" name="Content Placeholder 3"/>
-          <p:cNvPicPr>
-            <a:picLocks noChangeAspect="1"/>
-          </p:cNvPicPr>
-          <p:nvPr>
-            <p:ph sz="half" idx="2"/>
-          </p:nvPr>
-        </p:nvPicPr>
-        <p:blipFill>
-          <a:blip r:embed="rId1"/>
-          <a:stretch>
-            <a:fillRect/>
-          </a:stretch>
-        </p:blipFill>
-        <p:spPr>
-          <a:xfrm>
-            <a:off x="6344920" y="1506855"/>
-            <a:ext cx="5384800" cy="2244090"/>
-          </a:xfrm>
-          <a:prstGeom prst="rect">
-            <a:avLst/>
-          </a:prstGeom>
-        </p:spPr>
-      </p:pic>
+          <a:lstStyle/>
+          <a:p>
+            <a:pPr marL="0" indent="0">
+              <a:buNone/>
+            </a:pPr>
+            <a:r>
+              <a:rPr lang="en-NZ" sz="4000" u="sng" dirty="0"/>
+              <a:t>Data Sources used:</a:t>
+            </a:r>
+            <a:endParaRPr lang="en-NZ" sz="4000" dirty="0"/>
+          </a:p>
+          <a:p>
+            <a:endParaRPr lang="en-NZ" sz="2400" dirty="0"/>
+          </a:p>
+          <a:p>
+            <a:r>
+              <a:rPr lang="en-NZ" sz="2400" dirty="0"/>
+              <a:t>https://infoshare.stats.govt.nz</a:t>
+            </a:r>
+          </a:p>
+          <a:p>
+            <a:r>
+              <a:rPr lang="en-NZ" sz="2400" dirty="0"/>
+              <a:t>https://www.interest.co.nz/chart-data/get-csv-data</a:t>
+            </a:r>
+          </a:p>
+          <a:p>
+            <a:r>
+              <a:rPr lang="en-NZ" sz="2400" dirty="0"/>
+              <a:t>https://api.ofx.com/PublicSite.ApiService//SpotRateHistory/allTime/NZD/CNY</a:t>
+            </a:r>
+          </a:p>
+          <a:p>
+            <a:endParaRPr lang="en-NZ" sz="2400" dirty="0"/>
+          </a:p>
+        </p:txBody>
+      </p:sp>
     </p:spTree>
+    <p:extLst>
+      <p:ext uri="{BB962C8B-B14F-4D97-AF65-F5344CB8AC3E}">
+        <p14:creationId xmlns:p14="http://schemas.microsoft.com/office/powerpoint/2010/main" val="478165228"/>
+      </p:ext>
+    </p:extLst>
   </p:cSld>
   <p:clrMapOvr>
     <a:masterClrMapping/>
@@ -3997,10 +4067,17 @@
         <p:cNvGrpSpPr/>
         <p:nvPr/>
       </p:nvGrpSpPr>
-      <p:grpSpPr/>
-      <p:sp>
-        <p:nvSpPr>
-          <p:cNvPr id="2" name="Title 1"/>
+      <p:grpSpPr>
+        <a:xfrm>
+          <a:off x="0" y="0"/>
+          <a:ext cx="0" cy="0"/>
+          <a:chOff x="0" y="0"/>
+          <a:chExt cx="0" cy="0"/>
+        </a:xfrm>
+      </p:grpSpPr>
+      <p:sp>
+        <p:nvSpPr>
+          <p:cNvPr id="10" name="Title 9"/>
           <p:cNvSpPr>
             <a:spLocks noGrp="1"/>
           </p:cNvSpPr>
@@ -4011,18 +4088,24 @@
         <p:spPr/>
         <p:txBody>
           <a:bodyPr/>
-          <a:p>
-            <a:r>
-              <a:rPr lang="en-US"/>
-              <a:t>What techniques you did see</a:t>
-            </a:r>
-            <a:endParaRPr lang="en-US"/>
-          </a:p>
-        </p:txBody>
-      </p:sp>
-      <p:sp>
-        <p:nvSpPr>
-          <p:cNvPr id="3" name="Content Placeholder 2"/>
+          <a:lstStyle/>
+          <a:p>
+            <a:r>
+              <a:rPr lang="en-US" dirty="0"/>
+              <a:t>Techniques and tools used</a:t>
+            </a:r>
+          </a:p>
+        </p:txBody>
+      </p:sp>
+      <p:sp>
+        <p:nvSpPr>
+          <p:cNvPr id="3" name="Content Placeholder 2">
+            <a:extLst>
+              <a:ext uri="{FF2B5EF4-FFF2-40B4-BE49-F238E27FC236}">
+                <a16:creationId xmlns:a16="http://schemas.microsoft.com/office/drawing/2014/main" id="{710032EE-B782-C044-BD0F-24183EE1F90C}"/>
+              </a:ext>
+            </a:extLst>
+          </p:cNvPr>
           <p:cNvSpPr>
             <a:spLocks noGrp="1"/>
           </p:cNvSpPr>
@@ -4033,75 +4116,94 @@
         <p:spPr>
           <a:xfrm>
             <a:off x="609600" y="1174750"/>
-            <a:ext cx="11246485" cy="1351280"/>
+            <a:ext cx="10972800" cy="1900959"/>
           </a:xfrm>
         </p:spPr>
         <p:txBody>
           <a:bodyPr/>
-          <a:p>
-            <a:r>
-              <a:rPr lang="en-US"/>
-              <a:t>For data scraping,  various techniques have been utilized for direct data file downing, web scraping, API calling</a:t>
-            </a:r>
-            <a:endParaRPr lang="en-US"/>
-          </a:p>
-        </p:txBody>
-      </p:sp>
-      <p:pic>
-        <p:nvPicPr>
-          <p:cNvPr id="100" name="Content Placeholder 99"/>
-          <p:cNvPicPr/>
+          <a:lstStyle/>
+          <a:p>
+            <a:pPr marL="0" indent="0">
+              <a:buNone/>
+            </a:pPr>
+            <a:r>
+              <a:rPr lang="en-NZ" sz="4000" u="sng" dirty="0"/>
+              <a:t>Techniques used:</a:t>
+            </a:r>
+          </a:p>
+          <a:p>
+            <a:r>
+              <a:rPr lang="en-NZ" dirty="0"/>
+              <a:t>Browser Automation</a:t>
+            </a:r>
+          </a:p>
+          <a:p>
+            <a:r>
+              <a:rPr lang="en-NZ" dirty="0"/>
+              <a:t>Scrapping</a:t>
+            </a:r>
+          </a:p>
+          <a:p>
+            <a:endParaRPr lang="en-NZ" dirty="0"/>
+          </a:p>
+        </p:txBody>
+      </p:sp>
+      <p:sp>
+        <p:nvSpPr>
+          <p:cNvPr id="5" name="Content Placeholder 4">
+            <a:extLst>
+              <a:ext uri="{FF2B5EF4-FFF2-40B4-BE49-F238E27FC236}">
+                <a16:creationId xmlns:a16="http://schemas.microsoft.com/office/drawing/2014/main" id="{3BC8EE21-2A6E-9570-D00B-B05C592FB086}"/>
+              </a:ext>
+            </a:extLst>
+          </p:cNvPr>
+          <p:cNvSpPr>
+            <a:spLocks noGrp="1"/>
+          </p:cNvSpPr>
           <p:nvPr>
             <p:ph sz="half" idx="2"/>
           </p:nvPr>
-        </p:nvPicPr>
-        <p:blipFill>
-          <a:blip r:embed="rId1"/>
-          <a:stretch>
-            <a:fillRect/>
-          </a:stretch>
-        </p:blipFill>
-        <p:spPr>
-          <a:xfrm>
-            <a:off x="4691380" y="3823335"/>
-            <a:ext cx="6891020" cy="2545715"/>
-          </a:xfrm>
-          <a:prstGeom prst="rect">
-            <a:avLst/>
-          </a:prstGeom>
-          <a:noFill/>
-          <a:ln w="9525">
-            <a:noFill/>
-          </a:ln>
-        </p:spPr>
-      </p:pic>
-      <p:pic>
-        <p:nvPicPr>
-          <p:cNvPr id="102" name="Picture 101"/>
-          <p:cNvPicPr/>
-          <p:nvPr/>
-        </p:nvPicPr>
-        <p:blipFill>
-          <a:blip r:embed="rId2"/>
-          <a:stretch>
-            <a:fillRect/>
-          </a:stretch>
-        </p:blipFill>
-        <p:spPr>
-          <a:xfrm>
-            <a:off x="462915" y="3714115"/>
-            <a:ext cx="4084955" cy="2654935"/>
-          </a:xfrm>
-          <a:prstGeom prst="rect">
-            <a:avLst/>
-          </a:prstGeom>
-          <a:noFill/>
-          <a:ln w="9525">
-            <a:noFill/>
-          </a:ln>
-        </p:spPr>
-      </p:pic>
+        </p:nvSpPr>
+        <p:spPr>
+          <a:xfrm>
+            <a:off x="609600" y="3865418"/>
+            <a:ext cx="10972800" cy="2262332"/>
+          </a:xfrm>
+        </p:spPr>
+        <p:txBody>
+          <a:bodyPr/>
+          <a:lstStyle/>
+          <a:p>
+            <a:pPr marL="0" indent="0">
+              <a:buNone/>
+            </a:pPr>
+            <a:r>
+              <a:rPr lang="en-NZ" sz="3200" u="sng" dirty="0"/>
+              <a:t>Tools used for scraping and automation:</a:t>
+            </a:r>
+          </a:p>
+          <a:p>
+            <a:r>
+              <a:rPr lang="en-NZ" dirty="0" err="1"/>
+              <a:t>rvest</a:t>
+            </a:r>
+            <a:endParaRPr lang="en-NZ" dirty="0"/>
+          </a:p>
+          <a:p>
+            <a:r>
+              <a:rPr lang="en-NZ" dirty="0" err="1"/>
+              <a:t>RSelenium</a:t>
+            </a:r>
+            <a:endParaRPr lang="en-NZ" dirty="0"/>
+          </a:p>
+        </p:txBody>
+      </p:sp>
     </p:spTree>
+    <p:extLst>
+      <p:ext uri="{BB962C8B-B14F-4D97-AF65-F5344CB8AC3E}">
+        <p14:creationId xmlns:p14="http://schemas.microsoft.com/office/powerpoint/2010/main" val="388416163"/>
+      </p:ext>
+    </p:extLst>
   </p:cSld>
   <p:clrMapOvr>
     <a:masterClrMapping/>
@@ -4118,10 +4220,17 @@
         <p:cNvGrpSpPr/>
         <p:nvPr/>
       </p:nvGrpSpPr>
-      <p:grpSpPr/>
-      <p:sp>
-        <p:nvSpPr>
-          <p:cNvPr id="2" name="Title 1"/>
+      <p:grpSpPr>
+        <a:xfrm>
+          <a:off x="0" y="0"/>
+          <a:ext cx="0" cy="0"/>
+          <a:chOff x="0" y="0"/>
+          <a:chExt cx="0" cy="0"/>
+        </a:xfrm>
+      </p:grpSpPr>
+      <p:sp>
+        <p:nvSpPr>
+          <p:cNvPr id="10" name="Title 9"/>
           <p:cNvSpPr>
             <a:spLocks noGrp="1"/>
           </p:cNvSpPr>
@@ -4131,48 +4240,51 @@
         </p:nvSpPr>
         <p:spPr/>
         <p:txBody>
-          <a:bodyPr>
-            <a:normAutofit fontScale="90000"/>
-          </a:bodyPr>
-          <a:p>
-            <a:r>
-              <a:rPr lang="en-US"/>
-              <a:t>What you managed to achieve and what you failed to do  </a:t>
-            </a:r>
-            <a:endParaRPr lang="en-US"/>
-          </a:p>
-        </p:txBody>
-      </p:sp>
-      <p:sp>
-        <p:nvSpPr>
-          <p:cNvPr id="3" name="Content Placeholder 2"/>
-          <p:cNvSpPr>
-            <a:spLocks noGrp="1"/>
-          </p:cNvSpPr>
-          <p:nvPr>
-            <p:ph idx="1"/>
-          </p:nvPr>
-        </p:nvSpPr>
-        <p:spPr/>
-        <p:txBody>
           <a:bodyPr/>
-          <a:p>
-            <a:r>
-              <a:rPr lang="en-US"/>
-              <a:t>API </a:t>
-            </a:r>
-            <a:endParaRPr lang="en-US"/>
-          </a:p>
-          <a:p>
-            <a:r>
-              <a:rPr lang="en-US"/>
-              <a:t>HPI failed to </a:t>
-            </a:r>
-            <a:endParaRPr lang="en-US"/>
-          </a:p>
-        </p:txBody>
-      </p:sp>
+          <a:lstStyle/>
+          <a:p>
+            <a:r>
+              <a:rPr lang="en-US" dirty="0"/>
+              <a:t>Resources used to get data</a:t>
+            </a:r>
+          </a:p>
+        </p:txBody>
+      </p:sp>
+      <p:pic>
+        <p:nvPicPr>
+          <p:cNvPr id="8" name="Content Placeholder 3">
+            <a:extLst>
+              <a:ext uri="{FF2B5EF4-FFF2-40B4-BE49-F238E27FC236}">
+                <a16:creationId xmlns:a16="http://schemas.microsoft.com/office/drawing/2014/main" id="{96CC7DBA-2188-B3B8-FEDB-D19BDA5605C4}"/>
+              </a:ext>
+            </a:extLst>
+          </p:cNvPr>
+          <p:cNvPicPr>
+            <a:picLocks noGrp="1" noChangeAspect="1"/>
+          </p:cNvPicPr>
+          <p:nvPr>
+            <p:ph sz="half" idx="1"/>
+          </p:nvPr>
+        </p:nvPicPr>
+        <p:blipFill>
+          <a:blip r:embed="rId2"/>
+          <a:stretch>
+            <a:fillRect/>
+          </a:stretch>
+        </p:blipFill>
+        <p:spPr>
+          <a:xfrm>
+            <a:off x="457728" y="906391"/>
+            <a:ext cx="11124672" cy="5772703"/>
+          </a:xfrm>
+        </p:spPr>
+      </p:pic>
     </p:spTree>
+    <p:extLst>
+      <p:ext uri="{BB962C8B-B14F-4D97-AF65-F5344CB8AC3E}">
+        <p14:creationId xmlns:p14="http://schemas.microsoft.com/office/powerpoint/2010/main" val="2526099302"/>
+      </p:ext>
+    </p:extLst>
   </p:cSld>
   <p:clrMapOvr>
     <a:masterClrMapping/>
@@ -4189,10 +4301,17 @@
         <p:cNvGrpSpPr/>
         <p:nvPr/>
       </p:nvGrpSpPr>
-      <p:grpSpPr/>
-      <p:sp>
-        <p:nvSpPr>
-          <p:cNvPr id="2" name="Title 1"/>
+      <p:grpSpPr>
+        <a:xfrm>
+          <a:off x="0" y="0"/>
+          <a:ext cx="0" cy="0"/>
+          <a:chOff x="0" y="0"/>
+          <a:chExt cx="0" cy="0"/>
+        </a:xfrm>
+      </p:grpSpPr>
+      <p:sp>
+        <p:nvSpPr>
+          <p:cNvPr id="10" name="Title 9"/>
           <p:cNvSpPr>
             <a:spLocks noGrp="1"/>
           </p:cNvSpPr>
@@ -4203,35 +4322,38 @@
         <p:spPr/>
         <p:txBody>
           <a:bodyPr/>
-          <a:p>
-            <a:r>
-              <a:rPr lang="en-US"/>
-              <a:t>Charts generated to </a:t>
-            </a:r>
-            <a:endParaRPr lang="en-US"/>
+          <a:lstStyle/>
+          <a:p>
+            <a:r>
+              <a:rPr lang="en-US" dirty="0"/>
+              <a:t>Resources used to get data</a:t>
+            </a:r>
           </a:p>
         </p:txBody>
       </p:sp>
       <p:pic>
         <p:nvPicPr>
-          <p:cNvPr id="4" name="Content Placeholder 3"/>
+          <p:cNvPr id="17" name="Picture 16">
+            <a:extLst>
+              <a:ext uri="{FF2B5EF4-FFF2-40B4-BE49-F238E27FC236}">
+                <a16:creationId xmlns:a16="http://schemas.microsoft.com/office/drawing/2014/main" id="{F0343934-D581-BEB9-DBA5-D54C045F4706}"/>
+              </a:ext>
+            </a:extLst>
+          </p:cNvPr>
           <p:cNvPicPr>
             <a:picLocks noChangeAspect="1"/>
           </p:cNvPicPr>
-          <p:nvPr>
-            <p:ph idx="1"/>
-          </p:nvPr>
+          <p:nvPr/>
         </p:nvPicPr>
-        <p:blipFill>
-          <a:blip r:embed="rId1"/>
-          <a:stretch>
-            <a:fillRect/>
-          </a:stretch>
+        <p:blipFill rotWithShape="1">
+          <a:blip r:embed="rId2"/>
+          <a:srcRect b="10276"/>
+          <a:stretch/>
         </p:blipFill>
         <p:spPr>
           <a:xfrm>
-            <a:off x="2227580" y="1825625"/>
-            <a:ext cx="7735570" cy="4351655"/>
+            <a:off x="700585" y="1190624"/>
+            <a:ext cx="10881815" cy="5667376"/>
           </a:xfrm>
           <a:prstGeom prst="rect">
             <a:avLst/>
@@ -4239,6 +4361,11 @@
         </p:spPr>
       </p:pic>
     </p:spTree>
+    <p:extLst>
+      <p:ext uri="{BB962C8B-B14F-4D97-AF65-F5344CB8AC3E}">
+        <p14:creationId xmlns:p14="http://schemas.microsoft.com/office/powerpoint/2010/main" val="2097971960"/>
+      </p:ext>
+    </p:extLst>
   </p:cSld>
   <p:clrMapOvr>
     <a:masterClrMapping/>
@@ -4255,7 +4382,14 @@
         <p:cNvGrpSpPr/>
         <p:nvPr/>
       </p:nvGrpSpPr>
-      <p:grpSpPr/>
+      <p:grpSpPr>
+        <a:xfrm>
+          <a:off x="0" y="0"/>
+          <a:ext cx="0" cy="0"/>
+          <a:chOff x="0" y="0"/>
+          <a:chExt cx="0" cy="0"/>
+        </a:xfrm>
+      </p:grpSpPr>
       <p:sp>
         <p:nvSpPr>
           <p:cNvPr id="2" name="Title 1"/>
@@ -4269,80 +4403,100 @@
         <p:spPr/>
         <p:txBody>
           <a:bodyPr/>
-          <a:p>
-            <a:r>
-              <a:rPr lang="en-US"/>
-              <a:t>Charts</a:t>
-            </a:r>
-            <a:endParaRPr lang="en-US"/>
+          <a:lstStyle/>
+          <a:p>
+            <a:r>
+              <a:rPr lang="en-US"/>
+              <a:t>What techniques you did see</a:t>
+            </a:r>
+          </a:p>
+        </p:txBody>
+      </p:sp>
+      <p:sp>
+        <p:nvSpPr>
+          <p:cNvPr id="3" name="Content Placeholder 2"/>
+          <p:cNvSpPr>
+            <a:spLocks noGrp="1"/>
+          </p:cNvSpPr>
+          <p:nvPr>
+            <p:ph sz="half" idx="1"/>
+          </p:nvPr>
+        </p:nvSpPr>
+        <p:spPr>
+          <a:xfrm>
+            <a:off x="609600" y="1174750"/>
+            <a:ext cx="11246485" cy="1351280"/>
+          </a:xfrm>
+        </p:spPr>
+        <p:txBody>
+          <a:bodyPr/>
+          <a:lstStyle/>
+          <a:p>
+            <a:pPr marL="0" indent="0">
+              <a:buNone/>
+            </a:pPr>
+            <a:r>
+              <a:rPr lang="en-NZ" sz="4000" u="sng" dirty="0"/>
+              <a:t>Processes applied to data before visualization:</a:t>
+            </a:r>
+            <a:endParaRPr lang="en-NZ" sz="4000" dirty="0"/>
+          </a:p>
+          <a:p>
+            <a:r>
+              <a:rPr lang="en-US" dirty="0"/>
+              <a:t>For data scraping,  various techniques have been utilized for direct data file downing, web scraping, API calling</a:t>
+            </a:r>
+          </a:p>
+          <a:p>
+            <a:endParaRPr lang="en-US" dirty="0"/>
           </a:p>
         </p:txBody>
       </p:sp>
       <p:pic>
         <p:nvPicPr>
-          <p:cNvPr id="4" name="Content Placeholder 3"/>
+          <p:cNvPr id="100" name="Content Placeholder 99"/>
           <p:cNvPicPr>
-            <a:picLocks noChangeAspect="1"/>
+            <a:picLocks noGrp="1"/>
           </p:cNvPicPr>
           <p:nvPr>
-            <p:ph idx="1"/>
+            <p:ph sz="half" idx="2"/>
           </p:nvPr>
         </p:nvPicPr>
-        <p:blipFill>
-          <a:blip r:embed="rId1"/>
-          <a:stretch>
-            <a:fillRect/>
-          </a:stretch>
+        <p:blipFill rotWithShape="1">
+          <a:blip r:embed="rId2"/>
+          <a:srcRect t="16543" b="15906"/>
+          <a:stretch/>
         </p:blipFill>
         <p:spPr>
           <a:xfrm>
-            <a:off x="3642995" y="1469390"/>
-            <a:ext cx="4905375" cy="4362450"/>
-          </a:xfrm>
-          <a:prstGeom prst="rect">
-            <a:avLst/>
-          </a:prstGeom>
-        </p:spPr>
-      </p:pic>
-      <p:sp>
-        <p:nvSpPr>
-          <p:cNvPr id="3" name="Text Box 2"/>
-          <p:cNvSpPr txBox="1"/>
-          <p:nvPr/>
-        </p:nvSpPr>
-        <p:spPr>
-          <a:xfrm>
-            <a:off x="999490" y="6069330"/>
-            <a:ext cx="10695305" cy="368300"/>
+            <a:off x="-125064" y="3170522"/>
+            <a:ext cx="12442127" cy="3104866"/>
           </a:xfrm>
           <a:prstGeom prst="rect">
             <a:avLst/>
           </a:prstGeom>
           <a:noFill/>
-        </p:spPr>
-        <p:txBody>
-          <a:bodyPr wrap="square" rtlCol="0">
-            <a:spAutoFit/>
-          </a:bodyPr>
-          <a:p>
-            <a:r>
-              <a:rPr lang="en-US"/>
-              <a:t>2) x axis time (yyyy-mm) :  y axis (Tourism international visitors arrivals) + nzd-usd-exchange rate</a:t>
-            </a:r>
-            <a:endParaRPr lang="en-US"/>
-          </a:p>
-        </p:txBody>
-      </p:sp>
-      <p:sp>
-        <p:nvSpPr>
-          <p:cNvPr id="5" name="Text Box 4"/>
+          <a:ln w="9525">
+            <a:noFill/>
+          </a:ln>
+        </p:spPr>
+      </p:pic>
+      <p:sp>
+        <p:nvSpPr>
+          <p:cNvPr id="6" name="TextBox 5">
+            <a:extLst>
+              <a:ext uri="{FF2B5EF4-FFF2-40B4-BE49-F238E27FC236}">
+                <a16:creationId xmlns:a16="http://schemas.microsoft.com/office/drawing/2014/main" id="{FDD2FEA4-C1F4-A2D7-39A8-53338206B56D}"/>
+              </a:ext>
+            </a:extLst>
+          </p:cNvPr>
           <p:cNvSpPr txBox="1"/>
           <p:nvPr/>
         </p:nvSpPr>
         <p:spPr>
           <a:xfrm>
-            <a:off x="704850" y="2527935"/>
-            <a:ext cx="2364105" cy="2861310"/>
+            <a:off x="7984512" y="6029167"/>
+            <a:ext cx="3871573" cy="246221"/>
           </a:xfrm>
           <a:prstGeom prst="rect">
             <a:avLst/>
@@ -4350,15 +4504,15 @@
           <a:noFill/>
         </p:spPr>
         <p:txBody>
-          <a:bodyPr wrap="square" rtlCol="0">
+          <a:bodyPr wrap="none" rtlCol="0">
             <a:spAutoFit/>
           </a:bodyPr>
-          <a:p>
-            <a:r>
-              <a:rPr lang="en-US"/>
-              <a:t>With increase of the NZDollar USdollar exchange, it is more expensive for tourism coming to New Zealand, we can observe a dropping of the “Tourism International Visitors Arrivals”</a:t>
-            </a:r>
-            <a:endParaRPr lang="en-US"/>
+          <a:lstStyle/>
+          <a:p>
+            <a:r>
+              <a:rPr lang="en-NZ" sz="1000" dirty="0"/>
+              <a:t>(Image taken from: https://monkeylearn.com/blog/data-wrangling)</a:t>
+            </a:r>
           </a:p>
         </p:txBody>
       </p:sp>
@@ -4379,7 +4533,14 @@
         <p:cNvGrpSpPr/>
         <p:nvPr/>
       </p:nvGrpSpPr>
-      <p:grpSpPr/>
+      <p:grpSpPr>
+        <a:xfrm>
+          <a:off x="0" y="0"/>
+          <a:ext cx="0" cy="0"/>
+          <a:chOff x="0" y="0"/>
+          <a:chExt cx="0" cy="0"/>
+        </a:xfrm>
+      </p:grpSpPr>
       <p:sp>
         <p:nvSpPr>
           <p:cNvPr id="2" name="Title 1"/>
@@ -4392,100 +4553,43 @@
         </p:nvSpPr>
         <p:spPr/>
         <p:txBody>
+          <a:bodyPr>
+            <a:normAutofit fontScale="90000"/>
+          </a:bodyPr>
+          <a:lstStyle/>
+          <a:p>
+            <a:r>
+              <a:rPr lang="en-US"/>
+              <a:t>What you managed to achieve and what you failed to do  </a:t>
+            </a:r>
+          </a:p>
+        </p:txBody>
+      </p:sp>
+      <p:sp>
+        <p:nvSpPr>
+          <p:cNvPr id="3" name="Content Placeholder 2"/>
+          <p:cNvSpPr>
+            <a:spLocks noGrp="1"/>
+          </p:cNvSpPr>
+          <p:nvPr>
+            <p:ph idx="1"/>
+          </p:nvPr>
+        </p:nvSpPr>
+        <p:spPr/>
+        <p:txBody>
           <a:bodyPr/>
-          <a:p>
-            <a:endParaRPr lang="en-US"/>
-          </a:p>
-        </p:txBody>
-      </p:sp>
-      <p:pic>
-        <p:nvPicPr>
-          <p:cNvPr id="4" name="Content Placeholder 3"/>
-          <p:cNvPicPr>
-            <a:picLocks noChangeAspect="1"/>
-          </p:cNvPicPr>
-          <p:nvPr>
-            <p:ph idx="1"/>
-          </p:nvPr>
-        </p:nvPicPr>
-        <p:blipFill>
-          <a:blip r:embed="rId1"/>
-          <a:stretch>
-            <a:fillRect/>
-          </a:stretch>
-        </p:blipFill>
-        <p:spPr>
-          <a:xfrm>
-            <a:off x="3466465" y="1493520"/>
-            <a:ext cx="5257800" cy="4314825"/>
-          </a:xfrm>
-          <a:prstGeom prst="rect">
-            <a:avLst/>
-          </a:prstGeom>
-        </p:spPr>
-      </p:pic>
-      <p:sp>
-        <p:nvSpPr>
-          <p:cNvPr id="3" name="Text Box 2"/>
-          <p:cNvSpPr txBox="1"/>
-          <p:nvPr/>
-        </p:nvSpPr>
-        <p:spPr>
-          <a:xfrm>
-            <a:off x="1683385" y="5982970"/>
-            <a:ext cx="7766050" cy="645160"/>
-          </a:xfrm>
-          <a:prstGeom prst="rect">
-            <a:avLst/>
-          </a:prstGeom>
-          <a:noFill/>
-        </p:spPr>
-        <p:txBody>
-          <a:bodyPr wrap="square" rtlCol="0">
-            <a:spAutoFit/>
-          </a:bodyPr>
-          <a:p>
-            <a:r>
-              <a:rPr lang="en-US"/>
-              <a:t>Plot</a:t>
-            </a:r>
-            <a:endParaRPr lang="en-US"/>
-          </a:p>
-          <a:p>
-            <a:r>
-              <a:rPr lang="en-US"/>
-              <a:t>1) x axis time (yyyy-mm) : y axis (OCR + (Labour force status))</a:t>
-            </a:r>
-            <a:endParaRPr lang="en-US"/>
-          </a:p>
-        </p:txBody>
-      </p:sp>
-      <p:sp>
-        <p:nvSpPr>
-          <p:cNvPr id="5" name="Text Box 4"/>
-          <p:cNvSpPr txBox="1"/>
-          <p:nvPr/>
-        </p:nvSpPr>
-        <p:spPr>
-          <a:xfrm>
-            <a:off x="826135" y="1765935"/>
-            <a:ext cx="2199640" cy="2030095"/>
-          </a:xfrm>
-          <a:prstGeom prst="rect">
-            <a:avLst/>
-          </a:prstGeom>
-          <a:noFill/>
-        </p:spPr>
-        <p:txBody>
-          <a:bodyPr wrap="square" rtlCol="0">
-            <a:spAutoFit/>
-          </a:bodyPr>
-          <a:p>
-            <a:r>
-              <a:rPr lang="en-US"/>
-              <a:t>In this chart, it is observable that as OCR increase, in a few months time, the unemployment rate has also increased. </a:t>
-            </a:r>
-            <a:endParaRPr lang="en-US"/>
+          <a:lstStyle/>
+          <a:p>
+            <a:r>
+              <a:rPr lang="en-US"/>
+              <a:t>API </a:t>
+            </a:r>
+          </a:p>
+          <a:p>
+            <a:r>
+              <a:rPr lang="en-US"/>
+              <a:t>HPI failed to </a:t>
+            </a:r>
           </a:p>
         </p:txBody>
       </p:sp>
@@ -4500,24 +4604,20 @@
 <file path=ppt/slides/slide16.xml><?xml version="1.0" encoding="utf-8"?>
 <p:sld xmlns:a="http://schemas.openxmlformats.org/drawingml/2006/main" xmlns:r="http://schemas.openxmlformats.org/officeDocument/2006/relationships" xmlns:p="http://schemas.openxmlformats.org/presentationml/2006/main">
   <p:cSld>
-    <p:bg>
-      <p:bgPr>
-        <a:blipFill>
-          <a:blip r:embed="rId1"/>
-          <a:stretch>
-            <a:fillRect/>
-          </a:stretch>
-        </a:blipFill>
-        <a:effectLst/>
-      </p:bgPr>
-    </p:bg>
     <p:spTree>
       <p:nvGrpSpPr>
         <p:cNvPr id="1" name=""/>
         <p:cNvGrpSpPr/>
         <p:nvPr/>
       </p:nvGrpSpPr>
-      <p:grpSpPr/>
+      <p:grpSpPr>
+        <a:xfrm>
+          <a:off x="0" y="0"/>
+          <a:ext cx="0" cy="0"/>
+          <a:chOff x="0" y="0"/>
+          <a:chExt cx="0" cy="0"/>
+        </a:xfrm>
+      </p:grpSpPr>
       <p:sp>
         <p:nvSpPr>
           <p:cNvPr id="2" name="Title 1"/>
@@ -4531,12 +4631,12 @@
         <p:spPr/>
         <p:txBody>
           <a:bodyPr/>
-          <a:p>
-            <a:r>
-              <a:rPr lang="en-US"/>
-              <a:t>Charts Generated </a:t>
-            </a:r>
-            <a:endParaRPr lang="en-US"/>
+          <a:lstStyle/>
+          <a:p>
+            <a:r>
+              <a:rPr lang="en-US"/>
+              <a:t>Charts generated to </a:t>
+            </a:r>
           </a:p>
         </p:txBody>
       </p:sp>
@@ -4544,306 +4644,10 @@
         <p:nvPicPr>
           <p:cNvPr id="4" name="Content Placeholder 3"/>
           <p:cNvPicPr>
-            <a:picLocks noChangeAspect="1"/>
+            <a:picLocks noGrp="1" noChangeAspect="1"/>
           </p:cNvPicPr>
           <p:nvPr>
-            <p:ph sz="half" idx="1"/>
-          </p:nvPr>
-        </p:nvPicPr>
-        <p:blipFill>
-          <a:blip r:embed="rId1"/>
-          <a:stretch>
-            <a:fillRect/>
-          </a:stretch>
-        </p:blipFill>
-        <p:spPr>
-          <a:xfrm>
-            <a:off x="609600" y="1494790"/>
-            <a:ext cx="2371090" cy="1822450"/>
-          </a:xfrm>
-          <a:prstGeom prst="rect">
-            <a:avLst/>
-          </a:prstGeom>
-        </p:spPr>
-      </p:pic>
-      <p:pic>
-        <p:nvPicPr>
-          <p:cNvPr id="5" name="Content Placeholder 3"/>
-          <p:cNvPicPr>
-            <a:picLocks noChangeAspect="1"/>
-          </p:cNvPicPr>
-          <p:nvPr/>
-        </p:nvPicPr>
-        <p:blipFill>
-          <a:blip r:embed="rId1"/>
-          <a:stretch>
-            <a:fillRect/>
-          </a:stretch>
-        </p:blipFill>
-        <p:spPr>
-          <a:xfrm>
-            <a:off x="3606165" y="3836035"/>
-            <a:ext cx="3176270" cy="2441575"/>
-          </a:xfrm>
-          <a:prstGeom prst="rect">
-            <a:avLst/>
-          </a:prstGeom>
-          <a:noFill/>
-          <a:ln w="9525">
-            <a:noFill/>
-          </a:ln>
-        </p:spPr>
-      </p:pic>
-      <p:pic>
-        <p:nvPicPr>
-          <p:cNvPr id="6" name="Content Placeholder 3"/>
-          <p:cNvPicPr>
-            <a:picLocks noChangeAspect="1"/>
-          </p:cNvPicPr>
-          <p:nvPr/>
-        </p:nvPicPr>
-        <p:blipFill>
-          <a:blip r:embed="rId1"/>
-          <a:stretch>
-            <a:fillRect/>
-          </a:stretch>
-        </p:blipFill>
-        <p:spPr>
-          <a:xfrm>
-            <a:off x="7388860" y="4064000"/>
-            <a:ext cx="2947035" cy="2265680"/>
-          </a:xfrm>
-          <a:prstGeom prst="rect">
-            <a:avLst/>
-          </a:prstGeom>
-          <a:noFill/>
-          <a:ln w="9525">
-            <a:noFill/>
-          </a:ln>
-        </p:spPr>
-      </p:pic>
-      <p:pic>
-        <p:nvPicPr>
-          <p:cNvPr id="7" name="Content Placeholder 3"/>
-          <p:cNvPicPr>
-            <a:picLocks noChangeAspect="1"/>
-          </p:cNvPicPr>
-          <p:nvPr/>
-        </p:nvPicPr>
-        <p:blipFill>
-          <a:blip r:embed="rId1"/>
-          <a:stretch>
-            <a:fillRect/>
-          </a:stretch>
-        </p:blipFill>
-        <p:spPr>
-          <a:xfrm>
-            <a:off x="7608570" y="1313815"/>
-            <a:ext cx="3577590" cy="2750185"/>
-          </a:xfrm>
-          <a:prstGeom prst="rect">
-            <a:avLst/>
-          </a:prstGeom>
-          <a:noFill/>
-          <a:ln w="9525">
-            <a:noFill/>
-          </a:ln>
-        </p:spPr>
-      </p:pic>
-      <p:sp>
-        <p:nvSpPr>
-          <p:cNvPr id="8" name="Text Box 7"/>
-          <p:cNvSpPr txBox="1"/>
-          <p:nvPr/>
-        </p:nvSpPr>
-        <p:spPr>
-          <a:xfrm>
-            <a:off x="433070" y="969645"/>
-            <a:ext cx="3004820" cy="275590"/>
-          </a:xfrm>
-          <a:prstGeom prst="rect">
-            <a:avLst/>
-          </a:prstGeom>
-          <a:noFill/>
-        </p:spPr>
-        <p:txBody>
-          <a:bodyPr wrap="square" rtlCol="0">
-            <a:spAutoFit/>
-          </a:bodyPr>
-          <a:p>
-            <a:r>
-              <a:rPr lang="en-US" sz="1200"/>
-              <a:t>3) Correlation between “OCR” and CPI</a:t>
-            </a:r>
-            <a:endParaRPr lang="en-US" sz="1200"/>
-          </a:p>
-        </p:txBody>
-      </p:sp>
-      <p:sp>
-        <p:nvSpPr>
-          <p:cNvPr id="9" name="Text Box 8"/>
-          <p:cNvSpPr txBox="1"/>
-          <p:nvPr/>
-        </p:nvSpPr>
-        <p:spPr>
-          <a:xfrm>
-            <a:off x="3839210" y="1038225"/>
-            <a:ext cx="3004820" cy="275590"/>
-          </a:xfrm>
-          <a:prstGeom prst="rect">
-            <a:avLst/>
-          </a:prstGeom>
-          <a:noFill/>
-        </p:spPr>
-        <p:txBody>
-          <a:bodyPr wrap="square" rtlCol="0">
-            <a:spAutoFit/>
-          </a:bodyPr>
-          <a:p>
-            <a:r>
-              <a:rPr lang="en-US" sz="1200"/>
-              <a:t>4) Correlation between “CPI” and HPI</a:t>
-            </a:r>
-            <a:endParaRPr lang="en-US" sz="1200"/>
-          </a:p>
-        </p:txBody>
-      </p:sp>
-      <p:sp>
-        <p:nvSpPr>
-          <p:cNvPr id="10" name="Text Box 9"/>
-          <p:cNvSpPr txBox="1"/>
-          <p:nvPr/>
-        </p:nvSpPr>
-        <p:spPr>
-          <a:xfrm>
-            <a:off x="7733030" y="946150"/>
-            <a:ext cx="3004820" cy="460375"/>
-          </a:xfrm>
-          <a:prstGeom prst="rect">
-            <a:avLst/>
-          </a:prstGeom>
-          <a:noFill/>
-        </p:spPr>
-        <p:txBody>
-          <a:bodyPr wrap="square" rtlCol="0">
-            <a:spAutoFit/>
-          </a:bodyPr>
-          <a:p>
-            <a:r>
-              <a:rPr lang="en-US" sz="1200"/>
-              <a:t>5) Correlation between “OCR” and Exchange Rate NZD VS. USD</a:t>
-            </a:r>
-            <a:endParaRPr lang="en-US" sz="1200"/>
-          </a:p>
-        </p:txBody>
-      </p:sp>
-      <p:sp>
-        <p:nvSpPr>
-          <p:cNvPr id="11" name="Text Box 10"/>
-          <p:cNvSpPr txBox="1"/>
-          <p:nvPr/>
-        </p:nvSpPr>
-        <p:spPr>
-          <a:xfrm>
-            <a:off x="1998980" y="6383020"/>
-            <a:ext cx="3004820" cy="275590"/>
-          </a:xfrm>
-          <a:prstGeom prst="rect">
-            <a:avLst/>
-          </a:prstGeom>
-          <a:noFill/>
-        </p:spPr>
-        <p:txBody>
-          <a:bodyPr wrap="square" rtlCol="0">
-            <a:spAutoFit/>
-          </a:bodyPr>
-          <a:p>
-            <a:r>
-              <a:rPr lang="en-US" sz="1200"/>
-              <a:t>6) Correlation between “OCR” and CPI</a:t>
-            </a:r>
-            <a:endParaRPr lang="en-US" sz="1200"/>
-          </a:p>
-        </p:txBody>
-      </p:sp>
-      <p:sp>
-        <p:nvSpPr>
-          <p:cNvPr id="12" name="Text Box 11"/>
-          <p:cNvSpPr txBox="1"/>
-          <p:nvPr/>
-        </p:nvSpPr>
-        <p:spPr>
-          <a:xfrm>
-            <a:off x="6844030" y="6290945"/>
-            <a:ext cx="3004820" cy="460375"/>
-          </a:xfrm>
-          <a:prstGeom prst="rect">
-            <a:avLst/>
-          </a:prstGeom>
-          <a:noFill/>
-        </p:spPr>
-        <p:txBody>
-          <a:bodyPr wrap="square" rtlCol="0">
-            <a:spAutoFit/>
-          </a:bodyPr>
-          <a:p>
-            <a:r>
-              <a:rPr lang="en-US" sz="1200"/>
-              <a:t>7) Correlation between “OCR” and “State Highway Traffic Volumns”</a:t>
-            </a:r>
-            <a:endParaRPr lang="en-US" sz="1200"/>
-          </a:p>
-        </p:txBody>
-      </p:sp>
-      <p:sp>
-        <p:nvSpPr>
-          <p:cNvPr id="14" name="Text Box 13"/>
-          <p:cNvSpPr txBox="1"/>
-          <p:nvPr/>
-        </p:nvSpPr>
-        <p:spPr>
-          <a:xfrm>
-            <a:off x="419100" y="3714750"/>
-            <a:ext cx="1333500" cy="2399665"/>
-          </a:xfrm>
-          <a:prstGeom prst="rect">
-            <a:avLst/>
-          </a:prstGeom>
-          <a:noFill/>
-        </p:spPr>
-        <p:txBody>
-          <a:bodyPr wrap="square" rtlCol="0">
-            <a:spAutoFit/>
-          </a:bodyPr>
-          <a:p>
-            <a:r>
-              <a:rPr lang="en-US" sz="1000"/>
-              <a:t>3) x axis (OCR from low to high value) : y axis (CPI from low to high value) </a:t>
-            </a:r>
-            <a:endParaRPr lang="en-US" sz="1000"/>
-          </a:p>
-          <a:p>
-            <a:r>
-              <a:rPr lang="en-US" sz="1000"/>
-              <a:t>[cut in the Official Cash Rate (OCR) leads to an increase in inflation and GDP growth]</a:t>
-            </a:r>
-            <a:endParaRPr lang="en-US" sz="1000"/>
-          </a:p>
-          <a:p>
-            <a:r>
-              <a:rPr lang="en-US" sz="1000"/>
-              <a:t>[References : https://www.rbnz.govt.nz/-/media/d0024c4168944dc6a502b497cdd5d46c.ashx]</a:t>
-            </a:r>
-            <a:endParaRPr lang="en-US" sz="1000"/>
-          </a:p>
-        </p:txBody>
-      </p:sp>
-      <p:pic>
-        <p:nvPicPr>
-          <p:cNvPr id="103" name="Content Placeholder 102"/>
-          <p:cNvPicPr/>
-          <p:nvPr>
-            <p:ph sz="half" idx="2"/>
+            <p:ph idx="1"/>
           </p:nvPr>
         </p:nvPicPr>
         <p:blipFill>
@@ -4854,90 +4658,14 @@
         </p:blipFill>
         <p:spPr>
           <a:xfrm>
-            <a:off x="3839210" y="1405890"/>
-            <a:ext cx="3281045" cy="2324735"/>
+            <a:off x="2227580" y="1825625"/>
+            <a:ext cx="7735570" cy="4351655"/>
           </a:xfrm>
           <a:prstGeom prst="rect">
             <a:avLst/>
           </a:prstGeom>
-          <a:noFill/>
-          <a:ln w="9525">
-            <a:noFill/>
-          </a:ln>
         </p:spPr>
       </p:pic>
-      <p:sp>
-        <p:nvSpPr>
-          <p:cNvPr id="16" name="Text Box 15"/>
-          <p:cNvSpPr txBox="1"/>
-          <p:nvPr/>
-        </p:nvSpPr>
-        <p:spPr>
-          <a:xfrm>
-            <a:off x="2463800" y="3418840"/>
-            <a:ext cx="4799965" cy="275590"/>
-          </a:xfrm>
-          <a:prstGeom prst="rect">
-            <a:avLst/>
-          </a:prstGeom>
-          <a:noFill/>
-        </p:spPr>
-        <p:txBody>
-          <a:bodyPr wrap="square" rtlCol="0" anchor="t">
-            <a:spAutoFit/>
-          </a:bodyPr>
-          <a:p>
-            <a:r>
-              <a:rPr lang="en-US" sz="1200"/>
-              <a:t>https://www.bankingstrategist.com/housing-prices-hpi-vs-cpi</a:t>
-            </a:r>
-            <a:endParaRPr lang="en-US" sz="1200"/>
-          </a:p>
-        </p:txBody>
-      </p:sp>
-      <p:sp>
-        <p:nvSpPr>
-          <p:cNvPr id="17" name="Text Box 16"/>
-          <p:cNvSpPr txBox="1"/>
-          <p:nvPr/>
-        </p:nvSpPr>
-        <p:spPr>
-          <a:xfrm>
-            <a:off x="10593705" y="1610360"/>
-            <a:ext cx="978535" cy="2553335"/>
-          </a:xfrm>
-          <a:prstGeom prst="rect">
-            <a:avLst/>
-          </a:prstGeom>
-          <a:noFill/>
-        </p:spPr>
-        <p:txBody>
-          <a:bodyPr wrap="square" rtlCol="0">
-            <a:spAutoFit/>
-          </a:bodyPr>
-          <a:p>
-            <a:r>
-              <a:rPr lang="en-US" sz="800"/>
-              <a:t>[If we raise the OCR, banks' interest rates also tend to increase and vice versa. </a:t>
-            </a:r>
-            <a:endParaRPr lang="en-US" sz="800"/>
-          </a:p>
-          <a:p>
-            <a:r>
-              <a:rPr lang="en-US" sz="800"/>
-              <a:t>This is because the OCR influences the banks' costs, so as with any business, changes in costs are passed on in their prices. </a:t>
-            </a:r>
-            <a:endParaRPr lang="en-US" sz="800"/>
-          </a:p>
-          <a:p>
-            <a:r>
-              <a:rPr lang="en-US" sz="800"/>
-              <a:t>A decrease in banks' interest rates usually results in people spending more.]</a:t>
-            </a:r>
-            <a:endParaRPr lang="en-US" sz="800"/>
-          </a:p>
-        </p:txBody>
-      </p:sp>
     </p:spTree>
   </p:cSld>
   <p:clrMapOvr>
@@ -4955,7 +4683,14 @@
         <p:cNvGrpSpPr/>
         <p:nvPr/>
       </p:nvGrpSpPr>
-      <p:grpSpPr/>
+      <p:grpSpPr>
+        <a:xfrm>
+          <a:off x="0" y="0"/>
+          <a:ext cx="0" cy="0"/>
+          <a:chOff x="0" y="0"/>
+          <a:chExt cx="0" cy="0"/>
+        </a:xfrm>
+      </p:grpSpPr>
       <p:sp>
         <p:nvSpPr>
           <p:cNvPr id="2" name="Title 1"/>
@@ -4969,35 +4704,35 @@
         <p:spPr/>
         <p:txBody>
           <a:bodyPr/>
-          <a:p>
-            <a:r>
-              <a:rPr lang="en-US"/>
-              <a:t>How does Interest Rate Impact HPI</a:t>
-            </a:r>
-            <a:endParaRPr lang="en-US"/>
+          <a:lstStyle/>
+          <a:p>
+            <a:r>
+              <a:rPr lang="en-US"/>
+              <a:t>Charts</a:t>
+            </a:r>
           </a:p>
         </p:txBody>
       </p:sp>
       <p:pic>
         <p:nvPicPr>
-          <p:cNvPr id="7" name="Content Placeholder 6"/>
+          <p:cNvPr id="4" name="Content Placeholder 3"/>
           <p:cNvPicPr>
-            <a:picLocks noChangeAspect="1"/>
+            <a:picLocks noGrp="1" noChangeAspect="1"/>
           </p:cNvPicPr>
           <p:nvPr>
             <p:ph idx="1"/>
           </p:nvPr>
         </p:nvPicPr>
         <p:blipFill>
-          <a:blip r:embed="rId1"/>
+          <a:blip r:embed="rId2"/>
           <a:stretch>
             <a:fillRect/>
           </a:stretch>
         </p:blipFill>
         <p:spPr>
           <a:xfrm>
-            <a:off x="4513580" y="1154430"/>
-            <a:ext cx="7442200" cy="4953000"/>
+            <a:off x="3642995" y="1469390"/>
+            <a:ext cx="4905375" cy="4362450"/>
           </a:xfrm>
           <a:prstGeom prst="rect">
             <a:avLst/>
@@ -5006,14 +4741,14 @@
       </p:pic>
       <p:sp>
         <p:nvSpPr>
-          <p:cNvPr id="8" name="Text Box 7"/>
+          <p:cNvPr id="3" name="Text Box 2"/>
           <p:cNvSpPr txBox="1"/>
           <p:nvPr/>
         </p:nvSpPr>
         <p:spPr>
           <a:xfrm>
-            <a:off x="301625" y="1176655"/>
-            <a:ext cx="3818255" cy="922020"/>
+            <a:off x="999490" y="6069330"/>
+            <a:ext cx="10695305" cy="368300"/>
           </a:xfrm>
           <a:prstGeom prst="rect">
             <a:avLst/>
@@ -5024,12 +4759,41 @@
           <a:bodyPr wrap="square" rtlCol="0">
             <a:spAutoFit/>
           </a:bodyPr>
-          <a:p>
-            <a:r>
-              <a:rPr lang="en-US"/>
-              <a:t>How does Interest Rate of Reserver Bank of New Zealand Impact on house price index (HPI )</a:t>
-            </a:r>
-            <a:endParaRPr lang="en-US"/>
+          <a:lstStyle/>
+          <a:p>
+            <a:r>
+              <a:rPr lang="en-US"/>
+              <a:t>2) x axis time (yyyy-mm) :  y axis (Tourism international visitors arrivals) + nzd-usd-exchange rate</a:t>
+            </a:r>
+          </a:p>
+        </p:txBody>
+      </p:sp>
+      <p:sp>
+        <p:nvSpPr>
+          <p:cNvPr id="5" name="Text Box 4"/>
+          <p:cNvSpPr txBox="1"/>
+          <p:nvPr/>
+        </p:nvSpPr>
+        <p:spPr>
+          <a:xfrm>
+            <a:off x="704850" y="2527935"/>
+            <a:ext cx="2364105" cy="2861310"/>
+          </a:xfrm>
+          <a:prstGeom prst="rect">
+            <a:avLst/>
+          </a:prstGeom>
+          <a:noFill/>
+        </p:spPr>
+        <p:txBody>
+          <a:bodyPr wrap="square" rtlCol="0">
+            <a:spAutoFit/>
+          </a:bodyPr>
+          <a:lstStyle/>
+          <a:p>
+            <a:r>
+              <a:rPr lang="en-US"/>
+              <a:t>With increase of the NZDollar USdollar exchange, it is more expensive for tourism coming to New Zealand, we can observe a dropping of the “Tourism International Visitors Arrivals”</a:t>
+            </a:r>
           </a:p>
         </p:txBody>
       </p:sp>
@@ -5050,7 +4814,14 @@
         <p:cNvGrpSpPr/>
         <p:nvPr/>
       </p:nvGrpSpPr>
-      <p:grpSpPr/>
+      <p:grpSpPr>
+        <a:xfrm>
+          <a:off x="0" y="0"/>
+          <a:ext cx="0" cy="0"/>
+          <a:chOff x="0" y="0"/>
+          <a:chExt cx="0" cy="0"/>
+        </a:xfrm>
+      </p:grpSpPr>
       <p:sp>
         <p:nvSpPr>
           <p:cNvPr id="2" name="Title 1"/>
@@ -5064,97 +4835,189 @@
         <p:spPr/>
         <p:txBody>
           <a:bodyPr/>
-          <a:p>
-            <a:r>
-              <a:rPr lang="en-US"/>
-              <a:t>Conclusions</a:t>
-            </a:r>
+          <a:lstStyle/>
+          <a:p>
             <a:endParaRPr lang="en-US"/>
-          </a:p>
-        </p:txBody>
-      </p:sp>
-      <p:sp>
-        <p:nvSpPr>
-          <p:cNvPr id="3" name="Content Placeholder 2"/>
-          <p:cNvSpPr>
-            <a:spLocks noGrp="1"/>
-          </p:cNvSpPr>
-          <p:nvPr>
-            <p:ph sz="half" idx="1"/>
-          </p:nvPr>
-        </p:nvSpPr>
-        <p:spPr>
-          <a:xfrm>
-            <a:off x="609600" y="1174750"/>
-            <a:ext cx="5384800" cy="5375275"/>
-          </a:xfrm>
-        </p:spPr>
-        <p:txBody>
-          <a:bodyPr/>
-          <a:p>
-            <a:r>
-              <a:rPr lang="en-US" sz="1800"/>
-              <a:t>Based on the data we have collected as well as what subsequent plots generated based on that.  The following insights have been reviewed. </a:t>
-            </a:r>
-            <a:endParaRPr lang="en-US" sz="1800"/>
-          </a:p>
-          <a:p>
-            <a:pPr lvl="1"/>
-            <a:r>
-              <a:rPr lang="en-US" sz="1600"/>
-              <a:t>As New Zealand Reserve Bank sets its interest rate up, various business will have difficult of getting cheap loans for further development, therefore business activities have been reduced, which leads to increase of unemployment. </a:t>
-            </a:r>
-            <a:endParaRPr lang="en-US" sz="1600"/>
-          </a:p>
-          <a:p>
-            <a:pPr lvl="1"/>
-            <a:r>
-              <a:rPr lang="en-US" sz="1600"/>
-              <a:t>On the other hand, increase of Reserve Bank interest rate will attract oversea hot money for short term investment, therefore it is anticipated that exchange rate of New Zealand dollars VS. Other currency will go up. The high Reserve bank interest rate will lead to lower level of economic activities, hence in term of cargo freight statistics, general vehicle activities and tourism account, we are anticipating dropping in these activities.</a:t>
-            </a:r>
-            <a:endParaRPr lang="en-US" sz="1600"/>
-          </a:p>
-          <a:p>
-            <a:pPr lvl="1"/>
-            <a:r>
-              <a:rPr lang="en-US" sz="1600"/>
-              <a:t>However, Reserve Bank raise interest rate usually to combat high inflation rate (CPI), therefore, we should be expecting dropping of the CPI.</a:t>
-            </a:r>
-            <a:endParaRPr lang="en-US" sz="1600"/>
           </a:p>
         </p:txBody>
       </p:sp>
       <p:pic>
         <p:nvPicPr>
-          <p:cNvPr id="103" name="Content Placeholder 102"/>
-          <p:cNvPicPr/>
-          <p:nvPr>
-            <p:ph sz="half" idx="2"/>
+          <p:cNvPr id="4" name="Content Placeholder 3"/>
+          <p:cNvPicPr>
+            <a:picLocks noGrp="1" noChangeAspect="1"/>
+          </p:cNvPicPr>
+          <p:nvPr>
+            <p:ph idx="1"/>
           </p:nvPr>
         </p:nvPicPr>
         <p:blipFill>
-          <a:blip r:embed="rId1"/>
+          <a:blip r:embed="rId2"/>
           <a:stretch>
             <a:fillRect/>
           </a:stretch>
         </p:blipFill>
         <p:spPr>
           <a:xfrm>
-            <a:off x="6197600" y="1174750"/>
-            <a:ext cx="5922010" cy="2874645"/>
+            <a:off x="3466465" y="1493520"/>
+            <a:ext cx="5257800" cy="4314825"/>
+          </a:xfrm>
+          <a:prstGeom prst="rect">
+            <a:avLst/>
+          </a:prstGeom>
+        </p:spPr>
+      </p:pic>
+      <p:sp>
+        <p:nvSpPr>
+          <p:cNvPr id="3" name="Text Box 2"/>
+          <p:cNvSpPr txBox="1"/>
+          <p:nvPr/>
+        </p:nvSpPr>
+        <p:spPr>
+          <a:xfrm>
+            <a:off x="1683385" y="5982970"/>
+            <a:ext cx="7766050" cy="645160"/>
           </a:xfrm>
           <a:prstGeom prst="rect">
             <a:avLst/>
           </a:prstGeom>
           <a:noFill/>
-          <a:ln w="9525">
-            <a:noFill/>
-          </a:ln>
+        </p:spPr>
+        <p:txBody>
+          <a:bodyPr wrap="square" rtlCol="0">
+            <a:spAutoFit/>
+          </a:bodyPr>
+          <a:lstStyle/>
+          <a:p>
+            <a:r>
+              <a:rPr lang="en-US"/>
+              <a:t>Plot</a:t>
+            </a:r>
+          </a:p>
+          <a:p>
+            <a:r>
+              <a:rPr lang="en-US"/>
+              <a:t>1) x axis time (yyyy-mm) : y axis (OCR + (Labour force status))</a:t>
+            </a:r>
+          </a:p>
+        </p:txBody>
+      </p:sp>
+      <p:sp>
+        <p:nvSpPr>
+          <p:cNvPr id="5" name="Text Box 4"/>
+          <p:cNvSpPr txBox="1"/>
+          <p:nvPr/>
+        </p:nvSpPr>
+        <p:spPr>
+          <a:xfrm>
+            <a:off x="826135" y="1765935"/>
+            <a:ext cx="2199640" cy="2030095"/>
+          </a:xfrm>
+          <a:prstGeom prst="rect">
+            <a:avLst/>
+          </a:prstGeom>
+          <a:noFill/>
+        </p:spPr>
+        <p:txBody>
+          <a:bodyPr wrap="square" rtlCol="0">
+            <a:spAutoFit/>
+          </a:bodyPr>
+          <a:lstStyle/>
+          <a:p>
+            <a:r>
+              <a:rPr lang="en-US"/>
+              <a:t>In this chart, it is observable that as OCR increase, in a few months time, the unemployment rate has also increased. </a:t>
+            </a:r>
+          </a:p>
+        </p:txBody>
+      </p:sp>
+    </p:spTree>
+  </p:cSld>
+  <p:clrMapOvr>
+    <a:masterClrMapping/>
+  </p:clrMapOvr>
+</p:sld>
+</file>
+
+<file path=ppt/slides/slide19.xml><?xml version="1.0" encoding="utf-8"?>
+<p:sld xmlns:a="http://schemas.openxmlformats.org/drawingml/2006/main" xmlns:r="http://schemas.openxmlformats.org/officeDocument/2006/relationships" xmlns:p="http://schemas.openxmlformats.org/presentationml/2006/main">
+  <p:cSld>
+    <p:bg>
+      <p:bgPr>
+        <a:blipFill>
+          <a:blip r:embed="rId2"/>
+          <a:stretch>
+            <a:fillRect/>
+          </a:stretch>
+        </a:blipFill>
+        <a:effectLst/>
+      </p:bgPr>
+    </p:bg>
+    <p:spTree>
+      <p:nvGrpSpPr>
+        <p:cNvPr id="1" name=""/>
+        <p:cNvGrpSpPr/>
+        <p:nvPr/>
+      </p:nvGrpSpPr>
+      <p:grpSpPr>
+        <a:xfrm>
+          <a:off x="0" y="0"/>
+          <a:ext cx="0" cy="0"/>
+          <a:chOff x="0" y="0"/>
+          <a:chExt cx="0" cy="0"/>
+        </a:xfrm>
+      </p:grpSpPr>
+      <p:sp>
+        <p:nvSpPr>
+          <p:cNvPr id="2" name="Title 1"/>
+          <p:cNvSpPr>
+            <a:spLocks noGrp="1"/>
+          </p:cNvSpPr>
+          <p:nvPr>
+            <p:ph type="title"/>
+          </p:nvPr>
+        </p:nvSpPr>
+        <p:spPr/>
+        <p:txBody>
+          <a:bodyPr/>
+          <a:lstStyle/>
+          <a:p>
+            <a:r>
+              <a:rPr lang="en-US"/>
+              <a:t>Charts Generated </a:t>
+            </a:r>
+          </a:p>
+        </p:txBody>
+      </p:sp>
+      <p:pic>
+        <p:nvPicPr>
+          <p:cNvPr id="4" name="Content Placeholder 3"/>
+          <p:cNvPicPr>
+            <a:picLocks noGrp="1" noChangeAspect="1"/>
+          </p:cNvPicPr>
+          <p:nvPr>
+            <p:ph sz="half" idx="1"/>
+          </p:nvPr>
+        </p:nvPicPr>
+        <p:blipFill>
+          <a:blip r:embed="rId2"/>
+          <a:stretch>
+            <a:fillRect/>
+          </a:stretch>
+        </p:blipFill>
+        <p:spPr>
+          <a:xfrm>
+            <a:off x="609600" y="1494790"/>
+            <a:ext cx="2371090" cy="1822450"/>
+          </a:xfrm>
+          <a:prstGeom prst="rect">
+            <a:avLst/>
+          </a:prstGeom>
         </p:spPr>
       </p:pic>
       <p:pic>
         <p:nvPicPr>
-          <p:cNvPr id="4" name="Picture 3"/>
+          <p:cNvPr id="5" name="Content Placeholder 3"/>
           <p:cNvPicPr>
             <a:picLocks noChangeAspect="1"/>
           </p:cNvPicPr>
@@ -5168,174 +5031,357 @@
         </p:blipFill>
         <p:spPr>
           <a:xfrm>
-            <a:off x="6410960" y="4076700"/>
-            <a:ext cx="4133850" cy="2781300"/>
+            <a:off x="3606165" y="3836035"/>
+            <a:ext cx="3176270" cy="2441575"/>
           </a:xfrm>
           <a:prstGeom prst="rect">
             <a:avLst/>
           </a:prstGeom>
+          <a:noFill/>
+          <a:ln w="9525">
+            <a:noFill/>
+          </a:ln>
         </p:spPr>
       </p:pic>
-    </p:spTree>
-  </p:cSld>
-  <p:clrMapOvr>
-    <a:masterClrMapping/>
-  </p:clrMapOvr>
-</p:sld>
-</file>
-
-<file path=ppt/slides/slide19.xml><?xml version="1.0" encoding="utf-8"?>
-<p:sld xmlns:a="http://schemas.openxmlformats.org/drawingml/2006/main" xmlns:r="http://schemas.openxmlformats.org/officeDocument/2006/relationships" xmlns:p="http://schemas.openxmlformats.org/presentationml/2006/main">
-  <p:cSld>
-    <p:spTree>
-      <p:nvGrpSpPr>
-        <p:cNvPr id="1" name=""/>
-        <p:cNvGrpSpPr/>
-        <p:nvPr/>
-      </p:nvGrpSpPr>
-      <p:grpSpPr/>
-      <p:sp>
-        <p:nvSpPr>
-          <p:cNvPr id="5" name="Title 4"/>
-          <p:cNvSpPr>
-            <a:spLocks noGrp="1"/>
-          </p:cNvSpPr>
-          <p:nvPr>
-            <p:ph type="title"/>
-          </p:nvPr>
-        </p:nvSpPr>
-        <p:spPr/>
-        <p:txBody>
-          <a:bodyPr/>
-          <a:p>
-            <a:endParaRPr lang="en-US"/>
-          </a:p>
-        </p:txBody>
-      </p:sp>
-      <p:sp>
-        <p:nvSpPr>
-          <p:cNvPr id="3" name="Content Placeholder 2"/>
-          <p:cNvSpPr>
-            <a:spLocks noGrp="1"/>
-          </p:cNvSpPr>
-          <p:nvPr>
-            <p:ph sz="half" idx="1"/>
-          </p:nvPr>
-        </p:nvSpPr>
-        <p:spPr/>
-        <p:txBody>
-          <a:bodyPr>
-            <a:noAutofit/>
-          </a:bodyPr>
-          <a:p>
-            <a:r>
-              <a:rPr lang="en-US" sz="1800"/>
-              <a:t>When the economic activities are low and unemployment rate is high </a:t>
-            </a:r>
-            <a:endParaRPr lang="en-US" sz="1800"/>
-          </a:p>
-          <a:p>
-            <a:pPr lvl="1"/>
-            <a:r>
-              <a:rPr lang="en-US" sz="1600"/>
-              <a:t>New Zealand government is under pressure to unleash new monetary policies to stimulate economy. Hence government usually </a:t>
-            </a:r>
-            <a:r>
-              <a:rPr lang="en-US" sz="1600" b="1"/>
-              <a:t>resolve to lower reserve bank interest rate</a:t>
-            </a:r>
-            <a:r>
-              <a:rPr lang="en-US" sz="1600"/>
-              <a:t>. </a:t>
-            </a:r>
-            <a:endParaRPr lang="en-US" sz="1600"/>
-          </a:p>
-          <a:p>
-            <a:pPr lvl="1"/>
-            <a:r>
-              <a:rPr lang="en-US" sz="1600"/>
-              <a:t>With </a:t>
-            </a:r>
-            <a:r>
-              <a:rPr lang="en-US" sz="1600" b="1"/>
-              <a:t>high reserve bank interest rate</a:t>
-            </a:r>
-            <a:r>
-              <a:rPr lang="en-US" sz="1600"/>
-              <a:t>, we should be able to observe </a:t>
-            </a:r>
-            <a:r>
-              <a:rPr lang="en-US" sz="1600" b="1"/>
-              <a:t>weak New Zealand dollars VS US dollars</a:t>
-            </a:r>
-            <a:r>
-              <a:rPr lang="en-US" sz="1600"/>
-              <a:t>. Thus make export of our products cheaper, therefore attracts more oversea orders, subsequently we should be able to observe an increase of freight transportation activities, oversea passage flights. </a:t>
-            </a:r>
-            <a:endParaRPr lang="en-US" sz="1600"/>
-          </a:p>
-          <a:p>
-            <a:pPr lvl="1"/>
-            <a:r>
-              <a:rPr lang="en-US" sz="1600"/>
-              <a:t>To stimulate general economic growth, government usually starts major infrastructural projects like major road works, etc. Hence it is also anticipated that general road construction activities are increasing.</a:t>
-            </a:r>
-            <a:endParaRPr lang="en-US" sz="1600"/>
-          </a:p>
-        </p:txBody>
-      </p:sp>
       <p:pic>
         <p:nvPicPr>
-          <p:cNvPr id="4" name="Content Placeholder 3"/>
+          <p:cNvPr id="6" name="Content Placeholder 3"/>
           <p:cNvPicPr>
             <a:picLocks noChangeAspect="1"/>
           </p:cNvPicPr>
-          <p:nvPr>
-            <p:ph sz="half" idx="2"/>
-          </p:nvPr>
+          <p:nvPr/>
         </p:nvPicPr>
         <p:blipFill>
-          <a:blip r:embed="rId1"/>
+          <a:blip r:embed="rId2"/>
           <a:stretch>
             <a:fillRect/>
           </a:stretch>
         </p:blipFill>
         <p:spPr>
           <a:xfrm>
-            <a:off x="6665595" y="1264920"/>
-            <a:ext cx="4448175" cy="4772025"/>
-          </a:xfrm>
-          <a:prstGeom prst="rect">
-            <a:avLst/>
-          </a:prstGeom>
-        </p:spPr>
-      </p:pic>
-      <p:sp>
-        <p:nvSpPr>
-          <p:cNvPr id="6" name="Text Box 5"/>
-          <p:cNvSpPr txBox="1"/>
-          <p:nvPr/>
-        </p:nvSpPr>
-        <p:spPr>
-          <a:xfrm>
-            <a:off x="609600" y="6227445"/>
-            <a:ext cx="8583930" cy="306705"/>
+            <a:off x="7388860" y="4064000"/>
+            <a:ext cx="2947035" cy="2265680"/>
           </a:xfrm>
           <a:prstGeom prst="rect">
             <a:avLst/>
           </a:prstGeom>
           <a:noFill/>
+          <a:ln w="9525">
+            <a:noFill/>
+          </a:ln>
+        </p:spPr>
+      </p:pic>
+      <p:pic>
+        <p:nvPicPr>
+          <p:cNvPr id="7" name="Content Placeholder 3"/>
+          <p:cNvPicPr>
+            <a:picLocks noChangeAspect="1"/>
+          </p:cNvPicPr>
+          <p:nvPr/>
+        </p:nvPicPr>
+        <p:blipFill>
+          <a:blip r:embed="rId2"/>
+          <a:stretch>
+            <a:fillRect/>
+          </a:stretch>
+        </p:blipFill>
+        <p:spPr>
+          <a:xfrm>
+            <a:off x="7608570" y="1313815"/>
+            <a:ext cx="3577590" cy="2750185"/>
+          </a:xfrm>
+          <a:prstGeom prst="rect">
+            <a:avLst/>
+          </a:prstGeom>
+          <a:noFill/>
+          <a:ln w="9525">
+            <a:noFill/>
+          </a:ln>
+        </p:spPr>
+      </p:pic>
+      <p:sp>
+        <p:nvSpPr>
+          <p:cNvPr id="8" name="Text Box 7"/>
+          <p:cNvSpPr txBox="1"/>
+          <p:nvPr/>
+        </p:nvSpPr>
+        <p:spPr>
+          <a:xfrm>
+            <a:off x="433070" y="969645"/>
+            <a:ext cx="3004820" cy="275590"/>
+          </a:xfrm>
+          <a:prstGeom prst="rect">
+            <a:avLst/>
+          </a:prstGeom>
+          <a:noFill/>
+        </p:spPr>
+        <p:txBody>
+          <a:bodyPr wrap="square" rtlCol="0">
+            <a:spAutoFit/>
+          </a:bodyPr>
+          <a:lstStyle/>
+          <a:p>
+            <a:r>
+              <a:rPr lang="en-US" sz="1200"/>
+              <a:t>3) Correlation between “OCR” and CPI</a:t>
+            </a:r>
+          </a:p>
+        </p:txBody>
+      </p:sp>
+      <p:sp>
+        <p:nvSpPr>
+          <p:cNvPr id="9" name="Text Box 8"/>
+          <p:cNvSpPr txBox="1"/>
+          <p:nvPr/>
+        </p:nvSpPr>
+        <p:spPr>
+          <a:xfrm>
+            <a:off x="3839210" y="1038225"/>
+            <a:ext cx="3004820" cy="275590"/>
+          </a:xfrm>
+          <a:prstGeom prst="rect">
+            <a:avLst/>
+          </a:prstGeom>
+          <a:noFill/>
+        </p:spPr>
+        <p:txBody>
+          <a:bodyPr wrap="square" rtlCol="0">
+            <a:spAutoFit/>
+          </a:bodyPr>
+          <a:lstStyle/>
+          <a:p>
+            <a:r>
+              <a:rPr lang="en-US" sz="1200"/>
+              <a:t>4) Correlation between “CPI” and HPI</a:t>
+            </a:r>
+          </a:p>
+        </p:txBody>
+      </p:sp>
+      <p:sp>
+        <p:nvSpPr>
+          <p:cNvPr id="10" name="Text Box 9"/>
+          <p:cNvSpPr txBox="1"/>
+          <p:nvPr/>
+        </p:nvSpPr>
+        <p:spPr>
+          <a:xfrm>
+            <a:off x="7733030" y="946150"/>
+            <a:ext cx="3004820" cy="460375"/>
+          </a:xfrm>
+          <a:prstGeom prst="rect">
+            <a:avLst/>
+          </a:prstGeom>
+          <a:noFill/>
+        </p:spPr>
+        <p:txBody>
+          <a:bodyPr wrap="square" rtlCol="0">
+            <a:spAutoFit/>
+          </a:bodyPr>
+          <a:lstStyle/>
+          <a:p>
+            <a:r>
+              <a:rPr lang="en-US" sz="1200"/>
+              <a:t>5) Correlation between “OCR” and Exchange Rate NZD VS. USD</a:t>
+            </a:r>
+          </a:p>
+        </p:txBody>
+      </p:sp>
+      <p:sp>
+        <p:nvSpPr>
+          <p:cNvPr id="11" name="Text Box 10"/>
+          <p:cNvSpPr txBox="1"/>
+          <p:nvPr/>
+        </p:nvSpPr>
+        <p:spPr>
+          <a:xfrm>
+            <a:off x="1998980" y="6383020"/>
+            <a:ext cx="3004820" cy="275590"/>
+          </a:xfrm>
+          <a:prstGeom prst="rect">
+            <a:avLst/>
+          </a:prstGeom>
+          <a:noFill/>
+        </p:spPr>
+        <p:txBody>
+          <a:bodyPr wrap="square" rtlCol="0">
+            <a:spAutoFit/>
+          </a:bodyPr>
+          <a:lstStyle/>
+          <a:p>
+            <a:r>
+              <a:rPr lang="en-US" sz="1200"/>
+              <a:t>6) Correlation between “OCR” and CPI</a:t>
+            </a:r>
+          </a:p>
+        </p:txBody>
+      </p:sp>
+      <p:sp>
+        <p:nvSpPr>
+          <p:cNvPr id="12" name="Text Box 11"/>
+          <p:cNvSpPr txBox="1"/>
+          <p:nvPr/>
+        </p:nvSpPr>
+        <p:spPr>
+          <a:xfrm>
+            <a:off x="6844030" y="6290945"/>
+            <a:ext cx="3004820" cy="460375"/>
+          </a:xfrm>
+          <a:prstGeom prst="rect">
+            <a:avLst/>
+          </a:prstGeom>
+          <a:noFill/>
+        </p:spPr>
+        <p:txBody>
+          <a:bodyPr wrap="square" rtlCol="0">
+            <a:spAutoFit/>
+          </a:bodyPr>
+          <a:lstStyle/>
+          <a:p>
+            <a:r>
+              <a:rPr lang="en-US" sz="1200"/>
+              <a:t>7) Correlation between “OCR” and “State Highway Traffic Volumns”</a:t>
+            </a:r>
+          </a:p>
+        </p:txBody>
+      </p:sp>
+      <p:sp>
+        <p:nvSpPr>
+          <p:cNvPr id="14" name="Text Box 13"/>
+          <p:cNvSpPr txBox="1"/>
+          <p:nvPr/>
+        </p:nvSpPr>
+        <p:spPr>
+          <a:xfrm>
+            <a:off x="419100" y="3714750"/>
+            <a:ext cx="1333500" cy="2399665"/>
+          </a:xfrm>
+          <a:prstGeom prst="rect">
+            <a:avLst/>
+          </a:prstGeom>
+          <a:noFill/>
+        </p:spPr>
+        <p:txBody>
+          <a:bodyPr wrap="square" rtlCol="0">
+            <a:spAutoFit/>
+          </a:bodyPr>
+          <a:lstStyle/>
+          <a:p>
+            <a:r>
+              <a:rPr lang="en-US" sz="1000"/>
+              <a:t>3) x axis (OCR from low to high value) : y axis (CPI from low to high value) </a:t>
+            </a:r>
+          </a:p>
+          <a:p>
+            <a:r>
+              <a:rPr lang="en-US" sz="1000"/>
+              <a:t>[cut in the Official Cash Rate (OCR) leads to an increase in inflation and GDP growth]</a:t>
+            </a:r>
+          </a:p>
+          <a:p>
+            <a:r>
+              <a:rPr lang="en-US" sz="1000"/>
+              <a:t>[References : https://www.rbnz.govt.nz/-/media/d0024c4168944dc6a502b497cdd5d46c.ashx]</a:t>
+            </a:r>
+          </a:p>
+        </p:txBody>
+      </p:sp>
+      <p:pic>
+        <p:nvPicPr>
+          <p:cNvPr id="103" name="Content Placeholder 102"/>
+          <p:cNvPicPr>
+            <a:picLocks noGrp="1"/>
+          </p:cNvPicPr>
+          <p:nvPr>
+            <p:ph sz="half" idx="2"/>
+          </p:nvPr>
+        </p:nvPicPr>
+        <p:blipFill>
+          <a:blip r:embed="rId3"/>
+          <a:stretch>
+            <a:fillRect/>
+          </a:stretch>
+        </p:blipFill>
+        <p:spPr>
+          <a:xfrm>
+            <a:off x="3839210" y="1405890"/>
+            <a:ext cx="3281045" cy="2324735"/>
+          </a:xfrm>
+          <a:prstGeom prst="rect">
+            <a:avLst/>
+          </a:prstGeom>
+          <a:noFill/>
+          <a:ln w="9525">
+            <a:noFill/>
+          </a:ln>
+        </p:spPr>
+      </p:pic>
+      <p:sp>
+        <p:nvSpPr>
+          <p:cNvPr id="16" name="Text Box 15"/>
+          <p:cNvSpPr txBox="1"/>
+          <p:nvPr/>
+        </p:nvSpPr>
+        <p:spPr>
+          <a:xfrm>
+            <a:off x="2463800" y="3418840"/>
+            <a:ext cx="4799965" cy="275590"/>
+          </a:xfrm>
+          <a:prstGeom prst="rect">
+            <a:avLst/>
+          </a:prstGeom>
+          <a:noFill/>
         </p:spPr>
         <p:txBody>
           <a:bodyPr wrap="square" rtlCol="0" anchor="t">
             <a:spAutoFit/>
           </a:bodyPr>
-          <a:p>
-            <a:r>
-              <a:rPr lang="en-US" sz="1400"/>
-              <a:t>https://www.treasury.govt.nz/publications/weu/weekly-economic-update-17-april-2020-html</a:t>
-            </a:r>
-            <a:endParaRPr lang="en-US" sz="1400"/>
+          <a:lstStyle/>
+          <a:p>
+            <a:r>
+              <a:rPr lang="en-US" sz="1200"/>
+              <a:t>https://www.bankingstrategist.com/housing-prices-hpi-vs-cpi</a:t>
+            </a:r>
+          </a:p>
+        </p:txBody>
+      </p:sp>
+      <p:sp>
+        <p:nvSpPr>
+          <p:cNvPr id="17" name="Text Box 16"/>
+          <p:cNvSpPr txBox="1"/>
+          <p:nvPr/>
+        </p:nvSpPr>
+        <p:spPr>
+          <a:xfrm>
+            <a:off x="10593705" y="1610360"/>
+            <a:ext cx="978535" cy="2553335"/>
+          </a:xfrm>
+          <a:prstGeom prst="rect">
+            <a:avLst/>
+          </a:prstGeom>
+          <a:noFill/>
+        </p:spPr>
+        <p:txBody>
+          <a:bodyPr wrap="square" rtlCol="0">
+            <a:spAutoFit/>
+          </a:bodyPr>
+          <a:lstStyle/>
+          <a:p>
+            <a:r>
+              <a:rPr lang="en-US" sz="800"/>
+              <a:t>[If we raise the OCR, banks' interest rates also tend to increase and vice versa. </a:t>
+            </a:r>
+          </a:p>
+          <a:p>
+            <a:r>
+              <a:rPr lang="en-US" sz="800"/>
+              <a:t>This is because the OCR influences the banks' costs, so as with any business, changes in costs are passed on in their prices. </a:t>
+            </a:r>
+          </a:p>
+          <a:p>
+            <a:r>
+              <a:rPr lang="en-US" sz="800"/>
+              <a:t>A decrease in banks' interest rates usually results in people spending more.]</a:t>
+            </a:r>
           </a:p>
         </p:txBody>
       </p:sp>
@@ -5356,7 +5402,14 @@
         <p:cNvGrpSpPr/>
         <p:nvPr/>
       </p:nvGrpSpPr>
-      <p:grpSpPr/>
+      <p:grpSpPr>
+        <a:xfrm>
+          <a:off x="0" y="0"/>
+          <a:ext cx="0" cy="0"/>
+          <a:chOff x="0" y="0"/>
+          <a:chExt cx="0" cy="0"/>
+        </a:xfrm>
+      </p:grpSpPr>
       <p:sp>
         <p:nvSpPr>
           <p:cNvPr id="2" name="Title 1"/>
@@ -5370,12 +5423,12 @@
         <p:spPr/>
         <p:txBody>
           <a:bodyPr/>
+          <a:lstStyle/>
           <a:p>
             <a:r>
               <a:rPr lang="en-US"/>
               <a:t>Background</a:t>
             </a:r>
-            <a:endParaRPr lang="en-US"/>
           </a:p>
         </p:txBody>
       </p:sp>
@@ -5392,12 +5445,12 @@
         <p:spPr/>
         <p:txBody>
           <a:bodyPr/>
+          <a:lstStyle/>
           <a:p>
             <a:r>
               <a:rPr lang="en-US"/>
               <a:t>Turbluent International Market caused by political uneasying and COVID-19</a:t>
             </a:r>
-            <a:endParaRPr lang="en-US"/>
           </a:p>
           <a:p>
             <a:endParaRPr lang="en-US"/>
@@ -5407,13 +5460,15 @@
       <p:pic>
         <p:nvPicPr>
           <p:cNvPr id="101" name="Content Placeholder 100"/>
-          <p:cNvPicPr/>
+          <p:cNvPicPr>
+            <a:picLocks noGrp="1"/>
+          </p:cNvPicPr>
           <p:nvPr>
             <p:ph sz="half" idx="2"/>
           </p:nvPr>
         </p:nvPicPr>
         <p:blipFill>
-          <a:blip r:embed="rId1"/>
+          <a:blip r:embed="rId3"/>
           <a:stretch>
             <a:fillRect/>
           </a:stretch>
@@ -5439,7 +5494,7 @@
           <p:nvPr/>
         </p:nvPicPr>
         <p:blipFill>
-          <a:blip r:embed="rId2"/>
+          <a:blip r:embed="rId4"/>
           <a:stretch>
             <a:fillRect/>
           </a:stretch>
@@ -5465,7 +5520,7 @@
           <p:nvPr/>
         </p:nvPicPr>
         <p:blipFill>
-          <a:blip r:embed="rId3"/>
+          <a:blip r:embed="rId5"/>
           <a:stretch>
             <a:fillRect/>
           </a:stretch>
@@ -5484,6 +5539,425 @@
           </a:ln>
         </p:spPr>
       </p:pic>
+    </p:spTree>
+  </p:cSld>
+  <p:clrMapOvr>
+    <a:masterClrMapping/>
+  </p:clrMapOvr>
+</p:sld>
+</file>
+
+<file path=ppt/slides/slide20.xml><?xml version="1.0" encoding="utf-8"?>
+<p:sld xmlns:a="http://schemas.openxmlformats.org/drawingml/2006/main" xmlns:r="http://schemas.openxmlformats.org/officeDocument/2006/relationships" xmlns:p="http://schemas.openxmlformats.org/presentationml/2006/main">
+  <p:cSld>
+    <p:spTree>
+      <p:nvGrpSpPr>
+        <p:cNvPr id="1" name=""/>
+        <p:cNvGrpSpPr/>
+        <p:nvPr/>
+      </p:nvGrpSpPr>
+      <p:grpSpPr>
+        <a:xfrm>
+          <a:off x="0" y="0"/>
+          <a:ext cx="0" cy="0"/>
+          <a:chOff x="0" y="0"/>
+          <a:chExt cx="0" cy="0"/>
+        </a:xfrm>
+      </p:grpSpPr>
+      <p:sp>
+        <p:nvSpPr>
+          <p:cNvPr id="2" name="Title 1"/>
+          <p:cNvSpPr>
+            <a:spLocks noGrp="1"/>
+          </p:cNvSpPr>
+          <p:nvPr>
+            <p:ph type="title"/>
+          </p:nvPr>
+        </p:nvSpPr>
+        <p:spPr/>
+        <p:txBody>
+          <a:bodyPr/>
+          <a:lstStyle/>
+          <a:p>
+            <a:r>
+              <a:rPr lang="en-US"/>
+              <a:t>How does Interest Rate Impact HPI</a:t>
+            </a:r>
+          </a:p>
+        </p:txBody>
+      </p:sp>
+      <p:pic>
+        <p:nvPicPr>
+          <p:cNvPr id="7" name="Content Placeholder 6"/>
+          <p:cNvPicPr>
+            <a:picLocks noGrp="1" noChangeAspect="1"/>
+          </p:cNvPicPr>
+          <p:nvPr>
+            <p:ph idx="1"/>
+          </p:nvPr>
+        </p:nvPicPr>
+        <p:blipFill>
+          <a:blip r:embed="rId2"/>
+          <a:stretch>
+            <a:fillRect/>
+          </a:stretch>
+        </p:blipFill>
+        <p:spPr>
+          <a:xfrm>
+            <a:off x="4513580" y="1154430"/>
+            <a:ext cx="7442200" cy="4953000"/>
+          </a:xfrm>
+          <a:prstGeom prst="rect">
+            <a:avLst/>
+          </a:prstGeom>
+        </p:spPr>
+      </p:pic>
+      <p:sp>
+        <p:nvSpPr>
+          <p:cNvPr id="8" name="Text Box 7"/>
+          <p:cNvSpPr txBox="1"/>
+          <p:nvPr/>
+        </p:nvSpPr>
+        <p:spPr>
+          <a:xfrm>
+            <a:off x="301625" y="1176655"/>
+            <a:ext cx="3818255" cy="922020"/>
+          </a:xfrm>
+          <a:prstGeom prst="rect">
+            <a:avLst/>
+          </a:prstGeom>
+          <a:noFill/>
+        </p:spPr>
+        <p:txBody>
+          <a:bodyPr wrap="square" rtlCol="0">
+            <a:spAutoFit/>
+          </a:bodyPr>
+          <a:lstStyle/>
+          <a:p>
+            <a:r>
+              <a:rPr lang="en-US"/>
+              <a:t>How does Interest Rate of Reserver Bank of New Zealand Impact on house price index (HPI )</a:t>
+            </a:r>
+          </a:p>
+        </p:txBody>
+      </p:sp>
+    </p:spTree>
+  </p:cSld>
+  <p:clrMapOvr>
+    <a:masterClrMapping/>
+  </p:clrMapOvr>
+</p:sld>
+</file>
+
+<file path=ppt/slides/slide21.xml><?xml version="1.0" encoding="utf-8"?>
+<p:sld xmlns:a="http://schemas.openxmlformats.org/drawingml/2006/main" xmlns:r="http://schemas.openxmlformats.org/officeDocument/2006/relationships" xmlns:p="http://schemas.openxmlformats.org/presentationml/2006/main">
+  <p:cSld>
+    <p:spTree>
+      <p:nvGrpSpPr>
+        <p:cNvPr id="1" name=""/>
+        <p:cNvGrpSpPr/>
+        <p:nvPr/>
+      </p:nvGrpSpPr>
+      <p:grpSpPr>
+        <a:xfrm>
+          <a:off x="0" y="0"/>
+          <a:ext cx="0" cy="0"/>
+          <a:chOff x="0" y="0"/>
+          <a:chExt cx="0" cy="0"/>
+        </a:xfrm>
+      </p:grpSpPr>
+      <p:sp>
+        <p:nvSpPr>
+          <p:cNvPr id="2" name="Title 1"/>
+          <p:cNvSpPr>
+            <a:spLocks noGrp="1"/>
+          </p:cNvSpPr>
+          <p:nvPr>
+            <p:ph type="title"/>
+          </p:nvPr>
+        </p:nvSpPr>
+        <p:spPr/>
+        <p:txBody>
+          <a:bodyPr/>
+          <a:lstStyle/>
+          <a:p>
+            <a:r>
+              <a:rPr lang="en-US"/>
+              <a:t>Conclusions</a:t>
+            </a:r>
+          </a:p>
+        </p:txBody>
+      </p:sp>
+      <p:sp>
+        <p:nvSpPr>
+          <p:cNvPr id="3" name="Content Placeholder 2"/>
+          <p:cNvSpPr>
+            <a:spLocks noGrp="1"/>
+          </p:cNvSpPr>
+          <p:nvPr>
+            <p:ph sz="half" idx="1"/>
+          </p:nvPr>
+        </p:nvSpPr>
+        <p:spPr>
+          <a:xfrm>
+            <a:off x="609600" y="1174750"/>
+            <a:ext cx="5384800" cy="5375275"/>
+          </a:xfrm>
+        </p:spPr>
+        <p:txBody>
+          <a:bodyPr/>
+          <a:lstStyle/>
+          <a:p>
+            <a:r>
+              <a:rPr lang="en-US" sz="1800"/>
+              <a:t>Based on the data we have collected as well as what subsequent plots generated based on that.  The following insights have been reviewed. </a:t>
+            </a:r>
+          </a:p>
+          <a:p>
+            <a:pPr lvl="1"/>
+            <a:r>
+              <a:rPr lang="en-US" sz="1600"/>
+              <a:t>As New Zealand Reserve Bank sets its interest rate up, various business will have difficult of getting cheap loans for further development, therefore business activities have been reduced, which leads to increase of unemployment. </a:t>
+            </a:r>
+          </a:p>
+          <a:p>
+            <a:pPr lvl="1"/>
+            <a:r>
+              <a:rPr lang="en-US" sz="1600"/>
+              <a:t>On the other hand, increase of Reserve Bank interest rate will attract oversea hot money for short term investment, therefore it is anticipated that exchange rate of New Zealand dollars VS. Other currency will go up. The high Reserve bank interest rate will lead to lower level of economic activities, hence in term of cargo freight statistics, general vehicle activities and tourism account, we are anticipating dropping in these activities.</a:t>
+            </a:r>
+          </a:p>
+          <a:p>
+            <a:pPr lvl="1"/>
+            <a:r>
+              <a:rPr lang="en-US" sz="1600"/>
+              <a:t>However, Reserve Bank raise interest rate usually to combat high inflation rate (CPI), therefore, we should be expecting dropping of the CPI.</a:t>
+            </a:r>
+          </a:p>
+        </p:txBody>
+      </p:sp>
+      <p:pic>
+        <p:nvPicPr>
+          <p:cNvPr id="103" name="Content Placeholder 102"/>
+          <p:cNvPicPr>
+            <a:picLocks noGrp="1"/>
+          </p:cNvPicPr>
+          <p:nvPr>
+            <p:ph sz="half" idx="2"/>
+          </p:nvPr>
+        </p:nvPicPr>
+        <p:blipFill>
+          <a:blip r:embed="rId3"/>
+          <a:stretch>
+            <a:fillRect/>
+          </a:stretch>
+        </p:blipFill>
+        <p:spPr>
+          <a:xfrm>
+            <a:off x="6197600" y="1174750"/>
+            <a:ext cx="5922010" cy="2874645"/>
+          </a:xfrm>
+          <a:prstGeom prst="rect">
+            <a:avLst/>
+          </a:prstGeom>
+          <a:noFill/>
+          <a:ln w="9525">
+            <a:noFill/>
+          </a:ln>
+        </p:spPr>
+      </p:pic>
+      <p:pic>
+        <p:nvPicPr>
+          <p:cNvPr id="4" name="Picture 3"/>
+          <p:cNvPicPr>
+            <a:picLocks noChangeAspect="1"/>
+          </p:cNvPicPr>
+          <p:nvPr/>
+        </p:nvPicPr>
+        <p:blipFill>
+          <a:blip r:embed="rId4"/>
+          <a:stretch>
+            <a:fillRect/>
+          </a:stretch>
+        </p:blipFill>
+        <p:spPr>
+          <a:xfrm>
+            <a:off x="6410960" y="4076700"/>
+            <a:ext cx="4133850" cy="2781300"/>
+          </a:xfrm>
+          <a:prstGeom prst="rect">
+            <a:avLst/>
+          </a:prstGeom>
+        </p:spPr>
+      </p:pic>
+    </p:spTree>
+  </p:cSld>
+  <p:clrMapOvr>
+    <a:masterClrMapping/>
+  </p:clrMapOvr>
+</p:sld>
+</file>
+
+<file path=ppt/slides/slide22.xml><?xml version="1.0" encoding="utf-8"?>
+<p:sld xmlns:a="http://schemas.openxmlformats.org/drawingml/2006/main" xmlns:r="http://schemas.openxmlformats.org/officeDocument/2006/relationships" xmlns:p="http://schemas.openxmlformats.org/presentationml/2006/main">
+  <p:cSld>
+    <p:spTree>
+      <p:nvGrpSpPr>
+        <p:cNvPr id="1" name=""/>
+        <p:cNvGrpSpPr/>
+        <p:nvPr/>
+      </p:nvGrpSpPr>
+      <p:grpSpPr>
+        <a:xfrm>
+          <a:off x="0" y="0"/>
+          <a:ext cx="0" cy="0"/>
+          <a:chOff x="0" y="0"/>
+          <a:chExt cx="0" cy="0"/>
+        </a:xfrm>
+      </p:grpSpPr>
+      <p:sp>
+        <p:nvSpPr>
+          <p:cNvPr id="5" name="Title 4"/>
+          <p:cNvSpPr>
+            <a:spLocks noGrp="1"/>
+          </p:cNvSpPr>
+          <p:nvPr>
+            <p:ph type="title"/>
+          </p:nvPr>
+        </p:nvSpPr>
+        <p:spPr/>
+        <p:txBody>
+          <a:bodyPr/>
+          <a:lstStyle/>
+          <a:p>
+            <a:endParaRPr lang="en-US"/>
+          </a:p>
+        </p:txBody>
+      </p:sp>
+      <p:sp>
+        <p:nvSpPr>
+          <p:cNvPr id="3" name="Content Placeholder 2"/>
+          <p:cNvSpPr>
+            <a:spLocks noGrp="1"/>
+          </p:cNvSpPr>
+          <p:nvPr>
+            <p:ph sz="half" idx="1"/>
+          </p:nvPr>
+        </p:nvSpPr>
+        <p:spPr/>
+        <p:txBody>
+          <a:bodyPr>
+            <a:noAutofit/>
+          </a:bodyPr>
+          <a:lstStyle/>
+          <a:p>
+            <a:r>
+              <a:rPr lang="en-US" sz="1800"/>
+              <a:t>When the economic activities are low and unemployment rate is high </a:t>
+            </a:r>
+          </a:p>
+          <a:p>
+            <a:pPr lvl="1"/>
+            <a:r>
+              <a:rPr lang="en-US" sz="1600"/>
+              <a:t>New Zealand government is under pressure to unleash new monetary policies to stimulate economy. Hence government usually </a:t>
+            </a:r>
+            <a:r>
+              <a:rPr lang="en-US" sz="1600" b="1"/>
+              <a:t>resolve to lower reserve bank interest rate</a:t>
+            </a:r>
+            <a:r>
+              <a:rPr lang="en-US" sz="1600"/>
+              <a:t>. </a:t>
+            </a:r>
+          </a:p>
+          <a:p>
+            <a:pPr lvl="1"/>
+            <a:r>
+              <a:rPr lang="en-US" sz="1600"/>
+              <a:t>With </a:t>
+            </a:r>
+            <a:r>
+              <a:rPr lang="en-US" sz="1600" b="1"/>
+              <a:t>high reserve bank interest rate</a:t>
+            </a:r>
+            <a:r>
+              <a:rPr lang="en-US" sz="1600"/>
+              <a:t>, we should be able to observe </a:t>
+            </a:r>
+            <a:r>
+              <a:rPr lang="en-US" sz="1600" b="1"/>
+              <a:t>weak New Zealand dollars VS US dollars</a:t>
+            </a:r>
+            <a:r>
+              <a:rPr lang="en-US" sz="1600"/>
+              <a:t>. Thus make export of our products cheaper, therefore attracts more oversea orders, subsequently we should be able to observe an increase of freight transportation activities, oversea passage flights. </a:t>
+            </a:r>
+          </a:p>
+          <a:p>
+            <a:pPr lvl="1"/>
+            <a:r>
+              <a:rPr lang="en-US" sz="1600"/>
+              <a:t>To stimulate general economic growth, government usually starts major infrastructural projects like major road works, etc. Hence it is also anticipated that general road construction activities are increasing.</a:t>
+            </a:r>
+          </a:p>
+        </p:txBody>
+      </p:sp>
+      <p:pic>
+        <p:nvPicPr>
+          <p:cNvPr id="4" name="Content Placeholder 3"/>
+          <p:cNvPicPr>
+            <a:picLocks noGrp="1" noChangeAspect="1"/>
+          </p:cNvPicPr>
+          <p:nvPr>
+            <p:ph sz="half" idx="2"/>
+          </p:nvPr>
+        </p:nvPicPr>
+        <p:blipFill>
+          <a:blip r:embed="rId2"/>
+          <a:stretch>
+            <a:fillRect/>
+          </a:stretch>
+        </p:blipFill>
+        <p:spPr>
+          <a:xfrm>
+            <a:off x="6665595" y="1264920"/>
+            <a:ext cx="4448175" cy="4772025"/>
+          </a:xfrm>
+          <a:prstGeom prst="rect">
+            <a:avLst/>
+          </a:prstGeom>
+        </p:spPr>
+      </p:pic>
+      <p:sp>
+        <p:nvSpPr>
+          <p:cNvPr id="6" name="Text Box 5"/>
+          <p:cNvSpPr txBox="1"/>
+          <p:nvPr/>
+        </p:nvSpPr>
+        <p:spPr>
+          <a:xfrm>
+            <a:off x="609600" y="6227445"/>
+            <a:ext cx="8583930" cy="306705"/>
+          </a:xfrm>
+          <a:prstGeom prst="rect">
+            <a:avLst/>
+          </a:prstGeom>
+          <a:noFill/>
+        </p:spPr>
+        <p:txBody>
+          <a:bodyPr wrap="square" rtlCol="0" anchor="t">
+            <a:spAutoFit/>
+          </a:bodyPr>
+          <a:lstStyle/>
+          <a:p>
+            <a:r>
+              <a:rPr lang="en-US" sz="1400"/>
+              <a:t>https://www.treasury.govt.nz/publications/weu/weekly-economic-update-17-april-2020-html</a:t>
+            </a:r>
+          </a:p>
+        </p:txBody>
+      </p:sp>
     </p:spTree>
   </p:cSld>
   <p:clrMapOvr>
@@ -5501,7 +5975,14 @@
         <p:cNvGrpSpPr/>
         <p:nvPr/>
       </p:nvGrpSpPr>
-      <p:grpSpPr/>
+      <p:grpSpPr>
+        <a:xfrm>
+          <a:off x="0" y="0"/>
+          <a:ext cx="0" cy="0"/>
+          <a:chOff x="0" y="0"/>
+          <a:chExt cx="0" cy="0"/>
+        </a:xfrm>
+      </p:grpSpPr>
       <p:sp>
         <p:nvSpPr>
           <p:cNvPr id="2" name="Title 1"/>
@@ -5515,57 +5996,66 @@
         <p:spPr/>
         <p:txBody>
           <a:bodyPr/>
+          <a:lstStyle/>
           <a:p>
             <a:r>
               <a:rPr lang="en-US"/>
               <a:t>NZ monteary policy impacting the economic</a:t>
             </a:r>
+          </a:p>
+        </p:txBody>
+      </p:sp>
+      <p:sp>
+        <p:nvSpPr>
+          <p:cNvPr id="3" name="Content Placeholder 2"/>
+          <p:cNvSpPr>
+            <a:spLocks noGrp="1"/>
+          </p:cNvSpPr>
+          <p:nvPr>
+            <p:ph sz="half" idx="1"/>
+          </p:nvPr>
+        </p:nvSpPr>
+        <p:spPr/>
+        <p:txBody>
+          <a:bodyPr/>
+          <a:lstStyle/>
+          <a:p>
+            <a:r>
+              <a:rPr lang="en-US"/>
+              <a:t>Using reserve bank interest rate / official cash rate</a:t>
+            </a:r>
+          </a:p>
+          <a:p>
+            <a:r>
+              <a:rPr lang="en-US"/>
+              <a:t>CPI...</a:t>
+            </a:r>
+          </a:p>
+        </p:txBody>
+      </p:sp>
+      <p:sp>
+        <p:nvSpPr>
+          <p:cNvPr id="4" name="Content Placeholder 3"/>
+          <p:cNvSpPr>
+            <a:spLocks noGrp="1"/>
+          </p:cNvSpPr>
+          <p:nvPr>
+            <p:ph sz="half" idx="2"/>
+          </p:nvPr>
+        </p:nvSpPr>
+        <p:spPr/>
+        <p:txBody>
+          <a:bodyPr/>
+          <a:lstStyle/>
+          <a:p>
             <a:endParaRPr lang="en-US"/>
           </a:p>
-        </p:txBody>
-      </p:sp>
-      <p:sp>
-        <p:nvSpPr>
-          <p:cNvPr id="3" name="Content Placeholder 2"/>
-          <p:cNvSpPr>
-            <a:spLocks noGrp="1"/>
-          </p:cNvSpPr>
-          <p:nvPr>
-            <p:ph sz="half" idx="1"/>
-          </p:nvPr>
-        </p:nvSpPr>
-        <p:spPr/>
-        <p:txBody>
-          <a:bodyPr/>
-          <a:p>
-            <a:r>
-              <a:rPr lang="en-US"/>
-              <a:t>Using reserve bank interest rate / official cash rate</a:t>
-            </a:r>
+          <a:p>
             <a:endParaRPr lang="en-US"/>
           </a:p>
           <a:p>
-            <a:r>
-              <a:rPr lang="en-US"/>
-              <a:t>CPI...</a:t>
-            </a:r>
             <a:endParaRPr lang="en-US"/>
           </a:p>
-        </p:txBody>
-      </p:sp>
-      <p:sp>
-        <p:nvSpPr>
-          <p:cNvPr id="4" name="Content Placeholder 3"/>
-          <p:cNvSpPr>
-            <a:spLocks noGrp="1"/>
-          </p:cNvSpPr>
-          <p:nvPr>
-            <p:ph sz="half" idx="2"/>
-          </p:nvPr>
-        </p:nvSpPr>
-        <p:spPr/>
-        <p:txBody>
-          <a:bodyPr/>
           <a:p>
             <a:endParaRPr lang="en-US"/>
           </a:p>
@@ -5573,20 +6063,10 @@
             <a:endParaRPr lang="en-US"/>
           </a:p>
           <a:p>
-            <a:endParaRPr lang="en-US"/>
-          </a:p>
-          <a:p>
-            <a:endParaRPr lang="en-US"/>
-          </a:p>
-          <a:p>
-            <a:endParaRPr lang="en-US"/>
-          </a:p>
-          <a:p>
             <a:r>
               <a:rPr lang="en-US"/>
               <a:t>Stimulate the economy</a:t>
             </a:r>
-            <a:endParaRPr lang="en-US"/>
           </a:p>
         </p:txBody>
       </p:sp>
@@ -5597,7 +6077,7 @@
           <p:nvPr/>
         </p:nvPicPr>
         <p:blipFill>
-          <a:blip r:embed="rId1"/>
+          <a:blip r:embed="rId2"/>
           <a:stretch>
             <a:fillRect/>
           </a:stretch>
@@ -5623,7 +6103,7 @@
           <p:nvPr/>
         </p:nvPicPr>
         <p:blipFill>
-          <a:blip r:embed="rId2"/>
+          <a:blip r:embed="rId3"/>
           <a:stretch>
             <a:fillRect/>
           </a:stretch>
@@ -5659,7 +6139,14 @@
         <p:cNvGrpSpPr/>
         <p:nvPr/>
       </p:nvGrpSpPr>
-      <p:grpSpPr/>
+      <p:grpSpPr>
+        <a:xfrm>
+          <a:off x="0" y="0"/>
+          <a:ext cx="0" cy="0"/>
+          <a:chOff x="0" y="0"/>
+          <a:chExt cx="0" cy="0"/>
+        </a:xfrm>
+      </p:grpSpPr>
       <p:sp>
         <p:nvSpPr>
           <p:cNvPr id="2" name="Title 1"/>
@@ -5673,12 +6160,12 @@
         <p:spPr/>
         <p:txBody>
           <a:bodyPr/>
+          <a:lstStyle/>
           <a:p>
             <a:r>
               <a:rPr lang="en-US"/>
               <a:t>What do we want to collect</a:t>
             </a:r>
-            <a:endParaRPr lang="en-US"/>
           </a:p>
         </p:txBody>
       </p:sp>
@@ -5695,12 +6182,12 @@
         <p:spPr/>
         <p:txBody>
           <a:bodyPr/>
+          <a:lstStyle/>
           <a:p>
             <a:r>
               <a:rPr lang="en-US" sz="2800"/>
               <a:t>Historical economical activity data for New Zeland</a:t>
             </a:r>
-            <a:endParaRPr lang="en-US" sz="2800"/>
           </a:p>
           <a:p>
             <a:pPr lvl="1"/>
@@ -5708,7 +6195,6 @@
               <a:rPr lang="en-US" sz="2400"/>
               <a:t>Transporation (Air, Land...)</a:t>
             </a:r>
-            <a:endParaRPr lang="en-US" sz="2400"/>
           </a:p>
           <a:p>
             <a:pPr lvl="1"/>
@@ -5716,14 +6202,12 @@
               <a:rPr lang="en-US" sz="2400"/>
               <a:t>Employment / Unemployment Rate</a:t>
             </a:r>
-            <a:endParaRPr lang="en-US" sz="2400"/>
           </a:p>
           <a:p>
             <a:r>
               <a:rPr lang="en-US" sz="2800"/>
               <a:t>Economical policy data of New Zealand Government</a:t>
             </a:r>
-            <a:endParaRPr lang="en-US" sz="2800"/>
           </a:p>
           <a:p>
             <a:pPr lvl="1"/>
@@ -5731,7 +6215,6 @@
               <a:rPr lang="en-US" sz="2400"/>
               <a:t>Interest rate</a:t>
             </a:r>
-            <a:endParaRPr lang="en-US" sz="2400"/>
           </a:p>
           <a:p>
             <a:pPr lvl="1"/>
@@ -5739,7 +6222,6 @@
               <a:rPr lang="en-US" sz="2400"/>
               <a:t>CPI</a:t>
             </a:r>
-            <a:endParaRPr lang="en-US" sz="2400"/>
           </a:p>
           <a:p>
             <a:pPr lvl="1"/>
@@ -5747,7 +6229,6 @@
               <a:rPr lang="en-US" sz="2400"/>
               <a:t>HPI (optional)</a:t>
             </a:r>
-            <a:endParaRPr lang="en-US" sz="2400"/>
           </a:p>
           <a:p>
             <a:pPr lvl="1"/>
@@ -5755,7 +6236,6 @@
               <a:rPr lang="en-US" sz="2400"/>
               <a:t>Exchange Rate</a:t>
             </a:r>
-            <a:endParaRPr lang="en-US" sz="2400"/>
           </a:p>
         </p:txBody>
       </p:sp>
@@ -5766,7 +6246,7 @@
           <p:nvPr/>
         </p:nvPicPr>
         <p:blipFill>
-          <a:blip r:embed="rId1"/>
+          <a:blip r:embed="rId2"/>
           <a:stretch>
             <a:fillRect/>
           </a:stretch>
@@ -5788,13 +6268,15 @@
       <p:pic>
         <p:nvPicPr>
           <p:cNvPr id="104" name="Content Placeholder 103"/>
-          <p:cNvPicPr/>
+          <p:cNvPicPr>
+            <a:picLocks noGrp="1"/>
+          </p:cNvPicPr>
           <p:nvPr>
             <p:ph sz="half" idx="2"/>
           </p:nvPr>
         </p:nvPicPr>
         <p:blipFill>
-          <a:blip r:embed="rId2"/>
+          <a:blip r:embed="rId3"/>
           <a:stretch>
             <a:fillRect/>
           </a:stretch>
@@ -5833,12 +6315,12 @@
           <a:bodyPr wrap="square" rtlCol="0" anchor="t">
             <a:spAutoFit/>
           </a:bodyPr>
+          <a:lstStyle/>
           <a:p>
             <a:r>
               <a:rPr lang="en-US" sz="1200"/>
               <a:t>https://chartingtransport.com/category/new-zealand-cities/</a:t>
             </a:r>
-            <a:endParaRPr lang="en-US" sz="1200"/>
           </a:p>
         </p:txBody>
       </p:sp>
@@ -5859,7 +6341,14 @@
         <p:cNvGrpSpPr/>
         <p:nvPr/>
       </p:nvGrpSpPr>
-      <p:grpSpPr/>
+      <p:grpSpPr>
+        <a:xfrm>
+          <a:off x="0" y="0"/>
+          <a:ext cx="0" cy="0"/>
+          <a:chOff x="0" y="0"/>
+          <a:chExt cx="0" cy="0"/>
+        </a:xfrm>
+      </p:grpSpPr>
       <p:sp>
         <p:nvSpPr>
           <p:cNvPr id="2" name="Title 1"/>
@@ -5873,12 +6362,12 @@
         <p:spPr/>
         <p:txBody>
           <a:bodyPr/>
+          <a:lstStyle/>
           <a:p>
             <a:r>
               <a:rPr lang="en-US"/>
               <a:t>Data model</a:t>
             </a:r>
-            <a:endParaRPr lang="en-US"/>
           </a:p>
         </p:txBody>
       </p:sp>
@@ -5902,12 +6391,12 @@
           <a:bodyPr wrap="square" rtlCol="0">
             <a:spAutoFit/>
           </a:bodyPr>
+          <a:lstStyle/>
           <a:p>
             <a:r>
               <a:rPr lang="en-US"/>
               <a:t>Official cash rate / Interest rate</a:t>
             </a:r>
-            <a:endParaRPr lang="en-US"/>
           </a:p>
           <a:p>
             <a:endParaRPr lang="en-US"/>
@@ -5917,7 +6406,6 @@
               <a:rPr lang="en-US" sz="1600"/>
               <a:t>Monetary policy influences economic activity by changing the incentives for saving and investment. This channel typically affects consumption, housing investment and business investment. Lower interest rates on bank deposits reduce the incentives households have to save their money.</a:t>
             </a:r>
-            <a:endParaRPr lang="en-US" sz="1600"/>
           </a:p>
           <a:p>
             <a:endParaRPr lang="en-US" sz="1600"/>
@@ -5927,7 +6415,6 @@
               <a:rPr lang="en-US" sz="1600"/>
               <a:t>In our project, we choose “Reserve bank Interest Rate” as primary monetar policy indicators</a:t>
             </a:r>
-            <a:endParaRPr lang="en-US" sz="1600"/>
           </a:p>
         </p:txBody>
       </p:sp>
@@ -5940,7 +6427,7 @@
           <p:nvPr/>
         </p:nvPicPr>
         <p:blipFill>
-          <a:blip r:embed="rId1"/>
+          <a:blip r:embed="rId2"/>
           <a:stretch>
             <a:fillRect/>
           </a:stretch>
@@ -5972,7 +6459,14 @@
         <p:cNvGrpSpPr/>
         <p:nvPr/>
       </p:nvGrpSpPr>
-      <p:grpSpPr/>
+      <p:grpSpPr>
+        <a:xfrm>
+          <a:off x="0" y="0"/>
+          <a:ext cx="0" cy="0"/>
+          <a:chOff x="0" y="0"/>
+          <a:chExt cx="0" cy="0"/>
+        </a:xfrm>
+      </p:grpSpPr>
       <p:sp>
         <p:nvSpPr>
           <p:cNvPr id="2" name="Title 1"/>
@@ -5993,6 +6487,7 @@
           <a:bodyPr>
             <a:normAutofit fontScale="90000"/>
           </a:bodyPr>
+          <a:lstStyle/>
           <a:p>
             <a:pPr algn="r"/>
             <a:r>
@@ -6006,7 +6501,6 @@
               <a:rPr lang="en-US" sz="2700"/>
               <a:t>(I.e.n what is the intended use of the data, …)</a:t>
             </a:r>
-            <a:endParaRPr lang="en-US" sz="2700"/>
           </a:p>
         </p:txBody>
       </p:sp>
@@ -6023,23 +6517,18 @@
         <p:spPr/>
         <p:txBody>
           <a:bodyPr/>
+          <a:lstStyle/>
           <a:p>
             <a:r>
               <a:rPr lang="en-US"/>
               <a:t>Review of the hisotrical economic performance VS. policy</a:t>
             </a:r>
-            <a:endParaRPr lang="en-US"/>
-          </a:p>
-          <a:p>
-            <a:r>
-              <a:rPr lang="en-US"/>
-              <a:t>Potential to build </a:t>
-            </a:r>
-            <a:r>
-              <a:rPr lang="en-US"/>
-              <a:t>AI / machine learning algorithm for further forecast ... </a:t>
-            </a:r>
-            <a:endParaRPr lang="en-US"/>
+          </a:p>
+          <a:p>
+            <a:r>
+              <a:rPr lang="en-US"/>
+              <a:t>Potential to build AI / machine learning algorithm for further forecast ... </a:t>
+            </a:r>
           </a:p>
           <a:p>
             <a:pPr marL="0" indent="0">
@@ -6067,7 +6556,6 @@
               <a:rPr lang="en-US" sz="1000"/>
               <a:t> that is used to solve economic recession problem. (Output : collect vital NZ ecnoimic indicators for visualization and try to reveal the potential correlation between these indicators. )</a:t>
             </a:r>
-            <a:endParaRPr lang="en-US" sz="1000"/>
           </a:p>
           <a:p>
             <a:pPr marL="0" indent="0">
@@ -6083,7 +6571,6 @@
               <a:rPr lang="en-US" sz="1000"/>
               <a:t>Critical review of the NZ monetary policy effectiveness. To coupe with covid-19 lockdown and sequence recession, slowing down to dealing. </a:t>
             </a:r>
-            <a:endParaRPr lang="en-US" sz="1000"/>
           </a:p>
           <a:p>
             <a:pPr marL="0" indent="0">
@@ -6103,7 +6590,6 @@
               <a:rPr lang="en-US" sz="1000"/>
               <a:t>: </a:t>
             </a:r>
-            <a:endParaRPr lang="en-US" sz="1000"/>
           </a:p>
           <a:p>
             <a:pPr marL="0" indent="0">
@@ -6113,7 +6599,6 @@
               <a:rPr lang="en-US" sz="1000"/>
               <a:t>The data source we are building is intended to be used for building (visualization) and training prediction model (machine learning) _time series, forecasting . for New Zealand companies. </a:t>
             </a:r>
-            <a:endParaRPr lang="en-US" sz="1000"/>
           </a:p>
           <a:p>
             <a:pPr marL="0" indent="0">
@@ -6129,7 +6614,6 @@
               <a:rPr lang="en-US" sz="1000"/>
               <a:t>The potential user of our datasource are targeted to improve their company efficiency.</a:t>
             </a:r>
-            <a:endParaRPr lang="en-US" sz="1000"/>
           </a:p>
           <a:p>
             <a:pPr marL="0" indent="0">
@@ -6145,7 +6629,6 @@
               <a:rPr lang="en-US" sz="1000"/>
               <a:t>By analyzing company performance data such as Annual Income VS historical transportation statistics VS. New Zealand Government monetary policy data such as CPI, Exchange Rate, Import Taxation. </a:t>
             </a:r>
-            <a:endParaRPr lang="en-US" sz="1000"/>
           </a:p>
           <a:p>
             <a:pPr marL="0" indent="0">
@@ -6161,7 +6644,6 @@
               <a:rPr lang="en-US" sz="1000"/>
               <a:t>Should we include more overseas government data such Import Tax of China, US. Dollar CPI. Join these such data together, we are potentially able to produce a prediction mode trained with these historical data. Utilization of such prediction model will enable company to device forward strategies for increase or decrease production capabilities. Such company strategies will further enable its finance / accounting department on allocate investment budgets as well as income forecasting. Whether or not company should be hiring new employees and purchasing new equipment will depends upon such forward strategies.</a:t>
             </a:r>
-            <a:endParaRPr lang="en-US" sz="1000"/>
           </a:p>
         </p:txBody>
       </p:sp>
@@ -6182,17 +6664,26 @@
         <p:cNvGrpSpPr/>
         <p:nvPr/>
       </p:nvGrpSpPr>
-      <p:grpSpPr/>
+      <p:grpSpPr>
+        <a:xfrm>
+          <a:off x="0" y="0"/>
+          <a:ext cx="0" cy="0"/>
+          <a:chOff x="0" y="0"/>
+          <a:chExt cx="0" cy="0"/>
+        </a:xfrm>
+      </p:grpSpPr>
       <p:pic>
         <p:nvPicPr>
           <p:cNvPr id="109" name="Content Placeholder 108"/>
-          <p:cNvPicPr/>
+          <p:cNvPicPr>
+            <a:picLocks noGrp="1"/>
+          </p:cNvPicPr>
           <p:nvPr>
             <p:ph idx="1"/>
           </p:nvPr>
         </p:nvPicPr>
         <p:blipFill>
-          <a:blip r:embed="rId1"/>
+          <a:blip r:embed="rId2"/>
           <a:stretch>
             <a:fillRect/>
           </a:stretch>
@@ -6231,12 +6722,12 @@
           <a:bodyPr wrap="square" rtlCol="0">
             <a:spAutoFit/>
           </a:bodyPr>
+          <a:lstStyle/>
           <a:p>
             <a:r>
               <a:rPr lang="en-US"/>
               <a:t>Based on the data we have collected, machine learning / Artificial Intelligence Algorithms could be deployed to conduct prediction on Recession</a:t>
             </a:r>
-            <a:endParaRPr lang="en-US"/>
           </a:p>
         </p:txBody>
       </p:sp>
@@ -6260,6 +6751,7 @@
           <a:bodyPr>
             <a:normAutofit fontScale="90000"/>
           </a:bodyPr>
+          <a:lstStyle/>
           <a:p>
             <a:pPr algn="r"/>
             <a:r>
@@ -6273,7 +6765,6 @@
               <a:rPr lang="en-US" sz="2700"/>
               <a:t>(I.e.n what is the intended use of the data, …)</a:t>
             </a:r>
-            <a:endParaRPr lang="en-US" sz="2700"/>
           </a:p>
         </p:txBody>
       </p:sp>
@@ -6294,7 +6785,14 @@
         <p:cNvGrpSpPr/>
         <p:nvPr/>
       </p:nvGrpSpPr>
-      <p:grpSpPr/>
+      <p:grpSpPr>
+        <a:xfrm>
+          <a:off x="0" y="0"/>
+          <a:ext cx="0" cy="0"/>
+          <a:chOff x="0" y="0"/>
+          <a:chExt cx="0" cy="0"/>
+        </a:xfrm>
+      </p:grpSpPr>
       <p:sp>
         <p:nvSpPr>
           <p:cNvPr id="2" name="Title 1"/>
@@ -6308,12 +6806,12 @@
         <p:spPr/>
         <p:txBody>
           <a:bodyPr/>
+          <a:lstStyle/>
           <a:p>
             <a:r>
               <a:rPr lang="en-US"/>
               <a:t>Why do we choose these data sources</a:t>
             </a:r>
-            <a:endParaRPr lang="en-US"/>
           </a:p>
         </p:txBody>
       </p:sp>
@@ -6330,19 +6828,18 @@
         <p:spPr/>
         <p:txBody>
           <a:bodyPr/>
+          <a:lstStyle/>
           <a:p>
             <a:r>
               <a:rPr lang="en-US"/>
               <a:t>To build a solid fundation for further data analysis</a:t>
             </a:r>
-            <a:endParaRPr lang="en-US"/>
           </a:p>
           <a:p>
             <a:r>
               <a:rPr lang="en-US"/>
               <a:t>To find correlation between these data</a:t>
             </a:r>
-            <a:endParaRPr lang="en-US"/>
           </a:p>
           <a:p>
             <a:pPr marL="0" indent="0">
@@ -6359,7 +6856,7 @@
           <p:nvPr/>
         </p:nvPicPr>
         <p:blipFill>
-          <a:blip r:embed="rId1"/>
+          <a:blip r:embed="rId2"/>
           <a:stretch>
             <a:fillRect/>
           </a:stretch>
@@ -6398,12 +6895,12 @@
           <a:bodyPr wrap="square" rtlCol="0" anchor="t">
             <a:spAutoFit/>
           </a:bodyPr>
+          <a:lstStyle/>
           <a:p>
             <a:r>
               <a:rPr lang="en-US"/>
               <a:t>https://www.eiu.com/n/will-the-new-zealand-economy-tip-into-recession/</a:t>
             </a:r>
-            <a:endParaRPr lang="en-US"/>
           </a:p>
         </p:txBody>
       </p:sp>
@@ -6414,7 +6911,7 @@
           <p:nvPr/>
         </p:nvPicPr>
         <p:blipFill>
-          <a:blip r:embed="rId2"/>
+          <a:blip r:embed="rId3"/>
           <a:stretch>
             <a:fillRect/>
           </a:stretch>
@@ -6450,7 +6947,14 @@
         <p:cNvGrpSpPr/>
         <p:nvPr/>
       </p:nvGrpSpPr>
-      <p:grpSpPr/>
+      <p:grpSpPr>
+        <a:xfrm>
+          <a:off x="0" y="0"/>
+          <a:ext cx="0" cy="0"/>
+          <a:chOff x="0" y="0"/>
+          <a:chExt cx="0" cy="0"/>
+        </a:xfrm>
+      </p:grpSpPr>
       <p:sp>
         <p:nvSpPr>
           <p:cNvPr id="10" name="Title 9"/>
@@ -6464,12 +6968,12 @@
         <p:spPr/>
         <p:txBody>
           <a:bodyPr/>
+          <a:lstStyle/>
           <a:p>
             <a:r>
               <a:rPr lang="en-US"/>
               <a:t>`</a:t>
             </a:r>
-            <a:endParaRPr lang="en-US"/>
           </a:p>
         </p:txBody>
       </p:sp>
@@ -6477,14 +6981,14 @@
         <p:nvPicPr>
           <p:cNvPr id="8" name="Content Placeholder 7"/>
           <p:cNvPicPr>
-            <a:picLocks noChangeAspect="1"/>
+            <a:picLocks noGrp="1" noChangeAspect="1"/>
           </p:cNvPicPr>
           <p:nvPr>
             <p:ph sz="half" idx="1"/>
           </p:nvPr>
         </p:nvPicPr>
         <p:blipFill>
-          <a:blip r:embed="rId1"/>
+          <a:blip r:embed="rId2"/>
           <a:stretch>
             <a:fillRect/>
           </a:stretch>
@@ -6503,14 +7007,14 @@
         <p:nvPicPr>
           <p:cNvPr id="9" name="Content Placeholder 8"/>
           <p:cNvPicPr>
-            <a:picLocks noChangeAspect="1"/>
+            <a:picLocks noGrp="1" noChangeAspect="1"/>
           </p:cNvPicPr>
           <p:nvPr>
             <p:ph sz="half" idx="2"/>
           </p:nvPr>
         </p:nvPicPr>
         <p:blipFill>
-          <a:blip r:embed="rId2"/>
+          <a:blip r:embed="rId3"/>
           <a:stretch>
             <a:fillRect/>
           </a:stretch>
@@ -7650,6 +8154,8 @@
       </a:bgFillStyleLst>
     </a:fmtScheme>
   </a:themeElements>
+  <a:objectDefaults/>
+  <a:extraClrSchemeLst/>
   <a:extLst>
     <a:ext uri="{05A4C25C-085E-4340-85A3-A5531E510DB2}">
       <thm15:themeFamily xmlns:thm15="http://schemas.microsoft.com/office/thememl/2012/main" name="Office Theme" id="{62F939B6-93AF-4DB8-9C6B-D6C7DFDC589F}" vid="{4A3C46E8-61CC-4603-A589-7422A47A8E4A}"/>

</xml_diff>

<commit_message>
update data visiluation jc file
</commit_message>
<xml_diff>
--- a/Group Project Presentation.pptx
+++ b/Group Project Presentation.pptx
@@ -5,29 +5,27 @@
     <p:sldMasterId id="2147483648" r:id="rId1"/>
   </p:sldMasterIdLst>
   <p:notesMasterIdLst>
-    <p:notesMasterId r:id="rId24"/>
+    <p:notesMasterId r:id="rId4"/>
   </p:notesMasterIdLst>
   <p:sldIdLst>
-    <p:sldId id="256" r:id="rId2"/>
-    <p:sldId id="265" r:id="rId3"/>
-    <p:sldId id="276" r:id="rId4"/>
-    <p:sldId id="257" r:id="rId5"/>
-    <p:sldId id="303" r:id="rId6"/>
-    <p:sldId id="259" r:id="rId7"/>
-    <p:sldId id="288" r:id="rId8"/>
-    <p:sldId id="258" r:id="rId9"/>
-    <p:sldId id="287" r:id="rId10"/>
-    <p:sldId id="304" r:id="rId11"/>
-    <p:sldId id="305" r:id="rId12"/>
-    <p:sldId id="307" r:id="rId13"/>
-    <p:sldId id="306" r:id="rId14"/>
-    <p:sldId id="261" r:id="rId15"/>
-    <p:sldId id="262" r:id="rId16"/>
-    <p:sldId id="263" r:id="rId17"/>
+    <p:sldId id="256" r:id="rId3"/>
+    <p:sldId id="265" r:id="rId5"/>
+    <p:sldId id="276" r:id="rId6"/>
+    <p:sldId id="257" r:id="rId7"/>
+    <p:sldId id="303" r:id="rId8"/>
+    <p:sldId id="259" r:id="rId9"/>
+    <p:sldId id="288" r:id="rId10"/>
+    <p:sldId id="258" r:id="rId11"/>
+    <p:sldId id="304" r:id="rId12"/>
+    <p:sldId id="305" r:id="rId13"/>
+    <p:sldId id="307" r:id="rId14"/>
+    <p:sldId id="306" r:id="rId15"/>
+    <p:sldId id="261" r:id="rId16"/>
+    <p:sldId id="262" r:id="rId17"/>
     <p:sldId id="297" r:id="rId18"/>
     <p:sldId id="298" r:id="rId19"/>
     <p:sldId id="264" r:id="rId20"/>
-    <p:sldId id="302" r:id="rId21"/>
+    <p:sldId id="263" r:id="rId21"/>
     <p:sldId id="266" r:id="rId22"/>
     <p:sldId id="267" r:id="rId23"/>
   </p:sldIdLst>
@@ -128,24 +126,13 @@
       </a:defRPr>
     </a:lvl9pPr>
   </p:defaultTextStyle>
-  <p:extLst>
-    <p:ext uri="{EFAFB233-063F-42B5-8137-9DF3F51BA10A}">
-      <p15:sldGuideLst xmlns:p15="http://schemas.microsoft.com/office/powerpoint/2012/main"/>
-    </p:ext>
-  </p:extLst>
 </p:presentation>
 </file>
 
 <file path=ppt/commentAuthors.xml><?xml version="1.0" encoding="utf-8"?>
 <p:cmAuthorLst xmlns:a="http://schemas.openxmlformats.org/drawingml/2006/main" xmlns:r="http://schemas.openxmlformats.org/officeDocument/2006/relationships" xmlns:p="http://schemas.openxmlformats.org/presentationml/2006/main">
   <p:cmAuthor id="1" name="JeffreyC" initials="J" lastIdx="1" clrIdx="0"/>
-  <p:cmAuthor id="2" name="Ali Surface" initials="AS" lastIdx="1" clrIdx="1">
-    <p:extLst>
-      <p:ext uri="{19B8F6BF-5375-455C-9EA6-DF929625EA0E}">
-        <p15:presenceInfo xmlns:p15="http://schemas.microsoft.com/office/powerpoint/2012/main" userId="987164923809310b" providerId="Windows Live"/>
-      </p:ext>
-    </p:extLst>
-  </p:cmAuthor>
+  <p:cmAuthor id="2" name="Ali Surface" initials="AS" lastIdx="1" clrIdx="1"/>
 </p:cmAuthorLst>
 </file>
 
@@ -240,7 +227,6 @@
           <a:p>
             <a:fld id="{3EFD42F7-718C-4B98-AAEC-167E6DDD60A7}" type="datetimeFigureOut">
               <a:rPr lang="en-US" smtClean="0"/>
-              <a:t>10/20/2022</a:t>
             </a:fld>
             <a:endParaRPr lang="en-US"/>
           </a:p>
@@ -307,6 +293,7 @@
               <a:rPr lang="en-US"/>
               <a:t>Click to edit Master text styles</a:t>
             </a:r>
+            <a:endParaRPr lang="en-US"/>
           </a:p>
           <a:p>
             <a:pPr lvl="1"/>
@@ -314,6 +301,7 @@
               <a:rPr lang="en-US"/>
               <a:t>Second level</a:t>
             </a:r>
+            <a:endParaRPr lang="en-US"/>
           </a:p>
           <a:p>
             <a:pPr lvl="2"/>
@@ -321,6 +309,7 @@
               <a:rPr lang="en-US"/>
               <a:t>Third level</a:t>
             </a:r>
+            <a:endParaRPr lang="en-US"/>
           </a:p>
           <a:p>
             <a:pPr lvl="3"/>
@@ -328,6 +317,7 @@
               <a:rPr lang="en-US"/>
               <a:t>Fourth level</a:t>
             </a:r>
+            <a:endParaRPr lang="en-US"/>
           </a:p>
           <a:p>
             <a:pPr lvl="4"/>
@@ -335,6 +325,7 @@
               <a:rPr lang="en-US"/>
               <a:t>Fifth level</a:t>
             </a:r>
+            <a:endParaRPr lang="en-US"/>
           </a:p>
         </p:txBody>
       </p:sp>
@@ -398,7 +389,6 @@
           <a:p>
             <a:fld id="{21B2AA4F-B828-4D7C-AFD3-893933DAFCB4}" type="slidenum">
               <a:rPr lang="en-US" smtClean="0"/>
-              <a:t>‹#›</a:t>
             </a:fld>
             <a:endParaRPr lang="en-US"/>
           </a:p>
@@ -550,6 +540,107 @@
               <a:rPr lang="en-US"/>
               <a:t>New Zealand is a relatively small economical entity that heavily rely on overseas business. Facing an increasing turbulent international political and economical environment (war and covid-19), in order to maintain our prosperity, in depth analysis on how New Zealand vital economical policy impact on our main economical activities are not only useful but also crucial for the success of these New Zealand companies, such as Air NewZealand, Kiwi Rail and Tourism New Zealand. </a:t>
             </a:r>
+            <a:endParaRPr lang="en-US"/>
+          </a:p>
+        </p:txBody>
+      </p:sp>
+    </p:spTree>
+  </p:cSld>
+  <p:clrMapOvr>
+    <a:masterClrMapping/>
+  </p:clrMapOvr>
+</p:notes>
+</file>
+
+<file path=ppt/notesSlides/notesSlide10.xml><?xml version="1.0" encoding="utf-8"?>
+<p:notes xmlns:a="http://schemas.openxmlformats.org/drawingml/2006/main" xmlns:r="http://schemas.openxmlformats.org/officeDocument/2006/relationships" xmlns:p="http://schemas.openxmlformats.org/presentationml/2006/main">
+  <p:cSld>
+    <p:spTree>
+      <p:nvGrpSpPr>
+        <p:cNvPr id="1" name=""/>
+        <p:cNvGrpSpPr/>
+        <p:nvPr/>
+      </p:nvGrpSpPr>
+      <p:grpSpPr/>
+      <p:sp>
+        <p:nvSpPr>
+          <p:cNvPr id="2" name="Slide Image Placeholder 1"/>
+          <p:cNvSpPr/>
+          <p:nvPr>
+            <p:ph type="sldImg" idx="2"/>
+          </p:nvPr>
+        </p:nvSpPr>
+        <p:spPr/>
+      </p:sp>
+      <p:sp>
+        <p:nvSpPr>
+          <p:cNvPr id="3" name="Text Placeholder 2"/>
+          <p:cNvSpPr/>
+          <p:nvPr>
+            <p:ph type="body" idx="3"/>
+          </p:nvPr>
+        </p:nvSpPr>
+        <p:spPr/>
+        <p:txBody>
+          <a:bodyPr/>
+          <a:p>
+            <a:endParaRPr lang="en-US"/>
+          </a:p>
+        </p:txBody>
+      </p:sp>
+    </p:spTree>
+  </p:cSld>
+  <p:clrMapOvr>
+    <a:masterClrMapping/>
+  </p:clrMapOvr>
+</p:notes>
+</file>
+
+<file path=ppt/notesSlides/notesSlide11.xml><?xml version="1.0" encoding="utf-8"?>
+<p:notes xmlns:a="http://schemas.openxmlformats.org/drawingml/2006/main" xmlns:r="http://schemas.openxmlformats.org/officeDocument/2006/relationships" xmlns:p="http://schemas.openxmlformats.org/presentationml/2006/main">
+  <p:cSld>
+    <p:spTree>
+      <p:nvGrpSpPr>
+        <p:cNvPr id="1" name=""/>
+        <p:cNvGrpSpPr/>
+        <p:nvPr/>
+      </p:nvGrpSpPr>
+      <p:grpSpPr>
+        <a:xfrm>
+          <a:off x="0" y="0"/>
+          <a:ext cx="0" cy="0"/>
+          <a:chOff x="0" y="0"/>
+          <a:chExt cx="0" cy="0"/>
+        </a:xfrm>
+      </p:grpSpPr>
+      <p:sp>
+        <p:nvSpPr>
+          <p:cNvPr id="2" name="Slide Image Placeholder 1"/>
+          <p:cNvSpPr>
+            <a:spLocks noGrp="1" noRot="1" noChangeAspect="1"/>
+          </p:cNvSpPr>
+          <p:nvPr>
+            <p:ph type="sldImg" idx="2"/>
+          </p:nvPr>
+        </p:nvSpPr>
+        <p:spPr/>
+      </p:sp>
+      <p:sp>
+        <p:nvSpPr>
+          <p:cNvPr id="3" name="Text Placeholder 2"/>
+          <p:cNvSpPr>
+            <a:spLocks noGrp="1"/>
+          </p:cNvSpPr>
+          <p:nvPr>
+            <p:ph type="body" idx="3"/>
+          </p:nvPr>
+        </p:nvSpPr>
+        <p:spPr/>
+        <p:txBody>
+          <a:bodyPr/>
+          <a:lstStyle/>
+          <a:p>
+            <a:endParaRPr lang="en-US"/>
           </a:p>
         </p:txBody>
       </p:sp>
@@ -605,6 +696,24 @@
           <a:bodyPr/>
           <a:lstStyle/>
           <a:p>
+            <a:r>
+              <a:rPr lang="en-US"/>
+              <a:t>1) The China–United States trade war is an ongoing economic conflict between the People's Republic of China and the United States of America.</a:t>
+            </a:r>
+            <a:endParaRPr lang="en-US"/>
+          </a:p>
+          <a:p>
+            <a:r>
+              <a:rPr lang="en-US"/>
+              <a:t>2) The Russo-Ukrainian War has been ongoing between Russia and Ukraine since February 2014. Hostilities were initiated by Russia shortly after Ukraine's Revolution of Dignity and were focused on the political status of Crimea and the Donbas, which remain internationally recognized as part of Ukraine.</a:t>
+            </a:r>
+            <a:endParaRPr lang="en-US"/>
+          </a:p>
+          <a:p>
+            <a:r>
+              <a:rPr lang="en-US"/>
+              <a:t>3) The COVID-19 pandemic, also known as the coronavirus pandemic, is an ongoing global pandemic of coronavirus disease 2019 (COVID-19) caused by severe acute respiratory syndrome coronavirus 2 (SARS-CoV-2). The novel virus was first identified from an outbreak in Wuhan, China, in December 2019.</a:t>
+            </a:r>
             <a:endParaRPr lang="en-US"/>
           </a:p>
         </p:txBody>
@@ -626,20 +735,11 @@
         <p:cNvGrpSpPr/>
         <p:nvPr/>
       </p:nvGrpSpPr>
-      <p:grpSpPr>
-        <a:xfrm>
-          <a:off x="0" y="0"/>
-          <a:ext cx="0" cy="0"/>
-          <a:chOff x="0" y="0"/>
-          <a:chExt cx="0" cy="0"/>
-        </a:xfrm>
-      </p:grpSpPr>
+      <p:grpSpPr/>
       <p:sp>
         <p:nvSpPr>
           <p:cNvPr id="2" name="Slide Image Placeholder 1"/>
-          <p:cNvSpPr>
-            <a:spLocks noGrp="1" noRot="1" noChangeAspect="1"/>
-          </p:cNvSpPr>
+          <p:cNvSpPr/>
           <p:nvPr>
             <p:ph type="sldImg" idx="2"/>
           </p:nvPr>
@@ -649,9 +749,7 @@
       <p:sp>
         <p:nvSpPr>
           <p:cNvPr id="3" name="Text Placeholder 2"/>
-          <p:cNvSpPr>
-            <a:spLocks noGrp="1"/>
-          </p:cNvSpPr>
+          <p:cNvSpPr/>
           <p:nvPr>
             <p:ph type="body" idx="3"/>
           </p:nvPr>
@@ -659,8 +757,326 @@
         <p:spPr/>
         <p:txBody>
           <a:bodyPr/>
-          <a:lstStyle/>
-          <a:p>
+          <a:p>
+            <a:r>
+              <a:rPr lang="en-US"/>
+              <a:t>By adjusting short-term interest rates central banks can affect short-term economic growth. Low interest rates encourage business investment and consumption, while high interest rates induce saving and reduce consumption.</a:t>
+            </a:r>
+            <a:endParaRPr lang="en-US"/>
+          </a:p>
+          <a:p>
+            <a:endParaRPr lang="en-US"/>
+          </a:p>
+          <a:p>
+            <a:r>
+              <a:rPr lang="en-US"/>
+              <a:t>So, NZ central bank would try to "low interest rates" to encourage business investment and consumption, thus Stimulate NZ economy.</a:t>
+            </a:r>
+            <a:endParaRPr lang="en-US"/>
+          </a:p>
+        </p:txBody>
+      </p:sp>
+    </p:spTree>
+  </p:cSld>
+  <p:clrMapOvr>
+    <a:masterClrMapping/>
+  </p:clrMapOvr>
+</p:notes>
+</file>
+
+<file path=ppt/notesSlides/notesSlide4.xml><?xml version="1.0" encoding="utf-8"?>
+<p:notes xmlns:a="http://schemas.openxmlformats.org/drawingml/2006/main" xmlns:r="http://schemas.openxmlformats.org/officeDocument/2006/relationships" xmlns:p="http://schemas.openxmlformats.org/presentationml/2006/main">
+  <p:cSld>
+    <p:spTree>
+      <p:nvGrpSpPr>
+        <p:cNvPr id="1" name=""/>
+        <p:cNvGrpSpPr/>
+        <p:nvPr/>
+      </p:nvGrpSpPr>
+      <p:grpSpPr/>
+      <p:sp>
+        <p:nvSpPr>
+          <p:cNvPr id="2" name="Slide Image Placeholder 1"/>
+          <p:cNvSpPr/>
+          <p:nvPr>
+            <p:ph type="sldImg" idx="2"/>
+          </p:nvPr>
+        </p:nvSpPr>
+        <p:spPr/>
+      </p:sp>
+      <p:sp>
+        <p:nvSpPr>
+          <p:cNvPr id="3" name="Text Placeholder 2"/>
+          <p:cNvSpPr/>
+          <p:nvPr>
+            <p:ph type="body" idx="3"/>
+          </p:nvPr>
+        </p:nvSpPr>
+        <p:spPr/>
+        <p:txBody>
+          <a:bodyPr/>
+          <a:p>
+            <a:r>
+              <a:rPr lang="en-US"/>
+              <a:t>New Zealand govt release policy indictors : 1) Interest rate 2) CPI 3) Exchange Rate 4) Employment Statistics 5) Transportation Statistics</a:t>
+            </a:r>
+            <a:endParaRPr lang="en-US"/>
+          </a:p>
+        </p:txBody>
+      </p:sp>
+    </p:spTree>
+  </p:cSld>
+  <p:clrMapOvr>
+    <a:masterClrMapping/>
+  </p:clrMapOvr>
+</p:notes>
+</file>
+
+<file path=ppt/notesSlides/notesSlide5.xml><?xml version="1.0" encoding="utf-8"?>
+<p:notes xmlns:a="http://schemas.openxmlformats.org/drawingml/2006/main" xmlns:r="http://schemas.openxmlformats.org/officeDocument/2006/relationships" xmlns:p="http://schemas.openxmlformats.org/presentationml/2006/main">
+  <p:cSld>
+    <p:spTree>
+      <p:nvGrpSpPr>
+        <p:cNvPr id="1" name=""/>
+        <p:cNvGrpSpPr/>
+        <p:nvPr/>
+      </p:nvGrpSpPr>
+      <p:grpSpPr/>
+      <p:sp>
+        <p:nvSpPr>
+          <p:cNvPr id="2" name="Slide Image Placeholder 1"/>
+          <p:cNvSpPr/>
+          <p:nvPr>
+            <p:ph type="sldImg" idx="2"/>
+          </p:nvPr>
+        </p:nvSpPr>
+        <p:spPr/>
+      </p:sp>
+      <p:sp>
+        <p:nvSpPr>
+          <p:cNvPr id="3" name="Text Placeholder 2"/>
+          <p:cNvSpPr/>
+          <p:nvPr>
+            <p:ph type="body" idx="3"/>
+          </p:nvPr>
+        </p:nvSpPr>
+        <p:spPr/>
+        <p:txBody>
+          <a:bodyPr/>
+          <a:p>
+            <a:r>
+              <a:rPr lang="en-US"/>
+              <a:t>AI is particularly helpful in corporate finance as it can better predict and assess loan risks. For companies looking to increase their value, AI technologies such as machine learning can help improve loan underwriting and reduce financial risk.</a:t>
+            </a:r>
+            <a:endParaRPr lang="en-US"/>
+          </a:p>
+        </p:txBody>
+      </p:sp>
+    </p:spTree>
+  </p:cSld>
+  <p:clrMapOvr>
+    <a:masterClrMapping/>
+  </p:clrMapOvr>
+</p:notes>
+</file>
+
+<file path=ppt/notesSlides/notesSlide6.xml><?xml version="1.0" encoding="utf-8"?>
+<p:notes xmlns:a="http://schemas.openxmlformats.org/drawingml/2006/main" xmlns:r="http://schemas.openxmlformats.org/officeDocument/2006/relationships" xmlns:p="http://schemas.openxmlformats.org/presentationml/2006/main">
+  <p:cSld>
+    <p:spTree>
+      <p:nvGrpSpPr>
+        <p:cNvPr id="1" name=""/>
+        <p:cNvGrpSpPr/>
+        <p:nvPr/>
+      </p:nvGrpSpPr>
+      <p:grpSpPr/>
+      <p:sp>
+        <p:nvSpPr>
+          <p:cNvPr id="2" name="Slide Image Placeholder 1"/>
+          <p:cNvSpPr/>
+          <p:nvPr>
+            <p:ph type="sldImg" idx="2"/>
+          </p:nvPr>
+        </p:nvSpPr>
+        <p:spPr/>
+      </p:sp>
+      <p:sp>
+        <p:nvSpPr>
+          <p:cNvPr id="3" name="Text Placeholder 2"/>
+          <p:cNvSpPr/>
+          <p:nvPr>
+            <p:ph type="body" idx="3"/>
+          </p:nvPr>
+        </p:nvSpPr>
+        <p:spPr/>
+        <p:txBody>
+          <a:bodyPr/>
+          <a:p>
+            <a:endParaRPr lang="en-US"/>
+          </a:p>
+        </p:txBody>
+      </p:sp>
+    </p:spTree>
+  </p:cSld>
+  <p:clrMapOvr>
+    <a:masterClrMapping/>
+  </p:clrMapOvr>
+</p:notes>
+</file>
+
+<file path=ppt/notesSlides/notesSlide7.xml><?xml version="1.0" encoding="utf-8"?>
+<p:notes xmlns:a="http://schemas.openxmlformats.org/drawingml/2006/main" xmlns:r="http://schemas.openxmlformats.org/officeDocument/2006/relationships" xmlns:p="http://schemas.openxmlformats.org/presentationml/2006/main">
+  <p:cSld>
+    <p:spTree>
+      <p:nvGrpSpPr>
+        <p:cNvPr id="1" name=""/>
+        <p:cNvGrpSpPr/>
+        <p:nvPr/>
+      </p:nvGrpSpPr>
+      <p:grpSpPr/>
+      <p:sp>
+        <p:nvSpPr>
+          <p:cNvPr id="2" name="Slide Image Placeholder 1"/>
+          <p:cNvSpPr/>
+          <p:nvPr>
+            <p:ph type="sldImg" idx="2"/>
+          </p:nvPr>
+        </p:nvSpPr>
+        <p:spPr/>
+      </p:sp>
+      <p:sp>
+        <p:nvSpPr>
+          <p:cNvPr id="3" name="Text Placeholder 2"/>
+          <p:cNvSpPr/>
+          <p:nvPr>
+            <p:ph type="body" idx="3"/>
+          </p:nvPr>
+        </p:nvSpPr>
+        <p:spPr/>
+        <p:txBody>
+          <a:bodyPr/>
+          <a:p>
+            <a:r>
+              <a:rPr lang="en-US"/>
+              <a:t>These pages are database driven dynamic pages, so we have to be smarter for retrieving data, using “Rselenium”web driver. (Select tree and condition... all use R selenium)</a:t>
+            </a:r>
+            <a:endParaRPr lang="en-US"/>
+          </a:p>
+        </p:txBody>
+      </p:sp>
+    </p:spTree>
+  </p:cSld>
+  <p:clrMapOvr>
+    <a:masterClrMapping/>
+  </p:clrMapOvr>
+</p:notes>
+</file>
+
+<file path=ppt/notesSlides/notesSlide8.xml><?xml version="1.0" encoding="utf-8"?>
+<p:notes xmlns:a="http://schemas.openxmlformats.org/drawingml/2006/main" xmlns:r="http://schemas.openxmlformats.org/officeDocument/2006/relationships" xmlns:p="http://schemas.openxmlformats.org/presentationml/2006/main">
+  <p:cSld>
+    <p:spTree>
+      <p:nvGrpSpPr>
+        <p:cNvPr id="1" name=""/>
+        <p:cNvGrpSpPr/>
+        <p:nvPr/>
+      </p:nvGrpSpPr>
+      <p:grpSpPr/>
+      <p:sp>
+        <p:nvSpPr>
+          <p:cNvPr id="2" name="Slide Image Placeholder 1"/>
+          <p:cNvSpPr/>
+          <p:nvPr>
+            <p:ph type="sldImg" idx="2"/>
+          </p:nvPr>
+        </p:nvSpPr>
+        <p:spPr/>
+      </p:sp>
+      <p:sp>
+        <p:nvSpPr>
+          <p:cNvPr id="3" name="Text Placeholder 2"/>
+          <p:cNvSpPr/>
+          <p:nvPr>
+            <p:ph type="body" idx="3"/>
+          </p:nvPr>
+        </p:nvSpPr>
+        <p:spPr/>
+        <p:txBody>
+          <a:bodyPr/>
+          <a:p>
+            <a:r>
+              <a:rPr lang="en-US"/>
+              <a:t>Data Wrangling : Further detailed example, we have to wrangle 1921Q4 into 1921-12(December) by creating function that does the transformation. </a:t>
+            </a:r>
+            <a:endParaRPr lang="en-US"/>
+          </a:p>
+        </p:txBody>
+      </p:sp>
+    </p:spTree>
+  </p:cSld>
+  <p:clrMapOvr>
+    <a:masterClrMapping/>
+  </p:clrMapOvr>
+</p:notes>
+</file>
+
+<file path=ppt/notesSlides/notesSlide9.xml><?xml version="1.0" encoding="utf-8"?>
+<p:notes xmlns:a="http://schemas.openxmlformats.org/drawingml/2006/main" xmlns:r="http://schemas.openxmlformats.org/officeDocument/2006/relationships" xmlns:p="http://schemas.openxmlformats.org/presentationml/2006/main">
+  <p:cSld>
+    <p:spTree>
+      <p:nvGrpSpPr>
+        <p:cNvPr id="1" name=""/>
+        <p:cNvGrpSpPr/>
+        <p:nvPr/>
+      </p:nvGrpSpPr>
+      <p:grpSpPr/>
+      <p:sp>
+        <p:nvSpPr>
+          <p:cNvPr id="2" name="Slide Image Placeholder 1"/>
+          <p:cNvSpPr/>
+          <p:nvPr>
+            <p:ph type="sldImg" idx="2"/>
+          </p:nvPr>
+        </p:nvSpPr>
+        <p:spPr/>
+      </p:sp>
+      <p:sp>
+        <p:nvSpPr>
+          <p:cNvPr id="3" name="Text Placeholder 2"/>
+          <p:cNvSpPr/>
+          <p:nvPr>
+            <p:ph type="body" idx="3"/>
+          </p:nvPr>
+        </p:nvSpPr>
+        <p:spPr/>
+        <p:txBody>
+          <a:bodyPr/>
+          <a:p>
+            <a:r>
+              <a:rPr lang="en-US"/>
+              <a:t>The process we used following steps : </a:t>
+            </a:r>
+            <a:endParaRPr lang="en-US"/>
+          </a:p>
+          <a:p>
+            <a:r>
+              <a:rPr lang="en-US"/>
+              <a:t>First of all, we dfine our goals, secondly, we conduct discoverying data source, then we found our data is structured based on timeline. </a:t>
+            </a:r>
+            <a:endParaRPr lang="en-US"/>
+          </a:p>
+          <a:p>
+            <a:r>
+              <a:rPr lang="en-US"/>
+              <a:t>We have enriched our dataset by scrapping more revelent data sources (some particular measures. ), with validation complete, we going to preepare data publishing by buidling rest API (In R). </a:t>
+            </a:r>
+            <a:endParaRPr lang="en-US"/>
+          </a:p>
+          <a:p>
+            <a:r>
+              <a:rPr lang="en-US"/>
+              <a:t>The results can be demonstrated by visulization in the following section. </a:t>
+            </a:r>
             <a:endParaRPr lang="en-US"/>
           </a:p>
         </p:txBody>
@@ -674,7 +1090,7 @@
 </file>
 
 <file path=ppt/slideLayouts/slideLayout1.xml><?xml version="1.0" encoding="utf-8"?>
-<p:sldLayout xmlns:a="http://schemas.openxmlformats.org/drawingml/2006/main" xmlns:r="http://schemas.openxmlformats.org/officeDocument/2006/relationships" xmlns:p="http://schemas.openxmlformats.org/presentationml/2006/main" showMasterSp="0" type="title" preserve="1">
+<p:sldLayout xmlns:a="http://schemas.openxmlformats.org/drawingml/2006/main" xmlns:r="http://schemas.openxmlformats.org/officeDocument/2006/relationships" xmlns:p="http://schemas.openxmlformats.org/presentationml/2006/main" type="title" preserve="1" showMasterSp="0">
   <p:cSld name="Title Slide">
     <p:bg>
       <p:bgPr>
@@ -755,6 +1171,7 @@
               <a:rPr lang="en-US" altLang="zh-CN" noProof="0"/>
               <a:t>Click to edit Master title style</a:t>
             </a:r>
+            <a:endParaRPr lang="en-US" altLang="zh-CN" noProof="0"/>
           </a:p>
         </p:txBody>
       </p:sp>
@@ -793,6 +1210,7 @@
               <a:rPr lang="en-US" altLang="zh-CN" noProof="0"/>
               <a:t>Click to edit Master subtitle style</a:t>
             </a:r>
+            <a:endParaRPr lang="en-US" altLang="zh-CN" noProof="0"/>
           </a:p>
         </p:txBody>
       </p:sp>
@@ -854,7 +1272,6 @@
           <a:p>
             <a:fld id="{63A1C593-65D0-4073-BCC9-577B9352EA97}" type="datetimeFigureOut">
               <a:rPr lang="en-US" smtClean="0"/>
-              <a:t>10/20/2022</a:t>
             </a:fld>
             <a:endParaRPr lang="en-US"/>
           </a:p>
@@ -978,7 +1395,6 @@
           <a:p>
             <a:fld id="{9B618960-8005-486C-9A75-10CB2AAC16F9}" type="slidenum">
               <a:rPr lang="en-US" smtClean="0"/>
-              <a:t>‹#›</a:t>
             </a:fld>
             <a:endParaRPr lang="en-US"/>
           </a:p>
@@ -1029,6 +1445,7 @@
               <a:rPr lang="en-US"/>
               <a:t>Click to edit Master title style</a:t>
             </a:r>
+            <a:endParaRPr lang="en-US"/>
           </a:p>
         </p:txBody>
       </p:sp>
@@ -1052,6 +1469,7 @@
               <a:rPr lang="en-US"/>
               <a:t>Click to edit Master text styles</a:t>
             </a:r>
+            <a:endParaRPr lang="en-US"/>
           </a:p>
           <a:p>
             <a:pPr lvl="1"/>
@@ -1059,6 +1477,7 @@
               <a:rPr lang="en-US"/>
               <a:t>Second level</a:t>
             </a:r>
+            <a:endParaRPr lang="en-US"/>
           </a:p>
           <a:p>
             <a:pPr lvl="2"/>
@@ -1066,6 +1485,7 @@
               <a:rPr lang="en-US"/>
               <a:t>Third level</a:t>
             </a:r>
+            <a:endParaRPr lang="en-US"/>
           </a:p>
           <a:p>
             <a:pPr lvl="3"/>
@@ -1073,6 +1493,7 @@
               <a:rPr lang="en-US"/>
               <a:t>Fourth level</a:t>
             </a:r>
+            <a:endParaRPr lang="en-US"/>
           </a:p>
           <a:p>
             <a:pPr lvl="4"/>
@@ -1080,6 +1501,7 @@
               <a:rPr lang="en-US"/>
               <a:t>Fifth level</a:t>
             </a:r>
+            <a:endParaRPr lang="en-US"/>
           </a:p>
         </p:txBody>
       </p:sp>
@@ -1100,7 +1522,6 @@
           <a:p>
             <a:fld id="{63A1C593-65D0-4073-BCC9-577B9352EA97}" type="datetimeFigureOut">
               <a:rPr lang="en-US" smtClean="0"/>
-              <a:t>10/20/2022</a:t>
             </a:fld>
             <a:endParaRPr lang="en-US"/>
           </a:p>
@@ -1142,7 +1563,6 @@
           <a:p>
             <a:fld id="{9B618960-8005-486C-9A75-10CB2AAC16F9}" type="slidenum">
               <a:rPr lang="en-US" smtClean="0"/>
-              <a:t>‹#›</a:t>
             </a:fld>
             <a:endParaRPr lang="en-US"/>
           </a:p>
@@ -1198,6 +1618,7 @@
               <a:rPr lang="en-US"/>
               <a:t>Click to edit Master title style</a:t>
             </a:r>
+            <a:endParaRPr lang="en-US"/>
           </a:p>
         </p:txBody>
       </p:sp>
@@ -1226,6 +1647,7 @@
               <a:rPr lang="en-US"/>
               <a:t>Click to edit Master text styles</a:t>
             </a:r>
+            <a:endParaRPr lang="en-US"/>
           </a:p>
           <a:p>
             <a:pPr lvl="1"/>
@@ -1233,6 +1655,7 @@
               <a:rPr lang="en-US"/>
               <a:t>Second level</a:t>
             </a:r>
+            <a:endParaRPr lang="en-US"/>
           </a:p>
           <a:p>
             <a:pPr lvl="2"/>
@@ -1240,6 +1663,7 @@
               <a:rPr lang="en-US"/>
               <a:t>Third level</a:t>
             </a:r>
+            <a:endParaRPr lang="en-US"/>
           </a:p>
           <a:p>
             <a:pPr lvl="3"/>
@@ -1247,6 +1671,7 @@
               <a:rPr lang="en-US"/>
               <a:t>Fourth level</a:t>
             </a:r>
+            <a:endParaRPr lang="en-US"/>
           </a:p>
           <a:p>
             <a:pPr lvl="4"/>
@@ -1254,6 +1679,7 @@
               <a:rPr lang="en-US"/>
               <a:t>Fifth level</a:t>
             </a:r>
+            <a:endParaRPr lang="en-US"/>
           </a:p>
         </p:txBody>
       </p:sp>
@@ -1274,7 +1700,6 @@
           <a:p>
             <a:fld id="{63A1C593-65D0-4073-BCC9-577B9352EA97}" type="datetimeFigureOut">
               <a:rPr lang="en-US" smtClean="0"/>
-              <a:t>10/20/2022</a:t>
             </a:fld>
             <a:endParaRPr lang="en-US"/>
           </a:p>
@@ -1316,7 +1741,6 @@
           <a:p>
             <a:fld id="{9B618960-8005-486C-9A75-10CB2AAC16F9}" type="slidenum">
               <a:rPr lang="en-US" smtClean="0"/>
-              <a:t>‹#›</a:t>
             </a:fld>
             <a:endParaRPr lang="en-US"/>
           </a:p>
@@ -1367,6 +1791,7 @@
               <a:rPr lang="en-US"/>
               <a:t>Click to edit Master title style</a:t>
             </a:r>
+            <a:endParaRPr lang="en-US"/>
           </a:p>
         </p:txBody>
       </p:sp>
@@ -1390,6 +1815,7 @@
               <a:rPr lang="en-US"/>
               <a:t>Click to edit Master text styles</a:t>
             </a:r>
+            <a:endParaRPr lang="en-US"/>
           </a:p>
           <a:p>
             <a:pPr lvl="1"/>
@@ -1397,6 +1823,7 @@
               <a:rPr lang="en-US"/>
               <a:t>Second level</a:t>
             </a:r>
+            <a:endParaRPr lang="en-US"/>
           </a:p>
           <a:p>
             <a:pPr lvl="2"/>
@@ -1404,6 +1831,7 @@
               <a:rPr lang="en-US"/>
               <a:t>Third level</a:t>
             </a:r>
+            <a:endParaRPr lang="en-US"/>
           </a:p>
           <a:p>
             <a:pPr lvl="3"/>
@@ -1411,6 +1839,7 @@
               <a:rPr lang="en-US"/>
               <a:t>Fourth level</a:t>
             </a:r>
+            <a:endParaRPr lang="en-US"/>
           </a:p>
           <a:p>
             <a:pPr lvl="4"/>
@@ -1418,6 +1847,7 @@
               <a:rPr lang="en-US"/>
               <a:t>Fifth level</a:t>
             </a:r>
+            <a:endParaRPr lang="en-US"/>
           </a:p>
         </p:txBody>
       </p:sp>
@@ -1438,7 +1868,6 @@
           <a:p>
             <a:fld id="{63A1C593-65D0-4073-BCC9-577B9352EA97}" type="datetimeFigureOut">
               <a:rPr lang="en-US" smtClean="0"/>
-              <a:t>10/20/2022</a:t>
             </a:fld>
             <a:endParaRPr lang="en-US"/>
           </a:p>
@@ -1480,7 +1909,6 @@
           <a:p>
             <a:fld id="{9B618960-8005-486C-9A75-10CB2AAC16F9}" type="slidenum">
               <a:rPr lang="en-US" smtClean="0"/>
-              <a:t>‹#›</a:t>
             </a:fld>
             <a:endParaRPr lang="en-US"/>
           </a:p>
@@ -1540,6 +1968,7 @@
               <a:rPr lang="en-US"/>
               <a:t>Click to edit Master title style</a:t>
             </a:r>
+            <a:endParaRPr lang="en-US"/>
           </a:p>
         </p:txBody>
       </p:sp>
@@ -1605,6 +2034,7 @@
               <a:rPr lang="en-US"/>
               <a:t>Click to edit Master text styles</a:t>
             </a:r>
+            <a:endParaRPr lang="en-US"/>
           </a:p>
         </p:txBody>
       </p:sp>
@@ -1625,7 +2055,6 @@
           <a:p>
             <a:fld id="{63A1C593-65D0-4073-BCC9-577B9352EA97}" type="datetimeFigureOut">
               <a:rPr lang="en-US" smtClean="0"/>
-              <a:t>10/20/2022</a:t>
             </a:fld>
             <a:endParaRPr lang="en-US"/>
           </a:p>
@@ -1667,7 +2096,6 @@
           <a:p>
             <a:fld id="{9B618960-8005-486C-9A75-10CB2AAC16F9}" type="slidenum">
               <a:rPr lang="en-US" smtClean="0"/>
-              <a:t>‹#›</a:t>
             </a:fld>
             <a:endParaRPr lang="en-US"/>
           </a:p>
@@ -1718,6 +2146,7 @@
               <a:rPr lang="en-US"/>
               <a:t>Click to edit Master title style</a:t>
             </a:r>
+            <a:endParaRPr lang="en-US"/>
           </a:p>
         </p:txBody>
       </p:sp>
@@ -1746,6 +2175,7 @@
               <a:rPr lang="en-US"/>
               <a:t>Click to edit Master text styles</a:t>
             </a:r>
+            <a:endParaRPr lang="en-US"/>
           </a:p>
           <a:p>
             <a:pPr lvl="1"/>
@@ -1753,6 +2183,7 @@
               <a:rPr lang="en-US"/>
               <a:t>Second level</a:t>
             </a:r>
+            <a:endParaRPr lang="en-US"/>
           </a:p>
           <a:p>
             <a:pPr lvl="2"/>
@@ -1760,6 +2191,7 @@
               <a:rPr lang="en-US"/>
               <a:t>Third level</a:t>
             </a:r>
+            <a:endParaRPr lang="en-US"/>
           </a:p>
           <a:p>
             <a:pPr lvl="3"/>
@@ -1767,6 +2199,7 @@
               <a:rPr lang="en-US"/>
               <a:t>Fourth level</a:t>
             </a:r>
+            <a:endParaRPr lang="en-US"/>
           </a:p>
           <a:p>
             <a:pPr lvl="4"/>
@@ -1774,6 +2207,7 @@
               <a:rPr lang="en-US"/>
               <a:t>Fifth level</a:t>
             </a:r>
+            <a:endParaRPr lang="en-US"/>
           </a:p>
         </p:txBody>
       </p:sp>
@@ -1802,6 +2236,7 @@
               <a:rPr lang="en-US"/>
               <a:t>Click to edit Master text styles</a:t>
             </a:r>
+            <a:endParaRPr lang="en-US"/>
           </a:p>
           <a:p>
             <a:pPr lvl="1"/>
@@ -1809,6 +2244,7 @@
               <a:rPr lang="en-US"/>
               <a:t>Second level</a:t>
             </a:r>
+            <a:endParaRPr lang="en-US"/>
           </a:p>
           <a:p>
             <a:pPr lvl="2"/>
@@ -1816,6 +2252,7 @@
               <a:rPr lang="en-US"/>
               <a:t>Third level</a:t>
             </a:r>
+            <a:endParaRPr lang="en-US"/>
           </a:p>
           <a:p>
             <a:pPr lvl="3"/>
@@ -1823,6 +2260,7 @@
               <a:rPr lang="en-US"/>
               <a:t>Fourth level</a:t>
             </a:r>
+            <a:endParaRPr lang="en-US"/>
           </a:p>
           <a:p>
             <a:pPr lvl="4"/>
@@ -1830,6 +2268,7 @@
               <a:rPr lang="en-US"/>
               <a:t>Fifth level</a:t>
             </a:r>
+            <a:endParaRPr lang="en-US"/>
           </a:p>
         </p:txBody>
       </p:sp>
@@ -1850,7 +2289,6 @@
           <a:p>
             <a:fld id="{63A1C593-65D0-4073-BCC9-577B9352EA97}" type="datetimeFigureOut">
               <a:rPr lang="en-US" smtClean="0"/>
-              <a:t>10/20/2022</a:t>
             </a:fld>
             <a:endParaRPr lang="en-US"/>
           </a:p>
@@ -1892,7 +2330,6 @@
           <a:p>
             <a:fld id="{9B618960-8005-486C-9A75-10CB2AAC16F9}" type="slidenum">
               <a:rPr lang="en-US" smtClean="0"/>
-              <a:t>‹#›</a:t>
             </a:fld>
             <a:endParaRPr lang="en-US"/>
           </a:p>
@@ -1948,6 +2385,7 @@
               <a:rPr lang="en-US"/>
               <a:t>Click to edit Master title style</a:t>
             </a:r>
+            <a:endParaRPr lang="en-US"/>
           </a:p>
         </p:txBody>
       </p:sp>
@@ -2013,6 +2451,7 @@
               <a:rPr lang="en-US"/>
               <a:t>Click to edit Master text styles</a:t>
             </a:r>
+            <a:endParaRPr lang="en-US"/>
           </a:p>
         </p:txBody>
       </p:sp>
@@ -2041,6 +2480,7 @@
               <a:rPr lang="en-US"/>
               <a:t>Click to edit Master text styles</a:t>
             </a:r>
+            <a:endParaRPr lang="en-US"/>
           </a:p>
           <a:p>
             <a:pPr lvl="1"/>
@@ -2048,6 +2488,7 @@
               <a:rPr lang="en-US"/>
               <a:t>Second level</a:t>
             </a:r>
+            <a:endParaRPr lang="en-US"/>
           </a:p>
           <a:p>
             <a:pPr lvl="2"/>
@@ -2055,6 +2496,7 @@
               <a:rPr lang="en-US"/>
               <a:t>Third level</a:t>
             </a:r>
+            <a:endParaRPr lang="en-US"/>
           </a:p>
           <a:p>
             <a:pPr lvl="3"/>
@@ -2062,6 +2504,7 @@
               <a:rPr lang="en-US"/>
               <a:t>Fourth level</a:t>
             </a:r>
+            <a:endParaRPr lang="en-US"/>
           </a:p>
           <a:p>
             <a:pPr lvl="4"/>
@@ -2069,6 +2512,7 @@
               <a:rPr lang="en-US"/>
               <a:t>Fifth level</a:t>
             </a:r>
+            <a:endParaRPr lang="en-US"/>
           </a:p>
         </p:txBody>
       </p:sp>
@@ -2134,6 +2578,7 @@
               <a:rPr lang="en-US"/>
               <a:t>Click to edit Master text styles</a:t>
             </a:r>
+            <a:endParaRPr lang="en-US"/>
           </a:p>
         </p:txBody>
       </p:sp>
@@ -2162,6 +2607,7 @@
               <a:rPr lang="en-US"/>
               <a:t>Click to edit Master text styles</a:t>
             </a:r>
+            <a:endParaRPr lang="en-US"/>
           </a:p>
           <a:p>
             <a:pPr lvl="1"/>
@@ -2169,6 +2615,7 @@
               <a:rPr lang="en-US"/>
               <a:t>Second level</a:t>
             </a:r>
+            <a:endParaRPr lang="en-US"/>
           </a:p>
           <a:p>
             <a:pPr lvl="2"/>
@@ -2176,6 +2623,7 @@
               <a:rPr lang="en-US"/>
               <a:t>Third level</a:t>
             </a:r>
+            <a:endParaRPr lang="en-US"/>
           </a:p>
           <a:p>
             <a:pPr lvl="3"/>
@@ -2183,6 +2631,7 @@
               <a:rPr lang="en-US"/>
               <a:t>Fourth level</a:t>
             </a:r>
+            <a:endParaRPr lang="en-US"/>
           </a:p>
           <a:p>
             <a:pPr lvl="4"/>
@@ -2190,6 +2639,7 @@
               <a:rPr lang="en-US"/>
               <a:t>Fifth level</a:t>
             </a:r>
+            <a:endParaRPr lang="en-US"/>
           </a:p>
         </p:txBody>
       </p:sp>
@@ -2210,7 +2660,6 @@
           <a:p>
             <a:fld id="{63A1C593-65D0-4073-BCC9-577B9352EA97}" type="datetimeFigureOut">
               <a:rPr lang="en-US" smtClean="0"/>
-              <a:t>10/20/2022</a:t>
             </a:fld>
             <a:endParaRPr lang="en-US"/>
           </a:p>
@@ -2252,7 +2701,6 @@
           <a:p>
             <a:fld id="{9B618960-8005-486C-9A75-10CB2AAC16F9}" type="slidenum">
               <a:rPr lang="en-US" smtClean="0"/>
-              <a:t>‹#›</a:t>
             </a:fld>
             <a:endParaRPr lang="en-US"/>
           </a:p>
@@ -2303,6 +2751,7 @@
               <a:rPr lang="en-US"/>
               <a:t>Click to edit Master title style</a:t>
             </a:r>
+            <a:endParaRPr lang="en-US"/>
           </a:p>
         </p:txBody>
       </p:sp>
@@ -2323,7 +2772,6 @@
           <a:p>
             <a:fld id="{63A1C593-65D0-4073-BCC9-577B9352EA97}" type="datetimeFigureOut">
               <a:rPr lang="en-US" smtClean="0"/>
-              <a:t>10/20/2022</a:t>
             </a:fld>
             <a:endParaRPr lang="en-US"/>
           </a:p>
@@ -2365,7 +2813,6 @@
           <a:p>
             <a:fld id="{9B618960-8005-486C-9A75-10CB2AAC16F9}" type="slidenum">
               <a:rPr lang="en-US" smtClean="0"/>
-              <a:t>‹#›</a:t>
             </a:fld>
             <a:endParaRPr lang="en-US"/>
           </a:p>
@@ -2414,7 +2861,6 @@
           <a:p>
             <a:fld id="{63A1C593-65D0-4073-BCC9-577B9352EA97}" type="datetimeFigureOut">
               <a:rPr lang="en-US" smtClean="0"/>
-              <a:t>10/20/2022</a:t>
             </a:fld>
             <a:endParaRPr lang="en-US"/>
           </a:p>
@@ -2456,7 +2902,6 @@
           <a:p>
             <a:fld id="{9B618960-8005-486C-9A75-10CB2AAC16F9}" type="slidenum">
               <a:rPr lang="en-US" smtClean="0"/>
-              <a:t>‹#›</a:t>
             </a:fld>
             <a:endParaRPr lang="en-US"/>
           </a:p>
@@ -2516,6 +2961,7 @@
               <a:rPr lang="en-US"/>
               <a:t>Click to edit Master title style</a:t>
             </a:r>
+            <a:endParaRPr lang="en-US"/>
           </a:p>
         </p:txBody>
       </p:sp>
@@ -2572,6 +3018,7 @@
               <a:rPr lang="en-US"/>
               <a:t>Click to edit Master text styles</a:t>
             </a:r>
+            <a:endParaRPr lang="en-US"/>
           </a:p>
           <a:p>
             <a:pPr lvl="1"/>
@@ -2579,6 +3026,7 @@
               <a:rPr lang="en-US"/>
               <a:t>Second level</a:t>
             </a:r>
+            <a:endParaRPr lang="en-US"/>
           </a:p>
           <a:p>
             <a:pPr lvl="2"/>
@@ -2586,6 +3034,7 @@
               <a:rPr lang="en-US"/>
               <a:t>Third level</a:t>
             </a:r>
+            <a:endParaRPr lang="en-US"/>
           </a:p>
           <a:p>
             <a:pPr lvl="3"/>
@@ -2593,6 +3042,7 @@
               <a:rPr lang="en-US"/>
               <a:t>Fourth level</a:t>
             </a:r>
+            <a:endParaRPr lang="en-US"/>
           </a:p>
           <a:p>
             <a:pPr lvl="4"/>
@@ -2600,6 +3050,7 @@
               <a:rPr lang="en-US"/>
               <a:t>Fifth level</a:t>
             </a:r>
+            <a:endParaRPr lang="en-US"/>
           </a:p>
         </p:txBody>
       </p:sp>
@@ -2665,6 +3116,7 @@
               <a:rPr lang="en-US"/>
               <a:t>Click to edit Master text styles</a:t>
             </a:r>
+            <a:endParaRPr lang="en-US"/>
           </a:p>
         </p:txBody>
       </p:sp>
@@ -2685,7 +3137,6 @@
           <a:p>
             <a:fld id="{63A1C593-65D0-4073-BCC9-577B9352EA97}" type="datetimeFigureOut">
               <a:rPr lang="en-US" smtClean="0"/>
-              <a:t>10/20/2022</a:t>
             </a:fld>
             <a:endParaRPr lang="en-US"/>
           </a:p>
@@ -2727,7 +3178,6 @@
           <a:p>
             <a:fld id="{9B618960-8005-486C-9A75-10CB2AAC16F9}" type="slidenum">
               <a:rPr lang="en-US" smtClean="0"/>
-              <a:t>‹#›</a:t>
             </a:fld>
             <a:endParaRPr lang="en-US"/>
           </a:p>
@@ -2787,6 +3237,7 @@
               <a:rPr lang="en-US"/>
               <a:t>Click to edit Master title style</a:t>
             </a:r>
+            <a:endParaRPr lang="en-US"/>
           </a:p>
         </p:txBody>
       </p:sp>
@@ -2942,6 +3393,7 @@
               <a:rPr lang="en-US"/>
               <a:t>Click to edit Master text styles</a:t>
             </a:r>
+            <a:endParaRPr lang="en-US"/>
           </a:p>
         </p:txBody>
       </p:sp>
@@ -2962,7 +3414,6 @@
           <a:p>
             <a:fld id="{63A1C593-65D0-4073-BCC9-577B9352EA97}" type="datetimeFigureOut">
               <a:rPr lang="en-US" smtClean="0"/>
-              <a:t>10/20/2022</a:t>
             </a:fld>
             <a:endParaRPr lang="en-US"/>
           </a:p>
@@ -3004,7 +3455,6 @@
           <a:p>
             <a:fld id="{9B618960-8005-486C-9A75-10CB2AAC16F9}" type="slidenum">
               <a:rPr lang="en-US" smtClean="0"/>
-              <a:t>‹#›</a:t>
             </a:fld>
             <a:endParaRPr lang="en-US"/>
           </a:p>
@@ -3053,7 +3503,7 @@
           <p:nvPr/>
         </p:nvPicPr>
         <p:blipFill>
-          <a:blip r:embed="rId13"/>
+          <a:blip r:embed="rId12"/>
           <a:stretch>
             <a:fillRect/>
           </a:stretch>
@@ -3104,6 +3554,7 @@
               <a:rPr lang="en-US" altLang="zh-CN" dirty="0"/>
               <a:t>Click to edit Master title style</a:t>
             </a:r>
+            <a:endParaRPr lang="en-US" altLang="zh-CN" dirty="0"/>
           </a:p>
         </p:txBody>
       </p:sp>
@@ -3139,6 +3590,7 @@
               <a:rPr lang="en-US" altLang="zh-CN" dirty="0"/>
               <a:t>Click to edit Master text styles</a:t>
             </a:r>
+            <a:endParaRPr lang="en-US" altLang="zh-CN" dirty="0"/>
           </a:p>
           <a:p>
             <a:pPr lvl="1"/>
@@ -3146,6 +3598,7 @@
               <a:rPr lang="en-US" altLang="zh-CN" dirty="0"/>
               <a:t>Second level</a:t>
             </a:r>
+            <a:endParaRPr lang="en-US" altLang="zh-CN" dirty="0"/>
           </a:p>
           <a:p>
             <a:pPr lvl="2"/>
@@ -3153,6 +3606,7 @@
               <a:rPr lang="en-US" altLang="zh-CN" dirty="0"/>
               <a:t>Third level</a:t>
             </a:r>
+            <a:endParaRPr lang="en-US" altLang="zh-CN" dirty="0"/>
           </a:p>
           <a:p>
             <a:pPr lvl="3"/>
@@ -3160,6 +3614,7 @@
               <a:rPr lang="en-US" altLang="zh-CN" dirty="0"/>
               <a:t>Fourth level</a:t>
             </a:r>
+            <a:endParaRPr lang="en-US" altLang="zh-CN" dirty="0"/>
           </a:p>
           <a:p>
             <a:pPr lvl="4"/>
@@ -3167,6 +3622,7 @@
               <a:rPr lang="en-US" altLang="zh-CN" dirty="0"/>
               <a:t>Fifth level</a:t>
             </a:r>
+            <a:endParaRPr lang="en-US" altLang="zh-CN" dirty="0"/>
           </a:p>
         </p:txBody>
       </p:sp>
@@ -3232,7 +3688,6 @@
           <a:p>
             <a:fld id="{63A1C593-65D0-4073-BCC9-577B9352EA97}" type="datetimeFigureOut">
               <a:rPr lang="en-US" smtClean="0"/>
-              <a:t>10/20/2022</a:t>
             </a:fld>
             <a:endParaRPr lang="en-US"/>
           </a:p>
@@ -3364,7 +3819,6 @@
           <a:p>
             <a:fld id="{9B618960-8005-486C-9A75-10CB2AAC16F9}" type="slidenum">
               <a:rPr lang="en-US" smtClean="0"/>
-              <a:t>‹#›</a:t>
             </a:fld>
             <a:endParaRPr lang="en-US"/>
           </a:p>
@@ -3810,7 +4264,7 @@
           <p:nvPr/>
         </p:nvPicPr>
         <p:blipFill>
-          <a:blip r:embed="rId3"/>
+          <a:blip r:embed="rId1"/>
           <a:stretch>
             <a:fillRect/>
           </a:stretch>
@@ -3849,6 +4303,7 @@
               <a:rPr lang="en-US" dirty="0"/>
               <a:t>Team Asclepius</a:t>
             </a:r>
+            <a:endParaRPr lang="en-US" dirty="0"/>
           </a:p>
         </p:txBody>
       </p:sp>
@@ -3876,12 +4331,14 @@
               <a:rPr lang="en-US"/>
               <a:t>Insight into New Zealand Economy </a:t>
             </a:r>
+            <a:endParaRPr lang="en-US"/>
           </a:p>
           <a:p>
             <a:r>
               <a:rPr lang="en-US"/>
               <a:t>- A data science approach</a:t>
             </a:r>
+            <a:endParaRPr lang="en-US"/>
           </a:p>
         </p:txBody>
       </p:sp>
@@ -3892,7 +4349,7 @@
           <p:nvPr/>
         </p:nvPicPr>
         <p:blipFill>
-          <a:blip r:embed="rId4"/>
+          <a:blip r:embed="rId2"/>
           <a:stretch>
             <a:fillRect/>
           </a:stretch>
@@ -3918,7 +4375,7 @@
           <p:nvPr/>
         </p:nvPicPr>
         <p:blipFill>
-          <a:blip r:embed="rId5"/>
+          <a:blip r:embed="rId3"/>
           <a:stretch>
             <a:fillRect/>
           </a:stretch>
@@ -3979,20 +4436,15 @@
           <a:p>
             <a:r>
               <a:rPr lang="en-US" dirty="0"/>
-              <a:t>Resources used to get data</a:t>
-            </a:r>
-          </a:p>
-        </p:txBody>
-      </p:sp>
-      <p:sp>
-        <p:nvSpPr>
-          <p:cNvPr id="3" name="Content Placeholder 2">
-            <a:extLst>
-              <a:ext uri="{FF2B5EF4-FFF2-40B4-BE49-F238E27FC236}">
-                <a16:creationId xmlns:a16="http://schemas.microsoft.com/office/drawing/2014/main" id="{710032EE-B782-C044-BD0F-24183EE1F90C}"/>
-              </a:ext>
-            </a:extLst>
-          </p:cNvPr>
+              <a:t>Techniques and tools used</a:t>
+            </a:r>
+            <a:endParaRPr lang="en-US" dirty="0"/>
+          </a:p>
+        </p:txBody>
+      </p:sp>
+      <p:sp>
+        <p:nvSpPr>
+          <p:cNvPr id="3" name="Content Placeholder 2"/>
           <p:cNvSpPr>
             <a:spLocks noGrp="1"/>
           </p:cNvSpPr>
@@ -4002,8 +4454,8 @@
         </p:nvSpPr>
         <p:spPr>
           <a:xfrm>
-            <a:off x="609599" y="1773382"/>
-            <a:ext cx="11056883" cy="3255818"/>
+            <a:off x="609600" y="1174750"/>
+            <a:ext cx="10972800" cy="1900959"/>
           </a:xfrm>
         </p:spPr>
         <p:txBody>
@@ -4015,42 +4467,93 @@
             </a:pPr>
             <a:r>
               <a:rPr lang="en-NZ" sz="4000" u="sng" dirty="0"/>
-              <a:t>Data Sources used:</a:t>
-            </a:r>
-            <a:endParaRPr lang="en-NZ" sz="4000" dirty="0"/>
-          </a:p>
-          <a:p>
-            <a:endParaRPr lang="en-NZ" sz="2400" dirty="0"/>
-          </a:p>
-          <a:p>
-            <a:r>
-              <a:rPr lang="en-NZ" sz="2400" dirty="0"/>
-              <a:t>https://infoshare.stats.govt.nz</a:t>
-            </a:r>
-          </a:p>
-          <a:p>
-            <a:r>
-              <a:rPr lang="en-NZ" sz="2400" dirty="0"/>
-              <a:t>https://www.interest.co.nz/chart-data/get-csv-data</a:t>
-            </a:r>
-          </a:p>
-          <a:p>
-            <a:r>
-              <a:rPr lang="en-NZ" sz="2400" dirty="0"/>
-              <a:t>https://api.ofx.com/PublicSite.ApiService//SpotRateHistory/allTime/NZD/CNY</a:t>
-            </a:r>
-          </a:p>
-          <a:p>
-            <a:endParaRPr lang="en-NZ" sz="2400" dirty="0"/>
+              <a:t>Techniques used:</a:t>
+            </a:r>
+            <a:endParaRPr lang="en-NZ" sz="4000" u="sng" dirty="0"/>
+          </a:p>
+          <a:p>
+            <a:r>
+              <a:rPr lang="en-NZ" dirty="0"/>
+              <a:t>Browser Automation</a:t>
+            </a:r>
+            <a:r>
+              <a:rPr lang="en-US" altLang="en-NZ" dirty="0"/>
+              <a:t>(R selenium)</a:t>
+            </a:r>
+            <a:endParaRPr lang="en-NZ" dirty="0"/>
+          </a:p>
+          <a:p>
+            <a:r>
+              <a:rPr lang="en-NZ" dirty="0"/>
+              <a:t>Scrapping</a:t>
+            </a:r>
+            <a:endParaRPr lang="en-NZ" dirty="0"/>
+          </a:p>
+          <a:p>
+            <a:r>
+              <a:rPr lang="en-US" altLang="en-NZ" dirty="0"/>
+              <a:t>API</a:t>
+            </a:r>
+            <a:endParaRPr lang="en-NZ" dirty="0"/>
+          </a:p>
+          <a:p>
+            <a:endParaRPr lang="en-NZ" dirty="0"/>
+          </a:p>
+        </p:txBody>
+      </p:sp>
+      <p:sp>
+        <p:nvSpPr>
+          <p:cNvPr id="5" name="Content Placeholder 4"/>
+          <p:cNvSpPr>
+            <a:spLocks noGrp="1"/>
+          </p:cNvSpPr>
+          <p:nvPr>
+            <p:ph sz="half" idx="2"/>
+          </p:nvPr>
+        </p:nvSpPr>
+        <p:spPr>
+          <a:xfrm>
+            <a:off x="609600" y="3865418"/>
+            <a:ext cx="10972800" cy="2262332"/>
+          </a:xfrm>
+        </p:spPr>
+        <p:txBody>
+          <a:bodyPr/>
+          <a:lstStyle/>
+          <a:p>
+            <a:pPr marL="0" indent="0">
+              <a:buNone/>
+            </a:pPr>
+            <a:r>
+              <a:rPr lang="en-NZ" sz="3200" u="sng" dirty="0"/>
+              <a:t>Tools used for scraping and automation:</a:t>
+            </a:r>
+            <a:endParaRPr lang="en-NZ" sz="3200" u="sng" dirty="0"/>
+          </a:p>
+          <a:p>
+            <a:r>
+              <a:rPr lang="en-NZ" dirty="0" err="1"/>
+              <a:t>rvest</a:t>
+            </a:r>
+            <a:endParaRPr lang="en-NZ" dirty="0"/>
+          </a:p>
+          <a:p>
+            <a:r>
+              <a:rPr lang="en-NZ" dirty="0" err="1"/>
+              <a:t>RSelenium</a:t>
+            </a:r>
+            <a:endParaRPr lang="en-NZ" dirty="0" err="1"/>
+          </a:p>
+          <a:p>
+            <a:r>
+              <a:rPr lang="en-US" altLang="en-NZ" dirty="0"/>
+              <a:t>etc..</a:t>
+            </a:r>
+            <a:endParaRPr lang="en-US" altLang="en-NZ" dirty="0"/>
           </a:p>
         </p:txBody>
       </p:sp>
     </p:spTree>
-    <p:extLst>
-      <p:ext uri="{BB962C8B-B14F-4D97-AF65-F5344CB8AC3E}">
-        <p14:creationId xmlns:p14="http://schemas.microsoft.com/office/powerpoint/2010/main" val="478165228"/>
-      </p:ext>
-    </p:extLst>
   </p:cSld>
   <p:clrMapOvr>
     <a:masterClrMapping/>
@@ -4092,118 +4595,36 @@
           <a:p>
             <a:r>
               <a:rPr lang="en-US" dirty="0"/>
-              <a:t>Techniques and tools used</a:t>
-            </a:r>
-          </a:p>
-        </p:txBody>
-      </p:sp>
-      <p:sp>
-        <p:nvSpPr>
-          <p:cNvPr id="3" name="Content Placeholder 2">
-            <a:extLst>
-              <a:ext uri="{FF2B5EF4-FFF2-40B4-BE49-F238E27FC236}">
-                <a16:creationId xmlns:a16="http://schemas.microsoft.com/office/drawing/2014/main" id="{710032EE-B782-C044-BD0F-24183EE1F90C}"/>
-              </a:ext>
-            </a:extLst>
-          </p:cNvPr>
-          <p:cNvSpPr>
-            <a:spLocks noGrp="1"/>
-          </p:cNvSpPr>
+              <a:t>Resources used to get data</a:t>
+            </a:r>
+            <a:endParaRPr lang="en-US" dirty="0"/>
+          </a:p>
+        </p:txBody>
+      </p:sp>
+      <p:pic>
+        <p:nvPicPr>
+          <p:cNvPr id="8" name="Content Placeholder 3"/>
+          <p:cNvPicPr>
+            <a:picLocks noGrp="1" noChangeAspect="1"/>
+          </p:cNvPicPr>
           <p:nvPr>
             <p:ph sz="half" idx="1"/>
           </p:nvPr>
-        </p:nvSpPr>
+        </p:nvPicPr>
+        <p:blipFill>
+          <a:blip r:embed="rId1"/>
+          <a:stretch>
+            <a:fillRect/>
+          </a:stretch>
+        </p:blipFill>
         <p:spPr>
           <a:xfrm>
-            <a:off x="609600" y="1174750"/>
-            <a:ext cx="10972800" cy="1900959"/>
-          </a:xfrm>
-        </p:spPr>
-        <p:txBody>
-          <a:bodyPr/>
-          <a:lstStyle/>
-          <a:p>
-            <a:pPr marL="0" indent="0">
-              <a:buNone/>
-            </a:pPr>
-            <a:r>
-              <a:rPr lang="en-NZ" sz="4000" u="sng" dirty="0"/>
-              <a:t>Techniques used:</a:t>
-            </a:r>
-          </a:p>
-          <a:p>
-            <a:r>
-              <a:rPr lang="en-NZ" dirty="0"/>
-              <a:t>Browser Automation</a:t>
-            </a:r>
-          </a:p>
-          <a:p>
-            <a:r>
-              <a:rPr lang="en-NZ" dirty="0"/>
-              <a:t>Scrapping</a:t>
-            </a:r>
-          </a:p>
-          <a:p>
-            <a:endParaRPr lang="en-NZ" dirty="0"/>
-          </a:p>
-        </p:txBody>
-      </p:sp>
-      <p:sp>
-        <p:nvSpPr>
-          <p:cNvPr id="5" name="Content Placeholder 4">
-            <a:extLst>
-              <a:ext uri="{FF2B5EF4-FFF2-40B4-BE49-F238E27FC236}">
-                <a16:creationId xmlns:a16="http://schemas.microsoft.com/office/drawing/2014/main" id="{3BC8EE21-2A6E-9570-D00B-B05C592FB086}"/>
-              </a:ext>
-            </a:extLst>
-          </p:cNvPr>
-          <p:cNvSpPr>
-            <a:spLocks noGrp="1"/>
-          </p:cNvSpPr>
-          <p:nvPr>
-            <p:ph sz="half" idx="2"/>
-          </p:nvPr>
-        </p:nvSpPr>
-        <p:spPr>
-          <a:xfrm>
-            <a:off x="609600" y="3865418"/>
-            <a:ext cx="10972800" cy="2262332"/>
-          </a:xfrm>
-        </p:spPr>
-        <p:txBody>
-          <a:bodyPr/>
-          <a:lstStyle/>
-          <a:p>
-            <a:pPr marL="0" indent="0">
-              <a:buNone/>
-            </a:pPr>
-            <a:r>
-              <a:rPr lang="en-NZ" sz="3200" u="sng" dirty="0"/>
-              <a:t>Tools used for scraping and automation:</a:t>
-            </a:r>
-          </a:p>
-          <a:p>
-            <a:r>
-              <a:rPr lang="en-NZ" dirty="0" err="1"/>
-              <a:t>rvest</a:t>
-            </a:r>
-            <a:endParaRPr lang="en-NZ" dirty="0"/>
-          </a:p>
-          <a:p>
-            <a:r>
-              <a:rPr lang="en-NZ" dirty="0" err="1"/>
-              <a:t>RSelenium</a:t>
-            </a:r>
-            <a:endParaRPr lang="en-NZ" dirty="0"/>
-          </a:p>
-        </p:txBody>
-      </p:sp>
+            <a:off x="457728" y="906391"/>
+            <a:ext cx="11124672" cy="5772703"/>
+          </a:xfrm>
+        </p:spPr>
+      </p:pic>
     </p:spTree>
-    <p:extLst>
-      <p:ext uri="{BB962C8B-B14F-4D97-AF65-F5344CB8AC3E}">
-        <p14:creationId xmlns:p14="http://schemas.microsoft.com/office/powerpoint/2010/main" val="388416163"/>
-      </p:ext>
-    </p:extLst>
   </p:cSld>
   <p:clrMapOvr>
     <a:masterClrMapping/>
@@ -4247,44 +4668,36 @@
               <a:rPr lang="en-US" dirty="0"/>
               <a:t>Resources used to get data</a:t>
             </a:r>
+            <a:endParaRPr lang="en-US" dirty="0"/>
           </a:p>
         </p:txBody>
       </p:sp>
       <p:pic>
         <p:nvPicPr>
-          <p:cNvPr id="8" name="Content Placeholder 3">
-            <a:extLst>
-              <a:ext uri="{FF2B5EF4-FFF2-40B4-BE49-F238E27FC236}">
-                <a16:creationId xmlns:a16="http://schemas.microsoft.com/office/drawing/2014/main" id="{96CC7DBA-2188-B3B8-FEDB-D19BDA5605C4}"/>
-              </a:ext>
-            </a:extLst>
-          </p:cNvPr>
+          <p:cNvPr id="17" name="Picture 16"/>
           <p:cNvPicPr>
-            <a:picLocks noGrp="1" noChangeAspect="1"/>
+            <a:picLocks noChangeAspect="1"/>
           </p:cNvPicPr>
-          <p:nvPr>
-            <p:ph sz="half" idx="1"/>
-          </p:nvPr>
+          <p:nvPr/>
         </p:nvPicPr>
-        <p:blipFill>
-          <a:blip r:embed="rId2"/>
+        <p:blipFill rotWithShape="1">
+          <a:blip r:embed="rId1"/>
+          <a:srcRect b="10276"/>
           <a:stretch>
             <a:fillRect/>
           </a:stretch>
         </p:blipFill>
         <p:spPr>
           <a:xfrm>
-            <a:off x="457728" y="906391"/>
-            <a:ext cx="11124672" cy="5772703"/>
-          </a:xfrm>
+            <a:off x="700585" y="1190624"/>
+            <a:ext cx="10881815" cy="5667376"/>
+          </a:xfrm>
+          <a:prstGeom prst="rect">
+            <a:avLst/>
+          </a:prstGeom>
         </p:spPr>
       </p:pic>
     </p:spTree>
-    <p:extLst>
-      <p:ext uri="{BB962C8B-B14F-4D97-AF65-F5344CB8AC3E}">
-        <p14:creationId xmlns:p14="http://schemas.microsoft.com/office/powerpoint/2010/main" val="2526099302"/>
-      </p:ext>
-    </p:extLst>
   </p:cSld>
   <p:clrMapOvr>
     <a:masterClrMapping/>
@@ -4311,7 +4724,7 @@
       </p:grpSpPr>
       <p:sp>
         <p:nvSpPr>
-          <p:cNvPr id="10" name="Title 9"/>
+          <p:cNvPr id="2" name="Title 1"/>
           <p:cNvSpPr>
             <a:spLocks noGrp="1"/>
           </p:cNvSpPr>
@@ -4325,47 +4738,116 @@
           <a:lstStyle/>
           <a:p>
             <a:r>
+              <a:rPr lang="en-US"/>
+              <a:t>What techniques you did see</a:t>
+            </a:r>
+            <a:endParaRPr lang="en-US"/>
+          </a:p>
+        </p:txBody>
+      </p:sp>
+      <p:sp>
+        <p:nvSpPr>
+          <p:cNvPr id="3" name="Content Placeholder 2"/>
+          <p:cNvSpPr>
+            <a:spLocks noGrp="1"/>
+          </p:cNvSpPr>
+          <p:nvPr>
+            <p:ph sz="half" idx="1"/>
+          </p:nvPr>
+        </p:nvSpPr>
+        <p:spPr>
+          <a:xfrm>
+            <a:off x="609600" y="1174750"/>
+            <a:ext cx="11246485" cy="1351280"/>
+          </a:xfrm>
+        </p:spPr>
+        <p:txBody>
+          <a:bodyPr/>
+          <a:lstStyle/>
+          <a:p>
+            <a:pPr marL="0" indent="0">
+              <a:buNone/>
+            </a:pPr>
+            <a:r>
+              <a:rPr lang="en-NZ" sz="4000" u="sng" dirty="0"/>
+              <a:t>Processes applied to data before visualization:</a:t>
+            </a:r>
+            <a:endParaRPr lang="en-NZ" sz="4000" dirty="0"/>
+          </a:p>
+          <a:p>
+            <a:r>
               <a:rPr lang="en-US" dirty="0"/>
-              <a:t>Resources used to get data</a:t>
-            </a:r>
+              <a:t>For data scraping,  various techniques have been utilized for direct data file downing, web scraping, API calling</a:t>
+            </a:r>
+            <a:endParaRPr lang="en-US" dirty="0"/>
+          </a:p>
+          <a:p>
+            <a:endParaRPr lang="en-US" dirty="0"/>
           </a:p>
         </p:txBody>
       </p:sp>
       <p:pic>
         <p:nvPicPr>
-          <p:cNvPr id="17" name="Picture 16">
-            <a:extLst>
-              <a:ext uri="{FF2B5EF4-FFF2-40B4-BE49-F238E27FC236}">
-                <a16:creationId xmlns:a16="http://schemas.microsoft.com/office/drawing/2014/main" id="{F0343934-D581-BEB9-DBA5-D54C045F4706}"/>
-              </a:ext>
-            </a:extLst>
-          </p:cNvPr>
+          <p:cNvPr id="100" name="Content Placeholder 99"/>
           <p:cNvPicPr>
-            <a:picLocks noChangeAspect="1"/>
+            <a:picLocks noGrp="1"/>
           </p:cNvPicPr>
-          <p:nvPr/>
+          <p:nvPr>
+            <p:ph sz="half" idx="2"/>
+          </p:nvPr>
         </p:nvPicPr>
         <p:blipFill rotWithShape="1">
-          <a:blip r:embed="rId2"/>
-          <a:srcRect b="10276"/>
-          <a:stretch/>
+          <a:blip r:embed="rId1"/>
+          <a:srcRect t="16543" b="15906"/>
+          <a:stretch>
+            <a:fillRect/>
+          </a:stretch>
         </p:blipFill>
         <p:spPr>
           <a:xfrm>
-            <a:off x="700585" y="1190624"/>
-            <a:ext cx="10881815" cy="5667376"/>
+            <a:off x="-125064" y="3170522"/>
+            <a:ext cx="12442127" cy="3104866"/>
           </a:xfrm>
           <a:prstGeom prst="rect">
             <a:avLst/>
           </a:prstGeom>
+          <a:noFill/>
+          <a:ln w="9525">
+            <a:noFill/>
+          </a:ln>
         </p:spPr>
       </p:pic>
+      <p:sp>
+        <p:nvSpPr>
+          <p:cNvPr id="6" name="TextBox 5"/>
+          <p:cNvSpPr txBox="1"/>
+          <p:nvPr/>
+        </p:nvSpPr>
+        <p:spPr>
+          <a:xfrm>
+            <a:off x="7984512" y="6029167"/>
+            <a:ext cx="3871573" cy="246221"/>
+          </a:xfrm>
+          <a:prstGeom prst="rect">
+            <a:avLst/>
+          </a:prstGeom>
+          <a:noFill/>
+        </p:spPr>
+        <p:txBody>
+          <a:bodyPr wrap="none" rtlCol="0">
+            <a:spAutoFit/>
+          </a:bodyPr>
+          <a:lstStyle/>
+          <a:p>
+            <a:r>
+              <a:rPr lang="en-NZ" sz="1000" dirty="0"/>
+              <a:t>(Image taken from: https://monkeylearn.com/blog/data-wrangling)</a:t>
+            </a:r>
+            <a:endParaRPr lang="en-NZ" sz="1000" dirty="0"/>
+          </a:p>
+        </p:txBody>
+      </p:sp>
     </p:spTree>
-    <p:extLst>
-      <p:ext uri="{BB962C8B-B14F-4D97-AF65-F5344CB8AC3E}">
-        <p14:creationId xmlns:p14="http://schemas.microsoft.com/office/powerpoint/2010/main" val="2097971960"/>
-      </p:ext>
-    </p:extLst>
   </p:cSld>
   <p:clrMapOvr>
     <a:masterClrMapping/>
@@ -4402,13 +4884,16 @@
         </p:nvSpPr>
         <p:spPr/>
         <p:txBody>
-          <a:bodyPr/>
-          <a:lstStyle/>
-          <a:p>
-            <a:r>
-              <a:rPr lang="en-US"/>
-              <a:t>What techniques you did see</a:t>
-            </a:r>
+          <a:bodyPr>
+            <a:normAutofit fontScale="90000"/>
+          </a:bodyPr>
+          <a:lstStyle/>
+          <a:p>
+            <a:r>
+              <a:rPr lang="en-US"/>
+              <a:t>What you managed to achieve and what you failed to do  </a:t>
+            </a:r>
+            <a:endParaRPr lang="en-US"/>
           </a:p>
         </p:txBody>
       </p:sp>
@@ -4419,100 +4904,73 @@
             <a:spLocks noGrp="1"/>
           </p:cNvSpPr>
           <p:nvPr>
-            <p:ph sz="half" idx="1"/>
-          </p:nvPr>
-        </p:nvSpPr>
-        <p:spPr>
-          <a:xfrm>
-            <a:off x="609600" y="1174750"/>
-            <a:ext cx="11246485" cy="1351280"/>
-          </a:xfrm>
-        </p:spPr>
-        <p:txBody>
-          <a:bodyPr/>
-          <a:lstStyle/>
-          <a:p>
-            <a:pPr marL="0" indent="0">
+            <p:ph idx="1"/>
+          </p:nvPr>
+        </p:nvSpPr>
+        <p:spPr/>
+        <p:txBody>
+          <a:bodyPr/>
+          <a:lstStyle/>
+          <a:p>
+            <a:r>
+              <a:rPr lang="en-US"/>
+              <a:t>Achieved :</a:t>
+            </a:r>
+            <a:endParaRPr lang="en-US"/>
+          </a:p>
+          <a:p>
+            <a:pPr lvl="1"/>
+            <a:r>
+              <a:rPr lang="en-US"/>
+              <a:t>Data collection, data wrangling and data Visualization</a:t>
+            </a:r>
+            <a:endParaRPr lang="en-US"/>
+          </a:p>
+          <a:p>
+            <a:r>
+              <a:rPr lang="en-US">
+                <a:sym typeface="+mn-ea"/>
+              </a:rPr>
+              <a:t>To be achieved </a:t>
+            </a:r>
+            <a:endParaRPr lang="en-US">
+              <a:sym typeface="+mn-ea"/>
+            </a:endParaRPr>
+          </a:p>
+          <a:p>
+            <a:pPr lvl="1"/>
+            <a:r>
+              <a:rPr lang="en-US">
+                <a:sym typeface="+mn-ea"/>
+              </a:rPr>
+              <a:t>We are aiming at deliver publishing API</a:t>
+            </a:r>
+            <a:endParaRPr lang="en-US"/>
+          </a:p>
+          <a:p>
+            <a:r>
+              <a:rPr lang="en-US"/>
+              <a:t>Failed</a:t>
+            </a:r>
+            <a:endParaRPr lang="en-US"/>
+          </a:p>
+          <a:p>
+            <a:pPr lvl="1"/>
+            <a:r>
+              <a:rPr lang="en-US"/>
+              <a:t>We failed to download data from RBNZ web sites, as the data source is behind “Cloudflare” CDN (content delivery network)</a:t>
+            </a:r>
+            <a:endParaRPr lang="en-US"/>
+          </a:p>
+          <a:p>
+            <a:pPr lvl="0"/>
+            <a:endParaRPr lang="en-US"/>
+          </a:p>
+          <a:p>
+            <a:pPr marL="457200" lvl="1" indent="0">
               <a:buNone/>
             </a:pPr>
-            <a:r>
-              <a:rPr lang="en-NZ" sz="4000" u="sng" dirty="0"/>
-              <a:t>Processes applied to data before visualization:</a:t>
-            </a:r>
-            <a:endParaRPr lang="en-NZ" sz="4000" dirty="0"/>
-          </a:p>
-          <a:p>
-            <a:r>
-              <a:rPr lang="en-US" dirty="0"/>
-              <a:t>For data scraping,  various techniques have been utilized for direct data file downing, web scraping, API calling</a:t>
-            </a:r>
-          </a:p>
-          <a:p>
-            <a:endParaRPr lang="en-US" dirty="0"/>
-          </a:p>
-        </p:txBody>
-      </p:sp>
-      <p:pic>
-        <p:nvPicPr>
-          <p:cNvPr id="100" name="Content Placeholder 99"/>
-          <p:cNvPicPr>
-            <a:picLocks noGrp="1"/>
-          </p:cNvPicPr>
-          <p:nvPr>
-            <p:ph sz="half" idx="2"/>
-          </p:nvPr>
-        </p:nvPicPr>
-        <p:blipFill rotWithShape="1">
-          <a:blip r:embed="rId2"/>
-          <a:srcRect t="16543" b="15906"/>
-          <a:stretch/>
-        </p:blipFill>
-        <p:spPr>
-          <a:xfrm>
-            <a:off x="-125064" y="3170522"/>
-            <a:ext cx="12442127" cy="3104866"/>
-          </a:xfrm>
-          <a:prstGeom prst="rect">
-            <a:avLst/>
-          </a:prstGeom>
-          <a:noFill/>
-          <a:ln w="9525">
-            <a:noFill/>
-          </a:ln>
-        </p:spPr>
-      </p:pic>
-      <p:sp>
-        <p:nvSpPr>
-          <p:cNvPr id="6" name="TextBox 5">
-            <a:extLst>
-              <a:ext uri="{FF2B5EF4-FFF2-40B4-BE49-F238E27FC236}">
-                <a16:creationId xmlns:a16="http://schemas.microsoft.com/office/drawing/2014/main" id="{FDD2FEA4-C1F4-A2D7-39A8-53338206B56D}"/>
-              </a:ext>
-            </a:extLst>
-          </p:cNvPr>
-          <p:cNvSpPr txBox="1"/>
-          <p:nvPr/>
-        </p:nvSpPr>
-        <p:spPr>
-          <a:xfrm>
-            <a:off x="7984512" y="6029167"/>
-            <a:ext cx="3871573" cy="246221"/>
-          </a:xfrm>
-          <a:prstGeom prst="rect">
-            <a:avLst/>
-          </a:prstGeom>
-          <a:noFill/>
-        </p:spPr>
-        <p:txBody>
-          <a:bodyPr wrap="none" rtlCol="0">
-            <a:spAutoFit/>
-          </a:bodyPr>
-          <a:lstStyle/>
-          <a:p>
-            <a:r>
-              <a:rPr lang="en-NZ" sz="1000" dirty="0"/>
-              <a:t>(Image taken from: https://monkeylearn.com/blog/data-wrangling)</a:t>
-            </a:r>
+            <a:endParaRPr lang="en-US"/>
           </a:p>
         </p:txBody>
       </p:sp>
@@ -4553,43 +5011,100 @@
         </p:nvSpPr>
         <p:spPr/>
         <p:txBody>
-          <a:bodyPr>
-            <a:normAutofit fontScale="90000"/>
+          <a:bodyPr/>
+          <a:lstStyle/>
+          <a:p>
+            <a:r>
+              <a:rPr lang="en-US"/>
+              <a:t>Charts</a:t>
+            </a:r>
+            <a:endParaRPr lang="en-US"/>
+          </a:p>
+        </p:txBody>
+      </p:sp>
+      <p:pic>
+        <p:nvPicPr>
+          <p:cNvPr id="4" name="Content Placeholder 3"/>
+          <p:cNvPicPr>
+            <a:picLocks noGrp="1" noChangeAspect="1"/>
+          </p:cNvPicPr>
+          <p:nvPr>
+            <p:ph idx="1"/>
+          </p:nvPr>
+        </p:nvPicPr>
+        <p:blipFill>
+          <a:blip r:embed="rId1"/>
+          <a:stretch>
+            <a:fillRect/>
+          </a:stretch>
+        </p:blipFill>
+        <p:spPr>
+          <a:xfrm>
+            <a:off x="3643630" y="1448435"/>
+            <a:ext cx="4905375" cy="4362450"/>
+          </a:xfrm>
+          <a:prstGeom prst="rect">
+            <a:avLst/>
+          </a:prstGeom>
+        </p:spPr>
+      </p:pic>
+      <p:sp>
+        <p:nvSpPr>
+          <p:cNvPr id="3" name="Text Box 2"/>
+          <p:cNvSpPr txBox="1"/>
+          <p:nvPr/>
+        </p:nvSpPr>
+        <p:spPr>
+          <a:xfrm>
+            <a:off x="999490" y="6069330"/>
+            <a:ext cx="10695305" cy="368300"/>
+          </a:xfrm>
+          <a:prstGeom prst="rect">
+            <a:avLst/>
+          </a:prstGeom>
+          <a:noFill/>
+        </p:spPr>
+        <p:txBody>
+          <a:bodyPr wrap="square" rtlCol="0">
+            <a:spAutoFit/>
           </a:bodyPr>
           <a:lstStyle/>
           <a:p>
             <a:r>
               <a:rPr lang="en-US"/>
-              <a:t>What you managed to achieve and what you failed to do  </a:t>
-            </a:r>
-          </a:p>
-        </p:txBody>
-      </p:sp>
-      <p:sp>
-        <p:nvSpPr>
-          <p:cNvPr id="3" name="Content Placeholder 2"/>
-          <p:cNvSpPr>
-            <a:spLocks noGrp="1"/>
-          </p:cNvSpPr>
-          <p:nvPr>
-            <p:ph idx="1"/>
-          </p:nvPr>
-        </p:nvSpPr>
-        <p:spPr/>
-        <p:txBody>
-          <a:bodyPr/>
-          <a:lstStyle/>
-          <a:p>
-            <a:r>
-              <a:rPr lang="en-US"/>
-              <a:t>API </a:t>
-            </a:r>
-          </a:p>
-          <a:p>
-            <a:r>
-              <a:rPr lang="en-US"/>
-              <a:t>HPI failed to </a:t>
-            </a:r>
+              <a:t>2) x axis time (yyyy-mm) :  y axis (Tourism international visitors arrivals) + nzd-usd-exchange rate</a:t>
+            </a:r>
+            <a:endParaRPr lang="en-US"/>
+          </a:p>
+        </p:txBody>
+      </p:sp>
+      <p:sp>
+        <p:nvSpPr>
+          <p:cNvPr id="5" name="Text Box 4"/>
+          <p:cNvSpPr txBox="1"/>
+          <p:nvPr/>
+        </p:nvSpPr>
+        <p:spPr>
+          <a:xfrm>
+            <a:off x="704850" y="2527935"/>
+            <a:ext cx="2364105" cy="2861310"/>
+          </a:xfrm>
+          <a:prstGeom prst="rect">
+            <a:avLst/>
+          </a:prstGeom>
+          <a:noFill/>
+        </p:spPr>
+        <p:txBody>
+          <a:bodyPr wrap="square" rtlCol="0">
+            <a:spAutoFit/>
+          </a:bodyPr>
+          <a:lstStyle/>
+          <a:p>
+            <a:r>
+              <a:rPr lang="en-US"/>
+              <a:t>With increase of the NZDollar USdollar exchange, it is more expensive for tourism coming to New Zealand, we can observe a dropping of the “Tourism International Visitors Arrivals”</a:t>
+            </a:r>
+            <a:endParaRPr lang="en-US"/>
           </a:p>
         </p:txBody>
       </p:sp>
@@ -4620,7 +5135,7 @@
       </p:grpSpPr>
       <p:sp>
         <p:nvSpPr>
-          <p:cNvPr id="2" name="Title 1"/>
+          <p:cNvPr id="7" name="Title 6"/>
           <p:cNvSpPr>
             <a:spLocks noGrp="1"/>
           </p:cNvSpPr>
@@ -4631,39 +5146,106 @@
         <p:spPr/>
         <p:txBody>
           <a:bodyPr/>
-          <a:lstStyle/>
-          <a:p>
-            <a:r>
-              <a:rPr lang="en-US"/>
-              <a:t>Charts generated to </a:t>
-            </a:r>
+          <a:p>
+            <a:endParaRPr lang="en-US"/>
+          </a:p>
+        </p:txBody>
+      </p:sp>
+      <p:sp>
+        <p:nvSpPr>
+          <p:cNvPr id="3" name="Text Box 2"/>
+          <p:cNvSpPr txBox="1"/>
+          <p:nvPr/>
+        </p:nvSpPr>
+        <p:spPr>
+          <a:xfrm>
+            <a:off x="1683385" y="5982970"/>
+            <a:ext cx="7766050" cy="645160"/>
+          </a:xfrm>
+          <a:prstGeom prst="rect">
+            <a:avLst/>
+          </a:prstGeom>
+          <a:noFill/>
+        </p:spPr>
+        <p:txBody>
+          <a:bodyPr wrap="square" rtlCol="0">
+            <a:spAutoFit/>
+          </a:bodyPr>
+          <a:lstStyle/>
+          <a:p>
+            <a:r>
+              <a:rPr lang="en-US"/>
+              <a:t>Plot</a:t>
+            </a:r>
+            <a:endParaRPr lang="en-US"/>
+          </a:p>
+          <a:p>
+            <a:r>
+              <a:rPr lang="en-US"/>
+              <a:t>1) x axis time (yyyy-mm) : y axis (OCR + (Labour force status))</a:t>
+            </a:r>
+            <a:endParaRPr lang="en-US"/>
+          </a:p>
+        </p:txBody>
+      </p:sp>
+      <p:sp>
+        <p:nvSpPr>
+          <p:cNvPr id="5" name="Text Box 4"/>
+          <p:cNvSpPr txBox="1"/>
+          <p:nvPr/>
+        </p:nvSpPr>
+        <p:spPr>
+          <a:xfrm>
+            <a:off x="826135" y="1765935"/>
+            <a:ext cx="2199640" cy="2030095"/>
+          </a:xfrm>
+          <a:prstGeom prst="rect">
+            <a:avLst/>
+          </a:prstGeom>
+          <a:noFill/>
+        </p:spPr>
+        <p:txBody>
+          <a:bodyPr wrap="square" rtlCol="0">
+            <a:spAutoFit/>
+          </a:bodyPr>
+          <a:lstStyle/>
+          <a:p>
+            <a:r>
+              <a:rPr lang="en-US"/>
+              <a:t>In this chart, it is observable that as OCR increase, in a few months time, the unemployment rate has also increased. </a:t>
+            </a:r>
+            <a:endParaRPr lang="en-US"/>
           </a:p>
         </p:txBody>
       </p:sp>
       <p:pic>
         <p:nvPicPr>
-          <p:cNvPr id="4" name="Content Placeholder 3"/>
+          <p:cNvPr id="100" name="Content Placeholder 99"/>
           <p:cNvPicPr>
-            <a:picLocks noGrp="1" noChangeAspect="1"/>
+            <a:picLocks noChangeAspect="1"/>
           </p:cNvPicPr>
           <p:nvPr>
             <p:ph idx="1"/>
           </p:nvPr>
         </p:nvPicPr>
         <p:blipFill>
-          <a:blip r:embed="rId2"/>
+          <a:blip r:embed="rId1"/>
           <a:stretch>
             <a:fillRect/>
           </a:stretch>
         </p:blipFill>
         <p:spPr>
           <a:xfrm>
-            <a:off x="2227580" y="1825625"/>
-            <a:ext cx="7735570" cy="4351655"/>
+            <a:off x="3205480" y="1029970"/>
+            <a:ext cx="4953000" cy="4953000"/>
           </a:xfrm>
           <a:prstGeom prst="rect">
             <a:avLst/>
           </a:prstGeom>
+          <a:noFill/>
+          <a:ln w="9525">
+            <a:noFill/>
+          </a:ln>
         </p:spPr>
       </p:pic>
     </p:spTree>
@@ -4677,6 +5259,17 @@
 <file path=ppt/slides/slide17.xml><?xml version="1.0" encoding="utf-8"?>
 <p:sld xmlns:a="http://schemas.openxmlformats.org/drawingml/2006/main" xmlns:r="http://schemas.openxmlformats.org/officeDocument/2006/relationships" xmlns:p="http://schemas.openxmlformats.org/presentationml/2006/main">
   <p:cSld>
+    <p:bg>
+      <p:bgPr>
+        <a:blipFill>
+          <a:blip r:embed="rId1"/>
+          <a:stretch>
+            <a:fillRect/>
+          </a:stretch>
+        </a:blipFill>
+        <a:effectLst/>
+      </p:bgPr>
+    </p:bg>
     <p:spTree>
       <p:nvGrpSpPr>
         <p:cNvPr id="1" name=""/>
@@ -4708,19 +5301,258 @@
           <a:p>
             <a:r>
               <a:rPr lang="en-US"/>
-              <a:t>Charts</a:t>
-            </a:r>
+              <a:t>Charts Generated </a:t>
+            </a:r>
+            <a:endParaRPr lang="en-US"/>
+          </a:p>
+        </p:txBody>
+      </p:sp>
+      <p:sp>
+        <p:nvSpPr>
+          <p:cNvPr id="8" name="Text Box 7"/>
+          <p:cNvSpPr txBox="1"/>
+          <p:nvPr/>
+        </p:nvSpPr>
+        <p:spPr>
+          <a:xfrm>
+            <a:off x="433070" y="969645"/>
+            <a:ext cx="3004820" cy="275590"/>
+          </a:xfrm>
+          <a:prstGeom prst="rect">
+            <a:avLst/>
+          </a:prstGeom>
+          <a:noFill/>
+        </p:spPr>
+        <p:txBody>
+          <a:bodyPr wrap="square" rtlCol="0">
+            <a:spAutoFit/>
+          </a:bodyPr>
+          <a:lstStyle/>
+          <a:p>
+            <a:r>
+              <a:rPr lang="en-US" sz="1200"/>
+              <a:t>3) Correlation between “OCR” and CPI</a:t>
+            </a:r>
+            <a:endParaRPr lang="en-US" sz="1200"/>
+          </a:p>
+        </p:txBody>
+      </p:sp>
+      <p:sp>
+        <p:nvSpPr>
+          <p:cNvPr id="9" name="Text Box 8"/>
+          <p:cNvSpPr txBox="1"/>
+          <p:nvPr/>
+        </p:nvSpPr>
+        <p:spPr>
+          <a:xfrm>
+            <a:off x="3839210" y="1038225"/>
+            <a:ext cx="3004820" cy="275590"/>
+          </a:xfrm>
+          <a:prstGeom prst="rect">
+            <a:avLst/>
+          </a:prstGeom>
+          <a:noFill/>
+        </p:spPr>
+        <p:txBody>
+          <a:bodyPr wrap="square" rtlCol="0">
+            <a:spAutoFit/>
+          </a:bodyPr>
+          <a:lstStyle/>
+          <a:p>
+            <a:r>
+              <a:rPr lang="en-US" sz="1200"/>
+              <a:t>4) Correlation between “CPI” and HPI</a:t>
+            </a:r>
+            <a:endParaRPr lang="en-US" sz="1200"/>
+          </a:p>
+        </p:txBody>
+      </p:sp>
+      <p:sp>
+        <p:nvSpPr>
+          <p:cNvPr id="10" name="Text Box 9"/>
+          <p:cNvSpPr txBox="1"/>
+          <p:nvPr/>
+        </p:nvSpPr>
+        <p:spPr>
+          <a:xfrm>
+            <a:off x="6843395" y="946150"/>
+            <a:ext cx="3894455" cy="460375"/>
+          </a:xfrm>
+          <a:prstGeom prst="rect">
+            <a:avLst/>
+          </a:prstGeom>
+          <a:noFill/>
+        </p:spPr>
+        <p:txBody>
+          <a:bodyPr wrap="square" rtlCol="0">
+            <a:spAutoFit/>
+          </a:bodyPr>
+          <a:lstStyle/>
+          <a:p>
+            <a:r>
+              <a:rPr lang="en-US" sz="1200"/>
+              <a:t>5) Correlation between “OCR” and Exchange Rate NZD VS. USD</a:t>
+            </a:r>
+            <a:endParaRPr lang="en-US" sz="1200"/>
+          </a:p>
+        </p:txBody>
+      </p:sp>
+      <p:sp>
+        <p:nvSpPr>
+          <p:cNvPr id="11" name="Text Box 10"/>
+          <p:cNvSpPr txBox="1"/>
+          <p:nvPr/>
+        </p:nvSpPr>
+        <p:spPr>
+          <a:xfrm>
+            <a:off x="1998980" y="6383020"/>
+            <a:ext cx="3004820" cy="275590"/>
+          </a:xfrm>
+          <a:prstGeom prst="rect">
+            <a:avLst/>
+          </a:prstGeom>
+          <a:noFill/>
+        </p:spPr>
+        <p:txBody>
+          <a:bodyPr wrap="square" rtlCol="0">
+            <a:spAutoFit/>
+          </a:bodyPr>
+          <a:lstStyle/>
+          <a:p>
+            <a:r>
+              <a:rPr lang="en-US" sz="1200"/>
+              <a:t>6) Correlation between “OCR” and CPI</a:t>
+            </a:r>
+            <a:endParaRPr lang="en-US" sz="1200"/>
+          </a:p>
+        </p:txBody>
+      </p:sp>
+      <p:sp>
+        <p:nvSpPr>
+          <p:cNvPr id="12" name="Text Box 11"/>
+          <p:cNvSpPr txBox="1"/>
+          <p:nvPr/>
+        </p:nvSpPr>
+        <p:spPr>
+          <a:xfrm>
+            <a:off x="6844030" y="6290945"/>
+            <a:ext cx="3004820" cy="460375"/>
+          </a:xfrm>
+          <a:prstGeom prst="rect">
+            <a:avLst/>
+          </a:prstGeom>
+          <a:noFill/>
+        </p:spPr>
+        <p:txBody>
+          <a:bodyPr wrap="square" rtlCol="0">
+            <a:spAutoFit/>
+          </a:bodyPr>
+          <a:lstStyle/>
+          <a:p>
+            <a:r>
+              <a:rPr lang="en-US" sz="1200"/>
+              <a:t>7) Correlation between “OCR” and “State Highway Traffic Volumns”</a:t>
+            </a:r>
+            <a:endParaRPr lang="en-US" sz="1200"/>
+          </a:p>
+        </p:txBody>
+      </p:sp>
+      <p:sp>
+        <p:nvSpPr>
+          <p:cNvPr id="14" name="Text Box 13"/>
+          <p:cNvSpPr txBox="1"/>
+          <p:nvPr/>
+        </p:nvSpPr>
+        <p:spPr>
+          <a:xfrm>
+            <a:off x="419100" y="3714750"/>
+            <a:ext cx="1333500" cy="2399665"/>
+          </a:xfrm>
+          <a:prstGeom prst="rect">
+            <a:avLst/>
+          </a:prstGeom>
+          <a:noFill/>
+        </p:spPr>
+        <p:txBody>
+          <a:bodyPr wrap="square" rtlCol="0">
+            <a:spAutoFit/>
+          </a:bodyPr>
+          <a:lstStyle/>
+          <a:p>
+            <a:r>
+              <a:rPr lang="en-US" sz="1000"/>
+              <a:t>3) x axis (OCR from low to high value) : y axis (CPI from low to high value) </a:t>
+            </a:r>
+            <a:endParaRPr lang="en-US" sz="1000"/>
+          </a:p>
+          <a:p>
+            <a:r>
+              <a:rPr lang="en-US" sz="1000"/>
+              <a:t>[cut in the Official Cash Rate (OCR) leads to an increase in inflation and GDP growth]</a:t>
+            </a:r>
+            <a:endParaRPr lang="en-US" sz="1000"/>
+          </a:p>
+          <a:p>
+            <a:r>
+              <a:rPr lang="en-US" sz="1000"/>
+              <a:t>[References : https://www.rbnz.govt.nz/-/media/d0024c4168944dc6a502b497cdd5d46c.ashx]</a:t>
+            </a:r>
+            <a:endParaRPr lang="en-US" sz="1000"/>
+          </a:p>
+        </p:txBody>
+      </p:sp>
+      <p:sp>
+        <p:nvSpPr>
+          <p:cNvPr id="17" name="Text Box 16"/>
+          <p:cNvSpPr txBox="1"/>
+          <p:nvPr/>
+        </p:nvSpPr>
+        <p:spPr>
+          <a:xfrm>
+            <a:off x="9383395" y="4308475"/>
+            <a:ext cx="2458085" cy="953135"/>
+          </a:xfrm>
+          <a:prstGeom prst="rect">
+            <a:avLst/>
+          </a:prstGeom>
+          <a:noFill/>
+        </p:spPr>
+        <p:txBody>
+          <a:bodyPr wrap="square" rtlCol="0">
+            <a:spAutoFit/>
+          </a:bodyPr>
+          <a:lstStyle/>
+          <a:p>
+            <a:r>
+              <a:rPr lang="en-US" sz="800"/>
+              <a:t>[If we raise the OCR, banks' interest rates also tend to increase and vice versa. </a:t>
+            </a:r>
+            <a:endParaRPr lang="en-US" sz="800"/>
+          </a:p>
+          <a:p>
+            <a:r>
+              <a:rPr lang="en-US" sz="800"/>
+              <a:t>This is because the OCR influences the banks' costs, so as with any business, changes in costs are passed on in their prices. </a:t>
+            </a:r>
+            <a:endParaRPr lang="en-US" sz="800"/>
+          </a:p>
+          <a:p>
+            <a:r>
+              <a:rPr lang="en-US" sz="800"/>
+              <a:t>A decrease in banks' interest rates usually results in people spending more.]</a:t>
+            </a:r>
+            <a:endParaRPr lang="en-US" sz="800"/>
           </a:p>
         </p:txBody>
       </p:sp>
       <p:pic>
         <p:nvPicPr>
-          <p:cNvPr id="4" name="Content Placeholder 3"/>
+          <p:cNvPr id="101" name="Content Placeholder 100"/>
           <p:cNvPicPr>
-            <a:picLocks noGrp="1" noChangeAspect="1"/>
+            <a:picLocks noChangeAspect="1"/>
           </p:cNvPicPr>
           <p:nvPr>
-            <p:ph idx="1"/>
+            <p:ph sz="half" idx="1"/>
           </p:nvPr>
         </p:nvPicPr>
         <p:blipFill>
@@ -4731,69 +5563,126 @@
         </p:blipFill>
         <p:spPr>
           <a:xfrm>
-            <a:off x="3642995" y="1469390"/>
-            <a:ext cx="4905375" cy="4362450"/>
-          </a:xfrm>
-          <a:prstGeom prst="rect">
-            <a:avLst/>
-          </a:prstGeom>
-        </p:spPr>
-      </p:pic>
-      <p:sp>
-        <p:nvSpPr>
-          <p:cNvPr id="3" name="Text Box 2"/>
-          <p:cNvSpPr txBox="1"/>
-          <p:nvPr/>
-        </p:nvSpPr>
-        <p:spPr>
-          <a:xfrm>
-            <a:off x="999490" y="6069330"/>
-            <a:ext cx="10695305" cy="368300"/>
+            <a:off x="346075" y="1174750"/>
+            <a:ext cx="2797810" cy="2797810"/>
           </a:xfrm>
           <a:prstGeom prst="rect">
             <a:avLst/>
           </a:prstGeom>
           <a:noFill/>
-        </p:spPr>
-        <p:txBody>
-          <a:bodyPr wrap="square" rtlCol="0">
-            <a:spAutoFit/>
-          </a:bodyPr>
-          <a:lstStyle/>
-          <a:p>
-            <a:r>
-              <a:rPr lang="en-US"/>
-              <a:t>2) x axis time (yyyy-mm) :  y axis (Tourism international visitors arrivals) + nzd-usd-exchange rate</a:t>
-            </a:r>
-          </a:p>
-        </p:txBody>
-      </p:sp>
-      <p:sp>
-        <p:nvSpPr>
-          <p:cNvPr id="5" name="Text Box 4"/>
-          <p:cNvSpPr txBox="1"/>
-          <p:nvPr/>
-        </p:nvSpPr>
+          <a:ln w="9525">
+            <a:noFill/>
+          </a:ln>
+        </p:spPr>
+      </p:pic>
+      <p:pic>
+        <p:nvPicPr>
+          <p:cNvPr id="102" name="Content Placeholder 101"/>
+          <p:cNvPicPr>
+            <a:picLocks noChangeAspect="1"/>
+          </p:cNvPicPr>
+          <p:nvPr>
+            <p:ph sz="half" idx="2"/>
+          </p:nvPr>
+        </p:nvPicPr>
+        <p:blipFill>
+          <a:blip r:embed="rId3"/>
+          <a:stretch>
+            <a:fillRect/>
+          </a:stretch>
+        </p:blipFill>
         <p:spPr>
           <a:xfrm>
-            <a:off x="704850" y="2527935"/>
-            <a:ext cx="2364105" cy="2861310"/>
+            <a:off x="3839210" y="1235710"/>
+            <a:ext cx="2494915" cy="2494915"/>
           </a:xfrm>
           <a:prstGeom prst="rect">
             <a:avLst/>
           </a:prstGeom>
           <a:noFill/>
+          <a:ln w="9525">
+            <a:noFill/>
+          </a:ln>
+        </p:spPr>
+      </p:pic>
+      <p:pic>
+        <p:nvPicPr>
+          <p:cNvPr id="15" name="Picture 14"/>
+          <p:cNvPicPr/>
+          <p:nvPr/>
+        </p:nvPicPr>
+        <p:blipFill>
+          <a:blip r:embed="rId4"/>
+          <a:stretch>
+            <a:fillRect/>
+          </a:stretch>
+        </p:blipFill>
+        <p:spPr>
+          <a:xfrm>
+            <a:off x="7637780" y="1169035"/>
+            <a:ext cx="2529205" cy="2803525"/>
+          </a:xfrm>
+          <a:prstGeom prst="rect">
+            <a:avLst/>
+          </a:prstGeom>
+          <a:noFill/>
+          <a:ln w="9525">
+            <a:noFill/>
+          </a:ln>
+        </p:spPr>
+      </p:pic>
+      <p:pic>
+        <p:nvPicPr>
+          <p:cNvPr id="104" name="Picture 103"/>
+          <p:cNvPicPr/>
+          <p:nvPr/>
+        </p:nvPicPr>
+        <p:blipFill>
+          <a:blip r:embed="rId5"/>
+          <a:stretch>
+            <a:fillRect/>
+          </a:stretch>
+        </p:blipFill>
+        <p:spPr>
+          <a:xfrm>
+            <a:off x="2388235" y="3731260"/>
+            <a:ext cx="2877185" cy="2459990"/>
+          </a:xfrm>
+          <a:prstGeom prst="rect">
+            <a:avLst/>
+          </a:prstGeom>
+          <a:noFill/>
+          <a:ln w="9525">
+            <a:noFill/>
+          </a:ln>
+        </p:spPr>
+      </p:pic>
+      <p:sp>
+        <p:nvSpPr>
+          <p:cNvPr id="18" name="Text Box 17"/>
+          <p:cNvSpPr txBox="1"/>
+          <p:nvPr/>
+        </p:nvSpPr>
+        <p:spPr>
+          <a:xfrm>
+            <a:off x="7208520" y="4462780"/>
+            <a:ext cx="2625725" cy="368300"/>
+          </a:xfrm>
+          <a:prstGeom prst="rect">
+            <a:avLst/>
+          </a:prstGeom>
+          <a:noFill/>
         </p:spPr>
         <p:txBody>
           <a:bodyPr wrap="square" rtlCol="0">
             <a:spAutoFit/>
           </a:bodyPr>
-          <a:lstStyle/>
-          <a:p>
-            <a:r>
-              <a:rPr lang="en-US"/>
-              <a:t>With increase of the NZDollar USdollar exchange, it is more expensive for tourism coming to New Zealand, we can observe a dropping of the “Tourism International Visitors Arrivals”</a:t>
-            </a:r>
+          <a:p>
+            <a:r>
+              <a:rPr lang="en-US"/>
+              <a:t>To be done...</a:t>
+            </a:r>
+            <a:endParaRPr lang="en-US"/>
           </a:p>
         </p:txBody>
       </p:sp>
@@ -4837,100 +5726,81 @@
           <a:bodyPr/>
           <a:lstStyle/>
           <a:p>
-            <a:endParaRPr lang="en-US"/>
+            <a:r>
+              <a:rPr lang="en-US"/>
+              <a:t>Conclusions </a:t>
+            </a:r>
+            <a:endParaRPr lang="en-US"/>
+          </a:p>
+        </p:txBody>
+      </p:sp>
+      <p:sp>
+        <p:nvSpPr>
+          <p:cNvPr id="3" name="Text Box 2"/>
+          <p:cNvSpPr txBox="1"/>
+          <p:nvPr/>
+        </p:nvSpPr>
+        <p:spPr>
+          <a:xfrm>
+            <a:off x="416560" y="1775460"/>
+            <a:ext cx="2828290" cy="645160"/>
+          </a:xfrm>
+          <a:prstGeom prst="rect">
+            <a:avLst/>
+          </a:prstGeom>
+          <a:noFill/>
+        </p:spPr>
+        <p:txBody>
+          <a:bodyPr wrap="square" rtlCol="0">
+            <a:spAutoFit/>
+          </a:bodyPr>
+          <a:p>
+            <a:r>
+              <a:rPr lang="en-US" sz="1200"/>
+              <a:t>Big chart with everything in it, </a:t>
+            </a:r>
+            <a:r>
+              <a:rPr lang="en-US" sz="1200">
+                <a:solidFill>
+                  <a:srgbClr val="FF0000"/>
+                </a:solidFill>
+              </a:rPr>
+              <a:t>x-axis is tim</a:t>
+            </a:r>
+            <a:r>
+              <a:rPr lang="en-US" sz="1200"/>
+              <a:t>e, y-axis contains everything else... (Remove ... HPI)</a:t>
+            </a:r>
+            <a:endParaRPr lang="en-US" sz="1200"/>
           </a:p>
         </p:txBody>
       </p:sp>
       <p:pic>
         <p:nvPicPr>
-          <p:cNvPr id="4" name="Content Placeholder 3"/>
+          <p:cNvPr id="7" name="Content Placeholder 6"/>
           <p:cNvPicPr>
-            <a:picLocks noGrp="1" noChangeAspect="1"/>
+            <a:picLocks noChangeAspect="1"/>
           </p:cNvPicPr>
           <p:nvPr>
             <p:ph idx="1"/>
           </p:nvPr>
         </p:nvPicPr>
         <p:blipFill>
-          <a:blip r:embed="rId2"/>
+          <a:blip r:embed="rId1"/>
           <a:stretch>
             <a:fillRect/>
           </a:stretch>
         </p:blipFill>
         <p:spPr>
           <a:xfrm>
-            <a:off x="3466465" y="1493520"/>
-            <a:ext cx="5257800" cy="4314825"/>
+            <a:off x="3187700" y="906780"/>
+            <a:ext cx="5913755" cy="5913755"/>
           </a:xfrm>
           <a:prstGeom prst="rect">
             <a:avLst/>
           </a:prstGeom>
         </p:spPr>
       </p:pic>
-      <p:sp>
-        <p:nvSpPr>
-          <p:cNvPr id="3" name="Text Box 2"/>
-          <p:cNvSpPr txBox="1"/>
-          <p:nvPr/>
-        </p:nvSpPr>
-        <p:spPr>
-          <a:xfrm>
-            <a:off x="1683385" y="5982970"/>
-            <a:ext cx="7766050" cy="645160"/>
-          </a:xfrm>
-          <a:prstGeom prst="rect">
-            <a:avLst/>
-          </a:prstGeom>
-          <a:noFill/>
-        </p:spPr>
-        <p:txBody>
-          <a:bodyPr wrap="square" rtlCol="0">
-            <a:spAutoFit/>
-          </a:bodyPr>
-          <a:lstStyle/>
-          <a:p>
-            <a:r>
-              <a:rPr lang="en-US"/>
-              <a:t>Plot</a:t>
-            </a:r>
-          </a:p>
-          <a:p>
-            <a:r>
-              <a:rPr lang="en-US"/>
-              <a:t>1) x axis time (yyyy-mm) : y axis (OCR + (Labour force status))</a:t>
-            </a:r>
-          </a:p>
-        </p:txBody>
-      </p:sp>
-      <p:sp>
-        <p:nvSpPr>
-          <p:cNvPr id="5" name="Text Box 4"/>
-          <p:cNvSpPr txBox="1"/>
-          <p:nvPr/>
-        </p:nvSpPr>
-        <p:spPr>
-          <a:xfrm>
-            <a:off x="826135" y="1765935"/>
-            <a:ext cx="2199640" cy="2030095"/>
-          </a:xfrm>
-          <a:prstGeom prst="rect">
-            <a:avLst/>
-          </a:prstGeom>
-          <a:noFill/>
-        </p:spPr>
-        <p:txBody>
-          <a:bodyPr wrap="square" rtlCol="0">
-            <a:spAutoFit/>
-          </a:bodyPr>
-          <a:lstStyle/>
-          <a:p>
-            <a:r>
-              <a:rPr lang="en-US"/>
-              <a:t>In this chart, it is observable that as OCR increase, in a few months time, the unemployment rate has also increased. </a:t>
-            </a:r>
-          </a:p>
-        </p:txBody>
-      </p:sp>
     </p:spTree>
   </p:cSld>
   <p:clrMapOvr>
@@ -4942,17 +5812,6 @@
 <file path=ppt/slides/slide19.xml><?xml version="1.0" encoding="utf-8"?>
 <p:sld xmlns:a="http://schemas.openxmlformats.org/drawingml/2006/main" xmlns:r="http://schemas.openxmlformats.org/officeDocument/2006/relationships" xmlns:p="http://schemas.openxmlformats.org/presentationml/2006/main">
   <p:cSld>
-    <p:bg>
-      <p:bgPr>
-        <a:blipFill>
-          <a:blip r:embed="rId2"/>
-          <a:stretch>
-            <a:fillRect/>
-          </a:stretch>
-        </a:blipFill>
-        <a:effectLst/>
-      </p:bgPr>
-    </p:bg>
     <p:spTree>
       <p:nvGrpSpPr>
         <p:cNvPr id="1" name=""/>
@@ -4984,404 +5843,61 @@
           <a:p>
             <a:r>
               <a:rPr lang="en-US"/>
-              <a:t>Charts Generated </a:t>
-            </a:r>
-          </a:p>
-        </p:txBody>
-      </p:sp>
-      <p:pic>
-        <p:nvPicPr>
-          <p:cNvPr id="4" name="Content Placeholder 3"/>
-          <p:cNvPicPr>
-            <a:picLocks noGrp="1" noChangeAspect="1"/>
-          </p:cNvPicPr>
+              <a:t>Conclusions</a:t>
+            </a:r>
+            <a:endParaRPr lang="en-US"/>
+          </a:p>
+        </p:txBody>
+      </p:sp>
+      <p:sp>
+        <p:nvSpPr>
+          <p:cNvPr id="3" name="Content Placeholder 2"/>
+          <p:cNvSpPr>
+            <a:spLocks noGrp="1"/>
+          </p:cNvSpPr>
           <p:nvPr>
             <p:ph sz="half" idx="1"/>
           </p:nvPr>
-        </p:nvPicPr>
-        <p:blipFill>
-          <a:blip r:embed="rId2"/>
-          <a:stretch>
-            <a:fillRect/>
-          </a:stretch>
-        </p:blipFill>
+        </p:nvSpPr>
         <p:spPr>
           <a:xfrm>
-            <a:off x="609600" y="1494790"/>
-            <a:ext cx="2371090" cy="1822450"/>
-          </a:xfrm>
-          <a:prstGeom prst="rect">
-            <a:avLst/>
-          </a:prstGeom>
-        </p:spPr>
-      </p:pic>
-      <p:pic>
-        <p:nvPicPr>
-          <p:cNvPr id="5" name="Content Placeholder 3"/>
-          <p:cNvPicPr>
-            <a:picLocks noChangeAspect="1"/>
-          </p:cNvPicPr>
-          <p:nvPr/>
-        </p:nvPicPr>
-        <p:blipFill>
-          <a:blip r:embed="rId2"/>
-          <a:stretch>
-            <a:fillRect/>
-          </a:stretch>
-        </p:blipFill>
-        <p:spPr>
-          <a:xfrm>
-            <a:off x="3606165" y="3836035"/>
-            <a:ext cx="3176270" cy="2441575"/>
-          </a:xfrm>
-          <a:prstGeom prst="rect">
-            <a:avLst/>
-          </a:prstGeom>
-          <a:noFill/>
-          <a:ln w="9525">
-            <a:noFill/>
-          </a:ln>
-        </p:spPr>
-      </p:pic>
-      <p:pic>
-        <p:nvPicPr>
-          <p:cNvPr id="6" name="Content Placeholder 3"/>
-          <p:cNvPicPr>
-            <a:picLocks noChangeAspect="1"/>
-          </p:cNvPicPr>
-          <p:nvPr/>
-        </p:nvPicPr>
-        <p:blipFill>
-          <a:blip r:embed="rId2"/>
-          <a:stretch>
-            <a:fillRect/>
-          </a:stretch>
-        </p:blipFill>
-        <p:spPr>
-          <a:xfrm>
-            <a:off x="7388860" y="4064000"/>
-            <a:ext cx="2947035" cy="2265680"/>
-          </a:xfrm>
-          <a:prstGeom prst="rect">
-            <a:avLst/>
-          </a:prstGeom>
-          <a:noFill/>
-          <a:ln w="9525">
-            <a:noFill/>
-          </a:ln>
-        </p:spPr>
-      </p:pic>
-      <p:pic>
-        <p:nvPicPr>
-          <p:cNvPr id="7" name="Content Placeholder 3"/>
-          <p:cNvPicPr>
-            <a:picLocks noChangeAspect="1"/>
-          </p:cNvPicPr>
-          <p:nvPr/>
-        </p:nvPicPr>
-        <p:blipFill>
-          <a:blip r:embed="rId2"/>
-          <a:stretch>
-            <a:fillRect/>
-          </a:stretch>
-        </p:blipFill>
-        <p:spPr>
-          <a:xfrm>
-            <a:off x="7608570" y="1313815"/>
-            <a:ext cx="3577590" cy="2750185"/>
-          </a:xfrm>
-          <a:prstGeom prst="rect">
-            <a:avLst/>
-          </a:prstGeom>
-          <a:noFill/>
-          <a:ln w="9525">
-            <a:noFill/>
-          </a:ln>
-        </p:spPr>
-      </p:pic>
-      <p:sp>
-        <p:nvSpPr>
-          <p:cNvPr id="8" name="Text Box 7"/>
-          <p:cNvSpPr txBox="1"/>
-          <p:nvPr/>
-        </p:nvSpPr>
-        <p:spPr>
-          <a:xfrm>
-            <a:off x="433070" y="969645"/>
-            <a:ext cx="3004820" cy="275590"/>
-          </a:xfrm>
-          <a:prstGeom prst="rect">
-            <a:avLst/>
-          </a:prstGeom>
-          <a:noFill/>
-        </p:spPr>
-        <p:txBody>
-          <a:bodyPr wrap="square" rtlCol="0">
-            <a:spAutoFit/>
-          </a:bodyPr>
-          <a:lstStyle/>
-          <a:p>
-            <a:r>
-              <a:rPr lang="en-US" sz="1200"/>
-              <a:t>3) Correlation between “OCR” and CPI</a:t>
-            </a:r>
-          </a:p>
-        </p:txBody>
-      </p:sp>
-      <p:sp>
-        <p:nvSpPr>
-          <p:cNvPr id="9" name="Text Box 8"/>
-          <p:cNvSpPr txBox="1"/>
-          <p:nvPr/>
-        </p:nvSpPr>
-        <p:spPr>
-          <a:xfrm>
-            <a:off x="3839210" y="1038225"/>
-            <a:ext cx="3004820" cy="275590"/>
-          </a:xfrm>
-          <a:prstGeom prst="rect">
-            <a:avLst/>
-          </a:prstGeom>
-          <a:noFill/>
-        </p:spPr>
-        <p:txBody>
-          <a:bodyPr wrap="square" rtlCol="0">
-            <a:spAutoFit/>
-          </a:bodyPr>
-          <a:lstStyle/>
-          <a:p>
-            <a:r>
-              <a:rPr lang="en-US" sz="1200"/>
-              <a:t>4) Correlation between “CPI” and HPI</a:t>
-            </a:r>
-          </a:p>
-        </p:txBody>
-      </p:sp>
-      <p:sp>
-        <p:nvSpPr>
-          <p:cNvPr id="10" name="Text Box 9"/>
-          <p:cNvSpPr txBox="1"/>
-          <p:nvPr/>
-        </p:nvSpPr>
-        <p:spPr>
-          <a:xfrm>
-            <a:off x="7733030" y="946150"/>
-            <a:ext cx="3004820" cy="460375"/>
-          </a:xfrm>
-          <a:prstGeom prst="rect">
-            <a:avLst/>
-          </a:prstGeom>
-          <a:noFill/>
-        </p:spPr>
-        <p:txBody>
-          <a:bodyPr wrap="square" rtlCol="0">
-            <a:spAutoFit/>
-          </a:bodyPr>
-          <a:lstStyle/>
-          <a:p>
-            <a:r>
-              <a:rPr lang="en-US" sz="1200"/>
-              <a:t>5) Correlation between “OCR” and Exchange Rate NZD VS. USD</a:t>
-            </a:r>
-          </a:p>
-        </p:txBody>
-      </p:sp>
-      <p:sp>
-        <p:nvSpPr>
-          <p:cNvPr id="11" name="Text Box 10"/>
-          <p:cNvSpPr txBox="1"/>
-          <p:nvPr/>
-        </p:nvSpPr>
-        <p:spPr>
-          <a:xfrm>
-            <a:off x="1998980" y="6383020"/>
-            <a:ext cx="3004820" cy="275590"/>
-          </a:xfrm>
-          <a:prstGeom prst="rect">
-            <a:avLst/>
-          </a:prstGeom>
-          <a:noFill/>
-        </p:spPr>
-        <p:txBody>
-          <a:bodyPr wrap="square" rtlCol="0">
-            <a:spAutoFit/>
-          </a:bodyPr>
-          <a:lstStyle/>
-          <a:p>
-            <a:r>
-              <a:rPr lang="en-US" sz="1200"/>
-              <a:t>6) Correlation between “OCR” and CPI</a:t>
-            </a:r>
-          </a:p>
-        </p:txBody>
-      </p:sp>
-      <p:sp>
-        <p:nvSpPr>
-          <p:cNvPr id="12" name="Text Box 11"/>
-          <p:cNvSpPr txBox="1"/>
-          <p:nvPr/>
-        </p:nvSpPr>
-        <p:spPr>
-          <a:xfrm>
-            <a:off x="6844030" y="6290945"/>
-            <a:ext cx="3004820" cy="460375"/>
-          </a:xfrm>
-          <a:prstGeom prst="rect">
-            <a:avLst/>
-          </a:prstGeom>
-          <a:noFill/>
-        </p:spPr>
-        <p:txBody>
-          <a:bodyPr wrap="square" rtlCol="0">
-            <a:spAutoFit/>
-          </a:bodyPr>
-          <a:lstStyle/>
-          <a:p>
-            <a:r>
-              <a:rPr lang="en-US" sz="1200"/>
-              <a:t>7) Correlation between “OCR” and “State Highway Traffic Volumns”</a:t>
-            </a:r>
-          </a:p>
-        </p:txBody>
-      </p:sp>
-      <p:sp>
-        <p:nvSpPr>
-          <p:cNvPr id="14" name="Text Box 13"/>
-          <p:cNvSpPr txBox="1"/>
-          <p:nvPr/>
-        </p:nvSpPr>
-        <p:spPr>
-          <a:xfrm>
-            <a:off x="419100" y="3714750"/>
-            <a:ext cx="1333500" cy="2399665"/>
-          </a:xfrm>
-          <a:prstGeom prst="rect">
-            <a:avLst/>
-          </a:prstGeom>
-          <a:noFill/>
-        </p:spPr>
-        <p:txBody>
-          <a:bodyPr wrap="square" rtlCol="0">
-            <a:spAutoFit/>
-          </a:bodyPr>
-          <a:lstStyle/>
-          <a:p>
-            <a:r>
-              <a:rPr lang="en-US" sz="1000"/>
-              <a:t>3) x axis (OCR from low to high value) : y axis (CPI from low to high value) </a:t>
-            </a:r>
-          </a:p>
-          <a:p>
-            <a:r>
-              <a:rPr lang="en-US" sz="1000"/>
-              <a:t>[cut in the Official Cash Rate (OCR) leads to an increase in inflation and GDP growth]</a:t>
-            </a:r>
-          </a:p>
-          <a:p>
-            <a:r>
-              <a:rPr lang="en-US" sz="1000"/>
-              <a:t>[References : https://www.rbnz.govt.nz/-/media/d0024c4168944dc6a502b497cdd5d46c.ashx]</a:t>
-            </a:r>
-          </a:p>
-        </p:txBody>
-      </p:sp>
-      <p:pic>
-        <p:nvPicPr>
-          <p:cNvPr id="103" name="Content Placeholder 102"/>
-          <p:cNvPicPr>
-            <a:picLocks noGrp="1"/>
-          </p:cNvPicPr>
-          <p:nvPr>
-            <p:ph sz="half" idx="2"/>
-          </p:nvPr>
-        </p:nvPicPr>
-        <p:blipFill>
-          <a:blip r:embed="rId3"/>
-          <a:stretch>
-            <a:fillRect/>
-          </a:stretch>
-        </p:blipFill>
-        <p:spPr>
-          <a:xfrm>
-            <a:off x="3839210" y="1405890"/>
-            <a:ext cx="3281045" cy="2324735"/>
-          </a:xfrm>
-          <a:prstGeom prst="rect">
-            <a:avLst/>
-          </a:prstGeom>
-          <a:noFill/>
-          <a:ln w="9525">
-            <a:noFill/>
-          </a:ln>
-        </p:spPr>
-      </p:pic>
-      <p:sp>
-        <p:nvSpPr>
-          <p:cNvPr id="16" name="Text Box 15"/>
-          <p:cNvSpPr txBox="1"/>
-          <p:nvPr/>
-        </p:nvSpPr>
-        <p:spPr>
-          <a:xfrm>
-            <a:off x="2463800" y="3418840"/>
-            <a:ext cx="4799965" cy="275590"/>
-          </a:xfrm>
-          <a:prstGeom prst="rect">
-            <a:avLst/>
-          </a:prstGeom>
-          <a:noFill/>
-        </p:spPr>
-        <p:txBody>
-          <a:bodyPr wrap="square" rtlCol="0" anchor="t">
-            <a:spAutoFit/>
-          </a:bodyPr>
-          <a:lstStyle/>
-          <a:p>
-            <a:r>
-              <a:rPr lang="en-US" sz="1200"/>
-              <a:t>https://www.bankingstrategist.com/housing-prices-hpi-vs-cpi</a:t>
-            </a:r>
-          </a:p>
-        </p:txBody>
-      </p:sp>
-      <p:sp>
-        <p:nvSpPr>
-          <p:cNvPr id="17" name="Text Box 16"/>
-          <p:cNvSpPr txBox="1"/>
-          <p:nvPr/>
-        </p:nvSpPr>
-        <p:spPr>
-          <a:xfrm>
-            <a:off x="10593705" y="1610360"/>
-            <a:ext cx="978535" cy="2553335"/>
-          </a:xfrm>
-          <a:prstGeom prst="rect">
-            <a:avLst/>
-          </a:prstGeom>
-          <a:noFill/>
-        </p:spPr>
-        <p:txBody>
-          <a:bodyPr wrap="square" rtlCol="0">
-            <a:spAutoFit/>
-          </a:bodyPr>
-          <a:lstStyle/>
-          <a:p>
-            <a:r>
-              <a:rPr lang="en-US" sz="800"/>
-              <a:t>[If we raise the OCR, banks' interest rates also tend to increase and vice versa. </a:t>
-            </a:r>
-          </a:p>
-          <a:p>
-            <a:r>
-              <a:rPr lang="en-US" sz="800"/>
-              <a:t>This is because the OCR influences the banks' costs, so as with any business, changes in costs are passed on in their prices. </a:t>
-            </a:r>
-          </a:p>
-          <a:p>
-            <a:r>
-              <a:rPr lang="en-US" sz="800"/>
-              <a:t>A decrease in banks' interest rates usually results in people spending more.]</a:t>
-            </a:r>
+            <a:off x="609600" y="1174750"/>
+            <a:ext cx="5384800" cy="5375275"/>
+          </a:xfrm>
+        </p:spPr>
+        <p:txBody>
+          <a:bodyPr/>
+          <a:lstStyle/>
+          <a:p>
+            <a:r>
+              <a:rPr lang="en-US" sz="1800"/>
+              <a:t>Based on the data we have collected as well as what subsequent plots generated based on that.  The following insights have been reviewed. </a:t>
+            </a:r>
+            <a:endParaRPr lang="en-US" sz="1800"/>
+          </a:p>
+          <a:p>
+            <a:pPr lvl="1"/>
+            <a:r>
+              <a:rPr lang="en-US" sz="1600"/>
+              <a:t>As New Zealand Reserve Bank sets its interest rate up, various business will have difficult of getting cheap loans for further development, therefore business activities have been reduced, which leads to increase of unemployment and reduction of traffic. </a:t>
+            </a:r>
+            <a:endParaRPr lang="en-US" sz="1600"/>
+          </a:p>
+          <a:p>
+            <a:pPr lvl="1"/>
+            <a:r>
+              <a:rPr lang="en-US" sz="1600"/>
+              <a:t>On the other hand, increase of Reserve Bank interest rate will attract oversea hot money for short term investment, therefore it is anticipated that exchange rate of New Zealand dollars VS. Other currency will go up. The high Reserve bank interest rate will lead to lower level of economic activities, hence in term of cargo freight statistics, general vehicle activities and tourism account, we have observed dropping in these activities.</a:t>
+            </a:r>
+            <a:endParaRPr lang="en-US" sz="1600"/>
+          </a:p>
+          <a:p>
+            <a:pPr lvl="1"/>
+            <a:r>
+              <a:rPr lang="en-US" sz="1600"/>
+              <a:t>However, Reserve Bank raise interest rate usually to combat high inflation rate (CPI), therefore, we should be expecting dropping of the CPI.</a:t>
+            </a:r>
+            <a:endParaRPr lang="en-US" sz="1600"/>
           </a:p>
         </p:txBody>
       </p:sp>
@@ -5429,6 +5945,7 @@
               <a:rPr lang="en-US"/>
               <a:t>Background</a:t>
             </a:r>
+            <a:endParaRPr lang="en-US"/>
           </a:p>
         </p:txBody>
       </p:sp>
@@ -5451,6 +5968,7 @@
               <a:rPr lang="en-US"/>
               <a:t>Turbluent International Market caused by political uneasying and COVID-19</a:t>
             </a:r>
+            <a:endParaRPr lang="en-US"/>
           </a:p>
           <a:p>
             <a:endParaRPr lang="en-US"/>
@@ -5468,7 +5986,7 @@
           </p:nvPr>
         </p:nvPicPr>
         <p:blipFill>
-          <a:blip r:embed="rId3"/>
+          <a:blip r:embed="rId1"/>
           <a:stretch>
             <a:fillRect/>
           </a:stretch>
@@ -5494,7 +6012,7 @@
           <p:nvPr/>
         </p:nvPicPr>
         <p:blipFill>
-          <a:blip r:embed="rId4"/>
+          <a:blip r:embed="rId2"/>
           <a:stretch>
             <a:fillRect/>
           </a:stretch>
@@ -5520,7 +6038,7 @@
           <p:nvPr/>
         </p:nvPicPr>
         <p:blipFill>
-          <a:blip r:embed="rId5"/>
+          <a:blip r:embed="rId3"/>
           <a:stretch>
             <a:fillRect/>
           </a:stretch>
@@ -5566,257 +6084,6 @@
       </p:grpSpPr>
       <p:sp>
         <p:nvSpPr>
-          <p:cNvPr id="2" name="Title 1"/>
-          <p:cNvSpPr>
-            <a:spLocks noGrp="1"/>
-          </p:cNvSpPr>
-          <p:nvPr>
-            <p:ph type="title"/>
-          </p:nvPr>
-        </p:nvSpPr>
-        <p:spPr/>
-        <p:txBody>
-          <a:bodyPr/>
-          <a:lstStyle/>
-          <a:p>
-            <a:r>
-              <a:rPr lang="en-US"/>
-              <a:t>How does Interest Rate Impact HPI</a:t>
-            </a:r>
-          </a:p>
-        </p:txBody>
-      </p:sp>
-      <p:pic>
-        <p:nvPicPr>
-          <p:cNvPr id="7" name="Content Placeholder 6"/>
-          <p:cNvPicPr>
-            <a:picLocks noGrp="1" noChangeAspect="1"/>
-          </p:cNvPicPr>
-          <p:nvPr>
-            <p:ph idx="1"/>
-          </p:nvPr>
-        </p:nvPicPr>
-        <p:blipFill>
-          <a:blip r:embed="rId2"/>
-          <a:stretch>
-            <a:fillRect/>
-          </a:stretch>
-        </p:blipFill>
-        <p:spPr>
-          <a:xfrm>
-            <a:off x="4513580" y="1154430"/>
-            <a:ext cx="7442200" cy="4953000"/>
-          </a:xfrm>
-          <a:prstGeom prst="rect">
-            <a:avLst/>
-          </a:prstGeom>
-        </p:spPr>
-      </p:pic>
-      <p:sp>
-        <p:nvSpPr>
-          <p:cNvPr id="8" name="Text Box 7"/>
-          <p:cNvSpPr txBox="1"/>
-          <p:nvPr/>
-        </p:nvSpPr>
-        <p:spPr>
-          <a:xfrm>
-            <a:off x="301625" y="1176655"/>
-            <a:ext cx="3818255" cy="922020"/>
-          </a:xfrm>
-          <a:prstGeom prst="rect">
-            <a:avLst/>
-          </a:prstGeom>
-          <a:noFill/>
-        </p:spPr>
-        <p:txBody>
-          <a:bodyPr wrap="square" rtlCol="0">
-            <a:spAutoFit/>
-          </a:bodyPr>
-          <a:lstStyle/>
-          <a:p>
-            <a:r>
-              <a:rPr lang="en-US"/>
-              <a:t>How does Interest Rate of Reserver Bank of New Zealand Impact on house price index (HPI )</a:t>
-            </a:r>
-          </a:p>
-        </p:txBody>
-      </p:sp>
-    </p:spTree>
-  </p:cSld>
-  <p:clrMapOvr>
-    <a:masterClrMapping/>
-  </p:clrMapOvr>
-</p:sld>
-</file>
-
-<file path=ppt/slides/slide21.xml><?xml version="1.0" encoding="utf-8"?>
-<p:sld xmlns:a="http://schemas.openxmlformats.org/drawingml/2006/main" xmlns:r="http://schemas.openxmlformats.org/officeDocument/2006/relationships" xmlns:p="http://schemas.openxmlformats.org/presentationml/2006/main">
-  <p:cSld>
-    <p:spTree>
-      <p:nvGrpSpPr>
-        <p:cNvPr id="1" name=""/>
-        <p:cNvGrpSpPr/>
-        <p:nvPr/>
-      </p:nvGrpSpPr>
-      <p:grpSpPr>
-        <a:xfrm>
-          <a:off x="0" y="0"/>
-          <a:ext cx="0" cy="0"/>
-          <a:chOff x="0" y="0"/>
-          <a:chExt cx="0" cy="0"/>
-        </a:xfrm>
-      </p:grpSpPr>
-      <p:sp>
-        <p:nvSpPr>
-          <p:cNvPr id="2" name="Title 1"/>
-          <p:cNvSpPr>
-            <a:spLocks noGrp="1"/>
-          </p:cNvSpPr>
-          <p:nvPr>
-            <p:ph type="title"/>
-          </p:nvPr>
-        </p:nvSpPr>
-        <p:spPr/>
-        <p:txBody>
-          <a:bodyPr/>
-          <a:lstStyle/>
-          <a:p>
-            <a:r>
-              <a:rPr lang="en-US"/>
-              <a:t>Conclusions</a:t>
-            </a:r>
-          </a:p>
-        </p:txBody>
-      </p:sp>
-      <p:sp>
-        <p:nvSpPr>
-          <p:cNvPr id="3" name="Content Placeholder 2"/>
-          <p:cNvSpPr>
-            <a:spLocks noGrp="1"/>
-          </p:cNvSpPr>
-          <p:nvPr>
-            <p:ph sz="half" idx="1"/>
-          </p:nvPr>
-        </p:nvSpPr>
-        <p:spPr>
-          <a:xfrm>
-            <a:off x="609600" y="1174750"/>
-            <a:ext cx="5384800" cy="5375275"/>
-          </a:xfrm>
-        </p:spPr>
-        <p:txBody>
-          <a:bodyPr/>
-          <a:lstStyle/>
-          <a:p>
-            <a:r>
-              <a:rPr lang="en-US" sz="1800"/>
-              <a:t>Based on the data we have collected as well as what subsequent plots generated based on that.  The following insights have been reviewed. </a:t>
-            </a:r>
-          </a:p>
-          <a:p>
-            <a:pPr lvl="1"/>
-            <a:r>
-              <a:rPr lang="en-US" sz="1600"/>
-              <a:t>As New Zealand Reserve Bank sets its interest rate up, various business will have difficult of getting cheap loans for further development, therefore business activities have been reduced, which leads to increase of unemployment. </a:t>
-            </a:r>
-          </a:p>
-          <a:p>
-            <a:pPr lvl="1"/>
-            <a:r>
-              <a:rPr lang="en-US" sz="1600"/>
-              <a:t>On the other hand, increase of Reserve Bank interest rate will attract oversea hot money for short term investment, therefore it is anticipated that exchange rate of New Zealand dollars VS. Other currency will go up. The high Reserve bank interest rate will lead to lower level of economic activities, hence in term of cargo freight statistics, general vehicle activities and tourism account, we are anticipating dropping in these activities.</a:t>
-            </a:r>
-          </a:p>
-          <a:p>
-            <a:pPr lvl="1"/>
-            <a:r>
-              <a:rPr lang="en-US" sz="1600"/>
-              <a:t>However, Reserve Bank raise interest rate usually to combat high inflation rate (CPI), therefore, we should be expecting dropping of the CPI.</a:t>
-            </a:r>
-          </a:p>
-        </p:txBody>
-      </p:sp>
-      <p:pic>
-        <p:nvPicPr>
-          <p:cNvPr id="103" name="Content Placeholder 102"/>
-          <p:cNvPicPr>
-            <a:picLocks noGrp="1"/>
-          </p:cNvPicPr>
-          <p:nvPr>
-            <p:ph sz="half" idx="2"/>
-          </p:nvPr>
-        </p:nvPicPr>
-        <p:blipFill>
-          <a:blip r:embed="rId3"/>
-          <a:stretch>
-            <a:fillRect/>
-          </a:stretch>
-        </p:blipFill>
-        <p:spPr>
-          <a:xfrm>
-            <a:off x="6197600" y="1174750"/>
-            <a:ext cx="5922010" cy="2874645"/>
-          </a:xfrm>
-          <a:prstGeom prst="rect">
-            <a:avLst/>
-          </a:prstGeom>
-          <a:noFill/>
-          <a:ln w="9525">
-            <a:noFill/>
-          </a:ln>
-        </p:spPr>
-      </p:pic>
-      <p:pic>
-        <p:nvPicPr>
-          <p:cNvPr id="4" name="Picture 3"/>
-          <p:cNvPicPr>
-            <a:picLocks noChangeAspect="1"/>
-          </p:cNvPicPr>
-          <p:nvPr/>
-        </p:nvPicPr>
-        <p:blipFill>
-          <a:blip r:embed="rId4"/>
-          <a:stretch>
-            <a:fillRect/>
-          </a:stretch>
-        </p:blipFill>
-        <p:spPr>
-          <a:xfrm>
-            <a:off x="6410960" y="4076700"/>
-            <a:ext cx="4133850" cy="2781300"/>
-          </a:xfrm>
-          <a:prstGeom prst="rect">
-            <a:avLst/>
-          </a:prstGeom>
-        </p:spPr>
-      </p:pic>
-    </p:spTree>
-  </p:cSld>
-  <p:clrMapOvr>
-    <a:masterClrMapping/>
-  </p:clrMapOvr>
-</p:sld>
-</file>
-
-<file path=ppt/slides/slide22.xml><?xml version="1.0" encoding="utf-8"?>
-<p:sld xmlns:a="http://schemas.openxmlformats.org/drawingml/2006/main" xmlns:r="http://schemas.openxmlformats.org/officeDocument/2006/relationships" xmlns:p="http://schemas.openxmlformats.org/presentationml/2006/main">
-  <p:cSld>
-    <p:spTree>
-      <p:nvGrpSpPr>
-        <p:cNvPr id="1" name=""/>
-        <p:cNvGrpSpPr/>
-        <p:nvPr/>
-      </p:nvGrpSpPr>
-      <p:grpSpPr>
-        <a:xfrm>
-          <a:off x="0" y="0"/>
-          <a:ext cx="0" cy="0"/>
-          <a:chOff x="0" y="0"/>
-          <a:chExt cx="0" cy="0"/>
-        </a:xfrm>
-      </p:grpSpPr>
-      <p:sp>
-        <p:nvSpPr>
           <p:cNvPr id="5" name="Title 4"/>
           <p:cNvSpPr>
             <a:spLocks noGrp="1"/>
@@ -5855,6 +6122,7 @@
               <a:rPr lang="en-US" sz="1800"/>
               <a:t>When the economic activities are low and unemployment rate is high </a:t>
             </a:r>
+            <a:endParaRPr lang="en-US" sz="1800"/>
           </a:p>
           <a:p>
             <a:pPr lvl="1"/>
@@ -5870,6 +6138,7 @@
               <a:rPr lang="en-US" sz="1600"/>
               <a:t>. </a:t>
             </a:r>
+            <a:endParaRPr lang="en-US" sz="1600"/>
           </a:p>
           <a:p>
             <a:pPr lvl="1"/>
@@ -5893,6 +6162,7 @@
               <a:rPr lang="en-US" sz="1600"/>
               <a:t>. Thus make export of our products cheaper, therefore attracts more oversea orders, subsequently we should be able to observe an increase of freight transportation activities, oversea passage flights. </a:t>
             </a:r>
+            <a:endParaRPr lang="en-US" sz="1600"/>
           </a:p>
           <a:p>
             <a:pPr lvl="1"/>
@@ -5900,6 +6170,7 @@
               <a:rPr lang="en-US" sz="1600"/>
               <a:t>To stimulate general economic growth, government usually starts major infrastructural projects like major road works, etc. Hence it is also anticipated that general road construction activities are increasing.</a:t>
             </a:r>
+            <a:endParaRPr lang="en-US" sz="1600"/>
           </a:p>
         </p:txBody>
       </p:sp>
@@ -5914,7 +6185,7 @@
           </p:nvPr>
         </p:nvPicPr>
         <p:blipFill>
-          <a:blip r:embed="rId2"/>
+          <a:blip r:embed="rId1"/>
           <a:stretch>
             <a:fillRect/>
           </a:stretch>
@@ -5955,6 +6226,7 @@
               <a:rPr lang="en-US" sz="1400"/>
               <a:t>https://www.treasury.govt.nz/publications/weu/weekly-economic-update-17-april-2020-html</a:t>
             </a:r>
+            <a:endParaRPr lang="en-US" sz="1400"/>
           </a:p>
         </p:txBody>
       </p:sp>
@@ -6002,6 +6274,7 @@
               <a:rPr lang="en-US"/>
               <a:t>NZ monteary policy impacting the economic</a:t>
             </a:r>
+            <a:endParaRPr lang="en-US"/>
           </a:p>
         </p:txBody>
       </p:sp>
@@ -6024,12 +6297,14 @@
               <a:rPr lang="en-US"/>
               <a:t>Using reserve bank interest rate / official cash rate</a:t>
             </a:r>
+            <a:endParaRPr lang="en-US"/>
           </a:p>
           <a:p>
             <a:r>
               <a:rPr lang="en-US"/>
               <a:t>CPI...</a:t>
             </a:r>
+            <a:endParaRPr lang="en-US"/>
           </a:p>
         </p:txBody>
       </p:sp>
@@ -6063,16 +6338,49 @@
             <a:endParaRPr lang="en-US"/>
           </a:p>
           <a:p>
+            <a:endParaRPr lang="en-US"/>
+          </a:p>
+          <a:p>
+            <a:endParaRPr lang="en-US"/>
+          </a:p>
+          <a:p>
             <a:r>
               <a:rPr lang="en-US"/>
               <a:t>Stimulate the economy</a:t>
             </a:r>
+            <a:endParaRPr lang="en-US"/>
           </a:p>
         </p:txBody>
       </p:sp>
       <p:pic>
         <p:nvPicPr>
           <p:cNvPr id="100" name="Picture 99"/>
+          <p:cNvPicPr/>
+          <p:nvPr/>
+        </p:nvPicPr>
+        <p:blipFill>
+          <a:blip r:embed="rId1"/>
+          <a:stretch>
+            <a:fillRect/>
+          </a:stretch>
+        </p:blipFill>
+        <p:spPr>
+          <a:xfrm>
+            <a:off x="2258060" y="3041015"/>
+            <a:ext cx="3831590" cy="2862580"/>
+          </a:xfrm>
+          <a:prstGeom prst="rect">
+            <a:avLst/>
+          </a:prstGeom>
+          <a:noFill/>
+          <a:ln w="9525">
+            <a:noFill/>
+          </a:ln>
+        </p:spPr>
+      </p:pic>
+      <p:pic>
+        <p:nvPicPr>
+          <p:cNvPr id="101" name="Picture 100"/>
           <p:cNvPicPr/>
           <p:nvPr/>
         </p:nvPicPr>
@@ -6084,33 +6392,7 @@
         </p:blipFill>
         <p:spPr>
           <a:xfrm>
-            <a:off x="2258060" y="3041015"/>
-            <a:ext cx="3831590" cy="2862580"/>
-          </a:xfrm>
-          <a:prstGeom prst="rect">
-            <a:avLst/>
-          </a:prstGeom>
-          <a:noFill/>
-          <a:ln w="9525">
-            <a:noFill/>
-          </a:ln>
-        </p:spPr>
-      </p:pic>
-      <p:pic>
-        <p:nvPicPr>
-          <p:cNvPr id="101" name="Picture 100"/>
-          <p:cNvPicPr/>
-          <p:nvPr/>
-        </p:nvPicPr>
-        <p:blipFill>
-          <a:blip r:embed="rId3"/>
-          <a:stretch>
-            <a:fillRect/>
-          </a:stretch>
-        </p:blipFill>
-        <p:spPr>
-          <a:xfrm>
-            <a:off x="7324725" y="1174750"/>
+            <a:off x="6943090" y="1375410"/>
             <a:ext cx="3508375" cy="2917190"/>
           </a:xfrm>
           <a:prstGeom prst="rect">
@@ -6166,6 +6448,7 @@
               <a:rPr lang="en-US"/>
               <a:t>What do we want to collect</a:t>
             </a:r>
+            <a:endParaRPr lang="en-US"/>
           </a:p>
         </p:txBody>
       </p:sp>
@@ -6188,6 +6471,7 @@
               <a:rPr lang="en-US" sz="2800"/>
               <a:t>Historical economical activity data for New Zeland</a:t>
             </a:r>
+            <a:endParaRPr lang="en-US" sz="2800"/>
           </a:p>
           <a:p>
             <a:pPr lvl="1"/>
@@ -6195,6 +6479,7 @@
               <a:rPr lang="en-US" sz="2400"/>
               <a:t>Transporation (Air, Land...)</a:t>
             </a:r>
+            <a:endParaRPr lang="en-US" sz="2400"/>
           </a:p>
           <a:p>
             <a:pPr lvl="1"/>
@@ -6202,12 +6487,14 @@
               <a:rPr lang="en-US" sz="2400"/>
               <a:t>Employment / Unemployment Rate</a:t>
             </a:r>
+            <a:endParaRPr lang="en-US" sz="2400"/>
           </a:p>
           <a:p>
             <a:r>
               <a:rPr lang="en-US" sz="2800"/>
               <a:t>Economical policy data of New Zealand Government</a:t>
             </a:r>
+            <a:endParaRPr lang="en-US" sz="2800"/>
           </a:p>
           <a:p>
             <a:pPr lvl="1"/>
@@ -6215,6 +6502,7 @@
               <a:rPr lang="en-US" sz="2400"/>
               <a:t>Interest rate</a:t>
             </a:r>
+            <a:endParaRPr lang="en-US" sz="2400"/>
           </a:p>
           <a:p>
             <a:pPr lvl="1"/>
@@ -6222,6 +6510,7 @@
               <a:rPr lang="en-US" sz="2400"/>
               <a:t>CPI</a:t>
             </a:r>
+            <a:endParaRPr lang="en-US" sz="2400"/>
           </a:p>
           <a:p>
             <a:pPr lvl="1"/>
@@ -6229,6 +6518,7 @@
               <a:rPr lang="en-US" sz="2400"/>
               <a:t>HPI (optional)</a:t>
             </a:r>
+            <a:endParaRPr lang="en-US" sz="2400"/>
           </a:p>
           <a:p>
             <a:pPr lvl="1"/>
@@ -6236,14 +6526,73 @@
               <a:rPr lang="en-US" sz="2400"/>
               <a:t>Exchange Rate</a:t>
             </a:r>
+            <a:endParaRPr lang="en-US" sz="2400"/>
+          </a:p>
+        </p:txBody>
+      </p:sp>
+      <p:sp>
+        <p:nvSpPr>
+          <p:cNvPr id="5" name="Text Box 4"/>
+          <p:cNvSpPr txBox="1"/>
+          <p:nvPr/>
+        </p:nvSpPr>
+        <p:spPr>
+          <a:xfrm>
+            <a:off x="3398520" y="972185"/>
+            <a:ext cx="6289040" cy="275590"/>
+          </a:xfrm>
+          <a:prstGeom prst="rect">
+            <a:avLst/>
+          </a:prstGeom>
+          <a:noFill/>
+        </p:spPr>
+        <p:txBody>
+          <a:bodyPr wrap="square" rtlCol="0" anchor="t">
+            <a:spAutoFit/>
+          </a:bodyPr>
+          <a:lstStyle/>
+          <a:p>
+            <a:r>
+              <a:rPr lang="en-US" sz="1200"/>
+              <a:t>https://chartingtransport.com/category/new-zealand-cities/</a:t>
+            </a:r>
+            <a:endParaRPr lang="en-US" sz="1200"/>
           </a:p>
         </p:txBody>
       </p:sp>
       <p:pic>
         <p:nvPicPr>
-          <p:cNvPr id="102" name="Picture 101"/>
+          <p:cNvPr id="106" name="Picture 105"/>
           <p:cNvPicPr/>
           <p:nvPr/>
+        </p:nvPicPr>
+        <p:blipFill>
+          <a:blip r:embed="rId1"/>
+          <a:stretch>
+            <a:fillRect/>
+          </a:stretch>
+        </p:blipFill>
+        <p:spPr>
+          <a:xfrm>
+            <a:off x="7593330" y="1247775"/>
+            <a:ext cx="4190365" cy="2515870"/>
+          </a:xfrm>
+          <a:prstGeom prst="rect">
+            <a:avLst/>
+          </a:prstGeom>
+          <a:noFill/>
+          <a:ln w="9525">
+            <a:noFill/>
+          </a:ln>
+        </p:spPr>
+      </p:pic>
+      <p:pic>
+        <p:nvPicPr>
+          <p:cNvPr id="107" name="Content Placeholder 106"/>
+          <p:cNvPicPr/>
+          <p:nvPr>
+            <p:ph sz="half" idx="2"/>
+          </p:nvPr>
         </p:nvPicPr>
         <p:blipFill>
           <a:blip r:embed="rId2"/>
@@ -6253,8 +6602,8 @@
         </p:blipFill>
         <p:spPr>
           <a:xfrm>
-            <a:off x="6048058" y="1174750"/>
-            <a:ext cx="5534025" cy="2933700"/>
+            <a:off x="5217160" y="4237990"/>
+            <a:ext cx="3541395" cy="2244725"/>
           </a:xfrm>
           <a:prstGeom prst="rect">
             <a:avLst/>
@@ -6265,65 +6614,6 @@
           </a:ln>
         </p:spPr>
       </p:pic>
-      <p:pic>
-        <p:nvPicPr>
-          <p:cNvPr id="104" name="Content Placeholder 103"/>
-          <p:cNvPicPr>
-            <a:picLocks noGrp="1"/>
-          </p:cNvPicPr>
-          <p:nvPr>
-            <p:ph sz="half" idx="2"/>
-          </p:nvPr>
-        </p:nvPicPr>
-        <p:blipFill>
-          <a:blip r:embed="rId3"/>
-          <a:stretch>
-            <a:fillRect/>
-          </a:stretch>
-        </p:blipFill>
-        <p:spPr>
-          <a:xfrm>
-            <a:off x="4331970" y="4046855"/>
-            <a:ext cx="4792345" cy="2811145"/>
-          </a:xfrm>
-          <a:prstGeom prst="rect">
-            <a:avLst/>
-          </a:prstGeom>
-          <a:noFill/>
-          <a:ln w="9525">
-            <a:noFill/>
-          </a:ln>
-        </p:spPr>
-      </p:pic>
-      <p:sp>
-        <p:nvSpPr>
-          <p:cNvPr id="5" name="Text Box 4"/>
-          <p:cNvSpPr txBox="1"/>
-          <p:nvPr/>
-        </p:nvSpPr>
-        <p:spPr>
-          <a:xfrm>
-            <a:off x="3398520" y="972185"/>
-            <a:ext cx="6289040" cy="275590"/>
-          </a:xfrm>
-          <a:prstGeom prst="rect">
-            <a:avLst/>
-          </a:prstGeom>
-          <a:noFill/>
-        </p:spPr>
-        <p:txBody>
-          <a:bodyPr wrap="square" rtlCol="0" anchor="t">
-            <a:spAutoFit/>
-          </a:bodyPr>
-          <a:lstStyle/>
-          <a:p>
-            <a:r>
-              <a:rPr lang="en-US" sz="1200"/>
-              <a:t>https://chartingtransport.com/category/new-zealand-cities/</a:t>
-            </a:r>
-          </a:p>
-        </p:txBody>
-      </p:sp>
     </p:spTree>
   </p:cSld>
   <p:clrMapOvr>
@@ -6368,6 +6658,7 @@
               <a:rPr lang="en-US"/>
               <a:t>Data model</a:t>
             </a:r>
+            <a:endParaRPr lang="en-US"/>
           </a:p>
         </p:txBody>
       </p:sp>
@@ -6397,6 +6688,7 @@
               <a:rPr lang="en-US"/>
               <a:t>Official cash rate / Interest rate</a:t>
             </a:r>
+            <a:endParaRPr lang="en-US"/>
           </a:p>
           <a:p>
             <a:endParaRPr lang="en-US"/>
@@ -6406,6 +6698,7 @@
               <a:rPr lang="en-US" sz="1600"/>
               <a:t>Monetary policy influences economic activity by changing the incentives for saving and investment. This channel typically affects consumption, housing investment and business investment. Lower interest rates on bank deposits reduce the incentives households have to save their money.</a:t>
             </a:r>
+            <a:endParaRPr lang="en-US" sz="1600"/>
           </a:p>
           <a:p>
             <a:endParaRPr lang="en-US" sz="1600"/>
@@ -6415,6 +6708,7 @@
               <a:rPr lang="en-US" sz="1600"/>
               <a:t>In our project, we choose “Reserve bank Interest Rate” as primary monetar policy indicators</a:t>
             </a:r>
+            <a:endParaRPr lang="en-US" sz="1600"/>
           </a:p>
         </p:txBody>
       </p:sp>
@@ -6427,7 +6721,7 @@
           <p:nvPr/>
         </p:nvPicPr>
         <p:blipFill>
-          <a:blip r:embed="rId2"/>
+          <a:blip r:embed="rId1"/>
           <a:stretch>
             <a:fillRect/>
           </a:stretch>
@@ -6501,6 +6795,7 @@
               <a:rPr lang="en-US" sz="2700"/>
               <a:t>(I.e.n what is the intended use of the data, …)</a:t>
             </a:r>
+            <a:endParaRPr lang="en-US" sz="2700"/>
           </a:p>
         </p:txBody>
       </p:sp>
@@ -6523,12 +6818,7 @@
               <a:rPr lang="en-US"/>
               <a:t>Review of the hisotrical economic performance VS. policy</a:t>
             </a:r>
-          </a:p>
-          <a:p>
-            <a:r>
-              <a:rPr lang="en-US"/>
-              <a:t>Potential to build AI / machine learning algorithm for further forecast ... </a:t>
-            </a:r>
+            <a:endParaRPr lang="en-US"/>
           </a:p>
           <a:p>
             <a:pPr marL="0" indent="0">
@@ -6556,6 +6846,7 @@
               <a:rPr lang="en-US" sz="1000"/>
               <a:t> that is used to solve economic recession problem. (Output : collect vital NZ ecnoimic indicators for visualization and try to reveal the potential correlation between these indicators. )</a:t>
             </a:r>
+            <a:endParaRPr lang="en-US" sz="1000"/>
           </a:p>
           <a:p>
             <a:pPr marL="0" indent="0">
@@ -6571,6 +6862,7 @@
               <a:rPr lang="en-US" sz="1000"/>
               <a:t>Critical review of the NZ monetary policy effectiveness. To coupe with covid-19 lockdown and sequence recession, slowing down to dealing. </a:t>
             </a:r>
+            <a:endParaRPr lang="en-US" sz="1000"/>
           </a:p>
           <a:p>
             <a:pPr marL="0" indent="0">
@@ -6590,6 +6882,7 @@
               <a:rPr lang="en-US" sz="1000"/>
               <a:t>: </a:t>
             </a:r>
+            <a:endParaRPr lang="en-US" sz="1000"/>
           </a:p>
           <a:p>
             <a:pPr marL="0" indent="0">
@@ -6599,6 +6892,7 @@
               <a:rPr lang="en-US" sz="1000"/>
               <a:t>The data source we are building is intended to be used for building (visualization) and training prediction model (machine learning) _time series, forecasting . for New Zealand companies. </a:t>
             </a:r>
+            <a:endParaRPr lang="en-US" sz="1000"/>
           </a:p>
           <a:p>
             <a:pPr marL="0" indent="0">
@@ -6614,6 +6908,7 @@
               <a:rPr lang="en-US" sz="1000"/>
               <a:t>The potential user of our datasource are targeted to improve their company efficiency.</a:t>
             </a:r>
+            <a:endParaRPr lang="en-US" sz="1000"/>
           </a:p>
           <a:p>
             <a:pPr marL="0" indent="0">
@@ -6629,6 +6924,7 @@
               <a:rPr lang="en-US" sz="1000"/>
               <a:t>By analyzing company performance data such as Annual Income VS historical transportation statistics VS. New Zealand Government monetary policy data such as CPI, Exchange Rate, Import Taxation. </a:t>
             </a:r>
+            <a:endParaRPr lang="en-US" sz="1000"/>
           </a:p>
           <a:p>
             <a:pPr marL="0" indent="0">
@@ -6644,6 +6940,7 @@
               <a:rPr lang="en-US" sz="1000"/>
               <a:t>Should we include more overseas government data such Import Tax of China, US. Dollar CPI. Join these such data together, we are potentially able to produce a prediction mode trained with these historical data. Utilization of such prediction model will enable company to device forward strategies for increase or decrease production capabilities. Such company strategies will further enable its finance / accounting department on allocate investment budgets as well as income forecasting. Whether or not company should be hiring new employees and purchasing new equipment will depends upon such forward strategies.</a:t>
             </a:r>
+            <a:endParaRPr lang="en-US" sz="1000"/>
           </a:p>
         </p:txBody>
       </p:sp>
@@ -6683,14 +6980,14 @@
           </p:nvPr>
         </p:nvPicPr>
         <p:blipFill>
-          <a:blip r:embed="rId2"/>
+          <a:blip r:embed="rId1"/>
           <a:stretch>
             <a:fillRect/>
           </a:stretch>
         </p:blipFill>
         <p:spPr>
           <a:xfrm>
-            <a:off x="609600" y="1115695"/>
+            <a:off x="821055" y="2269490"/>
             <a:ext cx="7397115" cy="3074035"/>
           </a:xfrm>
           <a:prstGeom prst="rect">
@@ -6710,8 +7007,8 @@
         </p:nvSpPr>
         <p:spPr>
           <a:xfrm>
-            <a:off x="8705850" y="1584325"/>
-            <a:ext cx="2978785" cy="1753235"/>
+            <a:off x="8685530" y="2269490"/>
+            <a:ext cx="2978785" cy="2306955"/>
           </a:xfrm>
           <a:prstGeom prst="rect">
             <a:avLst/>
@@ -6726,8 +7023,9 @@
           <a:p>
             <a:r>
               <a:rPr lang="en-US"/>
-              <a:t>Based on the data we have collected, machine learning / Artificial Intelligence Algorithms could be deployed to conduct prediction on Recession</a:t>
-            </a:r>
+              <a:t>Based on the data we have collected, machine learning / Artificial Intelligence Algorithms could be deployed to conduct prediction on Recession and subsequent corporate financial risk.</a:t>
+            </a:r>
+            <a:endParaRPr lang="en-US"/>
           </a:p>
         </p:txBody>
       </p:sp>
@@ -6765,6 +7063,40 @@
               <a:rPr lang="en-US" sz="2700"/>
               <a:t>(I.e.n what is the intended use of the data, …)</a:t>
             </a:r>
+            <a:endParaRPr lang="en-US" sz="2700"/>
+          </a:p>
+        </p:txBody>
+      </p:sp>
+      <p:sp>
+        <p:nvSpPr>
+          <p:cNvPr id="2" name="Text Box 1"/>
+          <p:cNvSpPr txBox="1"/>
+          <p:nvPr/>
+        </p:nvSpPr>
+        <p:spPr>
+          <a:xfrm>
+            <a:off x="821055" y="1425575"/>
+            <a:ext cx="9701530" cy="460375"/>
+          </a:xfrm>
+          <a:prstGeom prst="rect">
+            <a:avLst/>
+          </a:prstGeom>
+          <a:noFill/>
+        </p:spPr>
+        <p:txBody>
+          <a:bodyPr wrap="none" rtlCol="0" anchor="t">
+            <a:spAutoFit/>
+          </a:bodyPr>
+          <a:p>
+            <a:r>
+              <a:rPr lang="en-US" sz="2400">
+                <a:sym typeface="+mn-ea"/>
+              </a:rPr>
+              <a:t>Potential to build AI / machine learning algorithm for further forecast ... </a:t>
+            </a:r>
+            <a:endParaRPr lang="en-US" sz="2400">
+              <a:sym typeface="+mn-ea"/>
+            </a:endParaRPr>
           </a:p>
         </p:txBody>
       </p:sp>
@@ -6812,6 +7144,7 @@
               <a:rPr lang="en-US"/>
               <a:t>Why do we choose these data sources</a:t>
             </a:r>
+            <a:endParaRPr lang="en-US"/>
           </a:p>
         </p:txBody>
       </p:sp>
@@ -6825,7 +7158,12 @@
             <p:ph idx="1"/>
           </p:nvPr>
         </p:nvSpPr>
-        <p:spPr/>
+        <p:spPr>
+          <a:xfrm>
+            <a:off x="323215" y="1653540"/>
+            <a:ext cx="6015990" cy="4034155"/>
+          </a:xfrm>
+        </p:spPr>
         <p:txBody>
           <a:bodyPr/>
           <a:lstStyle/>
@@ -6834,12 +7172,17 @@
               <a:rPr lang="en-US"/>
               <a:t>To build a solid fundation for further data analysis</a:t>
             </a:r>
-          </a:p>
-          <a:p>
-            <a:r>
-              <a:rPr lang="en-US"/>
-              <a:t>To find correlation between these data</a:t>
-            </a:r>
+            <a:endParaRPr lang="en-US"/>
+          </a:p>
+          <a:p>
+            <a:endParaRPr lang="en-US"/>
+          </a:p>
+          <a:p>
+            <a:r>
+              <a:rPr lang="en-US"/>
+              <a:t>To find correlation between these data and discover insight among them</a:t>
+            </a:r>
+            <a:endParaRPr lang="en-US"/>
           </a:p>
           <a:p>
             <a:pPr marL="0" indent="0">
@@ -6851,75 +7194,24 @@
       </p:sp>
       <p:pic>
         <p:nvPicPr>
-          <p:cNvPr id="105" name="Picture 104"/>
-          <p:cNvPicPr/>
-          <p:nvPr/>
+          <p:cNvPr id="102" name="Content Placeholder 101"/>
+          <p:cNvPicPr>
+            <a:picLocks noChangeAspect="1"/>
+          </p:cNvPicPr>
+          <p:nvPr>
+            <p:ph sz="half" idx="2"/>
+          </p:nvPr>
         </p:nvPicPr>
         <p:blipFill>
-          <a:blip r:embed="rId2"/>
+          <a:blip r:embed="rId1"/>
           <a:stretch>
             <a:fillRect/>
           </a:stretch>
         </p:blipFill>
         <p:spPr>
           <a:xfrm>
-            <a:off x="6955155" y="2713355"/>
-            <a:ext cx="4879975" cy="3251200"/>
-          </a:xfrm>
-          <a:prstGeom prst="rect">
-            <a:avLst/>
-          </a:prstGeom>
-          <a:noFill/>
-          <a:ln w="9525">
-            <a:noFill/>
-          </a:ln>
-        </p:spPr>
-      </p:pic>
-      <p:sp>
-        <p:nvSpPr>
-          <p:cNvPr id="4" name="Text Box 3"/>
-          <p:cNvSpPr txBox="1"/>
-          <p:nvPr/>
-        </p:nvSpPr>
-        <p:spPr>
-          <a:xfrm>
-            <a:off x="245110" y="6127750"/>
-            <a:ext cx="8954770" cy="368300"/>
-          </a:xfrm>
-          <a:prstGeom prst="rect">
-            <a:avLst/>
-          </a:prstGeom>
-          <a:noFill/>
-        </p:spPr>
-        <p:txBody>
-          <a:bodyPr wrap="square" rtlCol="0" anchor="t">
-            <a:spAutoFit/>
-          </a:bodyPr>
-          <a:lstStyle/>
-          <a:p>
-            <a:r>
-              <a:rPr lang="en-US"/>
-              <a:t>https://www.eiu.com/n/will-the-new-zealand-economy-tip-into-recession/</a:t>
-            </a:r>
-          </a:p>
-        </p:txBody>
-      </p:sp>
-      <p:pic>
-        <p:nvPicPr>
-          <p:cNvPr id="106" name="Picture 105"/>
-          <p:cNvPicPr/>
-          <p:nvPr/>
-        </p:nvPicPr>
-        <p:blipFill>
-          <a:blip r:embed="rId3"/>
-          <a:stretch>
-            <a:fillRect/>
-          </a:stretch>
-        </p:blipFill>
-        <p:spPr>
-          <a:xfrm>
-            <a:off x="735965" y="2767330"/>
-            <a:ext cx="5715000" cy="3143250"/>
+            <a:off x="6410960" y="1275715"/>
+            <a:ext cx="5171440" cy="5171440"/>
           </a:xfrm>
           <a:prstGeom prst="rect">
             <a:avLst/>
@@ -6971,64 +7263,71 @@
           <a:lstStyle/>
           <a:p>
             <a:r>
-              <a:rPr lang="en-US"/>
-              <a:t>`</a:t>
-            </a:r>
-          </a:p>
-        </p:txBody>
-      </p:sp>
-      <p:pic>
-        <p:nvPicPr>
-          <p:cNvPr id="8" name="Content Placeholder 7"/>
-          <p:cNvPicPr>
-            <a:picLocks noGrp="1" noChangeAspect="1"/>
-          </p:cNvPicPr>
+              <a:rPr lang="en-US" dirty="0"/>
+              <a:t>Resources used to get data</a:t>
+            </a:r>
+            <a:endParaRPr lang="en-US" dirty="0"/>
+          </a:p>
+        </p:txBody>
+      </p:sp>
+      <p:sp>
+        <p:nvSpPr>
+          <p:cNvPr id="3" name="Content Placeholder 2"/>
+          <p:cNvSpPr>
+            <a:spLocks noGrp="1"/>
+          </p:cNvSpPr>
           <p:nvPr>
             <p:ph sz="half" idx="1"/>
           </p:nvPr>
-        </p:nvPicPr>
-        <p:blipFill>
-          <a:blip r:embed="rId2"/>
-          <a:stretch>
-            <a:fillRect/>
-          </a:stretch>
-        </p:blipFill>
+        </p:nvSpPr>
         <p:spPr>
           <a:xfrm>
-            <a:off x="741045" y="1174750"/>
-            <a:ext cx="5120640" cy="4953000"/>
-          </a:xfrm>
-          <a:prstGeom prst="rect">
-            <a:avLst/>
-          </a:prstGeom>
-        </p:spPr>
-      </p:pic>
-      <p:pic>
-        <p:nvPicPr>
-          <p:cNvPr id="9" name="Content Placeholder 8"/>
-          <p:cNvPicPr>
-            <a:picLocks noGrp="1" noChangeAspect="1"/>
-          </p:cNvPicPr>
-          <p:nvPr>
-            <p:ph sz="half" idx="2"/>
-          </p:nvPr>
-        </p:nvPicPr>
-        <p:blipFill>
-          <a:blip r:embed="rId3"/>
-          <a:stretch>
-            <a:fillRect/>
-          </a:stretch>
-        </p:blipFill>
-        <p:spPr>
-          <a:xfrm>
-            <a:off x="6309995" y="1350010"/>
-            <a:ext cx="5384800" cy="3129915"/>
-          </a:xfrm>
-          <a:prstGeom prst="rect">
-            <a:avLst/>
-          </a:prstGeom>
-        </p:spPr>
-      </p:pic>
+            <a:off x="609599" y="1773382"/>
+            <a:ext cx="11056883" cy="3255818"/>
+          </a:xfrm>
+        </p:spPr>
+        <p:txBody>
+          <a:bodyPr/>
+          <a:lstStyle/>
+          <a:p>
+            <a:pPr marL="0" indent="0">
+              <a:buNone/>
+            </a:pPr>
+            <a:r>
+              <a:rPr lang="en-NZ" sz="4000" u="sng" dirty="0"/>
+              <a:t>Data Sources used:</a:t>
+            </a:r>
+            <a:endParaRPr lang="en-NZ" sz="4000" dirty="0"/>
+          </a:p>
+          <a:p>
+            <a:endParaRPr lang="en-NZ" sz="2400" dirty="0"/>
+          </a:p>
+          <a:p>
+            <a:r>
+              <a:rPr lang="en-NZ" sz="2400" dirty="0"/>
+              <a:t>https://infoshare.stats.govt.nz</a:t>
+            </a:r>
+            <a:endParaRPr lang="en-NZ" sz="2400" dirty="0"/>
+          </a:p>
+          <a:p>
+            <a:r>
+              <a:rPr lang="en-NZ" sz="2400" dirty="0"/>
+              <a:t>https://www.interest.co.nz/chart-data/get-csv-data</a:t>
+            </a:r>
+            <a:endParaRPr lang="en-NZ" sz="2400" dirty="0"/>
+          </a:p>
+          <a:p>
+            <a:r>
+              <a:rPr lang="en-NZ" sz="2400" dirty="0"/>
+              <a:t>https://api.ofx.com/PublicSite.ApiService//SpotRateHistory/allTime/NZD/CNY</a:t>
+            </a:r>
+            <a:endParaRPr lang="en-NZ" sz="2400" dirty="0"/>
+          </a:p>
+          <a:p>
+            <a:endParaRPr lang="en-NZ" sz="2400" dirty="0"/>
+          </a:p>
+        </p:txBody>
+      </p:sp>
     </p:spTree>
   </p:cSld>
   <p:clrMapOvr>
@@ -8154,8 +8453,6 @@
       </a:bgFillStyleLst>
     </a:fmtScheme>
   </a:themeElements>
-  <a:objectDefaults/>
-  <a:extraClrSchemeLst/>
   <a:extLst>
     <a:ext uri="{05A4C25C-085E-4340-85A3-A5531E510DB2}">
       <thm15:themeFamily xmlns:thm15="http://schemas.microsoft.com/office/thememl/2012/main" name="Office Theme" id="{62F939B6-93AF-4DB8-9C6B-D6C7DFDC589F}" vid="{4A3C46E8-61CC-4603-A589-7422A47A8E4A}"/>

</xml_diff>

<commit_message>
Update Group Project Presentation.pptx
</commit_message>
<xml_diff>
--- a/Group Project Presentation.pptx
+++ b/Group Project Presentation.pptx
@@ -26,8 +26,6 @@
     <p:sldId id="298" r:id="rId19"/>
     <p:sldId id="264" r:id="rId20"/>
     <p:sldId id="263" r:id="rId21"/>
-    <p:sldId id="266" r:id="rId22"/>
-    <p:sldId id="267" r:id="rId23"/>
   </p:sldIdLst>
   <p:sldSz cx="12192000" cy="6858000"/>
   <p:notesSz cx="6858000" cy="9144000"/>
@@ -584,6 +582,31 @@
         <p:txBody>
           <a:bodyPr/>
           <a:p>
+            <a:r>
+              <a:rPr lang="en-US"/>
+              <a:t>The process we used following steps : </a:t>
+            </a:r>
+            <a:endParaRPr lang="en-US"/>
+          </a:p>
+          <a:p>
+            <a:r>
+              <a:rPr lang="en-US"/>
+              <a:t>First of all, we dfine our goals, secondly, we conduct discoverying data source, then we found our data is structured based on timeline. </a:t>
+            </a:r>
+            <a:endParaRPr lang="en-US"/>
+          </a:p>
+          <a:p>
+            <a:r>
+              <a:rPr lang="en-US"/>
+              <a:t>We have enriched our dataset by scrapping more revelent data sources (some particular measures. ), with validation complete, we going to preepare data publishing by buidling rest API (In R). </a:t>
+            </a:r>
+            <a:endParaRPr lang="en-US"/>
+          </a:p>
+          <a:p>
+            <a:r>
+              <a:rPr lang="en-US"/>
+              <a:t>The results can be demonstrated by visulization in the following section. </a:t>
+            </a:r>
             <a:endParaRPr lang="en-US"/>
           </a:p>
         </p:txBody>
@@ -605,20 +628,11 @@
         <p:cNvGrpSpPr/>
         <p:nvPr/>
       </p:nvGrpSpPr>
-      <p:grpSpPr>
-        <a:xfrm>
-          <a:off x="0" y="0"/>
-          <a:ext cx="0" cy="0"/>
-          <a:chOff x="0" y="0"/>
-          <a:chExt cx="0" cy="0"/>
-        </a:xfrm>
-      </p:grpSpPr>
+      <p:grpSpPr/>
       <p:sp>
         <p:nvSpPr>
           <p:cNvPr id="2" name="Slide Image Placeholder 1"/>
-          <p:cNvSpPr>
-            <a:spLocks noGrp="1" noRot="1" noChangeAspect="1"/>
-          </p:cNvSpPr>
+          <p:cNvSpPr/>
           <p:nvPr>
             <p:ph type="sldImg" idx="2"/>
           </p:nvPr>
@@ -628,9 +642,7 @@
       <p:sp>
         <p:nvSpPr>
           <p:cNvPr id="3" name="Text Placeholder 2"/>
-          <p:cNvSpPr>
-            <a:spLocks noGrp="1"/>
-          </p:cNvSpPr>
+          <p:cNvSpPr/>
           <p:nvPr>
             <p:ph type="body" idx="3"/>
           </p:nvPr>
@@ -638,7 +650,6 @@
         <p:spPr/>
         <p:txBody>
           <a:bodyPr/>
-          <a:lstStyle/>
           <a:p>
             <a:endParaRPr lang="en-US"/>
           </a:p>
@@ -864,10 +875,6 @@
         <p:txBody>
           <a:bodyPr/>
           <a:p>
-            <a:r>
-              <a:rPr lang="en-US"/>
-              <a:t>AI is particularly helpful in corporate finance as it can better predict and assess loan risks. For companies looking to increase their value, AI technologies such as machine learning can help improve loan underwriting and reduce financial risk.</a:t>
-            </a:r>
             <a:endParaRPr lang="en-US"/>
           </a:p>
         </p:txBody>
@@ -912,6 +919,10 @@
         <p:txBody>
           <a:bodyPr/>
           <a:p>
+            <a:r>
+              <a:rPr lang="en-US"/>
+              <a:t>AI is particularly helpful in corporate finance as it can better predict and assess loan risks. For companies looking to increase their value, AI technologies such as machine learning can help improve loan underwriting and reduce financial risk.</a:t>
+            </a:r>
             <a:endParaRPr lang="en-US"/>
           </a:p>
         </p:txBody>
@@ -956,10 +967,6 @@
         <p:txBody>
           <a:bodyPr/>
           <a:p>
-            <a:r>
-              <a:rPr lang="en-US"/>
-              <a:t>These pages are database driven dynamic pages, so we have to be smarter for retrieving data, using “Rselenium”web driver. (Select tree and condition... all use R selenium)</a:t>
-            </a:r>
             <a:endParaRPr lang="en-US"/>
           </a:p>
         </p:txBody>
@@ -1006,7 +1013,7 @@
           <a:p>
             <a:r>
               <a:rPr lang="en-US"/>
-              <a:t>Data Wrangling : Further detailed example, we have to wrangle 1921Q4 into 1921-12(December) by creating function that does the transformation. </a:t>
+              <a:t>These pages are database driven dynamic pages, so we have to be smarter for retrieving data, using “Rselenium”web driver. (Select tree and condition... all use R selenium)</a:t>
             </a:r>
             <a:endParaRPr lang="en-US"/>
           </a:p>
@@ -1054,28 +1061,7 @@
           <a:p>
             <a:r>
               <a:rPr lang="en-US"/>
-              <a:t>The process we used following steps : </a:t>
-            </a:r>
-            <a:endParaRPr lang="en-US"/>
-          </a:p>
-          <a:p>
-            <a:r>
-              <a:rPr lang="en-US"/>
-              <a:t>First of all, we dfine our goals, secondly, we conduct discoverying data source, then we found our data is structured based on timeline. </a:t>
-            </a:r>
-            <a:endParaRPr lang="en-US"/>
-          </a:p>
-          <a:p>
-            <a:r>
-              <a:rPr lang="en-US"/>
-              <a:t>We have enriched our dataset by scrapping more revelent data sources (some particular measures. ), with validation complete, we going to preepare data publishing by buidling rest API (In R). </a:t>
-            </a:r>
-            <a:endParaRPr lang="en-US"/>
-          </a:p>
-          <a:p>
-            <a:r>
-              <a:rPr lang="en-US"/>
-              <a:t>The results can be demonstrated by visulization in the following section. </a:t>
+              <a:t>Data Wrangling : Further detailed example, we have to wrangle 1921Q4 into 1921-12(December) by creating function that does the transformation. </a:t>
             </a:r>
             <a:endParaRPr lang="en-US"/>
           </a:p>
@@ -4805,8 +4791,8 @@
         </p:blipFill>
         <p:spPr>
           <a:xfrm>
-            <a:off x="-125064" y="3170522"/>
-            <a:ext cx="12442127" cy="3104866"/>
+            <a:off x="379095" y="3380740"/>
+            <a:ext cx="11707495" cy="2790190"/>
           </a:xfrm>
           <a:prstGeom prst="rect">
             <a:avLst/>
@@ -4817,36 +4803,6 @@
           </a:ln>
         </p:spPr>
       </p:pic>
-      <p:sp>
-        <p:nvSpPr>
-          <p:cNvPr id="6" name="TextBox 5"/>
-          <p:cNvSpPr txBox="1"/>
-          <p:nvPr/>
-        </p:nvSpPr>
-        <p:spPr>
-          <a:xfrm>
-            <a:off x="7984512" y="6029167"/>
-            <a:ext cx="3871573" cy="246221"/>
-          </a:xfrm>
-          <a:prstGeom prst="rect">
-            <a:avLst/>
-          </a:prstGeom>
-          <a:noFill/>
-        </p:spPr>
-        <p:txBody>
-          <a:bodyPr wrap="none" rtlCol="0">
-            <a:spAutoFit/>
-          </a:bodyPr>
-          <a:lstStyle/>
-          <a:p>
-            <a:r>
-              <a:rPr lang="en-NZ" sz="1000" dirty="0"/>
-              <a:t>(Image taken from: https://monkeylearn.com/blog/data-wrangling)</a:t>
-            </a:r>
-            <a:endParaRPr lang="en-NZ" sz="1000" dirty="0"/>
-          </a:p>
-        </p:txBody>
-      </p:sp>
     </p:spTree>
   </p:cSld>
   <p:clrMapOvr>
@@ -4882,7 +4838,12 @@
             <p:ph type="title"/>
           </p:nvPr>
         </p:nvSpPr>
-        <p:spPr/>
+        <p:spPr>
+          <a:xfrm>
+            <a:off x="991235" y="161925"/>
+            <a:ext cx="10972800" cy="582613"/>
+          </a:xfrm>
+        </p:spPr>
         <p:txBody>
           <a:bodyPr>
             <a:normAutofit fontScale="90000"/>
@@ -5016,38 +4977,12 @@
           <a:p>
             <a:r>
               <a:rPr lang="en-US"/>
-              <a:t>Charts</a:t>
-            </a:r>
-            <a:endParaRPr lang="en-US"/>
-          </a:p>
-        </p:txBody>
-      </p:sp>
-      <p:pic>
-        <p:nvPicPr>
-          <p:cNvPr id="4" name="Content Placeholder 3"/>
-          <p:cNvPicPr>
-            <a:picLocks noGrp="1" noChangeAspect="1"/>
-          </p:cNvPicPr>
-          <p:nvPr>
-            <p:ph idx="1"/>
-          </p:nvPr>
-        </p:nvPicPr>
-        <p:blipFill>
-          <a:blip r:embed="rId1"/>
-          <a:stretch>
-            <a:fillRect/>
-          </a:stretch>
-        </p:blipFill>
-        <p:spPr>
-          <a:xfrm>
-            <a:off x="3643630" y="1448435"/>
-            <a:ext cx="4905375" cy="4362450"/>
-          </a:xfrm>
-          <a:prstGeom prst="rect">
-            <a:avLst/>
-          </a:prstGeom>
-        </p:spPr>
-      </p:pic>
+              <a:t>NZD USD Exchange Rate VS. Tourism</a:t>
+            </a:r>
+            <a:endParaRPr lang="en-US"/>
+          </a:p>
+        </p:txBody>
+      </p:sp>
       <p:sp>
         <p:nvSpPr>
           <p:cNvPr id="3" name="Text Box 2"/>
@@ -5056,7 +4991,7 @@
         </p:nvSpPr>
         <p:spPr>
           <a:xfrm>
-            <a:off x="999490" y="6069330"/>
+            <a:off x="887095" y="6269990"/>
             <a:ext cx="10695305" cy="368300"/>
           </a:xfrm>
           <a:prstGeom prst="rect">
@@ -5108,6 +5043,32 @@
           </a:p>
         </p:txBody>
       </p:sp>
+      <p:pic>
+        <p:nvPicPr>
+          <p:cNvPr id="7" name="Content Placeholder 6"/>
+          <p:cNvPicPr>
+            <a:picLocks noChangeAspect="1"/>
+          </p:cNvPicPr>
+          <p:nvPr>
+            <p:ph idx="1"/>
+          </p:nvPr>
+        </p:nvPicPr>
+        <p:blipFill>
+          <a:blip r:embed="rId1"/>
+          <a:stretch>
+            <a:fillRect/>
+          </a:stretch>
+        </p:blipFill>
+        <p:spPr>
+          <a:xfrm>
+            <a:off x="3714750" y="952500"/>
+            <a:ext cx="5400675" cy="5400675"/>
+          </a:xfrm>
+          <a:prstGeom prst="rect">
+            <a:avLst/>
+          </a:prstGeom>
+        </p:spPr>
+      </p:pic>
     </p:spTree>
   </p:cSld>
   <p:clrMapOvr>
@@ -5147,6 +5108,10 @@
         <p:txBody>
           <a:bodyPr/>
           <a:p>
+            <a:r>
+              <a:rPr lang="en-US"/>
+              <a:t>OCR VS. Unemployment Rate</a:t>
+            </a:r>
             <a:endParaRPr lang="en-US"/>
           </a:p>
         </p:txBody>
@@ -5159,8 +5124,8 @@
         </p:nvSpPr>
         <p:spPr>
           <a:xfrm>
-            <a:off x="1683385" y="5982970"/>
-            <a:ext cx="7766050" cy="645160"/>
+            <a:off x="2026920" y="6229985"/>
+            <a:ext cx="8271510" cy="368300"/>
           </a:xfrm>
           <a:prstGeom prst="rect">
             <a:avLst/>
@@ -5175,14 +5140,7 @@
           <a:p>
             <a:r>
               <a:rPr lang="en-US"/>
-              <a:t>Plot</a:t>
-            </a:r>
-            <a:endParaRPr lang="en-US"/>
-          </a:p>
-          <a:p>
-            <a:r>
-              <a:rPr lang="en-US"/>
-              <a:t>1) x axis time (yyyy-mm) : y axis (OCR + (Labour force status))</a:t>
+              <a:t>Plot 1) x axis time (yyyy-mm) : y axis (OCR + (Labour force status))</a:t>
             </a:r>
             <a:endParaRPr lang="en-US"/>
           </a:p>
@@ -5196,7 +5154,7 @@
         </p:nvSpPr>
         <p:spPr>
           <a:xfrm>
-            <a:off x="826135" y="1765935"/>
+            <a:off x="609600" y="2090420"/>
             <a:ext cx="2199640" cy="2030095"/>
           </a:xfrm>
           <a:prstGeom prst="rect">
@@ -5236,8 +5194,8 @@
         </p:blipFill>
         <p:spPr>
           <a:xfrm>
-            <a:off x="3205480" y="1029970"/>
-            <a:ext cx="4953000" cy="4953000"/>
+            <a:off x="3367405" y="1049020"/>
+            <a:ext cx="5104765" cy="5104765"/>
           </a:xfrm>
           <a:prstGeom prst="rect">
             <a:avLst/>
@@ -5465,8 +5423,8 @@
         </p:nvSpPr>
         <p:spPr>
           <a:xfrm>
-            <a:off x="419100" y="3714750"/>
-            <a:ext cx="1333500" cy="2399665"/>
+            <a:off x="232410" y="4177665"/>
+            <a:ext cx="1543050" cy="2245360"/>
           </a:xfrm>
           <a:prstGeom prst="rect">
             <a:avLst/>
@@ -5563,7 +5521,7 @@
         </p:blipFill>
         <p:spPr>
           <a:xfrm>
-            <a:off x="346075" y="1174750"/>
+            <a:off x="346075" y="1193800"/>
             <a:ext cx="2797810" cy="2797810"/>
           </a:xfrm>
           <a:prstGeom prst="rect">
@@ -5594,7 +5552,7 @@
         <p:spPr>
           <a:xfrm>
             <a:off x="3839210" y="1235710"/>
-            <a:ext cx="2494915" cy="2494915"/>
+            <a:ext cx="2865755" cy="2865755"/>
           </a:xfrm>
           <a:prstGeom prst="rect">
             <a:avLst/>
@@ -5734,47 +5692,6 @@
           </a:p>
         </p:txBody>
       </p:sp>
-      <p:sp>
-        <p:nvSpPr>
-          <p:cNvPr id="3" name="Text Box 2"/>
-          <p:cNvSpPr txBox="1"/>
-          <p:nvPr/>
-        </p:nvSpPr>
-        <p:spPr>
-          <a:xfrm>
-            <a:off x="416560" y="1775460"/>
-            <a:ext cx="2828290" cy="645160"/>
-          </a:xfrm>
-          <a:prstGeom prst="rect">
-            <a:avLst/>
-          </a:prstGeom>
-          <a:noFill/>
-        </p:spPr>
-        <p:txBody>
-          <a:bodyPr wrap="square" rtlCol="0">
-            <a:spAutoFit/>
-          </a:bodyPr>
-          <a:p>
-            <a:r>
-              <a:rPr lang="en-US" sz="1200"/>
-              <a:t>Big chart with everything in it, </a:t>
-            </a:r>
-            <a:r>
-              <a:rPr lang="en-US" sz="1200">
-                <a:solidFill>
-                  <a:srgbClr val="FF0000"/>
-                </a:solidFill>
-              </a:rPr>
-              <a:t>x-axis is tim</a:t>
-            </a:r>
-            <a:r>
-              <a:rPr lang="en-US" sz="1200"/>
-              <a:t>e, y-axis contains everything else... (Remove ... HPI)</a:t>
-            </a:r>
-            <a:endParaRPr lang="en-US" sz="1200"/>
-          </a:p>
-        </p:txBody>
-      </p:sp>
       <p:pic>
         <p:nvPicPr>
           <p:cNvPr id="7" name="Content Placeholder 6"/>
@@ -5793,7 +5710,7 @@
         </p:blipFill>
         <p:spPr>
           <a:xfrm>
-            <a:off x="3187700" y="906780"/>
+            <a:off x="116205" y="944245"/>
             <a:ext cx="5913755" cy="5913755"/>
           </a:xfrm>
           <a:prstGeom prst="rect">
@@ -5801,103 +5718,498 @@
           </a:prstGeom>
         </p:spPr>
       </p:pic>
-    </p:spTree>
-  </p:cSld>
-  <p:clrMapOvr>
-    <a:masterClrMapping/>
-  </p:clrMapOvr>
-</p:sld>
-</file>
-
-<file path=ppt/slides/slide19.xml><?xml version="1.0" encoding="utf-8"?>
-<p:sld xmlns:a="http://schemas.openxmlformats.org/drawingml/2006/main" xmlns:r="http://schemas.openxmlformats.org/officeDocument/2006/relationships" xmlns:p="http://schemas.openxmlformats.org/presentationml/2006/main">
-  <p:cSld>
-    <p:spTree>
-      <p:nvGrpSpPr>
-        <p:cNvPr id="1" name=""/>
-        <p:cNvGrpSpPr/>
-        <p:nvPr/>
-      </p:nvGrpSpPr>
-      <p:grpSpPr>
-        <a:xfrm>
-          <a:off x="0" y="0"/>
-          <a:ext cx="0" cy="0"/>
-          <a:chOff x="0" y="0"/>
-          <a:chExt cx="0" cy="0"/>
-        </a:xfrm>
-      </p:grpSpPr>
-      <p:sp>
-        <p:nvSpPr>
-          <p:cNvPr id="2" name="Title 1"/>
-          <p:cNvSpPr>
-            <a:spLocks noGrp="1"/>
-          </p:cNvSpPr>
-          <p:nvPr>
-            <p:ph type="title"/>
-          </p:nvPr>
-        </p:nvSpPr>
-        <p:spPr/>
-        <p:txBody>
-          <a:bodyPr/>
-          <a:lstStyle/>
-          <a:p>
-            <a:r>
-              <a:rPr lang="en-US"/>
-              <a:t>Conclusions</a:t>
-            </a:r>
-            <a:endParaRPr lang="en-US"/>
-          </a:p>
-        </p:txBody>
-      </p:sp>
-      <p:sp>
-        <p:nvSpPr>
-          <p:cNvPr id="3" name="Content Placeholder 2"/>
-          <p:cNvSpPr>
-            <a:spLocks noGrp="1"/>
-          </p:cNvSpPr>
-          <p:nvPr>
-            <p:ph sz="half" idx="1"/>
-          </p:nvPr>
+      <p:sp>
+        <p:nvSpPr>
+          <p:cNvPr id="4" name="Content Placeholder 2"/>
+          <p:cNvSpPr>
+            <a:spLocks noGrp="1"/>
+          </p:cNvSpPr>
+          <p:nvPr/>
         </p:nvSpPr>
         <p:spPr>
           <a:xfrm>
-            <a:off x="609600" y="1174750"/>
-            <a:ext cx="5384800" cy="5375275"/>
+            <a:off x="6503670" y="1213485"/>
+            <a:ext cx="5384800" cy="2495550"/>
           </a:xfrm>
+          <a:prstGeom prst="rect">
+            <a:avLst/>
+          </a:prstGeom>
+          <a:noFill/>
+          <a:ln w="9525">
+            <a:noFill/>
+          </a:ln>
         </p:spPr>
         <p:txBody>
           <a:bodyPr/>
-          <a:lstStyle/>
-          <a:p>
-            <a:r>
-              <a:rPr lang="en-US" sz="1800"/>
-              <a:t>Based on the data we have collected as well as what subsequent plots generated based on that.  The following insights have been reviewed. </a:t>
-            </a:r>
-            <a:endParaRPr lang="en-US" sz="1800"/>
+          <a:lstStyle>
+            <a:lvl1pPr marL="342900" indent="-342900" algn="l" rtl="0" fontAlgn="base">
+              <a:spcBef>
+                <a:spcPct val="20000"/>
+              </a:spcBef>
+              <a:spcAft>
+                <a:spcPct val="0"/>
+              </a:spcAft>
+              <a:buChar char="•"/>
+              <a:defRPr sz="3200" kern="1200">
+                <a:solidFill>
+                  <a:schemeClr val="tx1"/>
+                </a:solidFill>
+                <a:latin typeface="+mn-lt"/>
+                <a:ea typeface="+mn-ea"/>
+                <a:cs typeface="+mn-cs"/>
+              </a:defRPr>
+            </a:lvl1pPr>
+            <a:lvl2pPr marL="742950" indent="-285750" algn="l" rtl="0" fontAlgn="base">
+              <a:spcBef>
+                <a:spcPct val="20000"/>
+              </a:spcBef>
+              <a:spcAft>
+                <a:spcPct val="0"/>
+              </a:spcAft>
+              <a:buChar char="–"/>
+              <a:defRPr sz="2800" kern="1200">
+                <a:solidFill>
+                  <a:schemeClr val="tx1"/>
+                </a:solidFill>
+                <a:latin typeface="+mn-lt"/>
+                <a:ea typeface="+mn-ea"/>
+                <a:cs typeface="+mn-cs"/>
+              </a:defRPr>
+            </a:lvl2pPr>
+            <a:lvl3pPr marL="1143000" indent="-228600" algn="l" rtl="0" fontAlgn="base">
+              <a:spcBef>
+                <a:spcPct val="20000"/>
+              </a:spcBef>
+              <a:spcAft>
+                <a:spcPct val="0"/>
+              </a:spcAft>
+              <a:buChar char="•"/>
+              <a:defRPr sz="2400" kern="1200">
+                <a:solidFill>
+                  <a:schemeClr val="tx1"/>
+                </a:solidFill>
+                <a:latin typeface="+mn-lt"/>
+                <a:ea typeface="+mn-ea"/>
+                <a:cs typeface="+mn-cs"/>
+              </a:defRPr>
+            </a:lvl3pPr>
+            <a:lvl4pPr marL="1600200" indent="-228600" algn="l" rtl="0" fontAlgn="base">
+              <a:spcBef>
+                <a:spcPct val="20000"/>
+              </a:spcBef>
+              <a:spcAft>
+                <a:spcPct val="0"/>
+              </a:spcAft>
+              <a:buChar char="–"/>
+              <a:defRPr sz="2000" kern="1200">
+                <a:solidFill>
+                  <a:schemeClr val="tx1"/>
+                </a:solidFill>
+                <a:latin typeface="+mn-lt"/>
+                <a:ea typeface="+mn-ea"/>
+                <a:cs typeface="+mn-cs"/>
+              </a:defRPr>
+            </a:lvl4pPr>
+            <a:lvl5pPr marL="2057400" indent="-228600" algn="l" rtl="0" fontAlgn="base">
+              <a:spcBef>
+                <a:spcPct val="20000"/>
+              </a:spcBef>
+              <a:spcAft>
+                <a:spcPct val="0"/>
+              </a:spcAft>
+              <a:buChar char="»"/>
+              <a:defRPr sz="2000" kern="1200">
+                <a:solidFill>
+                  <a:schemeClr val="tx1"/>
+                </a:solidFill>
+                <a:latin typeface="+mn-lt"/>
+                <a:ea typeface="+mn-ea"/>
+                <a:cs typeface="+mn-cs"/>
+              </a:defRPr>
+            </a:lvl5pPr>
+            <a:lvl6pPr marL="2514600" indent="-228600" algn="l" defTabSz="914400" rtl="0" eaLnBrk="1" latinLnBrk="0" hangingPunct="1">
+              <a:lnSpc>
+                <a:spcPct val="90000"/>
+              </a:lnSpc>
+              <a:spcBef>
+                <a:spcPts val="500"/>
+              </a:spcBef>
+              <a:buFont typeface="Arial" panose="020B0604020202020204" pitchFamily="34" charset="0"/>
+              <a:buChar char="•"/>
+              <a:defRPr sz="1800" kern="1200">
+                <a:solidFill>
+                  <a:schemeClr val="tx1"/>
+                </a:solidFill>
+                <a:latin typeface="+mn-lt"/>
+                <a:ea typeface="+mn-ea"/>
+                <a:cs typeface="+mn-cs"/>
+              </a:defRPr>
+            </a:lvl6pPr>
+            <a:lvl7pPr marL="2971800" indent="-228600" algn="l" defTabSz="914400" rtl="0" eaLnBrk="1" latinLnBrk="0" hangingPunct="1">
+              <a:lnSpc>
+                <a:spcPct val="90000"/>
+              </a:lnSpc>
+              <a:spcBef>
+                <a:spcPts val="500"/>
+              </a:spcBef>
+              <a:buFont typeface="Arial" panose="020B0604020202020204" pitchFamily="34" charset="0"/>
+              <a:buChar char="•"/>
+              <a:defRPr sz="1800" kern="1200">
+                <a:solidFill>
+                  <a:schemeClr val="tx1"/>
+                </a:solidFill>
+                <a:latin typeface="+mn-lt"/>
+                <a:ea typeface="+mn-ea"/>
+                <a:cs typeface="+mn-cs"/>
+              </a:defRPr>
+            </a:lvl7pPr>
+            <a:lvl8pPr marL="3429000" indent="-228600" algn="l" defTabSz="914400" rtl="0" eaLnBrk="1" latinLnBrk="0" hangingPunct="1">
+              <a:lnSpc>
+                <a:spcPct val="90000"/>
+              </a:lnSpc>
+              <a:spcBef>
+                <a:spcPts val="500"/>
+              </a:spcBef>
+              <a:buFont typeface="Arial" panose="020B0604020202020204" pitchFamily="34" charset="0"/>
+              <a:buChar char="•"/>
+              <a:defRPr sz="1800" kern="1200">
+                <a:solidFill>
+                  <a:schemeClr val="tx1"/>
+                </a:solidFill>
+                <a:latin typeface="+mn-lt"/>
+                <a:ea typeface="+mn-ea"/>
+                <a:cs typeface="+mn-cs"/>
+              </a:defRPr>
+            </a:lvl8pPr>
+            <a:lvl9pPr marL="3886200" indent="-228600" algn="l" defTabSz="914400" rtl="0" eaLnBrk="1" latinLnBrk="0" hangingPunct="1">
+              <a:lnSpc>
+                <a:spcPct val="90000"/>
+              </a:lnSpc>
+              <a:spcBef>
+                <a:spcPts val="500"/>
+              </a:spcBef>
+              <a:buFont typeface="Arial" panose="020B0604020202020204" pitchFamily="34" charset="0"/>
+              <a:buChar char="•"/>
+              <a:defRPr sz="1800" kern="1200">
+                <a:solidFill>
+                  <a:schemeClr val="tx1"/>
+                </a:solidFill>
+                <a:latin typeface="+mn-lt"/>
+                <a:ea typeface="+mn-ea"/>
+                <a:cs typeface="+mn-cs"/>
+              </a:defRPr>
+            </a:lvl9pPr>
+          </a:lstStyle>
+          <a:p>
+            <a:r>
+              <a:rPr lang="en-US" sz="1200"/>
+              <a:t>Based on the data we have collected as well as what subsequent plots generated based on that.  </a:t>
+            </a:r>
+            <a:endParaRPr lang="en-US" sz="1200"/>
+          </a:p>
+          <a:p>
+            <a:r>
+              <a:rPr lang="en-US" sz="1200"/>
+              <a:t>The following insights have been reviewed. </a:t>
+            </a:r>
+            <a:endParaRPr lang="en-US" sz="1200"/>
           </a:p>
           <a:p>
             <a:pPr lvl="1"/>
             <a:r>
-              <a:rPr lang="en-US" sz="1600"/>
-              <a:t>As New Zealand Reserve Bank sets its interest rate up, various business will have difficult of getting cheap loans for further development, therefore business activities have been reduced, which leads to increase of unemployment and reduction of traffic. </a:t>
-            </a:r>
-            <a:endParaRPr lang="en-US" sz="1600"/>
+              <a:rPr lang="en-US" sz="1000"/>
+              <a:t>As New Zealand Reserve Bank </a:t>
+            </a:r>
+            <a:r>
+              <a:rPr lang="en-US" sz="1000" b="1"/>
+              <a:t>sets its interest rate up</a:t>
+            </a:r>
+            <a:r>
+              <a:rPr lang="en-US" sz="1000"/>
+              <a:t>, various business will have difficult of getting cheap loans for further development, therefore business activities have been reduced, which leads to increase of unemployment and reduction of general road traffic. </a:t>
+            </a:r>
+            <a:endParaRPr lang="en-US" sz="1000"/>
           </a:p>
           <a:p>
             <a:pPr lvl="1"/>
             <a:r>
-              <a:rPr lang="en-US" sz="1600"/>
-              <a:t>On the other hand, increase of Reserve Bank interest rate will attract oversea hot money for short term investment, therefore it is anticipated that exchange rate of New Zealand dollars VS. Other currency will go up. The high Reserve bank interest rate will lead to lower level of economic activities, hence in term of cargo freight statistics, general vehicle activities and tourism account, we have observed dropping in these activities.</a:t>
-            </a:r>
-            <a:endParaRPr lang="en-US" sz="1600"/>
+              <a:rPr lang="en-US" sz="1000"/>
+              <a:t>On the other hand, </a:t>
+            </a:r>
+            <a:r>
+              <a:rPr lang="en-US" sz="1000" b="1"/>
+              <a:t>increase of Reserve Bank interest rate</a:t>
+            </a:r>
+            <a:r>
+              <a:rPr lang="en-US" sz="1000"/>
+              <a:t> will attract oversea hot money for short term investment, therefore it is anticipated that exchange rate of New Zealand dollars VS. US dollar will go up. The high Reserve bank interest rate will lead to lower level of economic activities, hence in term of cargo freight statistics, general vehicle activities and tourism account, we have observed dropping in these activities.</a:t>
+            </a:r>
+            <a:endParaRPr lang="en-US" sz="1000"/>
           </a:p>
           <a:p>
             <a:pPr lvl="1"/>
             <a:r>
-              <a:rPr lang="en-US" sz="1600"/>
+              <a:rPr lang="en-US" sz="1000"/>
               <a:t>However, Reserve Bank raise interest rate usually to combat high inflation rate (CPI), therefore, we should be expecting dropping of the CPI.</a:t>
             </a:r>
-            <a:endParaRPr lang="en-US" sz="1600"/>
+            <a:endParaRPr lang="en-US" sz="1000"/>
+          </a:p>
+        </p:txBody>
+      </p:sp>
+      <p:sp>
+        <p:nvSpPr>
+          <p:cNvPr id="5" name="Content Placeholder 2"/>
+          <p:cNvSpPr>
+            <a:spLocks noGrp="1"/>
+          </p:cNvSpPr>
+          <p:nvPr/>
+        </p:nvSpPr>
+        <p:spPr>
+          <a:xfrm>
+            <a:off x="6513195" y="3832860"/>
+            <a:ext cx="5137150" cy="1842770"/>
+          </a:xfrm>
+          <a:prstGeom prst="rect">
+            <a:avLst/>
+          </a:prstGeom>
+          <a:noFill/>
+          <a:ln w="9525">
+            <a:noFill/>
+          </a:ln>
+        </p:spPr>
+        <p:txBody>
+          <a:bodyPr>
+            <a:noAutofit/>
+          </a:bodyPr>
+          <a:lstStyle>
+            <a:lvl1pPr marL="342900" indent="-342900" algn="l" rtl="0" fontAlgn="base">
+              <a:spcBef>
+                <a:spcPct val="20000"/>
+              </a:spcBef>
+              <a:spcAft>
+                <a:spcPct val="0"/>
+              </a:spcAft>
+              <a:buChar char="•"/>
+              <a:defRPr sz="3200" kern="1200">
+                <a:solidFill>
+                  <a:schemeClr val="tx1"/>
+                </a:solidFill>
+                <a:latin typeface="+mn-lt"/>
+                <a:ea typeface="+mn-ea"/>
+                <a:cs typeface="+mn-cs"/>
+              </a:defRPr>
+            </a:lvl1pPr>
+            <a:lvl2pPr marL="742950" indent="-285750" algn="l" rtl="0" fontAlgn="base">
+              <a:spcBef>
+                <a:spcPct val="20000"/>
+              </a:spcBef>
+              <a:spcAft>
+                <a:spcPct val="0"/>
+              </a:spcAft>
+              <a:buChar char="–"/>
+              <a:defRPr sz="2800" kern="1200">
+                <a:solidFill>
+                  <a:schemeClr val="tx1"/>
+                </a:solidFill>
+                <a:latin typeface="+mn-lt"/>
+                <a:ea typeface="+mn-ea"/>
+                <a:cs typeface="+mn-cs"/>
+              </a:defRPr>
+            </a:lvl2pPr>
+            <a:lvl3pPr marL="1143000" indent="-228600" algn="l" rtl="0" fontAlgn="base">
+              <a:spcBef>
+                <a:spcPct val="20000"/>
+              </a:spcBef>
+              <a:spcAft>
+                <a:spcPct val="0"/>
+              </a:spcAft>
+              <a:buChar char="•"/>
+              <a:defRPr sz="2400" kern="1200">
+                <a:solidFill>
+                  <a:schemeClr val="tx1"/>
+                </a:solidFill>
+                <a:latin typeface="+mn-lt"/>
+                <a:ea typeface="+mn-ea"/>
+                <a:cs typeface="+mn-cs"/>
+              </a:defRPr>
+            </a:lvl3pPr>
+            <a:lvl4pPr marL="1600200" indent="-228600" algn="l" rtl="0" fontAlgn="base">
+              <a:spcBef>
+                <a:spcPct val="20000"/>
+              </a:spcBef>
+              <a:spcAft>
+                <a:spcPct val="0"/>
+              </a:spcAft>
+              <a:buChar char="–"/>
+              <a:defRPr sz="2000" kern="1200">
+                <a:solidFill>
+                  <a:schemeClr val="tx1"/>
+                </a:solidFill>
+                <a:latin typeface="+mn-lt"/>
+                <a:ea typeface="+mn-ea"/>
+                <a:cs typeface="+mn-cs"/>
+              </a:defRPr>
+            </a:lvl4pPr>
+            <a:lvl5pPr marL="2057400" indent="-228600" algn="l" rtl="0" fontAlgn="base">
+              <a:spcBef>
+                <a:spcPct val="20000"/>
+              </a:spcBef>
+              <a:spcAft>
+                <a:spcPct val="0"/>
+              </a:spcAft>
+              <a:buChar char="»"/>
+              <a:defRPr sz="2000" kern="1200">
+                <a:solidFill>
+                  <a:schemeClr val="tx1"/>
+                </a:solidFill>
+                <a:latin typeface="+mn-lt"/>
+                <a:ea typeface="+mn-ea"/>
+                <a:cs typeface="+mn-cs"/>
+              </a:defRPr>
+            </a:lvl5pPr>
+            <a:lvl6pPr marL="2514600" indent="-228600" algn="l" defTabSz="914400" rtl="0" eaLnBrk="1" latinLnBrk="0" hangingPunct="1">
+              <a:lnSpc>
+                <a:spcPct val="90000"/>
+              </a:lnSpc>
+              <a:spcBef>
+                <a:spcPts val="500"/>
+              </a:spcBef>
+              <a:buFont typeface="Arial" panose="020B0604020202020204" pitchFamily="34" charset="0"/>
+              <a:buChar char="•"/>
+              <a:defRPr sz="1800" kern="1200">
+                <a:solidFill>
+                  <a:schemeClr val="tx1"/>
+                </a:solidFill>
+                <a:latin typeface="+mn-lt"/>
+                <a:ea typeface="+mn-ea"/>
+                <a:cs typeface="+mn-cs"/>
+              </a:defRPr>
+            </a:lvl6pPr>
+            <a:lvl7pPr marL="2971800" indent="-228600" algn="l" defTabSz="914400" rtl="0" eaLnBrk="1" latinLnBrk="0" hangingPunct="1">
+              <a:lnSpc>
+                <a:spcPct val="90000"/>
+              </a:lnSpc>
+              <a:spcBef>
+                <a:spcPts val="500"/>
+              </a:spcBef>
+              <a:buFont typeface="Arial" panose="020B0604020202020204" pitchFamily="34" charset="0"/>
+              <a:buChar char="•"/>
+              <a:defRPr sz="1800" kern="1200">
+                <a:solidFill>
+                  <a:schemeClr val="tx1"/>
+                </a:solidFill>
+                <a:latin typeface="+mn-lt"/>
+                <a:ea typeface="+mn-ea"/>
+                <a:cs typeface="+mn-cs"/>
+              </a:defRPr>
+            </a:lvl7pPr>
+            <a:lvl8pPr marL="3429000" indent="-228600" algn="l" defTabSz="914400" rtl="0" eaLnBrk="1" latinLnBrk="0" hangingPunct="1">
+              <a:lnSpc>
+                <a:spcPct val="90000"/>
+              </a:lnSpc>
+              <a:spcBef>
+                <a:spcPts val="500"/>
+              </a:spcBef>
+              <a:buFont typeface="Arial" panose="020B0604020202020204" pitchFamily="34" charset="0"/>
+              <a:buChar char="•"/>
+              <a:defRPr sz="1800" kern="1200">
+                <a:solidFill>
+                  <a:schemeClr val="tx1"/>
+                </a:solidFill>
+                <a:latin typeface="+mn-lt"/>
+                <a:ea typeface="+mn-ea"/>
+                <a:cs typeface="+mn-cs"/>
+              </a:defRPr>
+            </a:lvl8pPr>
+            <a:lvl9pPr marL="3886200" indent="-228600" algn="l" defTabSz="914400" rtl="0" eaLnBrk="1" latinLnBrk="0" hangingPunct="1">
+              <a:lnSpc>
+                <a:spcPct val="90000"/>
+              </a:lnSpc>
+              <a:spcBef>
+                <a:spcPts val="500"/>
+              </a:spcBef>
+              <a:buFont typeface="Arial" panose="020B0604020202020204" pitchFamily="34" charset="0"/>
+              <a:buChar char="•"/>
+              <a:defRPr sz="1800" kern="1200">
+                <a:solidFill>
+                  <a:schemeClr val="tx1"/>
+                </a:solidFill>
+                <a:latin typeface="+mn-lt"/>
+                <a:ea typeface="+mn-ea"/>
+                <a:cs typeface="+mn-cs"/>
+              </a:defRPr>
+            </a:lvl9pPr>
+          </a:lstStyle>
+          <a:p>
+            <a:r>
+              <a:rPr lang="en-US" sz="1000"/>
+              <a:t>When the economic activities are low and unemployment rate is high </a:t>
+            </a:r>
+            <a:endParaRPr lang="en-US" sz="1000"/>
+          </a:p>
+          <a:p>
+            <a:pPr lvl="1"/>
+            <a:r>
+              <a:rPr lang="en-US" sz="900"/>
+              <a:t>New Zealand government is under pressure to unleash new monetary policies to </a:t>
+            </a:r>
+            <a:r>
+              <a:rPr lang="en-US" sz="900" b="1">
+                <a:solidFill>
+                  <a:srgbClr val="FF0000"/>
+                </a:solidFill>
+              </a:rPr>
+              <a:t>stimulate </a:t>
+            </a:r>
+            <a:r>
+              <a:rPr lang="en-US" sz="900"/>
+              <a:t>economy. Hence government usually </a:t>
+            </a:r>
+            <a:r>
+              <a:rPr lang="en-US" sz="900" b="1"/>
+              <a:t>resolve to lower reserve bank interest rate</a:t>
+            </a:r>
+            <a:r>
+              <a:rPr lang="en-US" sz="900"/>
+              <a:t>. </a:t>
+            </a:r>
+            <a:endParaRPr lang="en-US" sz="900"/>
+          </a:p>
+          <a:p>
+            <a:pPr lvl="1"/>
+            <a:r>
+              <a:rPr lang="en-US" sz="900"/>
+              <a:t>With </a:t>
+            </a:r>
+            <a:r>
+              <a:rPr lang="en-US" sz="900" b="1"/>
+              <a:t>low </a:t>
+            </a:r>
+            <a:r>
+              <a:rPr lang="en-US" sz="900" b="1"/>
+              <a:t>reserve bank interest rate</a:t>
+            </a:r>
+            <a:r>
+              <a:rPr lang="en-US" sz="900"/>
+              <a:t>, we have observed </a:t>
+            </a:r>
+            <a:r>
+              <a:rPr lang="en-US" sz="900" b="1"/>
+              <a:t>weak New Zealand dollars VS US dollars</a:t>
+            </a:r>
+            <a:r>
+              <a:rPr lang="en-US" sz="900"/>
+              <a:t>. Thus make export of our products cheaper, therefore attracts more oversea purchases, subsequently we should also be able to observe an increase of freight transportation activities, oversea passage flights. </a:t>
+            </a:r>
+            <a:endParaRPr lang="en-US" sz="900"/>
+          </a:p>
+          <a:p>
+            <a:pPr lvl="1"/>
+            <a:r>
+              <a:rPr lang="en-US" sz="900"/>
+              <a:t>To stimulate general economic growth, government usually initiate major infrastructural projects like major road works, etc. Hence it is also anticipated that general road construction activities are increasing.</a:t>
+            </a:r>
+            <a:endParaRPr lang="en-US" sz="900"/>
           </a:p>
         </p:txBody>
       </p:sp>
@@ -6065,179 +6377,6 @@
 </p:sld>
 </file>
 
-<file path=ppt/slides/slide20.xml><?xml version="1.0" encoding="utf-8"?>
-<p:sld xmlns:a="http://schemas.openxmlformats.org/drawingml/2006/main" xmlns:r="http://schemas.openxmlformats.org/officeDocument/2006/relationships" xmlns:p="http://schemas.openxmlformats.org/presentationml/2006/main">
-  <p:cSld>
-    <p:spTree>
-      <p:nvGrpSpPr>
-        <p:cNvPr id="1" name=""/>
-        <p:cNvGrpSpPr/>
-        <p:nvPr/>
-      </p:nvGrpSpPr>
-      <p:grpSpPr>
-        <a:xfrm>
-          <a:off x="0" y="0"/>
-          <a:ext cx="0" cy="0"/>
-          <a:chOff x="0" y="0"/>
-          <a:chExt cx="0" cy="0"/>
-        </a:xfrm>
-      </p:grpSpPr>
-      <p:sp>
-        <p:nvSpPr>
-          <p:cNvPr id="5" name="Title 4"/>
-          <p:cNvSpPr>
-            <a:spLocks noGrp="1"/>
-          </p:cNvSpPr>
-          <p:nvPr>
-            <p:ph type="title"/>
-          </p:nvPr>
-        </p:nvSpPr>
-        <p:spPr/>
-        <p:txBody>
-          <a:bodyPr/>
-          <a:lstStyle/>
-          <a:p>
-            <a:endParaRPr lang="en-US"/>
-          </a:p>
-        </p:txBody>
-      </p:sp>
-      <p:sp>
-        <p:nvSpPr>
-          <p:cNvPr id="3" name="Content Placeholder 2"/>
-          <p:cNvSpPr>
-            <a:spLocks noGrp="1"/>
-          </p:cNvSpPr>
-          <p:nvPr>
-            <p:ph sz="half" idx="1"/>
-          </p:nvPr>
-        </p:nvSpPr>
-        <p:spPr/>
-        <p:txBody>
-          <a:bodyPr>
-            <a:noAutofit/>
-          </a:bodyPr>
-          <a:lstStyle/>
-          <a:p>
-            <a:r>
-              <a:rPr lang="en-US" sz="1800"/>
-              <a:t>When the economic activities are low and unemployment rate is high </a:t>
-            </a:r>
-            <a:endParaRPr lang="en-US" sz="1800"/>
-          </a:p>
-          <a:p>
-            <a:pPr lvl="1"/>
-            <a:r>
-              <a:rPr lang="en-US" sz="1600"/>
-              <a:t>New Zealand government is under pressure to unleash new monetary policies to stimulate economy. Hence government usually </a:t>
-            </a:r>
-            <a:r>
-              <a:rPr lang="en-US" sz="1600" b="1"/>
-              <a:t>resolve to lower reserve bank interest rate</a:t>
-            </a:r>
-            <a:r>
-              <a:rPr lang="en-US" sz="1600"/>
-              <a:t>. </a:t>
-            </a:r>
-            <a:endParaRPr lang="en-US" sz="1600"/>
-          </a:p>
-          <a:p>
-            <a:pPr lvl="1"/>
-            <a:r>
-              <a:rPr lang="en-US" sz="1600"/>
-              <a:t>With </a:t>
-            </a:r>
-            <a:r>
-              <a:rPr lang="en-US" sz="1600" b="1"/>
-              <a:t>high reserve bank interest rate</a:t>
-            </a:r>
-            <a:r>
-              <a:rPr lang="en-US" sz="1600"/>
-              <a:t>, we should be able to observe </a:t>
-            </a:r>
-            <a:r>
-              <a:rPr lang="en-US" sz="1600" b="1"/>
-              <a:t>weak New Zealand dollars VS US dollars</a:t>
-            </a:r>
-            <a:r>
-              <a:rPr lang="en-US" sz="1600"/>
-              <a:t>. Thus make export of our products cheaper, therefore attracts more oversea orders, subsequently we should be able to observe an increase of freight transportation activities, oversea passage flights. </a:t>
-            </a:r>
-            <a:endParaRPr lang="en-US" sz="1600"/>
-          </a:p>
-          <a:p>
-            <a:pPr lvl="1"/>
-            <a:r>
-              <a:rPr lang="en-US" sz="1600"/>
-              <a:t>To stimulate general economic growth, government usually starts major infrastructural projects like major road works, etc. Hence it is also anticipated that general road construction activities are increasing.</a:t>
-            </a:r>
-            <a:endParaRPr lang="en-US" sz="1600"/>
-          </a:p>
-        </p:txBody>
-      </p:sp>
-      <p:pic>
-        <p:nvPicPr>
-          <p:cNvPr id="4" name="Content Placeholder 3"/>
-          <p:cNvPicPr>
-            <a:picLocks noGrp="1" noChangeAspect="1"/>
-          </p:cNvPicPr>
-          <p:nvPr>
-            <p:ph sz="half" idx="2"/>
-          </p:nvPr>
-        </p:nvPicPr>
-        <p:blipFill>
-          <a:blip r:embed="rId1"/>
-          <a:stretch>
-            <a:fillRect/>
-          </a:stretch>
-        </p:blipFill>
-        <p:spPr>
-          <a:xfrm>
-            <a:off x="6665595" y="1264920"/>
-            <a:ext cx="4448175" cy="4772025"/>
-          </a:xfrm>
-          <a:prstGeom prst="rect">
-            <a:avLst/>
-          </a:prstGeom>
-        </p:spPr>
-      </p:pic>
-      <p:sp>
-        <p:nvSpPr>
-          <p:cNvPr id="6" name="Text Box 5"/>
-          <p:cNvSpPr txBox="1"/>
-          <p:nvPr/>
-        </p:nvSpPr>
-        <p:spPr>
-          <a:xfrm>
-            <a:off x="609600" y="6227445"/>
-            <a:ext cx="8583930" cy="306705"/>
-          </a:xfrm>
-          <a:prstGeom prst="rect">
-            <a:avLst/>
-          </a:prstGeom>
-          <a:noFill/>
-        </p:spPr>
-        <p:txBody>
-          <a:bodyPr wrap="square" rtlCol="0" anchor="t">
-            <a:spAutoFit/>
-          </a:bodyPr>
-          <a:lstStyle/>
-          <a:p>
-            <a:r>
-              <a:rPr lang="en-US" sz="1400"/>
-              <a:t>https://www.treasury.govt.nz/publications/weu/weekly-economic-update-17-april-2020-html</a:t>
-            </a:r>
-            <a:endParaRPr lang="en-US" sz="1400"/>
-          </a:p>
-        </p:txBody>
-      </p:sp>
-    </p:spTree>
-  </p:cSld>
-  <p:clrMapOvr>
-    <a:masterClrMapping/>
-  </p:clrMapOvr>
-</p:sld>
-</file>
-
 <file path=ppt/slides/slide3.xml><?xml version="1.0" encoding="utf-8"?>
 <p:sld xmlns:a="http://schemas.openxmlformats.org/drawingml/2006/main" xmlns:r="http://schemas.openxmlformats.org/officeDocument/2006/relationships" xmlns:p="http://schemas.openxmlformats.org/presentationml/2006/main">
   <p:cSld>
@@ -6814,6 +6953,9 @@
           <a:bodyPr/>
           <a:lstStyle/>
           <a:p>
+            <a:pPr marL="0" indent="0">
+              <a:buNone/>
+            </a:pPr>
             <a:r>
               <a:rPr lang="en-US"/>
               <a:t>Review of the hisotrical economic performance VS. policy</a:t>
@@ -6840,13 +6982,9 @@
             </a:r>
             <a:r>
               <a:rPr lang="en-US" sz="1000" b="1"/>
-              <a:t>Our target is to produce a well structured New Zealand economic dataset,</a:t>
-            </a:r>
-            <a:r>
-              <a:rPr lang="en-US" sz="1000"/>
-              <a:t> that is used to solve economic recession problem. (Output : collect vital NZ ecnoimic indicators for visualization and try to reveal the potential correlation between these indicators. )</a:t>
-            </a:r>
-            <a:endParaRPr lang="en-US" sz="1000"/>
+              <a:t>Our target is to produce a well structured New Zealand economic dataset</a:t>
+            </a:r>
+            <a:endParaRPr lang="en-US" sz="1000" b="1"/>
           </a:p>
           <a:p>
             <a:pPr marL="0" indent="0">
@@ -6860,7 +6998,7 @@
             </a:pPr>
             <a:r>
               <a:rPr lang="en-US" sz="1000"/>
-              <a:t>Critical review of the NZ monetary policy effectiveness. To coupe with covid-19 lockdown and sequence recession, slowing down to dealing. </a:t>
+              <a:t>Critical review of the NZ monetary policy effectiveness. </a:t>
             </a:r>
             <a:endParaRPr lang="en-US" sz="1000"/>
           </a:p>
@@ -6888,6 +7026,12 @@
             <a:pPr marL="0" indent="0">
               <a:buNone/>
             </a:pPr>
+            <a:endParaRPr lang="en-US" sz="1000"/>
+          </a:p>
+          <a:p>
+            <a:pPr marL="0" indent="0">
+              <a:buNone/>
+            </a:pPr>
             <a:r>
               <a:rPr lang="en-US" sz="1000"/>
               <a:t>The data source we are building is intended to be used for building (visualization) and training prediction model (machine learning) _time series, forecasting . for New Zealand companies. </a:t>
@@ -6936,10 +7080,6 @@
             <a:pPr marL="0" indent="0">
               <a:buNone/>
             </a:pPr>
-            <a:r>
-              <a:rPr lang="en-US" sz="1000"/>
-              <a:t>Should we include more overseas government data such Import Tax of China, US. Dollar CPI. Join these such data together, we are potentially able to produce a prediction mode trained with these historical data. Utilization of such prediction model will enable company to device forward strategies for increase or decrease production capabilities. Such company strategies will further enable its finance / accounting department on allocate investment budgets as well as income forecasting. Whether or not company should be hiring new employees and purchasing new equipment will depends upon such forward strategies.</a:t>
-            </a:r>
             <a:endParaRPr lang="en-US" sz="1000"/>
           </a:p>
         </p:txBody>
@@ -7007,8 +7147,8 @@
         </p:nvSpPr>
         <p:spPr>
           <a:xfrm>
-            <a:off x="8685530" y="2269490"/>
-            <a:ext cx="2978785" cy="2306955"/>
+            <a:off x="8552180" y="2269490"/>
+            <a:ext cx="3112135" cy="2306955"/>
           </a:xfrm>
           <a:prstGeom prst="rect">
             <a:avLst/>
@@ -7023,7 +7163,7 @@
           <a:p>
             <a:r>
               <a:rPr lang="en-US"/>
-              <a:t>Based on the data we have collected, machine learning / Artificial Intelligence Algorithms could be deployed to conduct prediction on Recession and subsequent corporate financial risk.</a:t>
+              <a:t>Based on the data we have collected, machine learning / Artificial Intelligence Algorithms could be deployed to conduct prediction on Recession and subsequent assess corporate financial risk.</a:t>
             </a:r>
             <a:endParaRPr lang="en-US"/>
           </a:p>

</xml_diff>

<commit_message>
Final version remove traffice plot
Final version of PPT removed traffic plot
</commit_message>
<xml_diff>
--- a/Group Project Presentation.pptx
+++ b/Group Project Presentation.pptx
@@ -14,18 +14,17 @@
     <p:sldId id="257" r:id="rId7"/>
     <p:sldId id="303" r:id="rId8"/>
     <p:sldId id="259" r:id="rId9"/>
-    <p:sldId id="288" r:id="rId10"/>
-    <p:sldId id="258" r:id="rId11"/>
-    <p:sldId id="304" r:id="rId12"/>
-    <p:sldId id="305" r:id="rId13"/>
-    <p:sldId id="307" r:id="rId14"/>
-    <p:sldId id="306" r:id="rId15"/>
-    <p:sldId id="261" r:id="rId16"/>
-    <p:sldId id="262" r:id="rId17"/>
-    <p:sldId id="297" r:id="rId18"/>
-    <p:sldId id="298" r:id="rId19"/>
-    <p:sldId id="264" r:id="rId20"/>
-    <p:sldId id="263" r:id="rId21"/>
+    <p:sldId id="258" r:id="rId10"/>
+    <p:sldId id="304" r:id="rId11"/>
+    <p:sldId id="305" r:id="rId12"/>
+    <p:sldId id="307" r:id="rId13"/>
+    <p:sldId id="306" r:id="rId14"/>
+    <p:sldId id="261" r:id="rId15"/>
+    <p:sldId id="262" r:id="rId16"/>
+    <p:sldId id="297" r:id="rId17"/>
+    <p:sldId id="298" r:id="rId18"/>
+    <p:sldId id="264" r:id="rId19"/>
+    <p:sldId id="263" r:id="rId20"/>
   </p:sldIdLst>
   <p:sldSz cx="12192000" cy="6858000"/>
   <p:notesSz cx="6858000" cy="9144000"/>
@@ -132,15 +131,6 @@
   <p:cmAuthor id="1" name="JeffreyC" initials="J" lastIdx="1" clrIdx="0"/>
   <p:cmAuthor id="2" name="Ali Surface" initials="AS" lastIdx="1" clrIdx="1"/>
 </p:cmAuthorLst>
-</file>
-
-<file path=ppt/comments/comment1.xml><?xml version="1.0" encoding="utf-8"?>
-<p:cmLst xmlns:a="http://schemas.openxmlformats.org/drawingml/2006/main" xmlns:r="http://schemas.openxmlformats.org/officeDocument/2006/relationships" xmlns:p="http://schemas.openxmlformats.org/presentationml/2006/main">
-  <p:cm authorId="1" dt="2022-10-18T22:14:41.755" idx="1">
-    <p:pos x="10" y="10"/>
-    <p:text/>
-  </p:cm>
-</p:cmLst>
 </file>
 
 <file path=ppt/notesMasters/notesMaster1.xml><?xml version="1.0" encoding="utf-8"?>
@@ -920,9 +910,14 @@
           <a:bodyPr/>
           <a:p>
             <a:r>
-              <a:rPr lang="en-US"/>
+              <a:rPr lang="en-US">
+                <a:sym typeface="+mn-ea"/>
+              </a:rPr>
               <a:t>AI is particularly helpful in corporate finance as it can better predict and assess loan risks. For companies looking to increase their value, AI technologies such as machine learning can help improve loan underwriting and reduce financial risk.</a:t>
             </a:r>
+            <a:endParaRPr lang="en-US"/>
+          </a:p>
+          <a:p>
             <a:endParaRPr lang="en-US"/>
           </a:p>
         </p:txBody>
@@ -4422,165 +4417,6 @@
           <a:p>
             <a:r>
               <a:rPr lang="en-US" dirty="0"/>
-              <a:t>Techniques and tools used</a:t>
-            </a:r>
-            <a:endParaRPr lang="en-US" dirty="0"/>
-          </a:p>
-        </p:txBody>
-      </p:sp>
-      <p:sp>
-        <p:nvSpPr>
-          <p:cNvPr id="3" name="Content Placeholder 2"/>
-          <p:cNvSpPr>
-            <a:spLocks noGrp="1"/>
-          </p:cNvSpPr>
-          <p:nvPr>
-            <p:ph sz="half" idx="1"/>
-          </p:nvPr>
-        </p:nvSpPr>
-        <p:spPr>
-          <a:xfrm>
-            <a:off x="609600" y="1174750"/>
-            <a:ext cx="10972800" cy="1900959"/>
-          </a:xfrm>
-        </p:spPr>
-        <p:txBody>
-          <a:bodyPr/>
-          <a:lstStyle/>
-          <a:p>
-            <a:pPr marL="0" indent="0">
-              <a:buNone/>
-            </a:pPr>
-            <a:r>
-              <a:rPr lang="en-NZ" sz="4000" u="sng" dirty="0"/>
-              <a:t>Techniques used:</a:t>
-            </a:r>
-            <a:endParaRPr lang="en-NZ" sz="4000" u="sng" dirty="0"/>
-          </a:p>
-          <a:p>
-            <a:r>
-              <a:rPr lang="en-NZ" dirty="0"/>
-              <a:t>Browser Automation</a:t>
-            </a:r>
-            <a:r>
-              <a:rPr lang="en-US" altLang="en-NZ" dirty="0"/>
-              <a:t>(R selenium)</a:t>
-            </a:r>
-            <a:endParaRPr lang="en-NZ" dirty="0"/>
-          </a:p>
-          <a:p>
-            <a:r>
-              <a:rPr lang="en-NZ" dirty="0"/>
-              <a:t>Scrapping</a:t>
-            </a:r>
-            <a:endParaRPr lang="en-NZ" dirty="0"/>
-          </a:p>
-          <a:p>
-            <a:r>
-              <a:rPr lang="en-US" altLang="en-NZ" dirty="0"/>
-              <a:t>API</a:t>
-            </a:r>
-            <a:endParaRPr lang="en-NZ" dirty="0"/>
-          </a:p>
-          <a:p>
-            <a:endParaRPr lang="en-NZ" dirty="0"/>
-          </a:p>
-        </p:txBody>
-      </p:sp>
-      <p:sp>
-        <p:nvSpPr>
-          <p:cNvPr id="5" name="Content Placeholder 4"/>
-          <p:cNvSpPr>
-            <a:spLocks noGrp="1"/>
-          </p:cNvSpPr>
-          <p:nvPr>
-            <p:ph sz="half" idx="2"/>
-          </p:nvPr>
-        </p:nvSpPr>
-        <p:spPr>
-          <a:xfrm>
-            <a:off x="609600" y="3865418"/>
-            <a:ext cx="10972800" cy="2262332"/>
-          </a:xfrm>
-        </p:spPr>
-        <p:txBody>
-          <a:bodyPr/>
-          <a:lstStyle/>
-          <a:p>
-            <a:pPr marL="0" indent="0">
-              <a:buNone/>
-            </a:pPr>
-            <a:r>
-              <a:rPr lang="en-NZ" sz="3200" u="sng" dirty="0"/>
-              <a:t>Tools used for scraping and automation:</a:t>
-            </a:r>
-            <a:endParaRPr lang="en-NZ" sz="3200" u="sng" dirty="0"/>
-          </a:p>
-          <a:p>
-            <a:r>
-              <a:rPr lang="en-NZ" dirty="0" err="1"/>
-              <a:t>rvest</a:t>
-            </a:r>
-            <a:endParaRPr lang="en-NZ" dirty="0"/>
-          </a:p>
-          <a:p>
-            <a:r>
-              <a:rPr lang="en-NZ" dirty="0" err="1"/>
-              <a:t>RSelenium</a:t>
-            </a:r>
-            <a:endParaRPr lang="en-NZ" dirty="0" err="1"/>
-          </a:p>
-          <a:p>
-            <a:r>
-              <a:rPr lang="en-US" altLang="en-NZ" dirty="0"/>
-              <a:t>etc..</a:t>
-            </a:r>
-            <a:endParaRPr lang="en-US" altLang="en-NZ" dirty="0"/>
-          </a:p>
-        </p:txBody>
-      </p:sp>
-    </p:spTree>
-  </p:cSld>
-  <p:clrMapOvr>
-    <a:masterClrMapping/>
-  </p:clrMapOvr>
-</p:sld>
-</file>
-
-<file path=ppt/slides/slide11.xml><?xml version="1.0" encoding="utf-8"?>
-<p:sld xmlns:a="http://schemas.openxmlformats.org/drawingml/2006/main" xmlns:r="http://schemas.openxmlformats.org/officeDocument/2006/relationships" xmlns:p="http://schemas.openxmlformats.org/presentationml/2006/main">
-  <p:cSld>
-    <p:spTree>
-      <p:nvGrpSpPr>
-        <p:cNvPr id="1" name=""/>
-        <p:cNvGrpSpPr/>
-        <p:nvPr/>
-      </p:nvGrpSpPr>
-      <p:grpSpPr>
-        <a:xfrm>
-          <a:off x="0" y="0"/>
-          <a:ext cx="0" cy="0"/>
-          <a:chOff x="0" y="0"/>
-          <a:chExt cx="0" cy="0"/>
-        </a:xfrm>
-      </p:grpSpPr>
-      <p:sp>
-        <p:nvSpPr>
-          <p:cNvPr id="10" name="Title 9"/>
-          <p:cNvSpPr>
-            <a:spLocks noGrp="1"/>
-          </p:cNvSpPr>
-          <p:nvPr>
-            <p:ph type="title"/>
-          </p:nvPr>
-        </p:nvSpPr>
-        <p:spPr/>
-        <p:txBody>
-          <a:bodyPr/>
-          <a:lstStyle/>
-          <a:p>
-            <a:r>
-              <a:rPr lang="en-US" dirty="0"/>
               <a:t>Resources used to get data</a:t>
             </a:r>
             <a:endParaRPr lang="en-US" dirty="0"/>
@@ -4618,7 +4454,7 @@
 </p:sld>
 </file>
 
-<file path=ppt/slides/slide12.xml><?xml version="1.0" encoding="utf-8"?>
+<file path=ppt/slides/slide11.xml><?xml version="1.0" encoding="utf-8"?>
 <p:sld xmlns:a="http://schemas.openxmlformats.org/drawingml/2006/main" xmlns:r="http://schemas.openxmlformats.org/officeDocument/2006/relationships" xmlns:p="http://schemas.openxmlformats.org/presentationml/2006/main">
   <p:cSld>
     <p:spTree>
@@ -4691,7 +4527,7 @@
 </p:sld>
 </file>
 
-<file path=ppt/slides/slide13.xml><?xml version="1.0" encoding="utf-8"?>
+<file path=ppt/slides/slide12.xml><?xml version="1.0" encoding="utf-8"?>
 <p:sld xmlns:a="http://schemas.openxmlformats.org/drawingml/2006/main" xmlns:r="http://schemas.openxmlformats.org/officeDocument/2006/relationships" xmlns:p="http://schemas.openxmlformats.org/presentationml/2006/main">
   <p:cSld>
     <p:spTree>
@@ -4811,7 +4647,7 @@
 </p:sld>
 </file>
 
-<file path=ppt/slides/slide14.xml><?xml version="1.0" encoding="utf-8"?>
+<file path=ppt/slides/slide13.xml><?xml version="1.0" encoding="utf-8"?>
 <p:sld xmlns:a="http://schemas.openxmlformats.org/drawingml/2006/main" xmlns:r="http://schemas.openxmlformats.org/officeDocument/2006/relationships" xmlns:p="http://schemas.openxmlformats.org/presentationml/2006/main">
   <p:cSld>
     <p:spTree>
@@ -4943,7 +4779,7 @@
 </p:sld>
 </file>
 
-<file path=ppt/slides/slide15.xml><?xml version="1.0" encoding="utf-8"?>
+<file path=ppt/slides/slide14.xml><?xml version="1.0" encoding="utf-8"?>
 <p:sld xmlns:a="http://schemas.openxmlformats.org/drawingml/2006/main" xmlns:r="http://schemas.openxmlformats.org/officeDocument/2006/relationships" xmlns:p="http://schemas.openxmlformats.org/presentationml/2006/main">
   <p:cSld>
     <p:spTree>
@@ -5077,7 +4913,7 @@
 </p:sld>
 </file>
 
-<file path=ppt/slides/slide16.xml><?xml version="1.0" encoding="utf-8"?>
+<file path=ppt/slides/slide15.xml><?xml version="1.0" encoding="utf-8"?>
 <p:sld xmlns:a="http://schemas.openxmlformats.org/drawingml/2006/main" xmlns:r="http://schemas.openxmlformats.org/officeDocument/2006/relationships" xmlns:p="http://schemas.openxmlformats.org/presentationml/2006/main">
   <p:cSld>
     <p:spTree>
@@ -5214,7 +5050,7 @@
 </p:sld>
 </file>
 
-<file path=ppt/slides/slide17.xml><?xml version="1.0" encoding="utf-8"?>
+<file path=ppt/slides/slide16.xml><?xml version="1.0" encoding="utf-8"?>
 <p:sld xmlns:a="http://schemas.openxmlformats.org/drawingml/2006/main" xmlns:r="http://schemas.openxmlformats.org/officeDocument/2006/relationships" xmlns:p="http://schemas.openxmlformats.org/presentationml/2006/main">
   <p:cSld>
     <p:bg>
@@ -5382,124 +5218,6 @@
               <a:t>6) Correlation between “OCR” and CPI</a:t>
             </a:r>
             <a:endParaRPr lang="en-US" sz="1200"/>
-          </a:p>
-        </p:txBody>
-      </p:sp>
-      <p:sp>
-        <p:nvSpPr>
-          <p:cNvPr id="12" name="Text Box 11"/>
-          <p:cNvSpPr txBox="1"/>
-          <p:nvPr/>
-        </p:nvSpPr>
-        <p:spPr>
-          <a:xfrm>
-            <a:off x="6844030" y="6290945"/>
-            <a:ext cx="3004820" cy="460375"/>
-          </a:xfrm>
-          <a:prstGeom prst="rect">
-            <a:avLst/>
-          </a:prstGeom>
-          <a:noFill/>
-        </p:spPr>
-        <p:txBody>
-          <a:bodyPr wrap="square" rtlCol="0">
-            <a:spAutoFit/>
-          </a:bodyPr>
-          <a:lstStyle/>
-          <a:p>
-            <a:r>
-              <a:rPr lang="en-US" sz="1200"/>
-              <a:t>7) Correlation between “OCR” and “State Highway Traffic Volumns”</a:t>
-            </a:r>
-            <a:endParaRPr lang="en-US" sz="1200"/>
-          </a:p>
-        </p:txBody>
-      </p:sp>
-      <p:sp>
-        <p:nvSpPr>
-          <p:cNvPr id="14" name="Text Box 13"/>
-          <p:cNvSpPr txBox="1"/>
-          <p:nvPr/>
-        </p:nvSpPr>
-        <p:spPr>
-          <a:xfrm>
-            <a:off x="232410" y="4177665"/>
-            <a:ext cx="1543050" cy="2245360"/>
-          </a:xfrm>
-          <a:prstGeom prst="rect">
-            <a:avLst/>
-          </a:prstGeom>
-          <a:noFill/>
-        </p:spPr>
-        <p:txBody>
-          <a:bodyPr wrap="square" rtlCol="0">
-            <a:spAutoFit/>
-          </a:bodyPr>
-          <a:lstStyle/>
-          <a:p>
-            <a:r>
-              <a:rPr lang="en-US" sz="1000"/>
-              <a:t>3) x axis (OCR from low to high value) : y axis (CPI from low to high value) </a:t>
-            </a:r>
-            <a:endParaRPr lang="en-US" sz="1000"/>
-          </a:p>
-          <a:p>
-            <a:r>
-              <a:rPr lang="en-US" sz="1000"/>
-              <a:t>[cut in the Official Cash Rate (OCR) leads to an increase in inflation and GDP growth]</a:t>
-            </a:r>
-            <a:endParaRPr lang="en-US" sz="1000"/>
-          </a:p>
-          <a:p>
-            <a:r>
-              <a:rPr lang="en-US" sz="1000"/>
-              <a:t>[References : https://www.rbnz.govt.nz/-/media/d0024c4168944dc6a502b497cdd5d46c.ashx]</a:t>
-            </a:r>
-            <a:endParaRPr lang="en-US" sz="1000"/>
-          </a:p>
-        </p:txBody>
-      </p:sp>
-      <p:sp>
-        <p:nvSpPr>
-          <p:cNvPr id="17" name="Text Box 16"/>
-          <p:cNvSpPr txBox="1"/>
-          <p:nvPr/>
-        </p:nvSpPr>
-        <p:spPr>
-          <a:xfrm>
-            <a:off x="9383395" y="4308475"/>
-            <a:ext cx="2458085" cy="953135"/>
-          </a:xfrm>
-          <a:prstGeom prst="rect">
-            <a:avLst/>
-          </a:prstGeom>
-          <a:noFill/>
-        </p:spPr>
-        <p:txBody>
-          <a:bodyPr wrap="square" rtlCol="0">
-            <a:spAutoFit/>
-          </a:bodyPr>
-          <a:lstStyle/>
-          <a:p>
-            <a:r>
-              <a:rPr lang="en-US" sz="800"/>
-              <a:t>[If we raise the OCR, banks' interest rates also tend to increase and vice versa. </a:t>
-            </a:r>
-            <a:endParaRPr lang="en-US" sz="800"/>
-          </a:p>
-          <a:p>
-            <a:r>
-              <a:rPr lang="en-US" sz="800"/>
-              <a:t>This is because the OCR influences the banks' costs, so as with any business, changes in costs are passed on in their prices. </a:t>
-            </a:r>
-            <a:endParaRPr lang="en-US" sz="800"/>
-          </a:p>
-          <a:p>
-            <a:r>
-              <a:rPr lang="en-US" sz="800"/>
-              <a:t>A decrease in banks' interest rates usually results in people spending more.]</a:t>
-            </a:r>
-            <a:endParaRPr lang="en-US" sz="800"/>
           </a:p>
         </p:txBody>
       </p:sp>
@@ -5615,35 +5333,6 @@
           </a:ln>
         </p:spPr>
       </p:pic>
-      <p:sp>
-        <p:nvSpPr>
-          <p:cNvPr id="18" name="Text Box 17"/>
-          <p:cNvSpPr txBox="1"/>
-          <p:nvPr/>
-        </p:nvSpPr>
-        <p:spPr>
-          <a:xfrm>
-            <a:off x="7208520" y="4462780"/>
-            <a:ext cx="2625725" cy="368300"/>
-          </a:xfrm>
-          <a:prstGeom prst="rect">
-            <a:avLst/>
-          </a:prstGeom>
-          <a:noFill/>
-        </p:spPr>
-        <p:txBody>
-          <a:bodyPr wrap="square" rtlCol="0">
-            <a:spAutoFit/>
-          </a:bodyPr>
-          <a:p>
-            <a:r>
-              <a:rPr lang="en-US"/>
-              <a:t>To be done...</a:t>
-            </a:r>
-            <a:endParaRPr lang="en-US"/>
-          </a:p>
-        </p:txBody>
-      </p:sp>
     </p:spTree>
   </p:cSld>
   <p:clrMapOvr>
@@ -5652,7 +5341,7 @@
 </p:sld>
 </file>
 
-<file path=ppt/slides/slide18.xml><?xml version="1.0" encoding="utf-8"?>
+<file path=ppt/slides/slide17.xml><?xml version="1.0" encoding="utf-8"?>
 <p:sld xmlns:a="http://schemas.openxmlformats.org/drawingml/2006/main" xmlns:r="http://schemas.openxmlformats.org/officeDocument/2006/relationships" xmlns:p="http://schemas.openxmlformats.org/presentationml/2006/main">
   <p:cSld>
     <p:spTree>
@@ -6616,14 +6305,6 @@
             <a:pPr lvl="1"/>
             <a:r>
               <a:rPr lang="en-US" sz="2400"/>
-              <a:t>Transporation (Air, Land...)</a:t>
-            </a:r>
-            <a:endParaRPr lang="en-US" sz="2400"/>
-          </a:p>
-          <a:p>
-            <a:pPr lvl="1"/>
-            <a:r>
-              <a:rPr lang="en-US" sz="2400"/>
               <a:t>Employment / Unemployment Rate</a:t>
             </a:r>
             <a:endParaRPr lang="en-US" sz="2400"/>
@@ -6910,12 +6591,7 @@
             <p:ph type="title"/>
           </p:nvPr>
         </p:nvSpPr>
-        <p:spPr>
-          <a:xfrm>
-            <a:off x="609600" y="112395"/>
-            <a:ext cx="10972800" cy="790575"/>
-          </a:xfrm>
-        </p:spPr>
+        <p:spPr/>
         <p:txBody>
           <a:bodyPr>
             <a:normAutofit fontScale="90000"/>
@@ -6945,7 +6621,7 @@
             <a:spLocks noGrp="1"/>
           </p:cNvSpPr>
           <p:nvPr>
-            <p:ph idx="1"/>
+            <p:ph sz="half" idx="1"/>
           </p:nvPr>
         </p:nvSpPr>
         <p:spPr/>
@@ -7034,7 +6710,15 @@
             </a:pPr>
             <a:r>
               <a:rPr lang="en-US" sz="1000"/>
-              <a:t>The data source we are building is intended to be used for building (visualization) and training prediction model (machine learning) _time series, forecasting . for New Zealand companies. </a:t>
+              <a:t>The data source we are building is intended to be used for building (visualization) and training </a:t>
+            </a:r>
+            <a:r>
+              <a:rPr lang="en-US" sz="1000" b="1"/>
+              <a:t>prediction model (machine learning)</a:t>
+            </a:r>
+            <a:r>
+              <a:rPr lang="en-US" sz="1000"/>
+              <a:t> time series, forecasting  for New Zealand companies. </a:t>
             </a:r>
             <a:endParaRPr lang="en-US" sz="1000"/>
           </a:p>
@@ -7050,7 +6734,7 @@
             </a:pPr>
             <a:r>
               <a:rPr lang="en-US" sz="1000"/>
-              <a:t>The potential user of our datasource are targeted to improve their company efficiency.</a:t>
+              <a:t>The potential user of our datasource are targeted to improve their company agility in the current turbulent market.</a:t>
             </a:r>
             <a:endParaRPr lang="en-US" sz="1000"/>
           </a:p>
@@ -7084,39 +6768,14 @@
           </a:p>
         </p:txBody>
       </p:sp>
-    </p:spTree>
-  </p:cSld>
-  <p:clrMapOvr>
-    <a:masterClrMapping/>
-  </p:clrMapOvr>
-</p:sld>
-</file>
-
-<file path=ppt/slides/slide7.xml><?xml version="1.0" encoding="utf-8"?>
-<p:sld xmlns:a="http://schemas.openxmlformats.org/drawingml/2006/main" xmlns:r="http://schemas.openxmlformats.org/officeDocument/2006/relationships" xmlns:p="http://schemas.openxmlformats.org/presentationml/2006/main">
-  <p:cSld>
-    <p:spTree>
-      <p:nvGrpSpPr>
-        <p:cNvPr id="1" name=""/>
-        <p:cNvGrpSpPr/>
-        <p:nvPr/>
-      </p:nvGrpSpPr>
-      <p:grpSpPr>
-        <a:xfrm>
-          <a:off x="0" y="0"/>
-          <a:ext cx="0" cy="0"/>
-          <a:chOff x="0" y="0"/>
-          <a:chExt cx="0" cy="0"/>
-        </a:xfrm>
-      </p:grpSpPr>
       <p:pic>
         <p:nvPicPr>
           <p:cNvPr id="109" name="Content Placeholder 108"/>
           <p:cNvPicPr>
-            <a:picLocks noGrp="1"/>
+            <a:picLocks noGrp="1" noChangeAspect="1"/>
           </p:cNvPicPr>
           <p:nvPr>
-            <p:ph idx="1"/>
+            <p:ph sz="half" idx="2"/>
           </p:nvPr>
         </p:nvPicPr>
         <p:blipFill>
@@ -7127,8 +6786,8 @@
         </p:blipFill>
         <p:spPr>
           <a:xfrm>
-            <a:off x="821055" y="2269490"/>
-            <a:ext cx="7397115" cy="3074035"/>
+            <a:off x="6499860" y="1381125"/>
+            <a:ext cx="5384800" cy="2443480"/>
           </a:xfrm>
           <a:prstGeom prst="rect">
             <a:avLst/>
@@ -7139,107 +6798,32 @@
           </a:ln>
         </p:spPr>
       </p:pic>
-      <p:sp>
-        <p:nvSpPr>
-          <p:cNvPr id="5" name="Text Box 4"/>
-          <p:cNvSpPr txBox="1"/>
+      <p:pic>
+        <p:nvPicPr>
+          <p:cNvPr id="100" name="Picture 99"/>
+          <p:cNvPicPr/>
           <p:nvPr/>
-        </p:nvSpPr>
+        </p:nvPicPr>
+        <p:blipFill>
+          <a:blip r:embed="rId2"/>
+          <a:stretch>
+            <a:fillRect/>
+          </a:stretch>
+        </p:blipFill>
         <p:spPr>
           <a:xfrm>
-            <a:off x="8552180" y="2269490"/>
-            <a:ext cx="3112135" cy="2306955"/>
+            <a:off x="6609080" y="4214495"/>
+            <a:ext cx="5165725" cy="2239645"/>
           </a:xfrm>
           <a:prstGeom prst="rect">
             <a:avLst/>
           </a:prstGeom>
           <a:noFill/>
+          <a:ln w="9525">
+            <a:noFill/>
+          </a:ln>
         </p:spPr>
-        <p:txBody>
-          <a:bodyPr wrap="square" rtlCol="0">
-            <a:spAutoFit/>
-          </a:bodyPr>
-          <a:lstStyle/>
-          <a:p>
-            <a:r>
-              <a:rPr lang="en-US"/>
-              <a:t>Based on the data we have collected, machine learning / Artificial Intelligence Algorithms could be deployed to conduct prediction on Recession and subsequent assess corporate financial risk.</a:t>
-            </a:r>
-            <a:endParaRPr lang="en-US"/>
-          </a:p>
-        </p:txBody>
-      </p:sp>
-      <p:sp>
-        <p:nvSpPr>
-          <p:cNvPr id="7" name="Title 6"/>
-          <p:cNvSpPr>
-            <a:spLocks noGrp="1"/>
-          </p:cNvSpPr>
-          <p:nvPr>
-            <p:ph type="title"/>
-          </p:nvPr>
-        </p:nvSpPr>
-        <p:spPr>
-          <a:xfrm>
-            <a:off x="609600" y="112395"/>
-            <a:ext cx="10972800" cy="790575"/>
-          </a:xfrm>
-        </p:spPr>
-        <p:txBody>
-          <a:bodyPr>
-            <a:normAutofit fontScale="90000"/>
-          </a:bodyPr>
-          <a:lstStyle/>
-          <a:p>
-            <a:pPr algn="r"/>
-            <a:r>
-              <a:rPr lang="en-US"/>
-              <a:t>What target you chose </a:t>
-            </a:r>
-            <a:br>
-              <a:rPr lang="en-US"/>
-            </a:br>
-            <a:r>
-              <a:rPr lang="en-US" sz="2700"/>
-              <a:t>(I.e.n what is the intended use of the data, …)</a:t>
-            </a:r>
-            <a:endParaRPr lang="en-US" sz="2700"/>
-          </a:p>
-        </p:txBody>
-      </p:sp>
-      <p:sp>
-        <p:nvSpPr>
-          <p:cNvPr id="2" name="Text Box 1"/>
-          <p:cNvSpPr txBox="1"/>
-          <p:nvPr/>
-        </p:nvSpPr>
-        <p:spPr>
-          <a:xfrm>
-            <a:off x="821055" y="1425575"/>
-            <a:ext cx="9701530" cy="460375"/>
-          </a:xfrm>
-          <a:prstGeom prst="rect">
-            <a:avLst/>
-          </a:prstGeom>
-          <a:noFill/>
-        </p:spPr>
-        <p:txBody>
-          <a:bodyPr wrap="none" rtlCol="0" anchor="t">
-            <a:spAutoFit/>
-          </a:bodyPr>
-          <a:p>
-            <a:r>
-              <a:rPr lang="en-US" sz="2400">
-                <a:sym typeface="+mn-ea"/>
-              </a:rPr>
-              <a:t>Potential to build AI / machine learning algorithm for further forecast ... </a:t>
-            </a:r>
-            <a:endParaRPr lang="en-US" sz="2400">
-              <a:sym typeface="+mn-ea"/>
-            </a:endParaRPr>
-          </a:p>
-        </p:txBody>
-      </p:sp>
+      </p:pic>
     </p:spTree>
   </p:cSld>
   <p:clrMapOvr>
@@ -7248,7 +6832,7 @@
 </p:sld>
 </file>
 
-<file path=ppt/slides/slide8.xml><?xml version="1.0" encoding="utf-8"?>
+<file path=ppt/slides/slide7.xml><?xml version="1.0" encoding="utf-8"?>
 <p:sld xmlns:a="http://schemas.openxmlformats.org/drawingml/2006/main" xmlns:r="http://schemas.openxmlformats.org/officeDocument/2006/relationships" xmlns:p="http://schemas.openxmlformats.org/presentationml/2006/main">
   <p:cSld>
     <p:spTree>
@@ -7370,6 +6954,112 @@
 </p:sld>
 </file>
 
+<file path=ppt/slides/slide8.xml><?xml version="1.0" encoding="utf-8"?>
+<p:sld xmlns:a="http://schemas.openxmlformats.org/drawingml/2006/main" xmlns:r="http://schemas.openxmlformats.org/officeDocument/2006/relationships" xmlns:p="http://schemas.openxmlformats.org/presentationml/2006/main">
+  <p:cSld>
+    <p:spTree>
+      <p:nvGrpSpPr>
+        <p:cNvPr id="1" name=""/>
+        <p:cNvGrpSpPr/>
+        <p:nvPr/>
+      </p:nvGrpSpPr>
+      <p:grpSpPr>
+        <a:xfrm>
+          <a:off x="0" y="0"/>
+          <a:ext cx="0" cy="0"/>
+          <a:chOff x="0" y="0"/>
+          <a:chExt cx="0" cy="0"/>
+        </a:xfrm>
+      </p:grpSpPr>
+      <p:sp>
+        <p:nvSpPr>
+          <p:cNvPr id="10" name="Title 9"/>
+          <p:cNvSpPr>
+            <a:spLocks noGrp="1"/>
+          </p:cNvSpPr>
+          <p:nvPr>
+            <p:ph type="title"/>
+          </p:nvPr>
+        </p:nvSpPr>
+        <p:spPr/>
+        <p:txBody>
+          <a:bodyPr/>
+          <a:lstStyle/>
+          <a:p>
+            <a:r>
+              <a:rPr lang="en-US" dirty="0"/>
+              <a:t>Resources used to get data</a:t>
+            </a:r>
+            <a:endParaRPr lang="en-US" dirty="0"/>
+          </a:p>
+        </p:txBody>
+      </p:sp>
+      <p:sp>
+        <p:nvSpPr>
+          <p:cNvPr id="3" name="Content Placeholder 2"/>
+          <p:cNvSpPr>
+            <a:spLocks noGrp="1"/>
+          </p:cNvSpPr>
+          <p:nvPr>
+            <p:ph sz="half" idx="1"/>
+          </p:nvPr>
+        </p:nvSpPr>
+        <p:spPr>
+          <a:xfrm>
+            <a:off x="609599" y="1773382"/>
+            <a:ext cx="11056883" cy="3255818"/>
+          </a:xfrm>
+        </p:spPr>
+        <p:txBody>
+          <a:bodyPr/>
+          <a:lstStyle/>
+          <a:p>
+            <a:pPr marL="0" indent="0">
+              <a:buNone/>
+            </a:pPr>
+            <a:r>
+              <a:rPr lang="en-NZ" sz="4000" u="sng" dirty="0"/>
+              <a:t>Data Sources used:</a:t>
+            </a:r>
+            <a:endParaRPr lang="en-NZ" sz="4000" dirty="0"/>
+          </a:p>
+          <a:p>
+            <a:endParaRPr lang="en-NZ" sz="2400" dirty="0"/>
+          </a:p>
+          <a:p>
+            <a:r>
+              <a:rPr lang="en-NZ" sz="2400" dirty="0"/>
+              <a:t>https://infoshare.stats.govt.nz</a:t>
+            </a:r>
+            <a:endParaRPr lang="en-NZ" sz="2400" dirty="0"/>
+          </a:p>
+          <a:p>
+            <a:r>
+              <a:rPr lang="en-NZ" sz="2400" dirty="0"/>
+              <a:t>https://www.interest.co.nz/chart-data/get-csv-data</a:t>
+            </a:r>
+            <a:endParaRPr lang="en-NZ" sz="2400" dirty="0"/>
+          </a:p>
+          <a:p>
+            <a:r>
+              <a:rPr lang="en-NZ" sz="2400" dirty="0"/>
+              <a:t>https://api.ofx.com/PublicSite.ApiService//SpotRateHistory/allTime/NZD/CNY</a:t>
+            </a:r>
+            <a:endParaRPr lang="en-NZ" sz="2400" dirty="0"/>
+          </a:p>
+          <a:p>
+            <a:endParaRPr lang="en-NZ" sz="2400" dirty="0"/>
+          </a:p>
+        </p:txBody>
+      </p:sp>
+    </p:spTree>
+  </p:cSld>
+  <p:clrMapOvr>
+    <a:masterClrMapping/>
+  </p:clrMapOvr>
+</p:sld>
+</file>
+
 <file path=ppt/slides/slide9.xml><?xml version="1.0" encoding="utf-8"?>
 <p:sld xmlns:a="http://schemas.openxmlformats.org/drawingml/2006/main" xmlns:r="http://schemas.openxmlformats.org/officeDocument/2006/relationships" xmlns:p="http://schemas.openxmlformats.org/presentationml/2006/main">
   <p:cSld>
@@ -7404,7 +7094,7 @@
           <a:p>
             <a:r>
               <a:rPr lang="en-US" dirty="0"/>
-              <a:t>Resources used to get data</a:t>
+              <a:t>Techniques and tools used</a:t>
             </a:r>
             <a:endParaRPr lang="en-US" dirty="0"/>
           </a:p>
@@ -7422,8 +7112,8 @@
         </p:nvSpPr>
         <p:spPr>
           <a:xfrm>
-            <a:off x="609599" y="1773382"/>
-            <a:ext cx="11056883" cy="3255818"/>
+            <a:off x="609600" y="1174750"/>
+            <a:ext cx="10972800" cy="1900959"/>
           </a:xfrm>
         </p:spPr>
         <p:txBody>
@@ -7435,36 +7125,89 @@
             </a:pPr>
             <a:r>
               <a:rPr lang="en-NZ" sz="4000" u="sng" dirty="0"/>
-              <a:t>Data Sources used:</a:t>
-            </a:r>
-            <a:endParaRPr lang="en-NZ" sz="4000" dirty="0"/>
-          </a:p>
-          <a:p>
-            <a:endParaRPr lang="en-NZ" sz="2400" dirty="0"/>
-          </a:p>
-          <a:p>
-            <a:r>
-              <a:rPr lang="en-NZ" sz="2400" dirty="0"/>
-              <a:t>https://infoshare.stats.govt.nz</a:t>
-            </a:r>
-            <a:endParaRPr lang="en-NZ" sz="2400" dirty="0"/>
-          </a:p>
-          <a:p>
-            <a:r>
-              <a:rPr lang="en-NZ" sz="2400" dirty="0"/>
-              <a:t>https://www.interest.co.nz/chart-data/get-csv-data</a:t>
-            </a:r>
-            <a:endParaRPr lang="en-NZ" sz="2400" dirty="0"/>
-          </a:p>
-          <a:p>
-            <a:r>
-              <a:rPr lang="en-NZ" sz="2400" dirty="0"/>
-              <a:t>https://api.ofx.com/PublicSite.ApiService//SpotRateHistory/allTime/NZD/CNY</a:t>
-            </a:r>
-            <a:endParaRPr lang="en-NZ" sz="2400" dirty="0"/>
-          </a:p>
-          <a:p>
-            <a:endParaRPr lang="en-NZ" sz="2400" dirty="0"/>
+              <a:t>Techniques used:</a:t>
+            </a:r>
+            <a:endParaRPr lang="en-NZ" sz="4000" u="sng" dirty="0"/>
+          </a:p>
+          <a:p>
+            <a:r>
+              <a:rPr lang="en-NZ" dirty="0"/>
+              <a:t>Browser Automation</a:t>
+            </a:r>
+            <a:r>
+              <a:rPr lang="en-US" altLang="en-NZ" dirty="0"/>
+              <a:t>(R selenium)</a:t>
+            </a:r>
+            <a:endParaRPr lang="en-NZ" dirty="0"/>
+          </a:p>
+          <a:p>
+            <a:r>
+              <a:rPr lang="en-NZ" dirty="0"/>
+              <a:t>Scrapping</a:t>
+            </a:r>
+            <a:endParaRPr lang="en-NZ" dirty="0"/>
+          </a:p>
+          <a:p>
+            <a:r>
+              <a:rPr lang="en-US" altLang="en-NZ" dirty="0"/>
+              <a:t>API</a:t>
+            </a:r>
+            <a:endParaRPr lang="en-NZ" dirty="0"/>
+          </a:p>
+          <a:p>
+            <a:endParaRPr lang="en-NZ" dirty="0"/>
+          </a:p>
+        </p:txBody>
+      </p:sp>
+      <p:sp>
+        <p:nvSpPr>
+          <p:cNvPr id="5" name="Content Placeholder 4"/>
+          <p:cNvSpPr>
+            <a:spLocks noGrp="1"/>
+          </p:cNvSpPr>
+          <p:nvPr>
+            <p:ph sz="half" idx="2"/>
+          </p:nvPr>
+        </p:nvSpPr>
+        <p:spPr>
+          <a:xfrm>
+            <a:off x="609600" y="3865418"/>
+            <a:ext cx="10972800" cy="2262332"/>
+          </a:xfrm>
+        </p:spPr>
+        <p:txBody>
+          <a:bodyPr/>
+          <a:lstStyle/>
+          <a:p>
+            <a:pPr marL="0" indent="0">
+              <a:buNone/>
+            </a:pPr>
+            <a:r>
+              <a:rPr lang="en-NZ" sz="3200" u="sng" dirty="0"/>
+              <a:t>Tools used for scraping and automation:</a:t>
+            </a:r>
+            <a:endParaRPr lang="en-NZ" sz="3200" u="sng" dirty="0"/>
+          </a:p>
+          <a:p>
+            <a:r>
+              <a:rPr lang="en-NZ" dirty="0" err="1"/>
+              <a:t>rvest</a:t>
+            </a:r>
+            <a:endParaRPr lang="en-NZ" dirty="0"/>
+          </a:p>
+          <a:p>
+            <a:r>
+              <a:rPr lang="en-NZ" dirty="0" err="1"/>
+              <a:t>RSelenium</a:t>
+            </a:r>
+            <a:endParaRPr lang="en-NZ" dirty="0" err="1"/>
+          </a:p>
+          <a:p>
+            <a:r>
+              <a:rPr lang="en-US" altLang="en-NZ" dirty="0"/>
+              <a:t>etc..</a:t>
+            </a:r>
+            <a:endParaRPr lang="en-US" altLang="en-NZ" dirty="0"/>
           </a:p>
         </p:txBody>
       </p:sp>

</xml_diff>